<commit_message>
Some new code added
</commit_message>
<xml_diff>
--- a/ppt/aria.pptx
+++ b/ppt/aria.pptx
@@ -5,29 +5,33 @@
     <p:sldMasterId id="2147483648" r:id="rId1"/>
   </p:sldMasterIdLst>
   <p:notesMasterIdLst>
-    <p:notesMasterId r:id="rId19"/>
+    <p:notesMasterId r:id="rId23"/>
   </p:notesMasterIdLst>
   <p:handoutMasterIdLst>
-    <p:handoutMasterId r:id="rId20"/>
+    <p:handoutMasterId r:id="rId24"/>
   </p:handoutMasterIdLst>
   <p:sldIdLst>
     <p:sldId id="259" r:id="rId2"/>
     <p:sldId id="281" r:id="rId3"/>
     <p:sldId id="308" r:id="rId4"/>
     <p:sldId id="310" r:id="rId5"/>
-    <p:sldId id="304" r:id="rId6"/>
-    <p:sldId id="303" r:id="rId7"/>
-    <p:sldId id="311" r:id="rId8"/>
-    <p:sldId id="306" r:id="rId9"/>
-    <p:sldId id="300" r:id="rId10"/>
+    <p:sldId id="303" r:id="rId6"/>
+    <p:sldId id="304" r:id="rId7"/>
+    <p:sldId id="319" r:id="rId8"/>
+    <p:sldId id="311" r:id="rId9"/>
+    <p:sldId id="306" r:id="rId10"/>
     <p:sldId id="313" r:id="rId11"/>
     <p:sldId id="309" r:id="rId12"/>
     <p:sldId id="312" r:id="rId13"/>
     <p:sldId id="314" r:id="rId14"/>
     <p:sldId id="307" r:id="rId15"/>
     <p:sldId id="315" r:id="rId16"/>
-    <p:sldId id="292" r:id="rId17"/>
-    <p:sldId id="277" r:id="rId18"/>
+    <p:sldId id="300" r:id="rId17"/>
+    <p:sldId id="316" r:id="rId18"/>
+    <p:sldId id="317" r:id="rId19"/>
+    <p:sldId id="318" r:id="rId20"/>
+    <p:sldId id="292" r:id="rId21"/>
+    <p:sldId id="277" r:id="rId22"/>
   </p:sldIdLst>
   <p:sldSz cx="9144000" cy="6858000" type="screen4x3"/>
   <p:notesSz cx="6858000" cy="9144000"/>
@@ -135,21 +139,25 @@
             <p14:sldId id="281"/>
             <p14:sldId id="308"/>
             <p14:sldId id="310"/>
-            <p14:sldId id="304"/>
           </p14:sldIdLst>
         </p14:section>
         <p14:section name="Topics" id="{ABA716BF-3A5C-4ADB-94C9-CFEF84EBA240}">
           <p14:sldIdLst>
             <p14:sldId id="303"/>
+            <p14:sldId id="304"/>
+            <p14:sldId id="319"/>
             <p14:sldId id="311"/>
             <p14:sldId id="306"/>
-            <p14:sldId id="300"/>
             <p14:sldId id="313"/>
             <p14:sldId id="309"/>
             <p14:sldId id="312"/>
             <p14:sldId id="314"/>
             <p14:sldId id="307"/>
             <p14:sldId id="315"/>
+            <p14:sldId id="300"/>
+            <p14:sldId id="316"/>
+            <p14:sldId id="317"/>
+            <p14:sldId id="318"/>
             <p14:sldId id="292"/>
           </p14:sldIdLst>
         </p14:section>
@@ -1404,7 +1412,7 @@
           <a:bodyPr/>
           <a:lstStyle/>
           <a:p>
-            <a:endParaRPr lang="en-US"/>
+            <a:endParaRPr lang="en-US" dirty="0"/>
           </a:p>
         </p:txBody>
       </p:sp>
@@ -1424,19 +1432,11 @@
           <a:lstStyle/>
           <a:p>
             <a:fld id="{75693FD4-8F83-4EF7-AC3F-0DC0388986B0}" type="slidenum">
-              <a:rPr lang="en-US" smtClean="0">
-                <a:solidFill>
-                  <a:prstClr val="black"/>
-                </a:solidFill>
-              </a:rPr>
+              <a:rPr lang="en-US" smtClean="0"/>
               <a:pPr/>
               <a:t>16</a:t>
             </a:fld>
-            <a:endParaRPr lang="en-US">
-              <a:solidFill>
-                <a:prstClr val="black"/>
-              </a:solidFill>
-            </a:endParaRPr>
+            <a:endParaRPr lang="en-US"/>
           </a:p>
         </p:txBody>
       </p:sp>
@@ -1467,128 +1467,318 @@
       </p:grpSpPr>
       <p:sp>
         <p:nvSpPr>
-          <p:cNvPr id="41986" name="Rectangle 23"/>
-          <p:cNvSpPr>
-            <a:spLocks noGrp="1" noChangeArrowheads="1"/>
-          </p:cNvSpPr>
-          <p:nvPr>
-            <p:ph type="hdr" sz="quarter"/>
-          </p:nvPr>
-        </p:nvSpPr>
-        <p:spPr>
-          <a:noFill/>
-        </p:spPr>
+          <p:cNvPr id="2" name="Slide Image Placeholder 1"/>
+          <p:cNvSpPr>
+            <a:spLocks noGrp="1" noRot="1" noChangeAspect="1"/>
+          </p:cNvSpPr>
+          <p:nvPr>
+            <p:ph type="sldImg"/>
+          </p:nvPr>
+        </p:nvSpPr>
+        <p:spPr/>
+      </p:sp>
+      <p:sp>
+        <p:nvSpPr>
+          <p:cNvPr id="3" name="Notes Placeholder 2"/>
+          <p:cNvSpPr>
+            <a:spLocks noGrp="1"/>
+          </p:cNvSpPr>
+          <p:nvPr>
+            <p:ph type="body" idx="1"/>
+          </p:nvPr>
+        </p:nvSpPr>
+        <p:spPr/>
         <p:txBody>
           <a:bodyPr/>
           <a:lstStyle/>
           <a:p>
-            <a:r>
-              <a:rPr lang="en-US" dirty="0" smtClean="0"/>
-              <a:t>Microsoft </a:t>
-            </a:r>
-            <a:r>
-              <a:rPr lang="en-US" b="1" dirty="0" smtClean="0"/>
-              <a:t>Engineering Excellence</a:t>
-            </a:r>
-            <a:endParaRPr lang="en-US" dirty="0" smtClean="0"/>
-          </a:p>
-        </p:txBody>
-      </p:sp>
-      <p:sp>
-        <p:nvSpPr>
-          <p:cNvPr id="41987" name="Rectangle 25"/>
-          <p:cNvSpPr>
-            <a:spLocks noGrp="1" noChangeArrowheads="1"/>
-          </p:cNvSpPr>
-          <p:nvPr>
-            <p:ph type="ftr" sz="quarter" idx="4"/>
-          </p:nvPr>
-        </p:nvSpPr>
-        <p:spPr>
-          <a:noFill/>
-        </p:spPr>
+            <a:endParaRPr lang="en-US" dirty="0"/>
+          </a:p>
+        </p:txBody>
+      </p:sp>
+      <p:sp>
+        <p:nvSpPr>
+          <p:cNvPr id="4" name="Slide Number Placeholder 3"/>
+          <p:cNvSpPr>
+            <a:spLocks noGrp="1"/>
+          </p:cNvSpPr>
+          <p:nvPr>
+            <p:ph type="sldNum" sz="quarter" idx="10"/>
+          </p:nvPr>
+        </p:nvSpPr>
+        <p:spPr/>
         <p:txBody>
           <a:bodyPr/>
           <a:lstStyle/>
           <a:p>
-            <a:r>
-              <a:rPr lang="en-US" dirty="0" smtClean="0"/>
-              <a:t>Microsoft Confidential</a:t>
-            </a:r>
-          </a:p>
-        </p:txBody>
-      </p:sp>
-      <p:sp>
-        <p:nvSpPr>
-          <p:cNvPr id="41988" name="Rectangle 26"/>
-          <p:cNvSpPr>
-            <a:spLocks noGrp="1" noChangeArrowheads="1"/>
-          </p:cNvSpPr>
-          <p:nvPr>
-            <p:ph type="sldNum" sz="quarter" idx="5"/>
-          </p:nvPr>
-        </p:nvSpPr>
-        <p:spPr>
-          <a:noFill/>
-        </p:spPr>
-        <p:txBody>
-          <a:bodyPr/>
-          <a:lstStyle/>
-          <a:p>
-            <a:fld id="{B2B44A5F-6CE4-493C-A0D7-6834FF76660C}" type="slidenum">
+            <a:fld id="{75693FD4-8F83-4EF7-AC3F-0DC0388986B0}" type="slidenum">
               <a:rPr lang="en-US" smtClean="0"/>
               <a:pPr/>
               <a:t>17</a:t>
             </a:fld>
-            <a:endParaRPr lang="en-US" dirty="0" smtClean="0"/>
-          </a:p>
-        </p:txBody>
-      </p:sp>
-      <p:sp>
-        <p:nvSpPr>
-          <p:cNvPr id="41989" name="Rectangle 2"/>
-          <p:cNvSpPr>
-            <a:spLocks noGrp="1" noRot="1" noChangeAspect="1" noChangeArrowheads="1" noTextEdit="1"/>
+            <a:endParaRPr lang="en-US"/>
+          </a:p>
+        </p:txBody>
+      </p:sp>
+    </p:spTree>
+  </p:cSld>
+  <p:clrMapOvr>
+    <a:masterClrMapping/>
+  </p:clrMapOvr>
+</p:notes>
+</file>
+
+<file path=ppt/notesSlides/notesSlide17.xml><?xml version="1.0" encoding="utf-8"?>
+<p:notes xmlns:a="http://schemas.openxmlformats.org/drawingml/2006/main" xmlns:r="http://schemas.openxmlformats.org/officeDocument/2006/relationships" xmlns:p="http://schemas.openxmlformats.org/presentationml/2006/main">
+  <p:cSld>
+    <p:spTree>
+      <p:nvGrpSpPr>
+        <p:cNvPr id="1" name=""/>
+        <p:cNvGrpSpPr/>
+        <p:nvPr/>
+      </p:nvGrpSpPr>
+      <p:grpSpPr>
+        <a:xfrm>
+          <a:off x="0" y="0"/>
+          <a:ext cx="0" cy="0"/>
+          <a:chOff x="0" y="0"/>
+          <a:chExt cx="0" cy="0"/>
+        </a:xfrm>
+      </p:grpSpPr>
+      <p:sp>
+        <p:nvSpPr>
+          <p:cNvPr id="2" name="Slide Image Placeholder 1"/>
+          <p:cNvSpPr>
+            <a:spLocks noGrp="1" noRot="1" noChangeAspect="1"/>
           </p:cNvSpPr>
           <p:nvPr>
             <p:ph type="sldImg"/>
           </p:nvPr>
         </p:nvSpPr>
-        <p:spPr>
-          <a:xfrm>
-            <a:off x="1143000" y="450850"/>
-            <a:ext cx="4572000" cy="3429000"/>
-          </a:xfrm>
-          <a:ln/>
-        </p:spPr>
-      </p:sp>
-      <p:sp>
-        <p:nvSpPr>
-          <p:cNvPr id="41990" name="Rectangle 3"/>
-          <p:cNvSpPr>
-            <a:spLocks noGrp="1" noChangeArrowheads="1"/>
+        <p:spPr/>
+      </p:sp>
+      <p:sp>
+        <p:nvSpPr>
+          <p:cNvPr id="3" name="Notes Placeholder 2"/>
+          <p:cNvSpPr>
+            <a:spLocks noGrp="1"/>
           </p:cNvSpPr>
           <p:nvPr>
             <p:ph type="body" idx="1"/>
           </p:nvPr>
         </p:nvSpPr>
-        <p:spPr>
-          <a:xfrm>
-            <a:off x="307492" y="4130104"/>
-            <a:ext cx="6261652" cy="4554823"/>
-          </a:xfrm>
-          <a:noFill/>
-          <a:ln/>
-        </p:spPr>
-        <p:txBody>
-          <a:bodyPr/>
+        <p:spPr/>
+        <p:txBody>
+          <a:bodyPr>
+            <a:normAutofit/>
+          </a:bodyPr>
           <a:lstStyle/>
           <a:p>
             <a:pPr>
-              <a:buFontTx/>
-              <a:buNone/>
+              <a:lnSpc>
+                <a:spcPct val="80000"/>
+              </a:lnSpc>
             </a:pPr>
             <a:endParaRPr lang="en-US" dirty="0" smtClean="0"/>
+          </a:p>
+        </p:txBody>
+      </p:sp>
+      <p:sp>
+        <p:nvSpPr>
+          <p:cNvPr id="4" name="Slide Number Placeholder 3"/>
+          <p:cNvSpPr>
+            <a:spLocks noGrp="1"/>
+          </p:cNvSpPr>
+          <p:nvPr>
+            <p:ph type="sldNum" sz="quarter" idx="10"/>
+          </p:nvPr>
+        </p:nvSpPr>
+        <p:spPr/>
+        <p:txBody>
+          <a:bodyPr/>
+          <a:lstStyle/>
+          <a:p>
+            <a:fld id="{EC6EAC7D-5A89-47C2-8ABA-56C9C2DEF7A4}" type="slidenum">
+              <a:rPr lang="en-US" smtClean="0"/>
+              <a:pPr/>
+              <a:t>18</a:t>
+            </a:fld>
+            <a:endParaRPr lang="en-US"/>
+          </a:p>
+        </p:txBody>
+      </p:sp>
+    </p:spTree>
+  </p:cSld>
+  <p:clrMapOvr>
+    <a:masterClrMapping/>
+  </p:clrMapOvr>
+</p:notes>
+</file>
+
+<file path=ppt/notesSlides/notesSlide18.xml><?xml version="1.0" encoding="utf-8"?>
+<p:notes xmlns:a="http://schemas.openxmlformats.org/drawingml/2006/main" xmlns:r="http://schemas.openxmlformats.org/officeDocument/2006/relationships" xmlns:p="http://schemas.openxmlformats.org/presentationml/2006/main">
+  <p:cSld>
+    <p:spTree>
+      <p:nvGrpSpPr>
+        <p:cNvPr id="1" name=""/>
+        <p:cNvGrpSpPr/>
+        <p:nvPr/>
+      </p:nvGrpSpPr>
+      <p:grpSpPr>
+        <a:xfrm>
+          <a:off x="0" y="0"/>
+          <a:ext cx="0" cy="0"/>
+          <a:chOff x="0" y="0"/>
+          <a:chExt cx="0" cy="0"/>
+        </a:xfrm>
+      </p:grpSpPr>
+      <p:sp>
+        <p:nvSpPr>
+          <p:cNvPr id="2" name="Slide Image Placeholder 1"/>
+          <p:cNvSpPr>
+            <a:spLocks noGrp="1" noRot="1" noChangeAspect="1"/>
+          </p:cNvSpPr>
+          <p:nvPr>
+            <p:ph type="sldImg"/>
+          </p:nvPr>
+        </p:nvSpPr>
+        <p:spPr/>
+      </p:sp>
+      <p:sp>
+        <p:nvSpPr>
+          <p:cNvPr id="3" name="Notes Placeholder 2"/>
+          <p:cNvSpPr>
+            <a:spLocks noGrp="1"/>
+          </p:cNvSpPr>
+          <p:nvPr>
+            <p:ph type="body" idx="1"/>
+          </p:nvPr>
+        </p:nvSpPr>
+        <p:spPr/>
+        <p:txBody>
+          <a:bodyPr>
+            <a:normAutofit/>
+          </a:bodyPr>
+          <a:lstStyle/>
+          <a:p>
+            <a:pPr>
+              <a:lnSpc>
+                <a:spcPct val="80000"/>
+              </a:lnSpc>
+            </a:pPr>
+            <a:endParaRPr lang="en-US" dirty="0" smtClean="0"/>
+          </a:p>
+        </p:txBody>
+      </p:sp>
+      <p:sp>
+        <p:nvSpPr>
+          <p:cNvPr id="4" name="Slide Number Placeholder 3"/>
+          <p:cNvSpPr>
+            <a:spLocks noGrp="1"/>
+          </p:cNvSpPr>
+          <p:nvPr>
+            <p:ph type="sldNum" sz="quarter" idx="10"/>
+          </p:nvPr>
+        </p:nvSpPr>
+        <p:spPr/>
+        <p:txBody>
+          <a:bodyPr/>
+          <a:lstStyle/>
+          <a:p>
+            <a:fld id="{EC6EAC7D-5A89-47C2-8ABA-56C9C2DEF7A4}" type="slidenum">
+              <a:rPr lang="en-US" smtClean="0"/>
+              <a:pPr/>
+              <a:t>19</a:t>
+            </a:fld>
+            <a:endParaRPr lang="en-US"/>
+          </a:p>
+        </p:txBody>
+      </p:sp>
+    </p:spTree>
+  </p:cSld>
+  <p:clrMapOvr>
+    <a:masterClrMapping/>
+  </p:clrMapOvr>
+</p:notes>
+</file>
+
+<file path=ppt/notesSlides/notesSlide19.xml><?xml version="1.0" encoding="utf-8"?>
+<p:notes xmlns:a="http://schemas.openxmlformats.org/drawingml/2006/main" xmlns:r="http://schemas.openxmlformats.org/officeDocument/2006/relationships" xmlns:p="http://schemas.openxmlformats.org/presentationml/2006/main">
+  <p:cSld>
+    <p:spTree>
+      <p:nvGrpSpPr>
+        <p:cNvPr id="1" name=""/>
+        <p:cNvGrpSpPr/>
+        <p:nvPr/>
+      </p:nvGrpSpPr>
+      <p:grpSpPr>
+        <a:xfrm>
+          <a:off x="0" y="0"/>
+          <a:ext cx="0" cy="0"/>
+          <a:chOff x="0" y="0"/>
+          <a:chExt cx="0" cy="0"/>
+        </a:xfrm>
+      </p:grpSpPr>
+      <p:sp>
+        <p:nvSpPr>
+          <p:cNvPr id="2" name="Slide Image Placeholder 1"/>
+          <p:cNvSpPr>
+            <a:spLocks noGrp="1" noRot="1" noChangeAspect="1"/>
+          </p:cNvSpPr>
+          <p:nvPr>
+            <p:ph type="sldImg"/>
+          </p:nvPr>
+        </p:nvSpPr>
+        <p:spPr/>
+      </p:sp>
+      <p:sp>
+        <p:nvSpPr>
+          <p:cNvPr id="3" name="Notes Placeholder 2"/>
+          <p:cNvSpPr>
+            <a:spLocks noGrp="1"/>
+          </p:cNvSpPr>
+          <p:nvPr>
+            <p:ph type="body" idx="1"/>
+          </p:nvPr>
+        </p:nvSpPr>
+        <p:spPr/>
+        <p:txBody>
+          <a:bodyPr/>
+          <a:lstStyle/>
+          <a:p>
+            <a:endParaRPr lang="en-US"/>
+          </a:p>
+        </p:txBody>
+      </p:sp>
+      <p:sp>
+        <p:nvSpPr>
+          <p:cNvPr id="4" name="Slide Number Placeholder 3"/>
+          <p:cNvSpPr>
+            <a:spLocks noGrp="1"/>
+          </p:cNvSpPr>
+          <p:nvPr>
+            <p:ph type="sldNum" sz="quarter" idx="10"/>
+          </p:nvPr>
+        </p:nvSpPr>
+        <p:spPr/>
+        <p:txBody>
+          <a:bodyPr/>
+          <a:lstStyle/>
+          <a:p>
+            <a:fld id="{75693FD4-8F83-4EF7-AC3F-0DC0388986B0}" type="slidenum">
+              <a:rPr lang="en-US" smtClean="0">
+                <a:solidFill>
+                  <a:prstClr val="black"/>
+                </a:solidFill>
+              </a:rPr>
+              <a:pPr/>
+              <a:t>20</a:t>
+            </a:fld>
+            <a:endParaRPr lang="en-US">
+              <a:solidFill>
+                <a:prstClr val="black"/>
+              </a:solidFill>
+            </a:endParaRPr>
           </a:p>
         </p:txBody>
       </p:sp>
@@ -1680,6 +1870,158 @@
 </p:notes>
 </file>
 
+<file path=ppt/notesSlides/notesSlide20.xml><?xml version="1.0" encoding="utf-8"?>
+<p:notes xmlns:a="http://schemas.openxmlformats.org/drawingml/2006/main" xmlns:r="http://schemas.openxmlformats.org/officeDocument/2006/relationships" xmlns:p="http://schemas.openxmlformats.org/presentationml/2006/main">
+  <p:cSld>
+    <p:spTree>
+      <p:nvGrpSpPr>
+        <p:cNvPr id="1" name=""/>
+        <p:cNvGrpSpPr/>
+        <p:nvPr/>
+      </p:nvGrpSpPr>
+      <p:grpSpPr>
+        <a:xfrm>
+          <a:off x="0" y="0"/>
+          <a:ext cx="0" cy="0"/>
+          <a:chOff x="0" y="0"/>
+          <a:chExt cx="0" cy="0"/>
+        </a:xfrm>
+      </p:grpSpPr>
+      <p:sp>
+        <p:nvSpPr>
+          <p:cNvPr id="41986" name="Rectangle 23"/>
+          <p:cNvSpPr>
+            <a:spLocks noGrp="1" noChangeArrowheads="1"/>
+          </p:cNvSpPr>
+          <p:nvPr>
+            <p:ph type="hdr" sz="quarter"/>
+          </p:nvPr>
+        </p:nvSpPr>
+        <p:spPr>
+          <a:noFill/>
+        </p:spPr>
+        <p:txBody>
+          <a:bodyPr/>
+          <a:lstStyle/>
+          <a:p>
+            <a:r>
+              <a:rPr lang="en-US" dirty="0" smtClean="0"/>
+              <a:t>Microsoft </a:t>
+            </a:r>
+            <a:r>
+              <a:rPr lang="en-US" b="1" dirty="0" smtClean="0"/>
+              <a:t>Engineering Excellence</a:t>
+            </a:r>
+            <a:endParaRPr lang="en-US" dirty="0" smtClean="0"/>
+          </a:p>
+        </p:txBody>
+      </p:sp>
+      <p:sp>
+        <p:nvSpPr>
+          <p:cNvPr id="41987" name="Rectangle 25"/>
+          <p:cNvSpPr>
+            <a:spLocks noGrp="1" noChangeArrowheads="1"/>
+          </p:cNvSpPr>
+          <p:nvPr>
+            <p:ph type="ftr" sz="quarter" idx="4"/>
+          </p:nvPr>
+        </p:nvSpPr>
+        <p:spPr>
+          <a:noFill/>
+        </p:spPr>
+        <p:txBody>
+          <a:bodyPr/>
+          <a:lstStyle/>
+          <a:p>
+            <a:r>
+              <a:rPr lang="en-US" dirty="0" smtClean="0"/>
+              <a:t>Microsoft Confidential</a:t>
+            </a:r>
+          </a:p>
+        </p:txBody>
+      </p:sp>
+      <p:sp>
+        <p:nvSpPr>
+          <p:cNvPr id="41988" name="Rectangle 26"/>
+          <p:cNvSpPr>
+            <a:spLocks noGrp="1" noChangeArrowheads="1"/>
+          </p:cNvSpPr>
+          <p:nvPr>
+            <p:ph type="sldNum" sz="quarter" idx="5"/>
+          </p:nvPr>
+        </p:nvSpPr>
+        <p:spPr>
+          <a:noFill/>
+        </p:spPr>
+        <p:txBody>
+          <a:bodyPr/>
+          <a:lstStyle/>
+          <a:p>
+            <a:fld id="{B2B44A5F-6CE4-493C-A0D7-6834FF76660C}" type="slidenum">
+              <a:rPr lang="en-US" smtClean="0"/>
+              <a:pPr/>
+              <a:t>21</a:t>
+            </a:fld>
+            <a:endParaRPr lang="en-US" dirty="0" smtClean="0"/>
+          </a:p>
+        </p:txBody>
+      </p:sp>
+      <p:sp>
+        <p:nvSpPr>
+          <p:cNvPr id="41989" name="Rectangle 2"/>
+          <p:cNvSpPr>
+            <a:spLocks noGrp="1" noRot="1" noChangeAspect="1" noChangeArrowheads="1" noTextEdit="1"/>
+          </p:cNvSpPr>
+          <p:nvPr>
+            <p:ph type="sldImg"/>
+          </p:nvPr>
+        </p:nvSpPr>
+        <p:spPr>
+          <a:xfrm>
+            <a:off x="1143000" y="450850"/>
+            <a:ext cx="4572000" cy="3429000"/>
+          </a:xfrm>
+          <a:ln/>
+        </p:spPr>
+      </p:sp>
+      <p:sp>
+        <p:nvSpPr>
+          <p:cNvPr id="41990" name="Rectangle 3"/>
+          <p:cNvSpPr>
+            <a:spLocks noGrp="1" noChangeArrowheads="1"/>
+          </p:cNvSpPr>
+          <p:nvPr>
+            <p:ph type="body" idx="1"/>
+          </p:nvPr>
+        </p:nvSpPr>
+        <p:spPr>
+          <a:xfrm>
+            <a:off x="307492" y="4130104"/>
+            <a:ext cx="6261652" cy="4554823"/>
+          </a:xfrm>
+          <a:noFill/>
+          <a:ln/>
+        </p:spPr>
+        <p:txBody>
+          <a:bodyPr/>
+          <a:lstStyle/>
+          <a:p>
+            <a:pPr>
+              <a:buFontTx/>
+              <a:buNone/>
+            </a:pPr>
+            <a:endParaRPr lang="en-US" dirty="0" smtClean="0"/>
+          </a:p>
+        </p:txBody>
+      </p:sp>
+    </p:spTree>
+  </p:cSld>
+  <p:clrMapOvr>
+    <a:masterClrMapping/>
+  </p:clrMapOvr>
+</p:notes>
+</file>
+
 <file path=ppt/notesSlides/notesSlide3.xml><?xml version="1.0" encoding="utf-8"?>
 <p:notes xmlns:a="http://schemas.openxmlformats.org/drawingml/2006/main" xmlns:r="http://schemas.openxmlformats.org/officeDocument/2006/relationships" xmlns:p="http://schemas.openxmlformats.org/presentationml/2006/main">
   <p:cSld>
@@ -1895,17 +2237,10 @@
         </p:nvSpPr>
         <p:spPr/>
         <p:txBody>
-          <a:bodyPr>
-            <a:normAutofit/>
-          </a:bodyPr>
-          <a:lstStyle/>
-          <a:p>
-            <a:pPr>
-              <a:lnSpc>
-                <a:spcPct val="80000"/>
-              </a:lnSpc>
-            </a:pPr>
-            <a:endParaRPr lang="en-US" dirty="0" smtClean="0"/>
+          <a:bodyPr/>
+          <a:lstStyle/>
+          <a:p>
+            <a:endParaRPr lang="en-US" dirty="0"/>
           </a:p>
         </p:txBody>
       </p:sp>
@@ -1924,7 +2259,7 @@
           <a:bodyPr/>
           <a:lstStyle/>
           <a:p>
-            <a:fld id="{EC6EAC7D-5A89-47C2-8ABA-56C9C2DEF7A4}" type="slidenum">
+            <a:fld id="{75693FD4-8F83-4EF7-AC3F-0DC0388986B0}" type="slidenum">
               <a:rPr lang="en-US" smtClean="0"/>
               <a:pPr/>
               <a:t>5</a:t>
@@ -1982,29 +2317,36 @@
         </p:nvSpPr>
         <p:spPr/>
         <p:txBody>
+          <a:bodyPr>
+            <a:normAutofit/>
+          </a:bodyPr>
+          <a:lstStyle/>
+          <a:p>
+            <a:pPr>
+              <a:lnSpc>
+                <a:spcPct val="80000"/>
+              </a:lnSpc>
+            </a:pPr>
+            <a:endParaRPr lang="en-US" dirty="0" smtClean="0"/>
+          </a:p>
+        </p:txBody>
+      </p:sp>
+      <p:sp>
+        <p:nvSpPr>
+          <p:cNvPr id="4" name="Slide Number Placeholder 3"/>
+          <p:cNvSpPr>
+            <a:spLocks noGrp="1"/>
+          </p:cNvSpPr>
+          <p:nvPr>
+            <p:ph type="sldNum" sz="quarter" idx="10"/>
+          </p:nvPr>
+        </p:nvSpPr>
+        <p:spPr/>
+        <p:txBody>
           <a:bodyPr/>
           <a:lstStyle/>
           <a:p>
-            <a:endParaRPr lang="en-US" dirty="0"/>
-          </a:p>
-        </p:txBody>
-      </p:sp>
-      <p:sp>
-        <p:nvSpPr>
-          <p:cNvPr id="4" name="Slide Number Placeholder 3"/>
-          <p:cNvSpPr>
-            <a:spLocks noGrp="1"/>
-          </p:cNvSpPr>
-          <p:nvPr>
-            <p:ph type="sldNum" sz="quarter" idx="10"/>
-          </p:nvPr>
-        </p:nvSpPr>
-        <p:spPr/>
-        <p:txBody>
-          <a:bodyPr/>
-          <a:lstStyle/>
-          <a:p>
-            <a:fld id="{75693FD4-8F83-4EF7-AC3F-0DC0388986B0}" type="slidenum">
+            <a:fld id="{EC6EAC7D-5A89-47C2-8ABA-56C9C2DEF7A4}" type="slidenum">
               <a:rPr lang="en-US" smtClean="0"/>
               <a:pPr/>
               <a:t>6</a:t>
@@ -2094,7 +2436,7 @@
             <a:fld id="{EC6EAC7D-5A89-47C2-8ABA-56C9C2DEF7A4}" type="slidenum">
               <a:rPr lang="en-US" smtClean="0"/>
               <a:pPr/>
-              <a:t>8</a:t>
+              <a:t>7</a:t>
             </a:fld>
             <a:endParaRPr lang="en-US"/>
           </a:p>
@@ -2149,29 +2491,36 @@
         </p:nvSpPr>
         <p:spPr/>
         <p:txBody>
+          <a:bodyPr>
+            <a:normAutofit/>
+          </a:bodyPr>
+          <a:lstStyle/>
+          <a:p>
+            <a:pPr>
+              <a:lnSpc>
+                <a:spcPct val="80000"/>
+              </a:lnSpc>
+            </a:pPr>
+            <a:endParaRPr lang="en-US" dirty="0" smtClean="0"/>
+          </a:p>
+        </p:txBody>
+      </p:sp>
+      <p:sp>
+        <p:nvSpPr>
+          <p:cNvPr id="4" name="Slide Number Placeholder 3"/>
+          <p:cNvSpPr>
+            <a:spLocks noGrp="1"/>
+          </p:cNvSpPr>
+          <p:nvPr>
+            <p:ph type="sldNum" sz="quarter" idx="10"/>
+          </p:nvPr>
+        </p:nvSpPr>
+        <p:spPr/>
+        <p:txBody>
           <a:bodyPr/>
           <a:lstStyle/>
           <a:p>
-            <a:endParaRPr lang="en-US" dirty="0"/>
-          </a:p>
-        </p:txBody>
-      </p:sp>
-      <p:sp>
-        <p:nvSpPr>
-          <p:cNvPr id="4" name="Slide Number Placeholder 3"/>
-          <p:cNvSpPr>
-            <a:spLocks noGrp="1"/>
-          </p:cNvSpPr>
-          <p:nvPr>
-            <p:ph type="sldNum" sz="quarter" idx="10"/>
-          </p:nvPr>
-        </p:nvSpPr>
-        <p:spPr/>
-        <p:txBody>
-          <a:bodyPr/>
-          <a:lstStyle/>
-          <a:p>
-            <a:fld id="{75693FD4-8F83-4EF7-AC3F-0DC0388986B0}" type="slidenum">
+            <a:fld id="{EC6EAC7D-5A89-47C2-8ABA-56C9C2DEF7A4}" type="slidenum">
               <a:rPr lang="en-US" smtClean="0"/>
               <a:pPr/>
               <a:t>9</a:t>
@@ -5928,19 +6277,7 @@
               <a:rPr lang="en-US" sz="2400" dirty="0" smtClean="0">
                 <a:latin typeface="+mn-lt"/>
               </a:rPr>
-              <a:t> </a:t>
-            </a:r>
-            <a:r>
-              <a:rPr lang="en-US" sz="2400" dirty="0" smtClean="0">
-                <a:latin typeface="+mn-lt"/>
-              </a:rPr>
-              <a:t>and </a:t>
-            </a:r>
-            <a:r>
-              <a:rPr lang="en-US" sz="2400" dirty="0" smtClean="0">
-                <a:latin typeface="+mn-lt"/>
-              </a:rPr>
-              <a:t>20</a:t>
+              <a:t> and 20</a:t>
             </a:r>
             <a:r>
               <a:rPr lang="en-US" sz="2400" baseline="30000" dirty="0" smtClean="0">
@@ -5952,13 +6289,7 @@
               <a:rPr lang="en-US" sz="2400" dirty="0" smtClean="0">
                 <a:latin typeface="+mn-lt"/>
               </a:rPr>
-              <a:t> </a:t>
-            </a:r>
-            <a:r>
-              <a:rPr lang="en-US" sz="2400" dirty="0" smtClean="0">
-                <a:latin typeface="+mn-lt"/>
-              </a:rPr>
-              <a:t>November</a:t>
+              <a:t> November</a:t>
             </a:r>
             <a:endParaRPr lang="en-US" sz="2400" dirty="0">
               <a:latin typeface="+mn-lt"/>
@@ -6088,7 +6419,6 @@
               <a:rPr lang="en-US" dirty="0" smtClean="0"/>
               <a:t>can process it.</a:t>
             </a:r>
-            <a:endParaRPr lang="en-US" dirty="0" smtClean="0"/>
           </a:p>
         </p:txBody>
       </p:sp>
@@ -6210,7 +6540,6 @@
               <a:rPr lang="en-US" dirty="0" smtClean="0"/>
               <a:t>mark</a:t>
             </a:r>
-            <a:endParaRPr lang="en-US" dirty="0" smtClean="0"/>
           </a:p>
         </p:txBody>
       </p:sp>
@@ -6799,7 +7128,6 @@
               <a:rPr lang="en-US" dirty="0" smtClean="0"/>
               <a:t>Use unique id’s</a:t>
             </a:r>
-            <a:endParaRPr lang="en-US" dirty="0" smtClean="0"/>
           </a:p>
         </p:txBody>
       </p:sp>
@@ -6830,6 +7158,604 @@
 </file>
 
 <file path=ppt/slides/slide16.xml><?xml version="1.0" encoding="utf-8"?>
+<p:sld xmlns:a="http://schemas.openxmlformats.org/drawingml/2006/main" xmlns:r="http://schemas.openxmlformats.org/officeDocument/2006/relationships" xmlns:p="http://schemas.openxmlformats.org/presentationml/2006/main">
+  <p:cSld>
+    <p:spTree>
+      <p:nvGrpSpPr>
+        <p:cNvPr id="1" name=""/>
+        <p:cNvGrpSpPr/>
+        <p:nvPr/>
+      </p:nvGrpSpPr>
+      <p:grpSpPr>
+        <a:xfrm>
+          <a:off x="0" y="0"/>
+          <a:ext cx="0" cy="0"/>
+          <a:chOff x="0" y="0"/>
+          <a:chExt cx="0" cy="0"/>
+        </a:xfrm>
+      </p:grpSpPr>
+      <p:sp>
+        <p:nvSpPr>
+          <p:cNvPr id="7" name="TextBox 6"/>
+          <p:cNvSpPr txBox="1"/>
+          <p:nvPr/>
+        </p:nvSpPr>
+        <p:spPr>
+          <a:xfrm>
+            <a:off x="1295400" y="2363450"/>
+            <a:ext cx="6781800" cy="3808750"/>
+          </a:xfrm>
+          <a:prstGeom prst="rect">
+            <a:avLst/>
+          </a:prstGeom>
+          <a:noFill/>
+        </p:spPr>
+        <p:txBody>
+          <a:bodyPr wrap="square" rtlCol="0">
+            <a:normAutofit/>
+          </a:bodyPr>
+          <a:lstStyle/>
+          <a:p>
+            <a:r>
+              <a:rPr lang="en-US" sz="7200" dirty="0" smtClean="0"/>
+              <a:t>HTML Tables</a:t>
+            </a:r>
+            <a:endParaRPr lang="en-US" sz="7200" dirty="0"/>
+          </a:p>
+        </p:txBody>
+      </p:sp>
+      <p:pic>
+        <p:nvPicPr>
+          <p:cNvPr id="12" name="Picture 11"/>
+          <p:cNvPicPr>
+            <a:picLocks noChangeAspect="1"/>
+          </p:cNvPicPr>
+          <p:nvPr/>
+        </p:nvPicPr>
+        <p:blipFill>
+          <a:blip r:embed="rId3" cstate="email">
+            <a:extLst>
+              <a:ext uri="{28A0092B-C50C-407E-A947-70E740481C1C}">
+                <a14:useLocalDpi xmlns:a14="http://schemas.microsoft.com/office/drawing/2010/main"/>
+              </a:ext>
+            </a:extLst>
+          </a:blip>
+          <a:stretch>
+            <a:fillRect/>
+          </a:stretch>
+        </p:blipFill>
+        <p:spPr>
+          <a:xfrm>
+            <a:off x="4191000" y="0"/>
+            <a:ext cx="7765662" cy="16476125"/>
+          </a:xfrm>
+          <a:prstGeom prst="rect">
+            <a:avLst/>
+          </a:prstGeom>
+        </p:spPr>
+      </p:pic>
+    </p:spTree>
+    <p:extLst>
+      <p:ext uri="{BB962C8B-B14F-4D97-AF65-F5344CB8AC3E}">
+        <p14:creationId xmlns:p14="http://schemas.microsoft.com/office/powerpoint/2010/main" val="107946701"/>
+      </p:ext>
+    </p:extLst>
+  </p:cSld>
+  <p:clrMapOvr>
+    <a:masterClrMapping/>
+  </p:clrMapOvr>
+  <p:transition spd="slow">
+    <p:fade/>
+  </p:transition>
+  <p:timing>
+    <p:tnLst>
+      <p:par>
+        <p:cTn id="1" dur="indefinite" restart="never" nodeType="tmRoot"/>
+      </p:par>
+    </p:tnLst>
+  </p:timing>
+</p:sld>
+</file>
+
+<file path=ppt/slides/slide17.xml><?xml version="1.0" encoding="utf-8"?>
+<p:sld xmlns:a="http://schemas.openxmlformats.org/drawingml/2006/main" xmlns:r="http://schemas.openxmlformats.org/officeDocument/2006/relationships" xmlns:p="http://schemas.openxmlformats.org/presentationml/2006/main">
+  <p:cSld>
+    <p:spTree>
+      <p:nvGrpSpPr>
+        <p:cNvPr id="1" name=""/>
+        <p:cNvGrpSpPr/>
+        <p:nvPr/>
+      </p:nvGrpSpPr>
+      <p:grpSpPr>
+        <a:xfrm>
+          <a:off x="0" y="0"/>
+          <a:ext cx="0" cy="0"/>
+          <a:chOff x="0" y="0"/>
+          <a:chExt cx="0" cy="0"/>
+        </a:xfrm>
+      </p:grpSpPr>
+      <p:sp>
+        <p:nvSpPr>
+          <p:cNvPr id="7" name="TextBox 6"/>
+          <p:cNvSpPr txBox="1"/>
+          <p:nvPr/>
+        </p:nvSpPr>
+        <p:spPr>
+          <a:xfrm>
+            <a:off x="1295400" y="2363450"/>
+            <a:ext cx="6781800" cy="3808750"/>
+          </a:xfrm>
+          <a:prstGeom prst="rect">
+            <a:avLst/>
+          </a:prstGeom>
+          <a:noFill/>
+        </p:spPr>
+        <p:txBody>
+          <a:bodyPr wrap="square" rtlCol="0">
+            <a:normAutofit/>
+          </a:bodyPr>
+          <a:lstStyle/>
+          <a:p>
+            <a:r>
+              <a:rPr lang="en-US" sz="7200" dirty="0" smtClean="0"/>
+              <a:t>Accessible </a:t>
+            </a:r>
+          </a:p>
+          <a:p>
+            <a:r>
+              <a:rPr lang="en-US" sz="7200" dirty="0" smtClean="0"/>
+              <a:t>Java Script</a:t>
+            </a:r>
+            <a:endParaRPr lang="en-US" sz="7200" dirty="0"/>
+          </a:p>
+        </p:txBody>
+      </p:sp>
+      <p:pic>
+        <p:nvPicPr>
+          <p:cNvPr id="12" name="Picture 11"/>
+          <p:cNvPicPr>
+            <a:picLocks noChangeAspect="1"/>
+          </p:cNvPicPr>
+          <p:nvPr/>
+        </p:nvPicPr>
+        <p:blipFill>
+          <a:blip r:embed="rId3" cstate="email">
+            <a:extLst>
+              <a:ext uri="{28A0092B-C50C-407E-A947-70E740481C1C}">
+                <a14:useLocalDpi xmlns:a14="http://schemas.microsoft.com/office/drawing/2010/main"/>
+              </a:ext>
+            </a:extLst>
+          </a:blip>
+          <a:stretch>
+            <a:fillRect/>
+          </a:stretch>
+        </p:blipFill>
+        <p:spPr>
+          <a:xfrm>
+            <a:off x="4191000" y="0"/>
+            <a:ext cx="7765662" cy="16476125"/>
+          </a:xfrm>
+          <a:prstGeom prst="rect">
+            <a:avLst/>
+          </a:prstGeom>
+        </p:spPr>
+      </p:pic>
+    </p:spTree>
+    <p:extLst>
+      <p:ext uri="{BB962C8B-B14F-4D97-AF65-F5344CB8AC3E}">
+        <p14:creationId xmlns:p14="http://schemas.microsoft.com/office/powerpoint/2010/main" val="2718644073"/>
+      </p:ext>
+    </p:extLst>
+  </p:cSld>
+  <p:clrMapOvr>
+    <a:masterClrMapping/>
+  </p:clrMapOvr>
+  <p:transition spd="slow">
+    <p:fade/>
+  </p:transition>
+  <p:timing>
+    <p:tnLst>
+      <p:par>
+        <p:cTn id="1" dur="indefinite" restart="never" nodeType="tmRoot"/>
+      </p:par>
+    </p:tnLst>
+  </p:timing>
+</p:sld>
+</file>
+
+<file path=ppt/slides/slide18.xml><?xml version="1.0" encoding="utf-8"?>
+<p:sld xmlns:a="http://schemas.openxmlformats.org/drawingml/2006/main" xmlns:r="http://schemas.openxmlformats.org/officeDocument/2006/relationships" xmlns:p="http://schemas.openxmlformats.org/presentationml/2006/main">
+  <p:cSld>
+    <p:spTree>
+      <p:nvGrpSpPr>
+        <p:cNvPr id="1" name=""/>
+        <p:cNvGrpSpPr/>
+        <p:nvPr/>
+      </p:nvGrpSpPr>
+      <p:grpSpPr>
+        <a:xfrm>
+          <a:off x="0" y="0"/>
+          <a:ext cx="0" cy="0"/>
+          <a:chOff x="0" y="0"/>
+          <a:chExt cx="0" cy="0"/>
+        </a:xfrm>
+      </p:grpSpPr>
+      <p:sp>
+        <p:nvSpPr>
+          <p:cNvPr id="2" name="Title 1"/>
+          <p:cNvSpPr>
+            <a:spLocks noGrp="1"/>
+          </p:cNvSpPr>
+          <p:nvPr>
+            <p:ph type="title"/>
+            <p:custDataLst>
+              <p:tags r:id="rId2"/>
+            </p:custDataLst>
+          </p:nvPr>
+        </p:nvSpPr>
+        <p:spPr/>
+        <p:txBody>
+          <a:bodyPr/>
+          <a:lstStyle/>
+          <a:p>
+            <a:r>
+              <a:rPr lang="en-US" dirty="0" smtClean="0"/>
+              <a:t>Accessible Java Script</a:t>
+            </a:r>
+            <a:endParaRPr lang="en-US" dirty="0"/>
+          </a:p>
+        </p:txBody>
+      </p:sp>
+      <p:sp>
+        <p:nvSpPr>
+          <p:cNvPr id="5" name="Content Placeholder 4"/>
+          <p:cNvSpPr>
+            <a:spLocks noGrp="1"/>
+          </p:cNvSpPr>
+          <p:nvPr>
+            <p:ph idx="1"/>
+            <p:custDataLst>
+              <p:tags r:id="rId3"/>
+            </p:custDataLst>
+          </p:nvPr>
+        </p:nvSpPr>
+        <p:spPr/>
+        <p:txBody>
+          <a:bodyPr>
+            <a:normAutofit fontScale="92500" lnSpcReduction="20000"/>
+          </a:bodyPr>
+          <a:lstStyle/>
+          <a:p>
+            <a:r>
+              <a:rPr lang="en-US" dirty="0"/>
+              <a:t>Mouse Specific Event </a:t>
+            </a:r>
+            <a:r>
+              <a:rPr lang="en-US" dirty="0" smtClean="0"/>
+              <a:t>Handler</a:t>
+            </a:r>
+          </a:p>
+          <a:p>
+            <a:pPr lvl="1"/>
+            <a:r>
+              <a:rPr lang="en-US" dirty="0" err="1" smtClean="0"/>
+              <a:t>onClick</a:t>
+            </a:r>
+            <a:endParaRPr lang="en-US" dirty="0" smtClean="0"/>
+          </a:p>
+          <a:p>
+            <a:pPr lvl="1"/>
+            <a:r>
+              <a:rPr lang="en-US" dirty="0" err="1" smtClean="0"/>
+              <a:t>onMouseOver</a:t>
+            </a:r>
+            <a:endParaRPr lang="en-US" dirty="0" smtClean="0"/>
+          </a:p>
+          <a:p>
+            <a:pPr lvl="1"/>
+            <a:r>
+              <a:rPr lang="en-US" dirty="0" err="1" smtClean="0"/>
+              <a:t>onMouseOut</a:t>
+            </a:r>
+            <a:endParaRPr lang="en-US" dirty="0" smtClean="0"/>
+          </a:p>
+          <a:p>
+            <a:pPr lvl="1"/>
+            <a:r>
+              <a:rPr lang="en-US" dirty="0" err="1" smtClean="0"/>
+              <a:t>onDblClick</a:t>
+            </a:r>
+            <a:endParaRPr lang="en-US" dirty="0" smtClean="0"/>
+          </a:p>
+          <a:p>
+            <a:r>
+              <a:rPr lang="en-US" dirty="0"/>
+              <a:t>Device Independent </a:t>
+            </a:r>
+            <a:r>
+              <a:rPr lang="en-US" dirty="0" smtClean="0"/>
+              <a:t>Event </a:t>
+            </a:r>
+            <a:r>
+              <a:rPr lang="en-US" dirty="0"/>
+              <a:t>Handler </a:t>
+            </a:r>
+            <a:endParaRPr lang="en-US" dirty="0" smtClean="0"/>
+          </a:p>
+          <a:p>
+            <a:pPr lvl="1"/>
+            <a:r>
+              <a:rPr lang="en-US" dirty="0" err="1" smtClean="0"/>
+              <a:t>onFocus</a:t>
+            </a:r>
+            <a:endParaRPr lang="en-US" dirty="0" smtClean="0"/>
+          </a:p>
+          <a:p>
+            <a:pPr lvl="1"/>
+            <a:r>
+              <a:rPr lang="en-US" dirty="0" err="1" smtClean="0"/>
+              <a:t>onBlur</a:t>
+            </a:r>
+            <a:endParaRPr lang="en-US" dirty="0" smtClean="0"/>
+          </a:p>
+          <a:p>
+            <a:pPr lvl="1"/>
+            <a:r>
+              <a:rPr lang="en-US" dirty="0" err="1" smtClean="0"/>
+              <a:t>onSelect</a:t>
+            </a:r>
+            <a:endParaRPr lang="en-US" dirty="0" smtClean="0"/>
+          </a:p>
+          <a:p>
+            <a:pPr lvl="1"/>
+            <a:r>
+              <a:rPr lang="en-US" dirty="0" err="1" smtClean="0"/>
+              <a:t>onChange</a:t>
+            </a:r>
+            <a:endParaRPr lang="en-US" dirty="0" smtClean="0"/>
+          </a:p>
+        </p:txBody>
+      </p:sp>
+    </p:spTree>
+    <p:custDataLst>
+      <p:tags r:id="rId1"/>
+    </p:custDataLst>
+    <p:extLst>
+      <p:ext uri="{BB962C8B-B14F-4D97-AF65-F5344CB8AC3E}">
+        <p14:creationId xmlns:p14="http://schemas.microsoft.com/office/powerpoint/2010/main" val="480214504"/>
+      </p:ext>
+    </p:extLst>
+  </p:cSld>
+  <p:clrMapOvr>
+    <a:masterClrMapping/>
+  </p:clrMapOvr>
+  <p:transition spd="slow">
+    <p:wipe dir="d"/>
+  </p:transition>
+  <p:timing>
+    <p:tnLst>
+      <p:par>
+        <p:cTn id="1" dur="indefinite" restart="never" nodeType="tmRoot"/>
+      </p:par>
+    </p:tnLst>
+  </p:timing>
+</p:sld>
+</file>
+
+<file path=ppt/slides/slide19.xml><?xml version="1.0" encoding="utf-8"?>
+<p:sld xmlns:a="http://schemas.openxmlformats.org/drawingml/2006/main" xmlns:r="http://schemas.openxmlformats.org/officeDocument/2006/relationships" xmlns:p="http://schemas.openxmlformats.org/presentationml/2006/main">
+  <p:cSld>
+    <p:spTree>
+      <p:nvGrpSpPr>
+        <p:cNvPr id="1" name=""/>
+        <p:cNvGrpSpPr/>
+        <p:nvPr/>
+      </p:nvGrpSpPr>
+      <p:grpSpPr>
+        <a:xfrm>
+          <a:off x="0" y="0"/>
+          <a:ext cx="0" cy="0"/>
+          <a:chOff x="0" y="0"/>
+          <a:chExt cx="0" cy="0"/>
+        </a:xfrm>
+      </p:grpSpPr>
+      <p:sp>
+        <p:nvSpPr>
+          <p:cNvPr id="2" name="Title 1"/>
+          <p:cNvSpPr>
+            <a:spLocks noGrp="1"/>
+          </p:cNvSpPr>
+          <p:nvPr>
+            <p:ph type="title"/>
+            <p:custDataLst>
+              <p:tags r:id="rId2"/>
+            </p:custDataLst>
+          </p:nvPr>
+        </p:nvSpPr>
+        <p:spPr/>
+        <p:txBody>
+          <a:bodyPr/>
+          <a:lstStyle/>
+          <a:p>
+            <a:r>
+              <a:rPr lang="en-US" dirty="0" smtClean="0"/>
+              <a:t>Java Script Best Practices</a:t>
+            </a:r>
+            <a:endParaRPr lang="en-US" dirty="0"/>
+          </a:p>
+        </p:txBody>
+      </p:sp>
+      <p:sp>
+        <p:nvSpPr>
+          <p:cNvPr id="5" name="Content Placeholder 4"/>
+          <p:cNvSpPr>
+            <a:spLocks noGrp="1"/>
+          </p:cNvSpPr>
+          <p:nvPr>
+            <p:ph idx="1"/>
+            <p:custDataLst>
+              <p:tags r:id="rId3"/>
+            </p:custDataLst>
+          </p:nvPr>
+        </p:nvSpPr>
+        <p:spPr/>
+        <p:txBody>
+          <a:bodyPr>
+            <a:normAutofit/>
+          </a:bodyPr>
+          <a:lstStyle/>
+          <a:p>
+            <a:r>
+              <a:rPr lang="en-US" dirty="0" smtClean="0"/>
+              <a:t>Keyboard access is bed rock</a:t>
+            </a:r>
+          </a:p>
+          <a:p>
+            <a:r>
+              <a:rPr lang="en-US" dirty="0" err="1" smtClean="0"/>
+              <a:t>onChange</a:t>
+            </a:r>
+            <a:r>
+              <a:rPr lang="en-US" dirty="0" smtClean="0"/>
+              <a:t> event misuse</a:t>
+            </a:r>
+            <a:endParaRPr lang="en-US" dirty="0" smtClean="0"/>
+          </a:p>
+          <a:p>
+            <a:pPr lvl="1"/>
+            <a:endParaRPr lang="en-US" dirty="0" smtClean="0"/>
+          </a:p>
+        </p:txBody>
+      </p:sp>
+    </p:spTree>
+    <p:custDataLst>
+      <p:tags r:id="rId1"/>
+    </p:custDataLst>
+    <p:extLst>
+      <p:ext uri="{BB962C8B-B14F-4D97-AF65-F5344CB8AC3E}">
+        <p14:creationId xmlns:p14="http://schemas.microsoft.com/office/powerpoint/2010/main" val="131960359"/>
+      </p:ext>
+    </p:extLst>
+  </p:cSld>
+  <p:clrMapOvr>
+    <a:masterClrMapping/>
+  </p:clrMapOvr>
+  <p:transition spd="slow">
+    <p:wipe dir="d"/>
+  </p:transition>
+  <p:timing>
+    <p:tnLst>
+      <p:par>
+        <p:cTn id="1" dur="indefinite" restart="never" nodeType="tmRoot"/>
+      </p:par>
+    </p:tnLst>
+  </p:timing>
+</p:sld>
+</file>
+
+<file path=ppt/slides/slide2.xml><?xml version="1.0" encoding="utf-8"?>
+<p:sld xmlns:a="http://schemas.openxmlformats.org/drawingml/2006/main" xmlns:r="http://schemas.openxmlformats.org/officeDocument/2006/relationships" xmlns:p="http://schemas.openxmlformats.org/presentationml/2006/main">
+  <p:cSld>
+    <p:spTree>
+      <p:nvGrpSpPr>
+        <p:cNvPr id="1" name=""/>
+        <p:cNvGrpSpPr/>
+        <p:nvPr/>
+      </p:nvGrpSpPr>
+      <p:grpSpPr>
+        <a:xfrm>
+          <a:off x="0" y="0"/>
+          <a:ext cx="0" cy="0"/>
+          <a:chOff x="0" y="0"/>
+          <a:chExt cx="0" cy="0"/>
+        </a:xfrm>
+      </p:grpSpPr>
+      <p:sp>
+        <p:nvSpPr>
+          <p:cNvPr id="7" name="TextBox 6"/>
+          <p:cNvSpPr txBox="1"/>
+          <p:nvPr/>
+        </p:nvSpPr>
+        <p:spPr>
+          <a:xfrm>
+            <a:off x="1295400" y="2363450"/>
+            <a:ext cx="6781800" cy="3808750"/>
+          </a:xfrm>
+          <a:prstGeom prst="rect">
+            <a:avLst/>
+          </a:prstGeom>
+          <a:noFill/>
+        </p:spPr>
+        <p:txBody>
+          <a:bodyPr wrap="square" rtlCol="0">
+            <a:normAutofit/>
+          </a:bodyPr>
+          <a:lstStyle/>
+          <a:p>
+            <a:r>
+              <a:rPr lang="en-US" sz="7200" dirty="0"/>
+              <a:t>Accessible </a:t>
+            </a:r>
+            <a:r>
+              <a:rPr lang="en-US" sz="7200" dirty="0" smtClean="0"/>
+              <a:t>Website is always SEO </a:t>
+            </a:r>
+            <a:r>
+              <a:rPr lang="en-US" sz="7200" dirty="0"/>
+              <a:t>Friendly</a:t>
+            </a:r>
+          </a:p>
+        </p:txBody>
+      </p:sp>
+      <p:pic>
+        <p:nvPicPr>
+          <p:cNvPr id="12" name="Picture 11"/>
+          <p:cNvPicPr>
+            <a:picLocks noChangeAspect="1"/>
+          </p:cNvPicPr>
+          <p:nvPr/>
+        </p:nvPicPr>
+        <p:blipFill>
+          <a:blip r:embed="rId3" cstate="email">
+            <a:extLst>
+              <a:ext uri="{28A0092B-C50C-407E-A947-70E740481C1C}">
+                <a14:useLocalDpi xmlns:a14="http://schemas.microsoft.com/office/drawing/2010/main"/>
+              </a:ext>
+            </a:extLst>
+          </a:blip>
+          <a:stretch>
+            <a:fillRect/>
+          </a:stretch>
+        </p:blipFill>
+        <p:spPr>
+          <a:xfrm>
+            <a:off x="4191000" y="0"/>
+            <a:ext cx="7765662" cy="16476125"/>
+          </a:xfrm>
+          <a:prstGeom prst="rect">
+            <a:avLst/>
+          </a:prstGeom>
+        </p:spPr>
+      </p:pic>
+    </p:spTree>
+  </p:cSld>
+  <p:clrMapOvr>
+    <a:masterClrMapping/>
+  </p:clrMapOvr>
+  <p:transition spd="slow">
+    <p:fade/>
+  </p:transition>
+  <p:timing>
+    <p:tnLst>
+      <p:par>
+        <p:cTn id="1" dur="indefinite" restart="never" nodeType="tmRoot"/>
+      </p:par>
+    </p:tnLst>
+  </p:timing>
+</p:sld>
+</file>
+
+<file path=ppt/slides/slide20.xml><?xml version="1.0" encoding="utf-8"?>
 <p:sld xmlns:a="http://schemas.openxmlformats.org/drawingml/2006/main" xmlns:r="http://schemas.openxmlformats.org/officeDocument/2006/relationships" xmlns:p="http://schemas.openxmlformats.org/presentationml/2006/main">
   <p:cSld>
     <p:spTree>
@@ -6932,7 +7858,7 @@
 </p:sld>
 </file>
 
-<file path=ppt/slides/slide17.xml><?xml version="1.0" encoding="utf-8"?>
+<file path=ppt/slides/slide21.xml><?xml version="1.0" encoding="utf-8"?>
 <p:sld xmlns:a="http://schemas.openxmlformats.org/drawingml/2006/main" xmlns:r="http://schemas.openxmlformats.org/officeDocument/2006/relationships" xmlns:p="http://schemas.openxmlformats.org/presentationml/2006/main">
   <p:cSld>
     <p:spTree>
@@ -7000,109 +7926,6 @@
 </p:sld>
 </file>
 
-<file path=ppt/slides/slide2.xml><?xml version="1.0" encoding="utf-8"?>
-<p:sld xmlns:a="http://schemas.openxmlformats.org/drawingml/2006/main" xmlns:r="http://schemas.openxmlformats.org/officeDocument/2006/relationships" xmlns:p="http://schemas.openxmlformats.org/presentationml/2006/main">
-  <p:cSld>
-    <p:spTree>
-      <p:nvGrpSpPr>
-        <p:cNvPr id="1" name=""/>
-        <p:cNvGrpSpPr/>
-        <p:nvPr/>
-      </p:nvGrpSpPr>
-      <p:grpSpPr>
-        <a:xfrm>
-          <a:off x="0" y="0"/>
-          <a:ext cx="0" cy="0"/>
-          <a:chOff x="0" y="0"/>
-          <a:chExt cx="0" cy="0"/>
-        </a:xfrm>
-      </p:grpSpPr>
-      <p:sp>
-        <p:nvSpPr>
-          <p:cNvPr id="7" name="TextBox 6"/>
-          <p:cNvSpPr txBox="1"/>
-          <p:nvPr/>
-        </p:nvSpPr>
-        <p:spPr>
-          <a:xfrm>
-            <a:off x="1295400" y="2363450"/>
-            <a:ext cx="6781800" cy="3808750"/>
-          </a:xfrm>
-          <a:prstGeom prst="rect">
-            <a:avLst/>
-          </a:prstGeom>
-          <a:noFill/>
-        </p:spPr>
-        <p:txBody>
-          <a:bodyPr wrap="square" rtlCol="0">
-            <a:normAutofit/>
-          </a:bodyPr>
-          <a:lstStyle/>
-          <a:p>
-            <a:r>
-              <a:rPr lang="en-US" sz="7200" dirty="0"/>
-              <a:t>Accessible </a:t>
-            </a:r>
-            <a:r>
-              <a:rPr lang="en-US" sz="7200" dirty="0" smtClean="0"/>
-              <a:t>Website is always SEO </a:t>
-            </a:r>
-            <a:r>
-              <a:rPr lang="en-US" sz="7200" dirty="0"/>
-              <a:t>Friendly</a:t>
-            </a:r>
-            <a:endParaRPr lang="en-US" sz="7200" dirty="0"/>
-          </a:p>
-        </p:txBody>
-      </p:sp>
-      <p:pic>
-        <p:nvPicPr>
-          <p:cNvPr id="12" name="Picture 11"/>
-          <p:cNvPicPr>
-            <a:picLocks noChangeAspect="1"/>
-          </p:cNvPicPr>
-          <p:nvPr/>
-        </p:nvPicPr>
-        <p:blipFill>
-          <a:blip r:embed="rId3" cstate="email">
-            <a:extLst>
-              <a:ext uri="{28A0092B-C50C-407E-A947-70E740481C1C}">
-                <a14:useLocalDpi xmlns:a14="http://schemas.microsoft.com/office/drawing/2010/main"/>
-              </a:ext>
-            </a:extLst>
-          </a:blip>
-          <a:stretch>
-            <a:fillRect/>
-          </a:stretch>
-        </p:blipFill>
-        <p:spPr>
-          <a:xfrm>
-            <a:off x="4191000" y="0"/>
-            <a:ext cx="7765662" cy="16476125"/>
-          </a:xfrm>
-          <a:prstGeom prst="rect">
-            <a:avLst/>
-          </a:prstGeom>
-        </p:spPr>
-      </p:pic>
-    </p:spTree>
-  </p:cSld>
-  <p:clrMapOvr>
-    <a:masterClrMapping/>
-  </p:clrMapOvr>
-  <p:transition spd="slow">
-    <p:fade/>
-  </p:transition>
-  <p:timing>
-    <p:tnLst>
-      <p:par>
-        <p:cTn id="1" dur="indefinite" restart="never" nodeType="tmRoot"/>
-      </p:par>
-    </p:tnLst>
-  </p:timing>
-</p:sld>
-</file>
-
 <file path=ppt/slides/slide3.xml><?xml version="1.0" encoding="utf-8"?>
 <p:sld xmlns:a="http://schemas.openxmlformats.org/drawingml/2006/main" xmlns:r="http://schemas.openxmlformats.org/officeDocument/2006/relationships" xmlns:p="http://schemas.openxmlformats.org/presentationml/2006/main">
   <p:cSld>
@@ -7164,7 +7987,7 @@
         <p:spPr/>
         <p:txBody>
           <a:bodyPr>
-            <a:normAutofit fontScale="92500"/>
+            <a:normAutofit fontScale="92500" lnSpcReduction="10000"/>
           </a:bodyPr>
           <a:lstStyle/>
           <a:p>
@@ -7189,7 +8012,6 @@
               <a:rPr lang="en-US" dirty="0" smtClean="0"/>
               <a:t>With HTML 5, CSS3 and Java Script now you write desktop equivalent applications</a:t>
             </a:r>
-            <a:endParaRPr lang="en-US" dirty="0" smtClean="0"/>
           </a:p>
           <a:p>
             <a:r>
@@ -7200,7 +8022,15 @@
           <a:p>
             <a:r>
               <a:rPr lang="en-US" dirty="0" smtClean="0"/>
-              <a:t>Browse ecosystem is also matured with frameworks like Angular, Backbone etc.</a:t>
+              <a:t>Browse ecosystem is also matured with frameworks like Angular, </a:t>
+            </a:r>
+            <a:r>
+              <a:rPr lang="en-US" dirty="0" smtClean="0"/>
+              <a:t>Backbone, knockout </a:t>
+            </a:r>
+            <a:r>
+              <a:rPr lang="en-US" dirty="0" smtClean="0"/>
+              <a:t>etc.</a:t>
             </a:r>
           </a:p>
         </p:txBody>
@@ -7290,13 +8120,23 @@
         <p:spPr/>
         <p:txBody>
           <a:bodyPr>
-            <a:normAutofit fontScale="92500" lnSpcReduction="20000"/>
+            <a:normAutofit fontScale="85000" lnSpcReduction="10000"/>
           </a:bodyPr>
           <a:lstStyle/>
           <a:p>
             <a:r>
               <a:rPr lang="en-US" dirty="0" smtClean="0"/>
-              <a:t>Custom Attributes – start with data</a:t>
+              <a:t>Semantic Structure</a:t>
+            </a:r>
+          </a:p>
+          <a:p>
+            <a:r>
+              <a:rPr lang="en-US" dirty="0" smtClean="0"/>
+              <a:t>Custom </a:t>
+            </a:r>
+            <a:r>
+              <a:rPr lang="en-US" dirty="0" smtClean="0"/>
+              <a:t>Attributes – start with data</a:t>
             </a:r>
           </a:p>
           <a:p>
@@ -7322,7 +8162,6 @@
               <a:rPr lang="en-US" dirty="0" smtClean="0"/>
               <a:t>Web Sockets</a:t>
             </a:r>
-            <a:endParaRPr lang="en-US" dirty="0" smtClean="0"/>
           </a:p>
           <a:p>
             <a:r>
@@ -7344,7 +8183,6 @@
               <a:rPr lang="en-US" dirty="0" smtClean="0"/>
               <a:t>HTML 5 specs implementation will complete in 2022</a:t>
             </a:r>
-            <a:endParaRPr lang="en-US" dirty="0" smtClean="0"/>
           </a:p>
         </p:txBody>
       </p:sp>
@@ -7375,153 +8213,6 @@
 </file>
 
 <file path=ppt/slides/slide5.xml><?xml version="1.0" encoding="utf-8"?>
-<p:sld xmlns:a="http://schemas.openxmlformats.org/drawingml/2006/main" xmlns:r="http://schemas.openxmlformats.org/officeDocument/2006/relationships" xmlns:p="http://schemas.openxmlformats.org/presentationml/2006/main">
-  <p:cSld>
-    <p:spTree>
-      <p:nvGrpSpPr>
-        <p:cNvPr id="1" name=""/>
-        <p:cNvGrpSpPr/>
-        <p:nvPr/>
-      </p:nvGrpSpPr>
-      <p:grpSpPr>
-        <a:xfrm>
-          <a:off x="0" y="0"/>
-          <a:ext cx="0" cy="0"/>
-          <a:chOff x="0" y="0"/>
-          <a:chExt cx="0" cy="0"/>
-        </a:xfrm>
-      </p:grpSpPr>
-      <p:sp>
-        <p:nvSpPr>
-          <p:cNvPr id="2" name="Title 1"/>
-          <p:cNvSpPr>
-            <a:spLocks noGrp="1"/>
-          </p:cNvSpPr>
-          <p:nvPr>
-            <p:ph type="title"/>
-            <p:custDataLst>
-              <p:tags r:id="rId2"/>
-            </p:custDataLst>
-          </p:nvPr>
-        </p:nvSpPr>
-        <p:spPr/>
-        <p:txBody>
-          <a:bodyPr/>
-          <a:lstStyle/>
-          <a:p>
-            <a:r>
-              <a:rPr lang="en-US" dirty="0" smtClean="0"/>
-              <a:t>Progressive Enhancement</a:t>
-            </a:r>
-            <a:endParaRPr lang="en-US" dirty="0"/>
-          </a:p>
-        </p:txBody>
-      </p:sp>
-      <p:sp>
-        <p:nvSpPr>
-          <p:cNvPr id="5" name="Content Placeholder 4"/>
-          <p:cNvSpPr>
-            <a:spLocks noGrp="1"/>
-          </p:cNvSpPr>
-          <p:nvPr>
-            <p:ph idx="1"/>
-            <p:custDataLst>
-              <p:tags r:id="rId3"/>
-            </p:custDataLst>
-          </p:nvPr>
-        </p:nvSpPr>
-        <p:spPr/>
-        <p:txBody>
-          <a:bodyPr>
-            <a:normAutofit fontScale="92500" lnSpcReduction="20000"/>
-          </a:bodyPr>
-          <a:lstStyle/>
-          <a:p>
-            <a:r>
-              <a:rPr lang="en-US" dirty="0" smtClean="0"/>
-              <a:t>Approach </a:t>
-            </a:r>
-            <a:r>
-              <a:rPr lang="en-US" dirty="0"/>
-              <a:t>to Web design that promotes accessibility using semantic HTML, </a:t>
-            </a:r>
-            <a:r>
-              <a:rPr lang="en-US" dirty="0" smtClean="0"/>
-              <a:t>style sheets </a:t>
-            </a:r>
-            <a:r>
-              <a:rPr lang="en-US" dirty="0"/>
-              <a:t>and scripting</a:t>
-            </a:r>
-            <a:r>
-              <a:rPr lang="en-US" dirty="0" smtClean="0"/>
-              <a:t>.</a:t>
-            </a:r>
-          </a:p>
-          <a:p>
-            <a:r>
-              <a:rPr lang="en-US" dirty="0" smtClean="0"/>
-              <a:t>Create Web </a:t>
-            </a:r>
-            <a:r>
-              <a:rPr lang="en-US" dirty="0"/>
-              <a:t>site where basic content is available to everyone while more advanced content and functionality are accessible to those with more </a:t>
-            </a:r>
-            <a:r>
-              <a:rPr lang="en-US" dirty="0" smtClean="0"/>
-              <a:t>capability</a:t>
-            </a:r>
-          </a:p>
-          <a:p>
-            <a:r>
-              <a:rPr lang="en-US" dirty="0"/>
-              <a:t>C</a:t>
-            </a:r>
-            <a:r>
-              <a:rPr lang="en-US" dirty="0" smtClean="0"/>
-              <a:t>oncentrate </a:t>
-            </a:r>
-            <a:r>
-              <a:rPr lang="en-US" dirty="0"/>
-              <a:t>first on displaying the content in the simplest manner.</a:t>
-            </a:r>
-            <a:endParaRPr lang="en-US" dirty="0"/>
-          </a:p>
-          <a:p>
-            <a:r>
-              <a:rPr lang="en-US" dirty="0" smtClean="0"/>
-              <a:t>MVC for web</a:t>
-            </a:r>
-          </a:p>
-        </p:txBody>
-      </p:sp>
-    </p:spTree>
-    <p:custDataLst>
-      <p:tags r:id="rId1"/>
-    </p:custDataLst>
-    <p:extLst>
-      <p:ext uri="{BB962C8B-B14F-4D97-AF65-F5344CB8AC3E}">
-        <p14:creationId xmlns:p14="http://schemas.microsoft.com/office/powerpoint/2010/main" val="1877717642"/>
-      </p:ext>
-    </p:extLst>
-  </p:cSld>
-  <p:clrMapOvr>
-    <a:masterClrMapping/>
-  </p:clrMapOvr>
-  <p:transition spd="slow">
-    <p:wipe dir="d"/>
-  </p:transition>
-  <p:timing>
-    <p:tnLst>
-      <p:par>
-        <p:cTn id="1" dur="indefinite" restart="never" nodeType="tmRoot"/>
-      </p:par>
-    </p:tnLst>
-  </p:timing>
-</p:sld>
-</file>
-
-<file path=ppt/slides/slide6.xml><?xml version="1.0" encoding="utf-8"?>
 <p:sld xmlns:a="http://schemas.openxmlformats.org/drawingml/2006/main" xmlns:r="http://schemas.openxmlformats.org/officeDocument/2006/relationships" xmlns:p="http://schemas.openxmlformats.org/presentationml/2006/main">
   <p:cSld>
     <p:spTree>
@@ -7621,6 +8312,165 @@
 </p:sld>
 </file>
 
+<file path=ppt/slides/slide6.xml><?xml version="1.0" encoding="utf-8"?>
+<p:sld xmlns:a="http://schemas.openxmlformats.org/drawingml/2006/main" xmlns:r="http://schemas.openxmlformats.org/officeDocument/2006/relationships" xmlns:p="http://schemas.openxmlformats.org/presentationml/2006/main">
+  <p:cSld>
+    <p:spTree>
+      <p:nvGrpSpPr>
+        <p:cNvPr id="1" name=""/>
+        <p:cNvGrpSpPr/>
+        <p:nvPr/>
+      </p:nvGrpSpPr>
+      <p:grpSpPr>
+        <a:xfrm>
+          <a:off x="0" y="0"/>
+          <a:ext cx="0" cy="0"/>
+          <a:chOff x="0" y="0"/>
+          <a:chExt cx="0" cy="0"/>
+        </a:xfrm>
+      </p:grpSpPr>
+      <p:sp>
+        <p:nvSpPr>
+          <p:cNvPr id="2" name="Title 1"/>
+          <p:cNvSpPr>
+            <a:spLocks noGrp="1"/>
+          </p:cNvSpPr>
+          <p:nvPr>
+            <p:ph type="title"/>
+            <p:custDataLst>
+              <p:tags r:id="rId2"/>
+            </p:custDataLst>
+          </p:nvPr>
+        </p:nvSpPr>
+        <p:spPr/>
+        <p:txBody>
+          <a:bodyPr/>
+          <a:lstStyle/>
+          <a:p>
+            <a:r>
+              <a:rPr lang="en-US" dirty="0" smtClean="0"/>
+              <a:t>Progressive Enhancement</a:t>
+            </a:r>
+            <a:endParaRPr lang="en-US" dirty="0"/>
+          </a:p>
+        </p:txBody>
+      </p:sp>
+      <p:sp>
+        <p:nvSpPr>
+          <p:cNvPr id="5" name="Content Placeholder 4"/>
+          <p:cNvSpPr>
+            <a:spLocks noGrp="1"/>
+          </p:cNvSpPr>
+          <p:nvPr>
+            <p:ph idx="1"/>
+            <p:custDataLst>
+              <p:tags r:id="rId3"/>
+            </p:custDataLst>
+          </p:nvPr>
+        </p:nvSpPr>
+        <p:spPr/>
+        <p:txBody>
+          <a:bodyPr>
+            <a:normAutofit fontScale="85000" lnSpcReduction="10000"/>
+          </a:bodyPr>
+          <a:lstStyle/>
+          <a:p>
+            <a:r>
+              <a:rPr lang="en-US" dirty="0" smtClean="0"/>
+              <a:t>Approach </a:t>
+            </a:r>
+            <a:r>
+              <a:rPr lang="en-US" dirty="0"/>
+              <a:t>to Web design that promotes accessibility using semantic HTML, </a:t>
+            </a:r>
+            <a:r>
+              <a:rPr lang="en-US" dirty="0" smtClean="0"/>
+              <a:t>style sheets </a:t>
+            </a:r>
+            <a:r>
+              <a:rPr lang="en-US" dirty="0"/>
+              <a:t>and scripting</a:t>
+            </a:r>
+            <a:r>
+              <a:rPr lang="en-US" dirty="0" smtClean="0"/>
+              <a:t>.</a:t>
+            </a:r>
+          </a:p>
+          <a:p>
+            <a:r>
+              <a:rPr lang="en-US" dirty="0" smtClean="0"/>
+              <a:t>Create Web </a:t>
+            </a:r>
+            <a:r>
+              <a:rPr lang="en-US" dirty="0"/>
+              <a:t>site where basic content is available to everyone while more advanced content and functionality are accessible to those with more </a:t>
+            </a:r>
+            <a:r>
+              <a:rPr lang="en-US" dirty="0" smtClean="0"/>
+              <a:t>capability</a:t>
+            </a:r>
+          </a:p>
+          <a:p>
+            <a:r>
+              <a:rPr lang="en-US" dirty="0"/>
+              <a:t>C</a:t>
+            </a:r>
+            <a:r>
+              <a:rPr lang="en-US" dirty="0" smtClean="0"/>
+              <a:t>oncentrate </a:t>
+            </a:r>
+            <a:r>
+              <a:rPr lang="en-US" dirty="0"/>
+              <a:t>first on displaying the content in the simplest manner.</a:t>
+            </a:r>
+          </a:p>
+          <a:p>
+            <a:r>
+              <a:rPr lang="en-US" dirty="0" smtClean="0"/>
+              <a:t>MVC for </a:t>
+            </a:r>
+            <a:r>
+              <a:rPr lang="en-US" dirty="0" smtClean="0"/>
+              <a:t>web – HTML as data, </a:t>
+            </a:r>
+            <a:r>
+              <a:rPr lang="en-US" dirty="0" err="1" smtClean="0"/>
+              <a:t>css</a:t>
+            </a:r>
+            <a:r>
+              <a:rPr lang="en-US" dirty="0" smtClean="0"/>
+              <a:t> as presentation and Java Script to manage interactions</a:t>
+            </a:r>
+            <a:endParaRPr lang="en-US" dirty="0" smtClean="0"/>
+          </a:p>
+        </p:txBody>
+      </p:sp>
+    </p:spTree>
+    <p:custDataLst>
+      <p:tags r:id="rId1"/>
+    </p:custDataLst>
+    <p:extLst>
+      <p:ext uri="{BB962C8B-B14F-4D97-AF65-F5344CB8AC3E}">
+        <p14:creationId xmlns:p14="http://schemas.microsoft.com/office/powerpoint/2010/main" val="1877717642"/>
+      </p:ext>
+    </p:extLst>
+  </p:cSld>
+  <p:clrMapOvr>
+    <a:masterClrMapping/>
+  </p:clrMapOvr>
+  <p:transition spd="slow">
+    <p:wipe dir="d"/>
+  </p:transition>
+  <p:timing>
+    <p:tnLst>
+      <p:par>
+        <p:cTn id="1" dur="indefinite" restart="never" nodeType="tmRoot"/>
+      </p:par>
+    </p:tnLst>
+  </p:timing>
+</p:sld>
+</file>
+
 <file path=ppt/slides/slide7.xml><?xml version="1.0" encoding="utf-8"?>
 <p:sld xmlns:a="http://schemas.openxmlformats.org/drawingml/2006/main" xmlns:r="http://schemas.openxmlformats.org/officeDocument/2006/relationships" xmlns:p="http://schemas.openxmlformats.org/presentationml/2006/main">
   <p:cSld>
@@ -7646,6 +8496,35 @@
           </p:cNvSpPr>
           <p:nvPr>
             <p:ph type="title"/>
+            <p:custDataLst>
+              <p:tags r:id="rId2"/>
+            </p:custDataLst>
+          </p:nvPr>
+        </p:nvSpPr>
+        <p:spPr/>
+        <p:txBody>
+          <a:bodyPr/>
+          <a:lstStyle/>
+          <a:p>
+            <a:r>
+              <a:rPr lang="en-US" dirty="0" smtClean="0"/>
+              <a:t>Fallback</a:t>
+            </a:r>
+            <a:endParaRPr lang="en-US" dirty="0"/>
+          </a:p>
+        </p:txBody>
+      </p:sp>
+      <p:sp>
+        <p:nvSpPr>
+          <p:cNvPr id="5" name="Content Placeholder 4"/>
+          <p:cNvSpPr>
+            <a:spLocks noGrp="1"/>
+          </p:cNvSpPr>
+          <p:nvPr>
+            <p:ph idx="1"/>
+            <p:custDataLst>
+              <p:tags r:id="rId3"/>
+            </p:custDataLst>
           </p:nvPr>
         </p:nvSpPr>
         <p:spPr/>
@@ -7657,6 +8536,88 @@
           <a:p>
             <a:r>
               <a:rPr lang="en-US" dirty="0" smtClean="0"/>
+              <a:t>Modernizer – demo</a:t>
+            </a:r>
+          </a:p>
+          <a:p>
+            <a:pPr lvl="1"/>
+            <a:r>
+              <a:rPr lang="en-US" dirty="0" err="1" smtClean="0"/>
+              <a:t>polyfills</a:t>
+            </a:r>
+            <a:endParaRPr lang="en-US" dirty="0" smtClean="0"/>
+          </a:p>
+          <a:p>
+            <a:r>
+              <a:rPr lang="en-US" dirty="0" smtClean="0"/>
+              <a:t>Html 5 shiv - demo</a:t>
+            </a:r>
+            <a:endParaRPr lang="en-US" dirty="0" smtClean="0"/>
+          </a:p>
+        </p:txBody>
+      </p:sp>
+    </p:spTree>
+    <p:custDataLst>
+      <p:tags r:id="rId1"/>
+    </p:custDataLst>
+    <p:extLst>
+      <p:ext uri="{BB962C8B-B14F-4D97-AF65-F5344CB8AC3E}">
+        <p14:creationId xmlns:p14="http://schemas.microsoft.com/office/powerpoint/2010/main" val="2020274867"/>
+      </p:ext>
+    </p:extLst>
+  </p:cSld>
+  <p:clrMapOvr>
+    <a:masterClrMapping/>
+  </p:clrMapOvr>
+  <p:transition spd="slow">
+    <p:wipe dir="d"/>
+  </p:transition>
+  <p:timing>
+    <p:tnLst>
+      <p:par>
+        <p:cTn id="1" dur="indefinite" restart="never" nodeType="tmRoot"/>
+      </p:par>
+    </p:tnLst>
+  </p:timing>
+</p:sld>
+</file>
+
+<file path=ppt/slides/slide8.xml><?xml version="1.0" encoding="utf-8"?>
+<p:sld xmlns:a="http://schemas.openxmlformats.org/drawingml/2006/main" xmlns:r="http://schemas.openxmlformats.org/officeDocument/2006/relationships" xmlns:p="http://schemas.openxmlformats.org/presentationml/2006/main">
+  <p:cSld>
+    <p:spTree>
+      <p:nvGrpSpPr>
+        <p:cNvPr id="1" name=""/>
+        <p:cNvGrpSpPr/>
+        <p:nvPr/>
+      </p:nvGrpSpPr>
+      <p:grpSpPr>
+        <a:xfrm>
+          <a:off x="0" y="0"/>
+          <a:ext cx="0" cy="0"/>
+          <a:chOff x="0" y="0"/>
+          <a:chExt cx="0" cy="0"/>
+        </a:xfrm>
+      </p:grpSpPr>
+      <p:sp>
+        <p:nvSpPr>
+          <p:cNvPr id="2" name="Title 1"/>
+          <p:cNvSpPr>
+            <a:spLocks noGrp="1"/>
+          </p:cNvSpPr>
+          <p:nvPr>
+            <p:ph type="title"/>
+          </p:nvPr>
+        </p:nvSpPr>
+        <p:spPr/>
+        <p:txBody>
+          <a:bodyPr>
+            <a:normAutofit/>
+          </a:bodyPr>
+          <a:lstStyle/>
+          <a:p>
+            <a:r>
+              <a:rPr lang="en-US" dirty="0" smtClean="0"/>
               <a:t>Semantic HTML</a:t>
             </a:r>
             <a:endParaRPr lang="en-US" dirty="0"/>
@@ -7692,6 +8653,19 @@
             <a:r>
               <a:rPr lang="en-US" dirty="0" smtClean="0"/>
               <a:t>.</a:t>
+            </a:r>
+          </a:p>
+          <a:p>
+            <a:pPr marL="0" indent="0" algn="ctr">
+              <a:buNone/>
+            </a:pPr>
+            <a:r>
+              <a:rPr lang="en-US" dirty="0" smtClean="0"/>
+              <a:t>Demo – old way of </a:t>
+            </a:r>
+            <a:r>
+              <a:rPr lang="en-US" smtClean="0"/>
+              <a:t>doing things</a:t>
             </a:r>
             <a:endParaRPr lang="en-US" dirty="0"/>
           </a:p>
@@ -7720,7 +8694,7 @@
 </p:sld>
 </file>
 
-<file path=ppt/slides/slide8.xml><?xml version="1.0" encoding="utf-8"?>
+<file path=ppt/slides/slide9.xml><?xml version="1.0" encoding="utf-8"?>
 <p:sld xmlns:a="http://schemas.openxmlformats.org/drawingml/2006/main" xmlns:r="http://schemas.openxmlformats.org/officeDocument/2006/relationships" xmlns:p="http://schemas.openxmlformats.org/presentationml/2006/main">
   <p:cSld>
     <p:spTree>
@@ -7854,7 +8828,6 @@
               <a:rPr lang="en-US" dirty="0" smtClean="0"/>
               <a:t>IE</a:t>
             </a:r>
-            <a:endParaRPr lang="en-US" dirty="0" smtClean="0"/>
           </a:p>
         </p:txBody>
       </p:sp>
@@ -7884,110 +8857,6 @@
 </p:sld>
 </file>
 
-<file path=ppt/slides/slide9.xml><?xml version="1.0" encoding="utf-8"?>
-<p:sld xmlns:a="http://schemas.openxmlformats.org/drawingml/2006/main" xmlns:r="http://schemas.openxmlformats.org/officeDocument/2006/relationships" xmlns:p="http://schemas.openxmlformats.org/presentationml/2006/main">
-  <p:cSld>
-    <p:spTree>
-      <p:nvGrpSpPr>
-        <p:cNvPr id="1" name=""/>
-        <p:cNvGrpSpPr/>
-        <p:nvPr/>
-      </p:nvGrpSpPr>
-      <p:grpSpPr>
-        <a:xfrm>
-          <a:off x="0" y="0"/>
-          <a:ext cx="0" cy="0"/>
-          <a:chOff x="0" y="0"/>
-          <a:chExt cx="0" cy="0"/>
-        </a:xfrm>
-      </p:grpSpPr>
-      <p:sp>
-        <p:nvSpPr>
-          <p:cNvPr id="7" name="TextBox 6"/>
-          <p:cNvSpPr txBox="1"/>
-          <p:nvPr/>
-        </p:nvSpPr>
-        <p:spPr>
-          <a:xfrm>
-            <a:off x="1295400" y="2363450"/>
-            <a:ext cx="6781800" cy="3808750"/>
-          </a:xfrm>
-          <a:prstGeom prst="rect">
-            <a:avLst/>
-          </a:prstGeom>
-          <a:noFill/>
-        </p:spPr>
-        <p:txBody>
-          <a:bodyPr wrap="square" rtlCol="0">
-            <a:normAutofit/>
-          </a:bodyPr>
-          <a:lstStyle/>
-          <a:p>
-            <a:r>
-              <a:rPr lang="en-US" sz="7200" dirty="0" smtClean="0"/>
-              <a:t>HTML 5 </a:t>
-            </a:r>
-            <a:r>
-              <a:rPr lang="en-US" sz="7200" dirty="0" err="1" smtClean="0"/>
-              <a:t>Microformats</a:t>
-            </a:r>
-            <a:endParaRPr lang="en-US" sz="7200" dirty="0"/>
-          </a:p>
-        </p:txBody>
-      </p:sp>
-      <p:pic>
-        <p:nvPicPr>
-          <p:cNvPr id="12" name="Picture 11"/>
-          <p:cNvPicPr>
-            <a:picLocks noChangeAspect="1"/>
-          </p:cNvPicPr>
-          <p:nvPr/>
-        </p:nvPicPr>
-        <p:blipFill>
-          <a:blip r:embed="rId3" cstate="email">
-            <a:extLst>
-              <a:ext uri="{28A0092B-C50C-407E-A947-70E740481C1C}">
-                <a14:useLocalDpi xmlns:a14="http://schemas.microsoft.com/office/drawing/2010/main"/>
-              </a:ext>
-            </a:extLst>
-          </a:blip>
-          <a:stretch>
-            <a:fillRect/>
-          </a:stretch>
-        </p:blipFill>
-        <p:spPr>
-          <a:xfrm>
-            <a:off x="4191000" y="0"/>
-            <a:ext cx="7765662" cy="16476125"/>
-          </a:xfrm>
-          <a:prstGeom prst="rect">
-            <a:avLst/>
-          </a:prstGeom>
-        </p:spPr>
-      </p:pic>
-    </p:spTree>
-    <p:extLst>
-      <p:ext uri="{BB962C8B-B14F-4D97-AF65-F5344CB8AC3E}">
-        <p14:creationId xmlns:p14="http://schemas.microsoft.com/office/powerpoint/2010/main" val="107946701"/>
-      </p:ext>
-    </p:extLst>
-  </p:cSld>
-  <p:clrMapOvr>
-    <a:masterClrMapping/>
-  </p:clrMapOvr>
-  <p:transition spd="slow">
-    <p:fade/>
-  </p:transition>
-  <p:timing>
-    <p:tnLst>
-      <p:par>
-        <p:cTn id="1" dur="indefinite" restart="never" nodeType="tmRoot"/>
-      </p:par>
-    </p:tnLst>
-  </p:timing>
-</p:sld>
-</file>
-
 <file path=ppt/tags/tag1.xml><?xml version="1.0" encoding="utf-8"?>
 <p:tagLst xmlns:a="http://schemas.openxmlformats.org/drawingml/2006/main" xmlns:r="http://schemas.openxmlformats.org/officeDocument/2006/relationships" xmlns:p="http://schemas.openxmlformats.org/presentationml/2006/main">
   <p:tag name="DVSECTIONID" val="yI2DOt6RzRcU51QxdhNewL"/>
@@ -8134,19 +9003,73 @@
 
 <file path=ppt/tags/tag31.xml><?xml version="1.0" encoding="utf-8"?>
 <p:tagLst xmlns:a="http://schemas.openxmlformats.org/drawingml/2006/main" xmlns:r="http://schemas.openxmlformats.org/officeDocument/2006/relationships" xmlns:p="http://schemas.openxmlformats.org/presentationml/2006/main">
+  <p:tag name="DVSECTIONID" val="QUq8QELArFIgadhH063fpq"/>
+</p:tagLst>
+</file>
+
+<file path=ppt/tags/tag32.xml><?xml version="1.0" encoding="utf-8"?>
+<p:tagLst xmlns:a="http://schemas.openxmlformats.org/drawingml/2006/main" xmlns:r="http://schemas.openxmlformats.org/officeDocument/2006/relationships" xmlns:p="http://schemas.openxmlformats.org/presentationml/2006/main">
+  <p:tag name="DVSHAPEID" val="InkrlxYPS4jAzciXk8ToAM"/>
+</p:tagLst>
+</file>
+
+<file path=ppt/tags/tag33.xml><?xml version="1.0" encoding="utf-8"?>
+<p:tagLst xmlns:a="http://schemas.openxmlformats.org/drawingml/2006/main" xmlns:r="http://schemas.openxmlformats.org/officeDocument/2006/relationships" xmlns:p="http://schemas.openxmlformats.org/presentationml/2006/main">
+  <p:tag name="DVSHAPEID" val="retnMj4SFfqbVIhVK0Rf83"/>
+</p:tagLst>
+</file>
+
+<file path=ppt/tags/tag34.xml><?xml version="1.0" encoding="utf-8"?>
+<p:tagLst xmlns:a="http://schemas.openxmlformats.org/drawingml/2006/main" xmlns:r="http://schemas.openxmlformats.org/officeDocument/2006/relationships" xmlns:p="http://schemas.openxmlformats.org/presentationml/2006/main">
+  <p:tag name="DVSECTIONID" val="QUq8QELArFIgadhH063fpq"/>
+</p:tagLst>
+</file>
+
+<file path=ppt/tags/tag35.xml><?xml version="1.0" encoding="utf-8"?>
+<p:tagLst xmlns:a="http://schemas.openxmlformats.org/drawingml/2006/main" xmlns:r="http://schemas.openxmlformats.org/officeDocument/2006/relationships" xmlns:p="http://schemas.openxmlformats.org/presentationml/2006/main">
+  <p:tag name="DVSHAPEID" val="InkrlxYPS4jAzciXk8ToAM"/>
+</p:tagLst>
+</file>
+
+<file path=ppt/tags/tag36.xml><?xml version="1.0" encoding="utf-8"?>
+<p:tagLst xmlns:a="http://schemas.openxmlformats.org/drawingml/2006/main" xmlns:r="http://schemas.openxmlformats.org/officeDocument/2006/relationships" xmlns:p="http://schemas.openxmlformats.org/presentationml/2006/main">
+  <p:tag name="DVSHAPEID" val="retnMj4SFfqbVIhVK0Rf83"/>
+</p:tagLst>
+</file>
+
+<file path=ppt/tags/tag37.xml><?xml version="1.0" encoding="utf-8"?>
+<p:tagLst xmlns:a="http://schemas.openxmlformats.org/drawingml/2006/main" xmlns:r="http://schemas.openxmlformats.org/officeDocument/2006/relationships" xmlns:p="http://schemas.openxmlformats.org/presentationml/2006/main">
+  <p:tag name="DVSECTIONID" val="QUq8QELArFIgadhH063fpq"/>
+</p:tagLst>
+</file>
+
+<file path=ppt/tags/tag38.xml><?xml version="1.0" encoding="utf-8"?>
+<p:tagLst xmlns:a="http://schemas.openxmlformats.org/drawingml/2006/main" xmlns:r="http://schemas.openxmlformats.org/officeDocument/2006/relationships" xmlns:p="http://schemas.openxmlformats.org/presentationml/2006/main">
+  <p:tag name="DVSHAPEID" val="InkrlxYPS4jAzciXk8ToAM"/>
+</p:tagLst>
+</file>
+
+<file path=ppt/tags/tag39.xml><?xml version="1.0" encoding="utf-8"?>
+<p:tagLst xmlns:a="http://schemas.openxmlformats.org/drawingml/2006/main" xmlns:r="http://schemas.openxmlformats.org/officeDocument/2006/relationships" xmlns:p="http://schemas.openxmlformats.org/presentationml/2006/main">
+  <p:tag name="DVSHAPEID" val="retnMj4SFfqbVIhVK0Rf83"/>
+</p:tagLst>
+</file>
+
+<file path=ppt/tags/tag4.xml><?xml version="1.0" encoding="utf-8"?>
+<p:tagLst xmlns:a="http://schemas.openxmlformats.org/drawingml/2006/main" xmlns:r="http://schemas.openxmlformats.org/officeDocument/2006/relationships" xmlns:p="http://schemas.openxmlformats.org/presentationml/2006/main">
+  <p:tag name="DVSECTIONID" val="QUq8QELArFIgadhH063fpq"/>
+</p:tagLst>
+</file>
+
+<file path=ppt/tags/tag40.xml><?xml version="1.0" encoding="utf-8"?>
+<p:tagLst xmlns:a="http://schemas.openxmlformats.org/drawingml/2006/main" xmlns:r="http://schemas.openxmlformats.org/officeDocument/2006/relationships" xmlns:p="http://schemas.openxmlformats.org/presentationml/2006/main">
   <p:tag name="DVSECTIONID" val="ezdaKHeWyBnZyZ2cDqRSoa"/>
 </p:tagLst>
 </file>
 
-<file path=ppt/tags/tag32.xml><?xml version="1.0" encoding="utf-8"?>
+<file path=ppt/tags/tag41.xml><?xml version="1.0" encoding="utf-8"?>
 <p:tagLst xmlns:a="http://schemas.openxmlformats.org/drawingml/2006/main" xmlns:r="http://schemas.openxmlformats.org/officeDocument/2006/relationships" xmlns:p="http://schemas.openxmlformats.org/presentationml/2006/main">
   <p:tag name="DVSHAPEID" val="LRMR96J2MVd0CGe2e5htjk"/>
-</p:tagLst>
-</file>
-
-<file path=ppt/tags/tag4.xml><?xml version="1.0" encoding="utf-8"?>
-<p:tagLst xmlns:a="http://schemas.openxmlformats.org/drawingml/2006/main" xmlns:r="http://schemas.openxmlformats.org/officeDocument/2006/relationships" xmlns:p="http://schemas.openxmlformats.org/presentationml/2006/main">
-  <p:tag name="DVSECTIONID" val="QUq8QELArFIgadhH063fpq"/>
 </p:tagLst>
 </file>
 

</xml_diff>

<commit_message>
added accessible jquery ui widgets
</commit_message>
<xml_diff>
--- a/ppt/aria.pptx
+++ b/ppt/aria.pptx
@@ -5,33 +5,39 @@
     <p:sldMasterId id="2147483648" r:id="rId1"/>
   </p:sldMasterIdLst>
   <p:notesMasterIdLst>
-    <p:notesMasterId r:id="rId23"/>
+    <p:notesMasterId r:id="rId29"/>
   </p:notesMasterIdLst>
   <p:handoutMasterIdLst>
-    <p:handoutMasterId r:id="rId24"/>
+    <p:handoutMasterId r:id="rId30"/>
   </p:handoutMasterIdLst>
   <p:sldIdLst>
     <p:sldId id="259" r:id="rId2"/>
     <p:sldId id="281" r:id="rId3"/>
-    <p:sldId id="308" r:id="rId4"/>
-    <p:sldId id="310" r:id="rId5"/>
-    <p:sldId id="303" r:id="rId6"/>
-    <p:sldId id="304" r:id="rId7"/>
-    <p:sldId id="319" r:id="rId8"/>
-    <p:sldId id="311" r:id="rId9"/>
-    <p:sldId id="306" r:id="rId10"/>
-    <p:sldId id="313" r:id="rId11"/>
-    <p:sldId id="309" r:id="rId12"/>
-    <p:sldId id="312" r:id="rId13"/>
-    <p:sldId id="314" r:id="rId14"/>
-    <p:sldId id="307" r:id="rId15"/>
-    <p:sldId id="315" r:id="rId16"/>
-    <p:sldId id="300" r:id="rId17"/>
-    <p:sldId id="316" r:id="rId18"/>
-    <p:sldId id="317" r:id="rId19"/>
-    <p:sldId id="318" r:id="rId20"/>
-    <p:sldId id="292" r:id="rId21"/>
-    <p:sldId id="277" r:id="rId22"/>
+    <p:sldId id="320" r:id="rId4"/>
+    <p:sldId id="322" r:id="rId5"/>
+    <p:sldId id="323" r:id="rId6"/>
+    <p:sldId id="325" r:id="rId7"/>
+    <p:sldId id="308" r:id="rId8"/>
+    <p:sldId id="324" r:id="rId9"/>
+    <p:sldId id="321" r:id="rId10"/>
+    <p:sldId id="310" r:id="rId11"/>
+    <p:sldId id="303" r:id="rId12"/>
+    <p:sldId id="304" r:id="rId13"/>
+    <p:sldId id="319" r:id="rId14"/>
+    <p:sldId id="311" r:id="rId15"/>
+    <p:sldId id="306" r:id="rId16"/>
+    <p:sldId id="313" r:id="rId17"/>
+    <p:sldId id="309" r:id="rId18"/>
+    <p:sldId id="312" r:id="rId19"/>
+    <p:sldId id="314" r:id="rId20"/>
+    <p:sldId id="307" r:id="rId21"/>
+    <p:sldId id="315" r:id="rId22"/>
+    <p:sldId id="300" r:id="rId23"/>
+    <p:sldId id="316" r:id="rId24"/>
+    <p:sldId id="317" r:id="rId25"/>
+    <p:sldId id="318" r:id="rId26"/>
+    <p:sldId id="292" r:id="rId27"/>
+    <p:sldId id="277" r:id="rId28"/>
   </p:sldIdLst>
   <p:sldSz cx="9144000" cy="6858000" type="screen4x3"/>
   <p:notesSz cx="6858000" cy="9144000"/>
@@ -137,7 +143,13 @@
           <p14:sldIdLst>
             <p14:sldId id="259"/>
             <p14:sldId id="281"/>
+            <p14:sldId id="320"/>
+            <p14:sldId id="322"/>
+            <p14:sldId id="323"/>
+            <p14:sldId id="325"/>
             <p14:sldId id="308"/>
+            <p14:sldId id="324"/>
+            <p14:sldId id="321"/>
             <p14:sldId id="310"/>
           </p14:sldIdLst>
         </p14:section>
@@ -255,7 +267,7 @@
             <a:fld id="{D83FDC75-7F73-4A4A-A77C-09AADF00E0EA}" type="datetimeFigureOut">
               <a:rPr lang="en-US" smtClean="0"/>
               <a:pPr/>
-              <a:t>11/16/2013</a:t>
+              <a:t>11/17/2013</a:t>
             </a:fld>
             <a:endParaRPr lang="en-US" dirty="0"/>
           </a:p>
@@ -422,7 +434,7 @@
             <a:fld id="{48AEF76B-3757-4A0B-AF93-28494465C1DD}" type="datetimeFigureOut">
               <a:rPr lang="en-US" smtClean="0"/>
               <a:pPr/>
-              <a:t>11/16/2013</a:t>
+              <a:t>11/17/2013</a:t>
             </a:fld>
             <a:endParaRPr lang="en-US" dirty="0"/>
           </a:p>
@@ -1013,7 +1025,7 @@
             <a:fld id="{EC6EAC7D-5A89-47C2-8ABA-56C9C2DEF7A4}" type="slidenum">
               <a:rPr lang="en-US" smtClean="0"/>
               <a:pPr/>
-              <a:t>11</a:t>
+              <a:t>10</a:t>
             </a:fld>
             <a:endParaRPr lang="en-US"/>
           </a:p>
@@ -1093,7 +1105,7 @@
             <a:fld id="{75693FD4-8F83-4EF7-AC3F-0DC0388986B0}" type="slidenum">
               <a:rPr lang="en-US" smtClean="0"/>
               <a:pPr/>
-              <a:t>12</a:t>
+              <a:t>11</a:t>
             </a:fld>
             <a:endParaRPr lang="en-US"/>
           </a:p>
@@ -1180,7 +1192,7 @@
             <a:fld id="{EC6EAC7D-5A89-47C2-8ABA-56C9C2DEF7A4}" type="slidenum">
               <a:rPr lang="en-US" smtClean="0"/>
               <a:pPr/>
-              <a:t>13</a:t>
+              <a:t>12</a:t>
             </a:fld>
             <a:endParaRPr lang="en-US"/>
           </a:p>
@@ -1267,7 +1279,7 @@
             <a:fld id="{EC6EAC7D-5A89-47C2-8ABA-56C9C2DEF7A4}" type="slidenum">
               <a:rPr lang="en-US" smtClean="0"/>
               <a:pPr/>
-              <a:t>14</a:t>
+              <a:t>13</a:t>
             </a:fld>
             <a:endParaRPr lang="en-US"/>
           </a:p>
@@ -1409,29 +1421,36 @@
         </p:nvSpPr>
         <p:spPr/>
         <p:txBody>
+          <a:bodyPr>
+            <a:normAutofit/>
+          </a:bodyPr>
+          <a:lstStyle/>
+          <a:p>
+            <a:pPr>
+              <a:lnSpc>
+                <a:spcPct val="80000"/>
+              </a:lnSpc>
+            </a:pPr>
+            <a:endParaRPr lang="en-US" dirty="0" smtClean="0"/>
+          </a:p>
+        </p:txBody>
+      </p:sp>
+      <p:sp>
+        <p:nvSpPr>
+          <p:cNvPr id="4" name="Slide Number Placeholder 3"/>
+          <p:cNvSpPr>
+            <a:spLocks noGrp="1"/>
+          </p:cNvSpPr>
+          <p:nvPr>
+            <p:ph type="sldNum" sz="quarter" idx="10"/>
+          </p:nvPr>
+        </p:nvSpPr>
+        <p:spPr/>
+        <p:txBody>
           <a:bodyPr/>
           <a:lstStyle/>
           <a:p>
-            <a:endParaRPr lang="en-US" dirty="0"/>
-          </a:p>
-        </p:txBody>
-      </p:sp>
-      <p:sp>
-        <p:nvSpPr>
-          <p:cNvPr id="4" name="Slide Number Placeholder 3"/>
-          <p:cNvSpPr>
-            <a:spLocks noGrp="1"/>
-          </p:cNvSpPr>
-          <p:nvPr>
-            <p:ph type="sldNum" sz="quarter" idx="10"/>
-          </p:nvPr>
-        </p:nvSpPr>
-        <p:spPr/>
-        <p:txBody>
-          <a:bodyPr/>
-          <a:lstStyle/>
-          <a:p>
-            <a:fld id="{75693FD4-8F83-4EF7-AC3F-0DC0388986B0}" type="slidenum">
+            <a:fld id="{EC6EAC7D-5A89-47C2-8ABA-56C9C2DEF7A4}" type="slidenum">
               <a:rPr lang="en-US" smtClean="0"/>
               <a:pPr/>
               <a:t>16</a:t>
@@ -1489,29 +1508,36 @@
         </p:nvSpPr>
         <p:spPr/>
         <p:txBody>
+          <a:bodyPr>
+            <a:normAutofit/>
+          </a:bodyPr>
+          <a:lstStyle/>
+          <a:p>
+            <a:pPr>
+              <a:lnSpc>
+                <a:spcPct val="80000"/>
+              </a:lnSpc>
+            </a:pPr>
+            <a:endParaRPr lang="en-US" dirty="0" smtClean="0"/>
+          </a:p>
+        </p:txBody>
+      </p:sp>
+      <p:sp>
+        <p:nvSpPr>
+          <p:cNvPr id="4" name="Slide Number Placeholder 3"/>
+          <p:cNvSpPr>
+            <a:spLocks noGrp="1"/>
+          </p:cNvSpPr>
+          <p:nvPr>
+            <p:ph type="sldNum" sz="quarter" idx="10"/>
+          </p:nvPr>
+        </p:nvSpPr>
+        <p:spPr/>
+        <p:txBody>
           <a:bodyPr/>
           <a:lstStyle/>
           <a:p>
-            <a:endParaRPr lang="en-US" dirty="0"/>
-          </a:p>
-        </p:txBody>
-      </p:sp>
-      <p:sp>
-        <p:nvSpPr>
-          <p:cNvPr id="4" name="Slide Number Placeholder 3"/>
-          <p:cNvSpPr>
-            <a:spLocks noGrp="1"/>
-          </p:cNvSpPr>
-          <p:nvPr>
-            <p:ph type="sldNum" sz="quarter" idx="10"/>
-          </p:nvPr>
-        </p:nvSpPr>
-        <p:spPr/>
-        <p:txBody>
-          <a:bodyPr/>
-          <a:lstStyle/>
-          <a:p>
-            <a:fld id="{75693FD4-8F83-4EF7-AC3F-0DC0388986B0}" type="slidenum">
+            <a:fld id="{EC6EAC7D-5A89-47C2-8ABA-56C9C2DEF7A4}" type="slidenum">
               <a:rPr lang="en-US" smtClean="0"/>
               <a:pPr/>
               <a:t>17</a:t>
@@ -1569,17 +1595,10 @@
         </p:nvSpPr>
         <p:spPr/>
         <p:txBody>
-          <a:bodyPr>
-            <a:normAutofit/>
-          </a:bodyPr>
-          <a:lstStyle/>
-          <a:p>
-            <a:pPr>
-              <a:lnSpc>
-                <a:spcPct val="80000"/>
-              </a:lnSpc>
-            </a:pPr>
-            <a:endParaRPr lang="en-US" dirty="0" smtClean="0"/>
+          <a:bodyPr/>
+          <a:lstStyle/>
+          <a:p>
+            <a:endParaRPr lang="en-US" dirty="0"/>
           </a:p>
         </p:txBody>
       </p:sp>
@@ -1598,7 +1617,7 @@
           <a:bodyPr/>
           <a:lstStyle/>
           <a:p>
-            <a:fld id="{EC6EAC7D-5A89-47C2-8ABA-56C9C2DEF7A4}" type="slidenum">
+            <a:fld id="{75693FD4-8F83-4EF7-AC3F-0DC0388986B0}" type="slidenum">
               <a:rPr lang="en-US" smtClean="0"/>
               <a:pPr/>
               <a:t>18</a:t>
@@ -1743,42 +1762,41 @@
         </p:nvSpPr>
         <p:spPr/>
         <p:txBody>
+          <a:bodyPr>
+            <a:normAutofit/>
+          </a:bodyPr>
+          <a:lstStyle/>
+          <a:p>
+            <a:pPr>
+              <a:lnSpc>
+                <a:spcPct val="80000"/>
+              </a:lnSpc>
+            </a:pPr>
+            <a:endParaRPr lang="en-US" dirty="0" smtClean="0"/>
+          </a:p>
+        </p:txBody>
+      </p:sp>
+      <p:sp>
+        <p:nvSpPr>
+          <p:cNvPr id="4" name="Slide Number Placeholder 3"/>
+          <p:cNvSpPr>
+            <a:spLocks noGrp="1"/>
+          </p:cNvSpPr>
+          <p:nvPr>
+            <p:ph type="sldNum" sz="quarter" idx="10"/>
+          </p:nvPr>
+        </p:nvSpPr>
+        <p:spPr/>
+        <p:txBody>
           <a:bodyPr/>
           <a:lstStyle/>
           <a:p>
-            <a:endParaRPr lang="en-US"/>
-          </a:p>
-        </p:txBody>
-      </p:sp>
-      <p:sp>
-        <p:nvSpPr>
-          <p:cNvPr id="4" name="Slide Number Placeholder 3"/>
-          <p:cNvSpPr>
-            <a:spLocks noGrp="1"/>
-          </p:cNvSpPr>
-          <p:nvPr>
-            <p:ph type="sldNum" sz="quarter" idx="10"/>
-          </p:nvPr>
-        </p:nvSpPr>
-        <p:spPr/>
-        <p:txBody>
-          <a:bodyPr/>
-          <a:lstStyle/>
-          <a:p>
-            <a:fld id="{75693FD4-8F83-4EF7-AC3F-0DC0388986B0}" type="slidenum">
-              <a:rPr lang="en-US" smtClean="0">
-                <a:solidFill>
-                  <a:prstClr val="black"/>
-                </a:solidFill>
-              </a:rPr>
+            <a:fld id="{EC6EAC7D-5A89-47C2-8ABA-56C9C2DEF7A4}" type="slidenum">
+              <a:rPr lang="en-US" smtClean="0"/>
               <a:pPr/>
               <a:t>20</a:t>
             </a:fld>
-            <a:endParaRPr lang="en-US">
-              <a:solidFill>
-                <a:prstClr val="black"/>
-              </a:solidFill>
-            </a:endParaRPr>
+            <a:endParaRPr lang="en-US"/>
           </a:p>
         </p:txBody>
       </p:sp>
@@ -1889,6 +1907,515 @@
       </p:grpSpPr>
       <p:sp>
         <p:nvSpPr>
+          <p:cNvPr id="2" name="Slide Image Placeholder 1"/>
+          <p:cNvSpPr>
+            <a:spLocks noGrp="1" noRot="1" noChangeAspect="1"/>
+          </p:cNvSpPr>
+          <p:nvPr>
+            <p:ph type="sldImg"/>
+          </p:nvPr>
+        </p:nvSpPr>
+        <p:spPr/>
+      </p:sp>
+      <p:sp>
+        <p:nvSpPr>
+          <p:cNvPr id="3" name="Notes Placeholder 2"/>
+          <p:cNvSpPr>
+            <a:spLocks noGrp="1"/>
+          </p:cNvSpPr>
+          <p:nvPr>
+            <p:ph type="body" idx="1"/>
+          </p:nvPr>
+        </p:nvSpPr>
+        <p:spPr/>
+        <p:txBody>
+          <a:bodyPr>
+            <a:normAutofit/>
+          </a:bodyPr>
+          <a:lstStyle/>
+          <a:p>
+            <a:pPr>
+              <a:lnSpc>
+                <a:spcPct val="80000"/>
+              </a:lnSpc>
+            </a:pPr>
+            <a:endParaRPr lang="en-US" dirty="0" smtClean="0"/>
+          </a:p>
+        </p:txBody>
+      </p:sp>
+      <p:sp>
+        <p:nvSpPr>
+          <p:cNvPr id="4" name="Slide Number Placeholder 3"/>
+          <p:cNvSpPr>
+            <a:spLocks noGrp="1"/>
+          </p:cNvSpPr>
+          <p:nvPr>
+            <p:ph type="sldNum" sz="quarter" idx="10"/>
+          </p:nvPr>
+        </p:nvSpPr>
+        <p:spPr/>
+        <p:txBody>
+          <a:bodyPr/>
+          <a:lstStyle/>
+          <a:p>
+            <a:fld id="{EC6EAC7D-5A89-47C2-8ABA-56C9C2DEF7A4}" type="slidenum">
+              <a:rPr lang="en-US" smtClean="0"/>
+              <a:pPr/>
+              <a:t>21</a:t>
+            </a:fld>
+            <a:endParaRPr lang="en-US"/>
+          </a:p>
+        </p:txBody>
+      </p:sp>
+    </p:spTree>
+  </p:cSld>
+  <p:clrMapOvr>
+    <a:masterClrMapping/>
+  </p:clrMapOvr>
+</p:notes>
+</file>
+
+<file path=ppt/notesSlides/notesSlide21.xml><?xml version="1.0" encoding="utf-8"?>
+<p:notes xmlns:a="http://schemas.openxmlformats.org/drawingml/2006/main" xmlns:r="http://schemas.openxmlformats.org/officeDocument/2006/relationships" xmlns:p="http://schemas.openxmlformats.org/presentationml/2006/main">
+  <p:cSld>
+    <p:spTree>
+      <p:nvGrpSpPr>
+        <p:cNvPr id="1" name=""/>
+        <p:cNvGrpSpPr/>
+        <p:nvPr/>
+      </p:nvGrpSpPr>
+      <p:grpSpPr>
+        <a:xfrm>
+          <a:off x="0" y="0"/>
+          <a:ext cx="0" cy="0"/>
+          <a:chOff x="0" y="0"/>
+          <a:chExt cx="0" cy="0"/>
+        </a:xfrm>
+      </p:grpSpPr>
+      <p:sp>
+        <p:nvSpPr>
+          <p:cNvPr id="2" name="Slide Image Placeholder 1"/>
+          <p:cNvSpPr>
+            <a:spLocks noGrp="1" noRot="1" noChangeAspect="1"/>
+          </p:cNvSpPr>
+          <p:nvPr>
+            <p:ph type="sldImg"/>
+          </p:nvPr>
+        </p:nvSpPr>
+        <p:spPr/>
+      </p:sp>
+      <p:sp>
+        <p:nvSpPr>
+          <p:cNvPr id="3" name="Notes Placeholder 2"/>
+          <p:cNvSpPr>
+            <a:spLocks noGrp="1"/>
+          </p:cNvSpPr>
+          <p:nvPr>
+            <p:ph type="body" idx="1"/>
+          </p:nvPr>
+        </p:nvSpPr>
+        <p:spPr/>
+        <p:txBody>
+          <a:bodyPr/>
+          <a:lstStyle/>
+          <a:p>
+            <a:endParaRPr lang="en-US" dirty="0"/>
+          </a:p>
+        </p:txBody>
+      </p:sp>
+      <p:sp>
+        <p:nvSpPr>
+          <p:cNvPr id="4" name="Slide Number Placeholder 3"/>
+          <p:cNvSpPr>
+            <a:spLocks noGrp="1"/>
+          </p:cNvSpPr>
+          <p:nvPr>
+            <p:ph type="sldNum" sz="quarter" idx="10"/>
+          </p:nvPr>
+        </p:nvSpPr>
+        <p:spPr/>
+        <p:txBody>
+          <a:bodyPr/>
+          <a:lstStyle/>
+          <a:p>
+            <a:fld id="{75693FD4-8F83-4EF7-AC3F-0DC0388986B0}" type="slidenum">
+              <a:rPr lang="en-US" smtClean="0"/>
+              <a:pPr/>
+              <a:t>22</a:t>
+            </a:fld>
+            <a:endParaRPr lang="en-US"/>
+          </a:p>
+        </p:txBody>
+      </p:sp>
+    </p:spTree>
+  </p:cSld>
+  <p:clrMapOvr>
+    <a:masterClrMapping/>
+  </p:clrMapOvr>
+</p:notes>
+</file>
+
+<file path=ppt/notesSlides/notesSlide22.xml><?xml version="1.0" encoding="utf-8"?>
+<p:notes xmlns:a="http://schemas.openxmlformats.org/drawingml/2006/main" xmlns:r="http://schemas.openxmlformats.org/officeDocument/2006/relationships" xmlns:p="http://schemas.openxmlformats.org/presentationml/2006/main">
+  <p:cSld>
+    <p:spTree>
+      <p:nvGrpSpPr>
+        <p:cNvPr id="1" name=""/>
+        <p:cNvGrpSpPr/>
+        <p:nvPr/>
+      </p:nvGrpSpPr>
+      <p:grpSpPr>
+        <a:xfrm>
+          <a:off x="0" y="0"/>
+          <a:ext cx="0" cy="0"/>
+          <a:chOff x="0" y="0"/>
+          <a:chExt cx="0" cy="0"/>
+        </a:xfrm>
+      </p:grpSpPr>
+      <p:sp>
+        <p:nvSpPr>
+          <p:cNvPr id="2" name="Slide Image Placeholder 1"/>
+          <p:cNvSpPr>
+            <a:spLocks noGrp="1" noRot="1" noChangeAspect="1"/>
+          </p:cNvSpPr>
+          <p:nvPr>
+            <p:ph type="sldImg"/>
+          </p:nvPr>
+        </p:nvSpPr>
+        <p:spPr/>
+      </p:sp>
+      <p:sp>
+        <p:nvSpPr>
+          <p:cNvPr id="3" name="Notes Placeholder 2"/>
+          <p:cNvSpPr>
+            <a:spLocks noGrp="1"/>
+          </p:cNvSpPr>
+          <p:nvPr>
+            <p:ph type="body" idx="1"/>
+          </p:nvPr>
+        </p:nvSpPr>
+        <p:spPr/>
+        <p:txBody>
+          <a:bodyPr/>
+          <a:lstStyle/>
+          <a:p>
+            <a:endParaRPr lang="en-US" dirty="0"/>
+          </a:p>
+        </p:txBody>
+      </p:sp>
+      <p:sp>
+        <p:nvSpPr>
+          <p:cNvPr id="4" name="Slide Number Placeholder 3"/>
+          <p:cNvSpPr>
+            <a:spLocks noGrp="1"/>
+          </p:cNvSpPr>
+          <p:nvPr>
+            <p:ph type="sldNum" sz="quarter" idx="10"/>
+          </p:nvPr>
+        </p:nvSpPr>
+        <p:spPr/>
+        <p:txBody>
+          <a:bodyPr/>
+          <a:lstStyle/>
+          <a:p>
+            <a:fld id="{75693FD4-8F83-4EF7-AC3F-0DC0388986B0}" type="slidenum">
+              <a:rPr lang="en-US" smtClean="0"/>
+              <a:pPr/>
+              <a:t>23</a:t>
+            </a:fld>
+            <a:endParaRPr lang="en-US"/>
+          </a:p>
+        </p:txBody>
+      </p:sp>
+    </p:spTree>
+  </p:cSld>
+  <p:clrMapOvr>
+    <a:masterClrMapping/>
+  </p:clrMapOvr>
+</p:notes>
+</file>
+
+<file path=ppt/notesSlides/notesSlide23.xml><?xml version="1.0" encoding="utf-8"?>
+<p:notes xmlns:a="http://schemas.openxmlformats.org/drawingml/2006/main" xmlns:r="http://schemas.openxmlformats.org/officeDocument/2006/relationships" xmlns:p="http://schemas.openxmlformats.org/presentationml/2006/main">
+  <p:cSld>
+    <p:spTree>
+      <p:nvGrpSpPr>
+        <p:cNvPr id="1" name=""/>
+        <p:cNvGrpSpPr/>
+        <p:nvPr/>
+      </p:nvGrpSpPr>
+      <p:grpSpPr>
+        <a:xfrm>
+          <a:off x="0" y="0"/>
+          <a:ext cx="0" cy="0"/>
+          <a:chOff x="0" y="0"/>
+          <a:chExt cx="0" cy="0"/>
+        </a:xfrm>
+      </p:grpSpPr>
+      <p:sp>
+        <p:nvSpPr>
+          <p:cNvPr id="2" name="Slide Image Placeholder 1"/>
+          <p:cNvSpPr>
+            <a:spLocks noGrp="1" noRot="1" noChangeAspect="1"/>
+          </p:cNvSpPr>
+          <p:nvPr>
+            <p:ph type="sldImg"/>
+          </p:nvPr>
+        </p:nvSpPr>
+        <p:spPr/>
+      </p:sp>
+      <p:sp>
+        <p:nvSpPr>
+          <p:cNvPr id="3" name="Notes Placeholder 2"/>
+          <p:cNvSpPr>
+            <a:spLocks noGrp="1"/>
+          </p:cNvSpPr>
+          <p:nvPr>
+            <p:ph type="body" idx="1"/>
+          </p:nvPr>
+        </p:nvSpPr>
+        <p:spPr/>
+        <p:txBody>
+          <a:bodyPr>
+            <a:normAutofit/>
+          </a:bodyPr>
+          <a:lstStyle/>
+          <a:p>
+            <a:pPr>
+              <a:lnSpc>
+                <a:spcPct val="80000"/>
+              </a:lnSpc>
+            </a:pPr>
+            <a:endParaRPr lang="en-US" dirty="0" smtClean="0"/>
+          </a:p>
+        </p:txBody>
+      </p:sp>
+      <p:sp>
+        <p:nvSpPr>
+          <p:cNvPr id="4" name="Slide Number Placeholder 3"/>
+          <p:cNvSpPr>
+            <a:spLocks noGrp="1"/>
+          </p:cNvSpPr>
+          <p:nvPr>
+            <p:ph type="sldNum" sz="quarter" idx="10"/>
+          </p:nvPr>
+        </p:nvSpPr>
+        <p:spPr/>
+        <p:txBody>
+          <a:bodyPr/>
+          <a:lstStyle/>
+          <a:p>
+            <a:fld id="{EC6EAC7D-5A89-47C2-8ABA-56C9C2DEF7A4}" type="slidenum">
+              <a:rPr lang="en-US" smtClean="0"/>
+              <a:pPr/>
+              <a:t>24</a:t>
+            </a:fld>
+            <a:endParaRPr lang="en-US"/>
+          </a:p>
+        </p:txBody>
+      </p:sp>
+    </p:spTree>
+  </p:cSld>
+  <p:clrMapOvr>
+    <a:masterClrMapping/>
+  </p:clrMapOvr>
+</p:notes>
+</file>
+
+<file path=ppt/notesSlides/notesSlide24.xml><?xml version="1.0" encoding="utf-8"?>
+<p:notes xmlns:a="http://schemas.openxmlformats.org/drawingml/2006/main" xmlns:r="http://schemas.openxmlformats.org/officeDocument/2006/relationships" xmlns:p="http://schemas.openxmlformats.org/presentationml/2006/main">
+  <p:cSld>
+    <p:spTree>
+      <p:nvGrpSpPr>
+        <p:cNvPr id="1" name=""/>
+        <p:cNvGrpSpPr/>
+        <p:nvPr/>
+      </p:nvGrpSpPr>
+      <p:grpSpPr>
+        <a:xfrm>
+          <a:off x="0" y="0"/>
+          <a:ext cx="0" cy="0"/>
+          <a:chOff x="0" y="0"/>
+          <a:chExt cx="0" cy="0"/>
+        </a:xfrm>
+      </p:grpSpPr>
+      <p:sp>
+        <p:nvSpPr>
+          <p:cNvPr id="2" name="Slide Image Placeholder 1"/>
+          <p:cNvSpPr>
+            <a:spLocks noGrp="1" noRot="1" noChangeAspect="1"/>
+          </p:cNvSpPr>
+          <p:nvPr>
+            <p:ph type="sldImg"/>
+          </p:nvPr>
+        </p:nvSpPr>
+        <p:spPr/>
+      </p:sp>
+      <p:sp>
+        <p:nvSpPr>
+          <p:cNvPr id="3" name="Notes Placeholder 2"/>
+          <p:cNvSpPr>
+            <a:spLocks noGrp="1"/>
+          </p:cNvSpPr>
+          <p:nvPr>
+            <p:ph type="body" idx="1"/>
+          </p:nvPr>
+        </p:nvSpPr>
+        <p:spPr/>
+        <p:txBody>
+          <a:bodyPr>
+            <a:normAutofit/>
+          </a:bodyPr>
+          <a:lstStyle/>
+          <a:p>
+            <a:pPr>
+              <a:lnSpc>
+                <a:spcPct val="80000"/>
+              </a:lnSpc>
+            </a:pPr>
+            <a:endParaRPr lang="en-US" dirty="0" smtClean="0"/>
+          </a:p>
+        </p:txBody>
+      </p:sp>
+      <p:sp>
+        <p:nvSpPr>
+          <p:cNvPr id="4" name="Slide Number Placeholder 3"/>
+          <p:cNvSpPr>
+            <a:spLocks noGrp="1"/>
+          </p:cNvSpPr>
+          <p:nvPr>
+            <p:ph type="sldNum" sz="quarter" idx="10"/>
+          </p:nvPr>
+        </p:nvSpPr>
+        <p:spPr/>
+        <p:txBody>
+          <a:bodyPr/>
+          <a:lstStyle/>
+          <a:p>
+            <a:fld id="{EC6EAC7D-5A89-47C2-8ABA-56C9C2DEF7A4}" type="slidenum">
+              <a:rPr lang="en-US" smtClean="0"/>
+              <a:pPr/>
+              <a:t>25</a:t>
+            </a:fld>
+            <a:endParaRPr lang="en-US"/>
+          </a:p>
+        </p:txBody>
+      </p:sp>
+    </p:spTree>
+  </p:cSld>
+  <p:clrMapOvr>
+    <a:masterClrMapping/>
+  </p:clrMapOvr>
+</p:notes>
+</file>
+
+<file path=ppt/notesSlides/notesSlide25.xml><?xml version="1.0" encoding="utf-8"?>
+<p:notes xmlns:a="http://schemas.openxmlformats.org/drawingml/2006/main" xmlns:r="http://schemas.openxmlformats.org/officeDocument/2006/relationships" xmlns:p="http://schemas.openxmlformats.org/presentationml/2006/main">
+  <p:cSld>
+    <p:spTree>
+      <p:nvGrpSpPr>
+        <p:cNvPr id="1" name=""/>
+        <p:cNvGrpSpPr/>
+        <p:nvPr/>
+      </p:nvGrpSpPr>
+      <p:grpSpPr>
+        <a:xfrm>
+          <a:off x="0" y="0"/>
+          <a:ext cx="0" cy="0"/>
+          <a:chOff x="0" y="0"/>
+          <a:chExt cx="0" cy="0"/>
+        </a:xfrm>
+      </p:grpSpPr>
+      <p:sp>
+        <p:nvSpPr>
+          <p:cNvPr id="2" name="Slide Image Placeholder 1"/>
+          <p:cNvSpPr>
+            <a:spLocks noGrp="1" noRot="1" noChangeAspect="1"/>
+          </p:cNvSpPr>
+          <p:nvPr>
+            <p:ph type="sldImg"/>
+          </p:nvPr>
+        </p:nvSpPr>
+        <p:spPr/>
+      </p:sp>
+      <p:sp>
+        <p:nvSpPr>
+          <p:cNvPr id="3" name="Notes Placeholder 2"/>
+          <p:cNvSpPr>
+            <a:spLocks noGrp="1"/>
+          </p:cNvSpPr>
+          <p:nvPr>
+            <p:ph type="body" idx="1"/>
+          </p:nvPr>
+        </p:nvSpPr>
+        <p:spPr/>
+        <p:txBody>
+          <a:bodyPr/>
+          <a:lstStyle/>
+          <a:p>
+            <a:endParaRPr lang="en-US"/>
+          </a:p>
+        </p:txBody>
+      </p:sp>
+      <p:sp>
+        <p:nvSpPr>
+          <p:cNvPr id="4" name="Slide Number Placeholder 3"/>
+          <p:cNvSpPr>
+            <a:spLocks noGrp="1"/>
+          </p:cNvSpPr>
+          <p:nvPr>
+            <p:ph type="sldNum" sz="quarter" idx="10"/>
+          </p:nvPr>
+        </p:nvSpPr>
+        <p:spPr/>
+        <p:txBody>
+          <a:bodyPr/>
+          <a:lstStyle/>
+          <a:p>
+            <a:fld id="{75693FD4-8F83-4EF7-AC3F-0DC0388986B0}" type="slidenum">
+              <a:rPr lang="en-US" smtClean="0">
+                <a:solidFill>
+                  <a:prstClr val="black"/>
+                </a:solidFill>
+              </a:rPr>
+              <a:pPr/>
+              <a:t>26</a:t>
+            </a:fld>
+            <a:endParaRPr lang="en-US">
+              <a:solidFill>
+                <a:prstClr val="black"/>
+              </a:solidFill>
+            </a:endParaRPr>
+          </a:p>
+        </p:txBody>
+      </p:sp>
+    </p:spTree>
+  </p:cSld>
+  <p:clrMapOvr>
+    <a:masterClrMapping/>
+  </p:clrMapOvr>
+</p:notes>
+</file>
+
+<file path=ppt/notesSlides/notesSlide26.xml><?xml version="1.0" encoding="utf-8"?>
+<p:notes xmlns:a="http://schemas.openxmlformats.org/drawingml/2006/main" xmlns:r="http://schemas.openxmlformats.org/officeDocument/2006/relationships" xmlns:p="http://schemas.openxmlformats.org/presentationml/2006/main">
+  <p:cSld>
+    <p:spTree>
+      <p:nvGrpSpPr>
+        <p:cNvPr id="1" name=""/>
+        <p:cNvGrpSpPr/>
+        <p:nvPr/>
+      </p:nvGrpSpPr>
+      <p:grpSpPr>
+        <a:xfrm>
+          <a:off x="0" y="0"/>
+          <a:ext cx="0" cy="0"/>
+          <a:chOff x="0" y="0"/>
+          <a:chExt cx="0" cy="0"/>
+        </a:xfrm>
+      </p:grpSpPr>
+      <p:sp>
+        <p:nvSpPr>
           <p:cNvPr id="41986" name="Rectangle 23"/>
           <p:cNvSpPr>
             <a:spLocks noGrp="1" noChangeArrowheads="1"/>
@@ -1960,7 +2487,7 @@
             <a:fld id="{B2B44A5F-6CE4-493C-A0D7-6834FF76660C}" type="slidenum">
               <a:rPr lang="en-US" smtClean="0"/>
               <a:pPr/>
-              <a:t>21</a:t>
+              <a:t>27</a:t>
             </a:fld>
             <a:endParaRPr lang="en-US" dirty="0" smtClean="0"/>
           </a:p>
@@ -2063,17 +2590,18 @@
         </p:nvSpPr>
         <p:spPr/>
         <p:txBody>
-          <a:bodyPr>
-            <a:normAutofit/>
-          </a:bodyPr>
-          <a:lstStyle/>
-          <a:p>
-            <a:pPr>
-              <a:lnSpc>
-                <a:spcPct val="80000"/>
-              </a:lnSpc>
-            </a:pPr>
-            <a:endParaRPr lang="en-US" dirty="0" smtClean="0"/>
+          <a:bodyPr/>
+          <a:lstStyle/>
+          <a:p>
+            <a:r>
+              <a:rPr lang="en-US" dirty="0" smtClean="0"/>
+              <a:t>Web Accessibility Initiative</a:t>
+            </a:r>
+            <a:r>
+              <a:rPr lang="en-US" baseline="0" dirty="0" smtClean="0"/>
+              <a:t> – Accessible rich internet application</a:t>
+            </a:r>
+            <a:endParaRPr lang="en-US" dirty="0"/>
           </a:p>
         </p:txBody>
       </p:sp>
@@ -2092,7 +2620,7 @@
           <a:bodyPr/>
           <a:lstStyle/>
           <a:p>
-            <a:fld id="{EC6EAC7D-5A89-47C2-8ABA-56C9C2DEF7A4}" type="slidenum">
+            <a:fld id="{75693FD4-8F83-4EF7-AC3F-0DC0388986B0}" type="slidenum">
               <a:rPr lang="en-US" smtClean="0"/>
               <a:pPr/>
               <a:t>3</a:t>
@@ -2523,7 +3051,7 @@
             <a:fld id="{EC6EAC7D-5A89-47C2-8ABA-56C9C2DEF7A4}" type="slidenum">
               <a:rPr lang="en-US" smtClean="0"/>
               <a:pPr/>
-              <a:t>9</a:t>
+              <a:t>8</a:t>
             </a:fld>
             <a:endParaRPr lang="en-US"/>
           </a:p>
@@ -2610,7 +3138,7 @@
             <a:fld id="{EC6EAC7D-5A89-47C2-8ABA-56C9C2DEF7A4}" type="slidenum">
               <a:rPr lang="en-US" smtClean="0"/>
               <a:pPr/>
-              <a:t>10</a:t>
+              <a:t>9</a:t>
             </a:fld>
             <a:endParaRPr lang="en-US"/>
           </a:p>
@@ -3092,7 +3620,7 @@
             <a:fld id="{757B281C-5159-4971-8228-52B9A72E9ED2}" type="datetimeFigureOut">
               <a:rPr lang="en-US" smtClean="0"/>
               <a:pPr/>
-              <a:t>11/16/2013</a:t>
+              <a:t>11/17/2013</a:t>
             </a:fld>
             <a:endParaRPr lang="en-US" dirty="0"/>
           </a:p>
@@ -3194,7 +3722,7 @@
             <a:fld id="{757B281C-5159-4971-8228-52B9A72E9ED2}" type="datetimeFigureOut">
               <a:rPr lang="en-US" smtClean="0"/>
               <a:pPr/>
-              <a:t>11/16/2013</a:t>
+              <a:t>11/17/2013</a:t>
             </a:fld>
             <a:endParaRPr lang="en-US" dirty="0"/>
           </a:p>
@@ -3330,7 +3858,7 @@
             <a:fld id="{757B281C-5159-4971-8228-52B9A72E9ED2}" type="datetimeFigureOut">
               <a:rPr lang="en-US" smtClean="0"/>
               <a:pPr/>
-              <a:t>11/16/2013</a:t>
+              <a:t>11/17/2013</a:t>
             </a:fld>
             <a:endParaRPr lang="en-US" dirty="0"/>
           </a:p>
@@ -3536,7 +4064,7 @@
             <a:fld id="{757B281C-5159-4971-8228-52B9A72E9ED2}" type="datetimeFigureOut">
               <a:rPr lang="en-US" smtClean="0"/>
               <a:pPr/>
-              <a:t>11/16/2013</a:t>
+              <a:t>11/17/2013</a:t>
             </a:fld>
             <a:endParaRPr lang="en-US" dirty="0"/>
           </a:p>
@@ -3935,7 +4463,7 @@
             <a:fld id="{757B281C-5159-4971-8228-52B9A72E9ED2}" type="datetimeFigureOut">
               <a:rPr lang="en-US" smtClean="0"/>
               <a:pPr/>
-              <a:t>11/16/2013</a:t>
+              <a:t>11/17/2013</a:t>
             </a:fld>
             <a:endParaRPr lang="en-US" dirty="0"/>
           </a:p>
@@ -4235,7 +4763,7 @@
             <a:fld id="{757B281C-5159-4971-8228-52B9A72E9ED2}" type="datetimeFigureOut">
               <a:rPr lang="en-US" smtClean="0"/>
               <a:pPr/>
-              <a:t>11/16/2013</a:t>
+              <a:t>11/17/2013</a:t>
             </a:fld>
             <a:endParaRPr lang="en-US" dirty="0"/>
           </a:p>
@@ -4664,7 +5192,7 @@
             <a:fld id="{757B281C-5159-4971-8228-52B9A72E9ED2}" type="datetimeFigureOut">
               <a:rPr lang="en-US" smtClean="0"/>
               <a:pPr/>
-              <a:t>11/16/2013</a:t>
+              <a:t>11/17/2013</a:t>
             </a:fld>
             <a:endParaRPr lang="en-US" dirty="0"/>
           </a:p>
@@ -4941,7 +5469,7 @@
             <a:fld id="{757B281C-5159-4971-8228-52B9A72E9ED2}" type="datetimeFigureOut">
               <a:rPr lang="en-US" smtClean="0"/>
               <a:pPr/>
-              <a:t>11/16/2013</a:t>
+              <a:t>11/17/2013</a:t>
             </a:fld>
             <a:endParaRPr lang="en-US" dirty="0"/>
           </a:p>
@@ -5205,7 +5733,7 @@
             <a:fld id="{757B281C-5159-4971-8228-52B9A72E9ED2}" type="datetimeFigureOut">
               <a:rPr lang="en-US" smtClean="0"/>
               <a:pPr/>
-              <a:t>11/16/2013</a:t>
+              <a:t>11/17/2013</a:t>
             </a:fld>
             <a:endParaRPr lang="en-US" dirty="0"/>
           </a:p>
@@ -5375,7 +5903,7 @@
             <a:fld id="{757B281C-5159-4971-8228-52B9A72E9ED2}" type="datetimeFigureOut">
               <a:rPr lang="en-US" smtClean="0"/>
               <a:pPr/>
-              <a:t>11/16/2013</a:t>
+              <a:t>11/17/2013</a:t>
             </a:fld>
             <a:endParaRPr lang="en-US" dirty="0"/>
           </a:p>
@@ -5555,7 +6083,7 @@
             <a:fld id="{757B281C-5159-4971-8228-52B9A72E9ED2}" type="datetimeFigureOut">
               <a:rPr lang="en-US" smtClean="0"/>
               <a:pPr/>
-              <a:t>11/16/2013</a:t>
+              <a:t>11/17/2013</a:t>
             </a:fld>
             <a:endParaRPr lang="en-US" dirty="0"/>
           </a:p>
@@ -5797,7 +6325,7 @@
             <a:fld id="{757B281C-5159-4971-8228-52B9A72E9ED2}" type="datetimeFigureOut">
               <a:rPr lang="en-US" smtClean="0"/>
               <a:pPr/>
-              <a:t>11/16/2013</a:t>
+              <a:t>11/17/2013</a:t>
             </a:fld>
             <a:endParaRPr lang="en-US" dirty="0"/>
           </a:p>
@@ -6228,7 +6756,23 @@
           <a:p>
             <a:r>
               <a:rPr lang="en-US" dirty="0" smtClean="0"/>
-              <a:t>HTML5, WAI-ARIA &amp; </a:t>
+              <a:t>WAI-ARIA, </a:t>
+            </a:r>
+            <a:r>
+              <a:rPr lang="en-US" dirty="0"/>
+              <a:t>HTML5</a:t>
+            </a:r>
+            <a:r>
+              <a:rPr lang="en-US" dirty="0" smtClean="0"/>
+              <a:t> </a:t>
+            </a:r>
+            <a:r>
+              <a:rPr lang="en-US" dirty="0" smtClean="0"/>
+              <a:t>&amp; </a:t>
+            </a:r>
+            <a:r>
+              <a:rPr lang="en-US" dirty="0" smtClean="0"/>
+              <a:t/>
             </a:r>
             <a:br>
               <a:rPr lang="en-US" dirty="0" smtClean="0"/>
@@ -6319,6 +6863,792 @@
 </file>
 
 <file path=ppt/slides/slide10.xml><?xml version="1.0" encoding="utf-8"?>
+<p:sld xmlns:a="http://schemas.openxmlformats.org/drawingml/2006/main" xmlns:r="http://schemas.openxmlformats.org/officeDocument/2006/relationships" xmlns:p="http://schemas.openxmlformats.org/presentationml/2006/main">
+  <p:cSld>
+    <p:spTree>
+      <p:nvGrpSpPr>
+        <p:cNvPr id="1" name=""/>
+        <p:cNvGrpSpPr/>
+        <p:nvPr/>
+      </p:nvGrpSpPr>
+      <p:grpSpPr>
+        <a:xfrm>
+          <a:off x="0" y="0"/>
+          <a:ext cx="0" cy="0"/>
+          <a:chOff x="0" y="0"/>
+          <a:chExt cx="0" cy="0"/>
+        </a:xfrm>
+      </p:grpSpPr>
+      <p:sp>
+        <p:nvSpPr>
+          <p:cNvPr id="2" name="Title 1"/>
+          <p:cNvSpPr>
+            <a:spLocks noGrp="1"/>
+          </p:cNvSpPr>
+          <p:nvPr>
+            <p:ph type="title"/>
+            <p:custDataLst>
+              <p:tags r:id="rId2"/>
+            </p:custDataLst>
+          </p:nvPr>
+        </p:nvSpPr>
+        <p:spPr/>
+        <p:txBody>
+          <a:bodyPr/>
+          <a:lstStyle/>
+          <a:p>
+            <a:r>
+              <a:rPr lang="en-US" dirty="0" smtClean="0"/>
+              <a:t>HTML 5 Features</a:t>
+            </a:r>
+            <a:endParaRPr lang="en-US" dirty="0"/>
+          </a:p>
+        </p:txBody>
+      </p:sp>
+      <p:sp>
+        <p:nvSpPr>
+          <p:cNvPr id="5" name="Content Placeholder 4"/>
+          <p:cNvSpPr>
+            <a:spLocks noGrp="1"/>
+          </p:cNvSpPr>
+          <p:nvPr>
+            <p:ph idx="1"/>
+            <p:custDataLst>
+              <p:tags r:id="rId3"/>
+            </p:custDataLst>
+          </p:nvPr>
+        </p:nvSpPr>
+        <p:spPr/>
+        <p:txBody>
+          <a:bodyPr>
+            <a:normAutofit fontScale="85000" lnSpcReduction="10000"/>
+          </a:bodyPr>
+          <a:lstStyle/>
+          <a:p>
+            <a:r>
+              <a:rPr lang="en-US" dirty="0" smtClean="0"/>
+              <a:t>Semantic Structure</a:t>
+            </a:r>
+          </a:p>
+          <a:p>
+            <a:r>
+              <a:rPr lang="en-US" dirty="0" smtClean="0"/>
+              <a:t>Custom Attributes – start with data</a:t>
+            </a:r>
+          </a:p>
+          <a:p>
+            <a:r>
+              <a:rPr lang="en-US" dirty="0" smtClean="0"/>
+              <a:t>Web workers</a:t>
+            </a:r>
+          </a:p>
+          <a:p>
+            <a:r>
+              <a:rPr lang="en-US" dirty="0" smtClean="0"/>
+              <a:t>Web storage</a:t>
+            </a:r>
+          </a:p>
+          <a:p>
+            <a:r>
+              <a:rPr lang="en-US" dirty="0" smtClean="0"/>
+              <a:t>Geo location</a:t>
+            </a:r>
+          </a:p>
+          <a:p>
+            <a:r>
+              <a:rPr lang="en-US" dirty="0" smtClean="0"/>
+              <a:t>Web Sockets</a:t>
+            </a:r>
+          </a:p>
+          <a:p>
+            <a:r>
+              <a:rPr lang="en-US" dirty="0" smtClean="0"/>
+              <a:t>Audio and Video Support</a:t>
+            </a:r>
+          </a:p>
+          <a:p>
+            <a:r>
+              <a:rPr lang="en-US" dirty="0" smtClean="0"/>
+              <a:t>Canvas</a:t>
+            </a:r>
+          </a:p>
+          <a:p>
+            <a:pPr marL="0" indent="0">
+              <a:buNone/>
+            </a:pPr>
+            <a:r>
+              <a:rPr lang="en-US" dirty="0" smtClean="0"/>
+              <a:t>HTML 5 specs implementation will complete in 2022</a:t>
+            </a:r>
+          </a:p>
+        </p:txBody>
+      </p:sp>
+    </p:spTree>
+    <p:custDataLst>
+      <p:tags r:id="rId1"/>
+    </p:custDataLst>
+    <p:extLst>
+      <p:ext uri="{BB962C8B-B14F-4D97-AF65-F5344CB8AC3E}">
+        <p14:creationId xmlns:p14="http://schemas.microsoft.com/office/powerpoint/2010/main" val="3241600861"/>
+      </p:ext>
+    </p:extLst>
+  </p:cSld>
+  <p:clrMapOvr>
+    <a:masterClrMapping/>
+  </p:clrMapOvr>
+  <p:transition spd="slow">
+    <p:wipe dir="d"/>
+  </p:transition>
+  <p:timing>
+    <p:tnLst>
+      <p:par>
+        <p:cTn id="1" dur="indefinite" restart="never" nodeType="tmRoot"/>
+      </p:par>
+    </p:tnLst>
+  </p:timing>
+</p:sld>
+</file>
+
+<file path=ppt/slides/slide11.xml><?xml version="1.0" encoding="utf-8"?>
+<p:sld xmlns:a="http://schemas.openxmlformats.org/drawingml/2006/main" xmlns:r="http://schemas.openxmlformats.org/officeDocument/2006/relationships" xmlns:p="http://schemas.openxmlformats.org/presentationml/2006/main">
+  <p:cSld>
+    <p:spTree>
+      <p:nvGrpSpPr>
+        <p:cNvPr id="1" name=""/>
+        <p:cNvGrpSpPr/>
+        <p:nvPr/>
+      </p:nvGrpSpPr>
+      <p:grpSpPr>
+        <a:xfrm>
+          <a:off x="0" y="0"/>
+          <a:ext cx="0" cy="0"/>
+          <a:chOff x="0" y="0"/>
+          <a:chExt cx="0" cy="0"/>
+        </a:xfrm>
+      </p:grpSpPr>
+      <p:sp>
+        <p:nvSpPr>
+          <p:cNvPr id="7" name="TextBox 6"/>
+          <p:cNvSpPr txBox="1"/>
+          <p:nvPr/>
+        </p:nvSpPr>
+        <p:spPr>
+          <a:xfrm>
+            <a:off x="1295400" y="2363450"/>
+            <a:ext cx="6781800" cy="3808750"/>
+          </a:xfrm>
+          <a:prstGeom prst="rect">
+            <a:avLst/>
+          </a:prstGeom>
+          <a:noFill/>
+        </p:spPr>
+        <p:txBody>
+          <a:bodyPr wrap="square" rtlCol="0">
+            <a:normAutofit/>
+          </a:bodyPr>
+          <a:lstStyle/>
+          <a:p>
+            <a:r>
+              <a:rPr lang="en-US" sz="7200" dirty="0" smtClean="0"/>
+              <a:t>HTML 5 Semantics</a:t>
+            </a:r>
+            <a:endParaRPr lang="en-US" sz="7200" dirty="0"/>
+          </a:p>
+        </p:txBody>
+      </p:sp>
+      <p:pic>
+        <p:nvPicPr>
+          <p:cNvPr id="12" name="Picture 11"/>
+          <p:cNvPicPr>
+            <a:picLocks noChangeAspect="1"/>
+          </p:cNvPicPr>
+          <p:nvPr/>
+        </p:nvPicPr>
+        <p:blipFill>
+          <a:blip r:embed="rId3" cstate="email">
+            <a:extLst>
+              <a:ext uri="{28A0092B-C50C-407E-A947-70E740481C1C}">
+                <a14:useLocalDpi xmlns:a14="http://schemas.microsoft.com/office/drawing/2010/main"/>
+              </a:ext>
+            </a:extLst>
+          </a:blip>
+          <a:stretch>
+            <a:fillRect/>
+          </a:stretch>
+        </p:blipFill>
+        <p:spPr>
+          <a:xfrm>
+            <a:off x="4191000" y="0"/>
+            <a:ext cx="7765662" cy="16476125"/>
+          </a:xfrm>
+          <a:prstGeom prst="rect">
+            <a:avLst/>
+          </a:prstGeom>
+        </p:spPr>
+      </p:pic>
+    </p:spTree>
+    <p:extLst>
+      <p:ext uri="{BB962C8B-B14F-4D97-AF65-F5344CB8AC3E}">
+        <p14:creationId xmlns:p14="http://schemas.microsoft.com/office/powerpoint/2010/main" val="2479029445"/>
+      </p:ext>
+    </p:extLst>
+  </p:cSld>
+  <p:clrMapOvr>
+    <a:masterClrMapping/>
+  </p:clrMapOvr>
+  <p:transition spd="slow">
+    <p:fade/>
+  </p:transition>
+  <p:timing>
+    <p:tnLst>
+      <p:par>
+        <p:cTn id="1" dur="indefinite" restart="never" nodeType="tmRoot"/>
+      </p:par>
+    </p:tnLst>
+  </p:timing>
+</p:sld>
+</file>
+
+<file path=ppt/slides/slide12.xml><?xml version="1.0" encoding="utf-8"?>
+<p:sld xmlns:a="http://schemas.openxmlformats.org/drawingml/2006/main" xmlns:r="http://schemas.openxmlformats.org/officeDocument/2006/relationships" xmlns:p="http://schemas.openxmlformats.org/presentationml/2006/main">
+  <p:cSld>
+    <p:spTree>
+      <p:nvGrpSpPr>
+        <p:cNvPr id="1" name=""/>
+        <p:cNvGrpSpPr/>
+        <p:nvPr/>
+      </p:nvGrpSpPr>
+      <p:grpSpPr>
+        <a:xfrm>
+          <a:off x="0" y="0"/>
+          <a:ext cx="0" cy="0"/>
+          <a:chOff x="0" y="0"/>
+          <a:chExt cx="0" cy="0"/>
+        </a:xfrm>
+      </p:grpSpPr>
+      <p:sp>
+        <p:nvSpPr>
+          <p:cNvPr id="2" name="Title 1"/>
+          <p:cNvSpPr>
+            <a:spLocks noGrp="1"/>
+          </p:cNvSpPr>
+          <p:nvPr>
+            <p:ph type="title"/>
+            <p:custDataLst>
+              <p:tags r:id="rId2"/>
+            </p:custDataLst>
+          </p:nvPr>
+        </p:nvSpPr>
+        <p:spPr/>
+        <p:txBody>
+          <a:bodyPr/>
+          <a:lstStyle/>
+          <a:p>
+            <a:r>
+              <a:rPr lang="en-US" dirty="0" smtClean="0"/>
+              <a:t>Progressive Enhancement</a:t>
+            </a:r>
+            <a:endParaRPr lang="en-US" dirty="0"/>
+          </a:p>
+        </p:txBody>
+      </p:sp>
+      <p:sp>
+        <p:nvSpPr>
+          <p:cNvPr id="5" name="Content Placeholder 4"/>
+          <p:cNvSpPr>
+            <a:spLocks noGrp="1"/>
+          </p:cNvSpPr>
+          <p:nvPr>
+            <p:ph idx="1"/>
+            <p:custDataLst>
+              <p:tags r:id="rId3"/>
+            </p:custDataLst>
+          </p:nvPr>
+        </p:nvSpPr>
+        <p:spPr/>
+        <p:txBody>
+          <a:bodyPr>
+            <a:normAutofit fontScale="85000" lnSpcReduction="10000"/>
+          </a:bodyPr>
+          <a:lstStyle/>
+          <a:p>
+            <a:r>
+              <a:rPr lang="en-US" dirty="0" smtClean="0"/>
+              <a:t>Approach </a:t>
+            </a:r>
+            <a:r>
+              <a:rPr lang="en-US" dirty="0"/>
+              <a:t>to Web design that promotes accessibility using semantic HTML, </a:t>
+            </a:r>
+            <a:r>
+              <a:rPr lang="en-US" dirty="0" smtClean="0"/>
+              <a:t>style sheets </a:t>
+            </a:r>
+            <a:r>
+              <a:rPr lang="en-US" dirty="0"/>
+              <a:t>and scripting</a:t>
+            </a:r>
+            <a:r>
+              <a:rPr lang="en-US" dirty="0" smtClean="0"/>
+              <a:t>.</a:t>
+            </a:r>
+          </a:p>
+          <a:p>
+            <a:r>
+              <a:rPr lang="en-US" dirty="0" smtClean="0"/>
+              <a:t>Create Web </a:t>
+            </a:r>
+            <a:r>
+              <a:rPr lang="en-US" dirty="0"/>
+              <a:t>site where basic content is available to everyone while more advanced content and functionality are accessible to those with more </a:t>
+            </a:r>
+            <a:r>
+              <a:rPr lang="en-US" dirty="0" smtClean="0"/>
+              <a:t>capability</a:t>
+            </a:r>
+          </a:p>
+          <a:p>
+            <a:r>
+              <a:rPr lang="en-US" dirty="0"/>
+              <a:t>C</a:t>
+            </a:r>
+            <a:r>
+              <a:rPr lang="en-US" dirty="0" smtClean="0"/>
+              <a:t>oncentrate </a:t>
+            </a:r>
+            <a:r>
+              <a:rPr lang="en-US" dirty="0"/>
+              <a:t>first on displaying the content in the simplest manner.</a:t>
+            </a:r>
+          </a:p>
+          <a:p>
+            <a:r>
+              <a:rPr lang="en-US" dirty="0" smtClean="0"/>
+              <a:t>MVC for web – HTML as data, </a:t>
+            </a:r>
+            <a:r>
+              <a:rPr lang="en-US" dirty="0" err="1" smtClean="0"/>
+              <a:t>css</a:t>
+            </a:r>
+            <a:r>
+              <a:rPr lang="en-US" dirty="0" smtClean="0"/>
+              <a:t> as presentation and Java Script to manage interactions</a:t>
+            </a:r>
+          </a:p>
+        </p:txBody>
+      </p:sp>
+    </p:spTree>
+    <p:custDataLst>
+      <p:tags r:id="rId1"/>
+    </p:custDataLst>
+    <p:extLst>
+      <p:ext uri="{BB962C8B-B14F-4D97-AF65-F5344CB8AC3E}">
+        <p14:creationId xmlns:p14="http://schemas.microsoft.com/office/powerpoint/2010/main" val="1877717642"/>
+      </p:ext>
+    </p:extLst>
+  </p:cSld>
+  <p:clrMapOvr>
+    <a:masterClrMapping/>
+  </p:clrMapOvr>
+  <p:transition spd="slow">
+    <p:wipe dir="d"/>
+  </p:transition>
+  <p:timing>
+    <p:tnLst>
+      <p:par>
+        <p:cTn id="1" dur="indefinite" restart="never" nodeType="tmRoot"/>
+      </p:par>
+    </p:tnLst>
+  </p:timing>
+</p:sld>
+</file>
+
+<file path=ppt/slides/slide13.xml><?xml version="1.0" encoding="utf-8"?>
+<p:sld xmlns:a="http://schemas.openxmlformats.org/drawingml/2006/main" xmlns:r="http://schemas.openxmlformats.org/officeDocument/2006/relationships" xmlns:p="http://schemas.openxmlformats.org/presentationml/2006/main">
+  <p:cSld>
+    <p:spTree>
+      <p:nvGrpSpPr>
+        <p:cNvPr id="1" name=""/>
+        <p:cNvGrpSpPr/>
+        <p:nvPr/>
+      </p:nvGrpSpPr>
+      <p:grpSpPr>
+        <a:xfrm>
+          <a:off x="0" y="0"/>
+          <a:ext cx="0" cy="0"/>
+          <a:chOff x="0" y="0"/>
+          <a:chExt cx="0" cy="0"/>
+        </a:xfrm>
+      </p:grpSpPr>
+      <p:sp>
+        <p:nvSpPr>
+          <p:cNvPr id="2" name="Title 1"/>
+          <p:cNvSpPr>
+            <a:spLocks noGrp="1"/>
+          </p:cNvSpPr>
+          <p:nvPr>
+            <p:ph type="title"/>
+            <p:custDataLst>
+              <p:tags r:id="rId2"/>
+            </p:custDataLst>
+          </p:nvPr>
+        </p:nvSpPr>
+        <p:spPr/>
+        <p:txBody>
+          <a:bodyPr/>
+          <a:lstStyle/>
+          <a:p>
+            <a:r>
+              <a:rPr lang="en-US" dirty="0" smtClean="0"/>
+              <a:t>Fallback</a:t>
+            </a:r>
+            <a:endParaRPr lang="en-US" dirty="0"/>
+          </a:p>
+        </p:txBody>
+      </p:sp>
+      <p:sp>
+        <p:nvSpPr>
+          <p:cNvPr id="5" name="Content Placeholder 4"/>
+          <p:cNvSpPr>
+            <a:spLocks noGrp="1"/>
+          </p:cNvSpPr>
+          <p:nvPr>
+            <p:ph idx="1"/>
+            <p:custDataLst>
+              <p:tags r:id="rId3"/>
+            </p:custDataLst>
+          </p:nvPr>
+        </p:nvSpPr>
+        <p:spPr/>
+        <p:txBody>
+          <a:bodyPr>
+            <a:normAutofit/>
+          </a:bodyPr>
+          <a:lstStyle/>
+          <a:p>
+            <a:r>
+              <a:rPr lang="en-US" dirty="0" smtClean="0"/>
+              <a:t>Modernizer – demo</a:t>
+            </a:r>
+          </a:p>
+          <a:p>
+            <a:pPr lvl="1"/>
+            <a:r>
+              <a:rPr lang="en-US" dirty="0" err="1" smtClean="0"/>
+              <a:t>polyfills</a:t>
+            </a:r>
+            <a:endParaRPr lang="en-US" dirty="0" smtClean="0"/>
+          </a:p>
+          <a:p>
+            <a:r>
+              <a:rPr lang="en-US" dirty="0" smtClean="0"/>
+              <a:t>Html 5 shiv - demo</a:t>
+            </a:r>
+          </a:p>
+        </p:txBody>
+      </p:sp>
+    </p:spTree>
+    <p:custDataLst>
+      <p:tags r:id="rId1"/>
+    </p:custDataLst>
+    <p:extLst>
+      <p:ext uri="{BB962C8B-B14F-4D97-AF65-F5344CB8AC3E}">
+        <p14:creationId xmlns:p14="http://schemas.microsoft.com/office/powerpoint/2010/main" val="2020274867"/>
+      </p:ext>
+    </p:extLst>
+  </p:cSld>
+  <p:clrMapOvr>
+    <a:masterClrMapping/>
+  </p:clrMapOvr>
+  <p:transition spd="slow">
+    <p:wipe dir="d"/>
+  </p:transition>
+  <p:timing>
+    <p:tnLst>
+      <p:par>
+        <p:cTn id="1" dur="indefinite" restart="never" nodeType="tmRoot"/>
+      </p:par>
+    </p:tnLst>
+  </p:timing>
+</p:sld>
+</file>
+
+<file path=ppt/slides/slide14.xml><?xml version="1.0" encoding="utf-8"?>
+<p:sld xmlns:a="http://schemas.openxmlformats.org/drawingml/2006/main" xmlns:r="http://schemas.openxmlformats.org/officeDocument/2006/relationships" xmlns:p="http://schemas.openxmlformats.org/presentationml/2006/main">
+  <p:cSld>
+    <p:spTree>
+      <p:nvGrpSpPr>
+        <p:cNvPr id="1" name=""/>
+        <p:cNvGrpSpPr/>
+        <p:nvPr/>
+      </p:nvGrpSpPr>
+      <p:grpSpPr>
+        <a:xfrm>
+          <a:off x="0" y="0"/>
+          <a:ext cx="0" cy="0"/>
+          <a:chOff x="0" y="0"/>
+          <a:chExt cx="0" cy="0"/>
+        </a:xfrm>
+      </p:grpSpPr>
+      <p:sp>
+        <p:nvSpPr>
+          <p:cNvPr id="2" name="Title 1"/>
+          <p:cNvSpPr>
+            <a:spLocks noGrp="1"/>
+          </p:cNvSpPr>
+          <p:nvPr>
+            <p:ph type="title"/>
+          </p:nvPr>
+        </p:nvSpPr>
+        <p:spPr/>
+        <p:txBody>
+          <a:bodyPr>
+            <a:normAutofit/>
+          </a:bodyPr>
+          <a:lstStyle/>
+          <a:p>
+            <a:r>
+              <a:rPr lang="en-US" dirty="0" smtClean="0"/>
+              <a:t>Semantic HTML</a:t>
+            </a:r>
+            <a:endParaRPr lang="en-US" dirty="0"/>
+          </a:p>
+        </p:txBody>
+      </p:sp>
+      <p:sp>
+        <p:nvSpPr>
+          <p:cNvPr id="3" name="Content Placeholder 2"/>
+          <p:cNvSpPr>
+            <a:spLocks noGrp="1"/>
+          </p:cNvSpPr>
+          <p:nvPr>
+            <p:ph idx="1"/>
+          </p:nvPr>
+        </p:nvSpPr>
+        <p:spPr/>
+        <p:txBody>
+          <a:bodyPr/>
+          <a:lstStyle/>
+          <a:p>
+            <a:pPr marL="0" indent="0" algn="ctr">
+              <a:buNone/>
+            </a:pPr>
+            <a:r>
+              <a:rPr lang="en-US" dirty="0" smtClean="0"/>
+              <a:t>It </a:t>
+            </a:r>
+            <a:r>
+              <a:rPr lang="en-US" dirty="0"/>
+              <a:t>means the HTML tags in a page should describe the content in a way that has to do with its meaning rather than its presentation</a:t>
+            </a:r>
+            <a:r>
+              <a:rPr lang="en-US" dirty="0" smtClean="0"/>
+              <a:t>.</a:t>
+            </a:r>
+          </a:p>
+          <a:p>
+            <a:pPr marL="0" indent="0" algn="ctr">
+              <a:buNone/>
+            </a:pPr>
+            <a:r>
+              <a:rPr lang="en-US" dirty="0" smtClean="0"/>
+              <a:t>Demo – old way of </a:t>
+            </a:r>
+            <a:r>
+              <a:rPr lang="en-US" smtClean="0"/>
+              <a:t>doing things</a:t>
+            </a:r>
+            <a:endParaRPr lang="en-US" dirty="0"/>
+          </a:p>
+        </p:txBody>
+      </p:sp>
+    </p:spTree>
+    <p:extLst>
+      <p:ext uri="{BB962C8B-B14F-4D97-AF65-F5344CB8AC3E}">
+        <p14:creationId xmlns:p14="http://schemas.microsoft.com/office/powerpoint/2010/main" val="3682638100"/>
+      </p:ext>
+    </p:extLst>
+  </p:cSld>
+  <p:clrMapOvr>
+    <a:masterClrMapping/>
+  </p:clrMapOvr>
+  <p:transition spd="slow">
+    <p:wipe dir="d"/>
+  </p:transition>
+  <p:timing>
+    <p:tnLst>
+      <p:par>
+        <p:cTn id="1" dur="indefinite" restart="never" nodeType="tmRoot"/>
+      </p:par>
+    </p:tnLst>
+  </p:timing>
+</p:sld>
+</file>
+
+<file path=ppt/slides/slide15.xml><?xml version="1.0" encoding="utf-8"?>
+<p:sld xmlns:a="http://schemas.openxmlformats.org/drawingml/2006/main" xmlns:r="http://schemas.openxmlformats.org/officeDocument/2006/relationships" xmlns:p="http://schemas.openxmlformats.org/presentationml/2006/main">
+  <p:cSld>
+    <p:spTree>
+      <p:nvGrpSpPr>
+        <p:cNvPr id="1" name=""/>
+        <p:cNvGrpSpPr/>
+        <p:nvPr/>
+      </p:nvGrpSpPr>
+      <p:grpSpPr>
+        <a:xfrm>
+          <a:off x="0" y="0"/>
+          <a:ext cx="0" cy="0"/>
+          <a:chOff x="0" y="0"/>
+          <a:chExt cx="0" cy="0"/>
+        </a:xfrm>
+      </p:grpSpPr>
+      <p:sp>
+        <p:nvSpPr>
+          <p:cNvPr id="2" name="Title 1"/>
+          <p:cNvSpPr>
+            <a:spLocks noGrp="1"/>
+          </p:cNvSpPr>
+          <p:nvPr>
+            <p:ph type="title"/>
+            <p:custDataLst>
+              <p:tags r:id="rId2"/>
+            </p:custDataLst>
+          </p:nvPr>
+        </p:nvSpPr>
+        <p:spPr/>
+        <p:txBody>
+          <a:bodyPr>
+            <a:normAutofit/>
+          </a:bodyPr>
+          <a:lstStyle/>
+          <a:p>
+            <a:r>
+              <a:rPr lang="en-US" dirty="0" smtClean="0"/>
+              <a:t>Accessibility Friendly HTML 5</a:t>
+            </a:r>
+            <a:endParaRPr lang="en-US" dirty="0"/>
+          </a:p>
+        </p:txBody>
+      </p:sp>
+      <p:sp>
+        <p:nvSpPr>
+          <p:cNvPr id="5" name="Content Placeholder 4"/>
+          <p:cNvSpPr>
+            <a:spLocks noGrp="1"/>
+          </p:cNvSpPr>
+          <p:nvPr>
+            <p:ph idx="1"/>
+            <p:custDataLst>
+              <p:tags r:id="rId3"/>
+            </p:custDataLst>
+          </p:nvPr>
+        </p:nvSpPr>
+        <p:spPr/>
+        <p:txBody>
+          <a:bodyPr>
+            <a:normAutofit fontScale="92500" lnSpcReduction="10000"/>
+          </a:bodyPr>
+          <a:lstStyle/>
+          <a:p>
+            <a:r>
+              <a:rPr lang="en-US" dirty="0" smtClean="0"/>
+              <a:t>Semantic HTML</a:t>
+            </a:r>
+          </a:p>
+          <a:p>
+            <a:pPr lvl="1"/>
+            <a:r>
+              <a:rPr lang="en-US" dirty="0" smtClean="0"/>
+              <a:t>Header</a:t>
+            </a:r>
+          </a:p>
+          <a:p>
+            <a:pPr lvl="1"/>
+            <a:r>
+              <a:rPr lang="en-US" dirty="0" smtClean="0"/>
+              <a:t>Footer</a:t>
+            </a:r>
+          </a:p>
+          <a:p>
+            <a:pPr lvl="1"/>
+            <a:r>
+              <a:rPr lang="en-US" dirty="0" err="1" smtClean="0"/>
+              <a:t>Nav</a:t>
+            </a:r>
+            <a:endParaRPr lang="en-US" dirty="0" smtClean="0"/>
+          </a:p>
+          <a:p>
+            <a:pPr lvl="1"/>
+            <a:r>
+              <a:rPr lang="en-US" dirty="0" smtClean="0"/>
+              <a:t>Section</a:t>
+            </a:r>
+          </a:p>
+          <a:p>
+            <a:pPr lvl="1"/>
+            <a:r>
+              <a:rPr lang="en-US" dirty="0" smtClean="0"/>
+              <a:t>Aside</a:t>
+            </a:r>
+            <a:endParaRPr lang="en-US" dirty="0"/>
+          </a:p>
+          <a:p>
+            <a:r>
+              <a:rPr lang="en-US" dirty="0" err="1"/>
+              <a:t>Divs</a:t>
+            </a:r>
+            <a:r>
+              <a:rPr lang="en-US" dirty="0"/>
+              <a:t> should be utilized when there’s no better element for the job</a:t>
+            </a:r>
+            <a:r>
+              <a:rPr lang="en-US" dirty="0" smtClean="0"/>
+              <a:t>.</a:t>
+            </a:r>
+          </a:p>
+          <a:p>
+            <a:r>
+              <a:rPr lang="en-US" dirty="0" smtClean="0"/>
+              <a:t> Problems </a:t>
+            </a:r>
+            <a:r>
+              <a:rPr lang="en-US" dirty="0"/>
+              <a:t>with </a:t>
+            </a:r>
+            <a:r>
+              <a:rPr lang="en-US" dirty="0" smtClean="0"/>
+              <a:t>IE</a:t>
+            </a:r>
+          </a:p>
+        </p:txBody>
+      </p:sp>
+    </p:spTree>
+    <p:custDataLst>
+      <p:tags r:id="rId1"/>
+    </p:custDataLst>
+    <p:extLst>
+      <p:ext uri="{BB962C8B-B14F-4D97-AF65-F5344CB8AC3E}">
+        <p14:creationId xmlns:p14="http://schemas.microsoft.com/office/powerpoint/2010/main" val="3373504723"/>
+      </p:ext>
+    </p:extLst>
+  </p:cSld>
+  <p:clrMapOvr>
+    <a:masterClrMapping/>
+  </p:clrMapOvr>
+  <p:transition spd="slow">
+    <p:wipe dir="d"/>
+  </p:transition>
+  <p:timing>
+    <p:tnLst>
+      <p:par>
+        <p:cTn id="1" dur="indefinite" restart="never" nodeType="tmRoot"/>
+      </p:par>
+    </p:tnLst>
+  </p:timing>
+</p:sld>
+</file>
+
+<file path=ppt/slides/slide16.xml><?xml version="1.0" encoding="utf-8"?>
 <p:sld xmlns:a="http://schemas.openxmlformats.org/drawingml/2006/main" xmlns:r="http://schemas.openxmlformats.org/officeDocument/2006/relationships" xmlns:p="http://schemas.openxmlformats.org/presentationml/2006/main">
   <p:cSld>
     <p:spTree>
@@ -6448,7 +7778,7 @@
 </p:sld>
 </file>
 
-<file path=ppt/slides/slide11.xml><?xml version="1.0" encoding="utf-8"?>
+<file path=ppt/slides/slide17.xml><?xml version="1.0" encoding="utf-8"?>
 <p:sld xmlns:a="http://schemas.openxmlformats.org/drawingml/2006/main" xmlns:r="http://schemas.openxmlformats.org/officeDocument/2006/relationships" xmlns:p="http://schemas.openxmlformats.org/presentationml/2006/main">
   <p:cSld>
     <p:spTree>
@@ -6569,7 +7899,7 @@
 </p:sld>
 </file>
 
-<file path=ppt/slides/slide12.xml><?xml version="1.0" encoding="utf-8"?>
+<file path=ppt/slides/slide18.xml><?xml version="1.0" encoding="utf-8"?>
 <p:sld xmlns:a="http://schemas.openxmlformats.org/drawingml/2006/main" xmlns:r="http://schemas.openxmlformats.org/officeDocument/2006/relationships" xmlns:p="http://schemas.openxmlformats.org/presentationml/2006/main">
   <p:cSld>
     <p:spTree>
@@ -6669,7 +7999,7 @@
 </p:sld>
 </file>
 
-<file path=ppt/slides/slide13.xml><?xml version="1.0" encoding="utf-8"?>
+<file path=ppt/slides/slide19.xml><?xml version="1.0" encoding="utf-8"?>
 <p:sld xmlns:a="http://schemas.openxmlformats.org/drawingml/2006/main" xmlns:r="http://schemas.openxmlformats.org/officeDocument/2006/relationships" xmlns:p="http://schemas.openxmlformats.org/presentationml/2006/main">
   <p:cSld>
     <p:spTree>
@@ -6867,7 +8197,117 @@
 </p:sld>
 </file>
 
-<file path=ppt/slides/slide14.xml><?xml version="1.0" encoding="utf-8"?>
+<file path=ppt/slides/slide2.xml><?xml version="1.0" encoding="utf-8"?>
+<p:sld xmlns:a="http://schemas.openxmlformats.org/drawingml/2006/main" xmlns:r="http://schemas.openxmlformats.org/officeDocument/2006/relationships" xmlns:p="http://schemas.openxmlformats.org/presentationml/2006/main">
+  <p:cSld>
+    <p:spTree>
+      <p:nvGrpSpPr>
+        <p:cNvPr id="1" name=""/>
+        <p:cNvGrpSpPr/>
+        <p:nvPr/>
+      </p:nvGrpSpPr>
+      <p:grpSpPr>
+        <a:xfrm>
+          <a:off x="0" y="0"/>
+          <a:ext cx="0" cy="0"/>
+          <a:chOff x="0" y="0"/>
+          <a:chExt cx="0" cy="0"/>
+        </a:xfrm>
+      </p:grpSpPr>
+      <p:sp>
+        <p:nvSpPr>
+          <p:cNvPr id="7" name="TextBox 6"/>
+          <p:cNvSpPr txBox="1"/>
+          <p:nvPr/>
+        </p:nvSpPr>
+        <p:spPr>
+          <a:xfrm>
+            <a:off x="1295400" y="2363450"/>
+            <a:ext cx="6781800" cy="3808750"/>
+          </a:xfrm>
+          <a:prstGeom prst="rect">
+            <a:avLst/>
+          </a:prstGeom>
+          <a:noFill/>
+        </p:spPr>
+        <p:txBody>
+          <a:bodyPr wrap="square" rtlCol="0">
+            <a:normAutofit fontScale="92500"/>
+          </a:bodyPr>
+          <a:lstStyle/>
+          <a:p>
+            <a:r>
+              <a:rPr lang="en-US" sz="7200" dirty="0"/>
+              <a:t>Accessible </a:t>
+            </a:r>
+            <a:r>
+              <a:rPr lang="en-US" sz="7200" dirty="0" smtClean="0"/>
+              <a:t>Website </a:t>
+            </a:r>
+            <a:r>
+              <a:rPr lang="en-US" sz="7200" dirty="0" smtClean="0"/>
+              <a:t>are </a:t>
+            </a:r>
+            <a:r>
+              <a:rPr lang="en-US" sz="7200" dirty="0" smtClean="0"/>
+              <a:t>always SEO </a:t>
+            </a:r>
+            <a:r>
+              <a:rPr lang="en-US" sz="7200" dirty="0"/>
+              <a:t>Friendly</a:t>
+            </a:r>
+          </a:p>
+        </p:txBody>
+      </p:sp>
+      <p:pic>
+        <p:nvPicPr>
+          <p:cNvPr id="12" name="Picture 11"/>
+          <p:cNvPicPr>
+            <a:picLocks noChangeAspect="1"/>
+          </p:cNvPicPr>
+          <p:nvPr/>
+        </p:nvPicPr>
+        <p:blipFill>
+          <a:blip r:embed="rId3" cstate="email">
+            <a:extLst>
+              <a:ext uri="{28A0092B-C50C-407E-A947-70E740481C1C}">
+                <a14:useLocalDpi xmlns:a14="http://schemas.microsoft.com/office/drawing/2010/main"/>
+              </a:ext>
+            </a:extLst>
+          </a:blip>
+          <a:stretch>
+            <a:fillRect/>
+          </a:stretch>
+        </p:blipFill>
+        <p:spPr>
+          <a:xfrm>
+            <a:off x="4191000" y="0"/>
+            <a:ext cx="7765662" cy="16476125"/>
+          </a:xfrm>
+          <a:prstGeom prst="rect">
+            <a:avLst/>
+          </a:prstGeom>
+        </p:spPr>
+      </p:pic>
+    </p:spTree>
+  </p:cSld>
+  <p:clrMapOvr>
+    <a:masterClrMapping/>
+  </p:clrMapOvr>
+  <p:transition spd="slow">
+    <p:fade/>
+  </p:transition>
+  <p:timing>
+    <p:tnLst>
+      <p:par>
+        <p:cTn id="1" dur="indefinite" restart="never" nodeType="tmRoot"/>
+      </p:par>
+    </p:tnLst>
+  </p:timing>
+</p:sld>
+</file>
+
+<file path=ppt/slides/slide20.xml><?xml version="1.0" encoding="utf-8"?>
 <p:sld xmlns:a="http://schemas.openxmlformats.org/drawingml/2006/main" xmlns:r="http://schemas.openxmlformats.org/officeDocument/2006/relationships" xmlns:p="http://schemas.openxmlformats.org/presentationml/2006/main">
   <p:cSld>
     <p:spTree>
@@ -7011,7 +8451,7 @@
 </p:sld>
 </file>
 
-<file path=ppt/slides/slide15.xml><?xml version="1.0" encoding="utf-8"?>
+<file path=ppt/slides/slide21.xml><?xml version="1.0" encoding="utf-8"?>
 <p:sld xmlns:a="http://schemas.openxmlformats.org/drawingml/2006/main" xmlns:r="http://schemas.openxmlformats.org/officeDocument/2006/relationships" xmlns:p="http://schemas.openxmlformats.org/presentationml/2006/main">
   <p:cSld>
     <p:spTree>
@@ -7157,7 +8597,7 @@
 </p:sld>
 </file>
 
-<file path=ppt/slides/slide16.xml><?xml version="1.0" encoding="utf-8"?>
+<file path=ppt/slides/slide22.xml><?xml version="1.0" encoding="utf-8"?>
 <p:sld xmlns:a="http://schemas.openxmlformats.org/drawingml/2006/main" xmlns:r="http://schemas.openxmlformats.org/officeDocument/2006/relationships" xmlns:p="http://schemas.openxmlformats.org/presentationml/2006/main">
   <p:cSld>
     <p:spTree>
@@ -7257,7 +8697,7 @@
 </p:sld>
 </file>
 
-<file path=ppt/slides/slide17.xml><?xml version="1.0" encoding="utf-8"?>
+<file path=ppt/slides/slide23.xml><?xml version="1.0" encoding="utf-8"?>
 <p:sld xmlns:a="http://schemas.openxmlformats.org/drawingml/2006/main" xmlns:r="http://schemas.openxmlformats.org/officeDocument/2006/relationships" xmlns:p="http://schemas.openxmlformats.org/presentationml/2006/main">
   <p:cSld>
     <p:spTree>
@@ -7363,7 +8803,7 @@
 </p:sld>
 </file>
 
-<file path=ppt/slides/slide18.xml><?xml version="1.0" encoding="utf-8"?>
+<file path=ppt/slides/slide24.xml><?xml version="1.0" encoding="utf-8"?>
 <p:sld xmlns:a="http://schemas.openxmlformats.org/drawingml/2006/main" xmlns:r="http://schemas.openxmlformats.org/officeDocument/2006/relationships" xmlns:p="http://schemas.openxmlformats.org/presentationml/2006/main">
   <p:cSld>
     <p:spTree>
@@ -7542,7 +8982,7 @@
 </p:sld>
 </file>
 
-<file path=ppt/slides/slide19.xml><?xml version="1.0" encoding="utf-8"?>
+<file path=ppt/slides/slide25.xml><?xml version="1.0" encoding="utf-8"?>
 <p:sld xmlns:a="http://schemas.openxmlformats.org/drawingml/2006/main" xmlns:r="http://schemas.openxmlformats.org/officeDocument/2006/relationships" xmlns:p="http://schemas.openxmlformats.org/presentationml/2006/main">
   <p:cSld>
     <p:spTree>
@@ -7619,7 +9059,6 @@
               <a:rPr lang="en-US" dirty="0" smtClean="0"/>
               <a:t> event misuse</a:t>
             </a:r>
-            <a:endParaRPr lang="en-US" dirty="0" smtClean="0"/>
           </a:p>
           <a:p>
             <a:pPr lvl="1"/>
@@ -7653,109 +9092,7 @@
 </p:sld>
 </file>
 
-<file path=ppt/slides/slide2.xml><?xml version="1.0" encoding="utf-8"?>
-<p:sld xmlns:a="http://schemas.openxmlformats.org/drawingml/2006/main" xmlns:r="http://schemas.openxmlformats.org/officeDocument/2006/relationships" xmlns:p="http://schemas.openxmlformats.org/presentationml/2006/main">
-  <p:cSld>
-    <p:spTree>
-      <p:nvGrpSpPr>
-        <p:cNvPr id="1" name=""/>
-        <p:cNvGrpSpPr/>
-        <p:nvPr/>
-      </p:nvGrpSpPr>
-      <p:grpSpPr>
-        <a:xfrm>
-          <a:off x="0" y="0"/>
-          <a:ext cx="0" cy="0"/>
-          <a:chOff x="0" y="0"/>
-          <a:chExt cx="0" cy="0"/>
-        </a:xfrm>
-      </p:grpSpPr>
-      <p:sp>
-        <p:nvSpPr>
-          <p:cNvPr id="7" name="TextBox 6"/>
-          <p:cNvSpPr txBox="1"/>
-          <p:nvPr/>
-        </p:nvSpPr>
-        <p:spPr>
-          <a:xfrm>
-            <a:off x="1295400" y="2363450"/>
-            <a:ext cx="6781800" cy="3808750"/>
-          </a:xfrm>
-          <a:prstGeom prst="rect">
-            <a:avLst/>
-          </a:prstGeom>
-          <a:noFill/>
-        </p:spPr>
-        <p:txBody>
-          <a:bodyPr wrap="square" rtlCol="0">
-            <a:normAutofit/>
-          </a:bodyPr>
-          <a:lstStyle/>
-          <a:p>
-            <a:r>
-              <a:rPr lang="en-US" sz="7200" dirty="0"/>
-              <a:t>Accessible </a:t>
-            </a:r>
-            <a:r>
-              <a:rPr lang="en-US" sz="7200" dirty="0" smtClean="0"/>
-              <a:t>Website is always SEO </a:t>
-            </a:r>
-            <a:r>
-              <a:rPr lang="en-US" sz="7200" dirty="0"/>
-              <a:t>Friendly</a:t>
-            </a:r>
-          </a:p>
-        </p:txBody>
-      </p:sp>
-      <p:pic>
-        <p:nvPicPr>
-          <p:cNvPr id="12" name="Picture 11"/>
-          <p:cNvPicPr>
-            <a:picLocks noChangeAspect="1"/>
-          </p:cNvPicPr>
-          <p:nvPr/>
-        </p:nvPicPr>
-        <p:blipFill>
-          <a:blip r:embed="rId3" cstate="email">
-            <a:extLst>
-              <a:ext uri="{28A0092B-C50C-407E-A947-70E740481C1C}">
-                <a14:useLocalDpi xmlns:a14="http://schemas.microsoft.com/office/drawing/2010/main"/>
-              </a:ext>
-            </a:extLst>
-          </a:blip>
-          <a:stretch>
-            <a:fillRect/>
-          </a:stretch>
-        </p:blipFill>
-        <p:spPr>
-          <a:xfrm>
-            <a:off x="4191000" y="0"/>
-            <a:ext cx="7765662" cy="16476125"/>
-          </a:xfrm>
-          <a:prstGeom prst="rect">
-            <a:avLst/>
-          </a:prstGeom>
-        </p:spPr>
-      </p:pic>
-    </p:spTree>
-  </p:cSld>
-  <p:clrMapOvr>
-    <a:masterClrMapping/>
-  </p:clrMapOvr>
-  <p:transition spd="slow">
-    <p:fade/>
-  </p:transition>
-  <p:timing>
-    <p:tnLst>
-      <p:par>
-        <p:cTn id="1" dur="indefinite" restart="never" nodeType="tmRoot"/>
-      </p:par>
-    </p:tnLst>
-  </p:timing>
-</p:sld>
-</file>
-
-<file path=ppt/slides/slide20.xml><?xml version="1.0" encoding="utf-8"?>
+<file path=ppt/slides/slide26.xml><?xml version="1.0" encoding="utf-8"?>
 <p:sld xmlns:a="http://schemas.openxmlformats.org/drawingml/2006/main" xmlns:r="http://schemas.openxmlformats.org/officeDocument/2006/relationships" xmlns:p="http://schemas.openxmlformats.org/presentationml/2006/main">
   <p:cSld>
     <p:spTree>
@@ -7858,7 +9195,7 @@
 </p:sld>
 </file>
 
-<file path=ppt/slides/slide21.xml><?xml version="1.0" encoding="utf-8"?>
+<file path=ppt/slides/slide27.xml><?xml version="1.0" encoding="utf-8"?>
 <p:sld xmlns:a="http://schemas.openxmlformats.org/drawingml/2006/main" xmlns:r="http://schemas.openxmlformats.org/officeDocument/2006/relationships" xmlns:p="http://schemas.openxmlformats.org/presentationml/2006/main">
   <p:cSld>
     <p:spTree>
@@ -7945,292 +9282,6 @@
       </p:grpSpPr>
       <p:sp>
         <p:nvSpPr>
-          <p:cNvPr id="2" name="Title 1"/>
-          <p:cNvSpPr>
-            <a:spLocks noGrp="1"/>
-          </p:cNvSpPr>
-          <p:nvPr>
-            <p:ph type="title"/>
-            <p:custDataLst>
-              <p:tags r:id="rId2"/>
-            </p:custDataLst>
-          </p:nvPr>
-        </p:nvSpPr>
-        <p:spPr/>
-        <p:txBody>
-          <a:bodyPr>
-            <a:normAutofit/>
-          </a:bodyPr>
-          <a:lstStyle/>
-          <a:p>
-            <a:r>
-              <a:rPr lang="en-US" dirty="0" smtClean="0"/>
-              <a:t>Re Introducing Browser</a:t>
-            </a:r>
-            <a:endParaRPr lang="en-US" dirty="0"/>
-          </a:p>
-        </p:txBody>
-      </p:sp>
-      <p:sp>
-        <p:nvSpPr>
-          <p:cNvPr id="5" name="Content Placeholder 4"/>
-          <p:cNvSpPr>
-            <a:spLocks noGrp="1"/>
-          </p:cNvSpPr>
-          <p:nvPr>
-            <p:ph idx="1"/>
-            <p:custDataLst>
-              <p:tags r:id="rId3"/>
-            </p:custDataLst>
-          </p:nvPr>
-        </p:nvSpPr>
-        <p:spPr/>
-        <p:txBody>
-          <a:bodyPr>
-            <a:normAutofit fontScale="92500" lnSpcReduction="10000"/>
-          </a:bodyPr>
-          <a:lstStyle/>
-          <a:p>
-            <a:r>
-              <a:rPr lang="en-US" dirty="0"/>
-              <a:t>HTML has grown from ‘just’ markup </a:t>
-            </a:r>
-            <a:r>
-              <a:rPr lang="en-US" dirty="0" smtClean="0"/>
-              <a:t>language to a whole new Infrastructure.</a:t>
-            </a:r>
-          </a:p>
-          <a:p>
-            <a:r>
-              <a:rPr lang="en-US" dirty="0" smtClean="0"/>
-              <a:t>Browser is Platform</a:t>
-            </a:r>
-            <a:endParaRPr lang="en-US" dirty="0"/>
-          </a:p>
-          <a:p>
-            <a:r>
-              <a:rPr lang="en-US" dirty="0" smtClean="0"/>
-              <a:t>With HTML 5, CSS3 and Java Script now you write desktop equivalent applications</a:t>
-            </a:r>
-          </a:p>
-          <a:p>
-            <a:r>
-              <a:rPr lang="en-US" dirty="0" smtClean="0"/>
-              <a:t>You can debug java script, perform logging etc.</a:t>
-            </a:r>
-          </a:p>
-          <a:p>
-            <a:r>
-              <a:rPr lang="en-US" dirty="0" smtClean="0"/>
-              <a:t>Browse ecosystem is also matured with frameworks like Angular, </a:t>
-            </a:r>
-            <a:r>
-              <a:rPr lang="en-US" dirty="0" smtClean="0"/>
-              <a:t>Backbone, knockout </a:t>
-            </a:r>
-            <a:r>
-              <a:rPr lang="en-US" dirty="0" smtClean="0"/>
-              <a:t>etc.</a:t>
-            </a:r>
-          </a:p>
-        </p:txBody>
-      </p:sp>
-    </p:spTree>
-    <p:custDataLst>
-      <p:tags r:id="rId1"/>
-    </p:custDataLst>
-    <p:extLst>
-      <p:ext uri="{BB962C8B-B14F-4D97-AF65-F5344CB8AC3E}">
-        <p14:creationId xmlns:p14="http://schemas.microsoft.com/office/powerpoint/2010/main" val="1215114749"/>
-      </p:ext>
-    </p:extLst>
-  </p:cSld>
-  <p:clrMapOvr>
-    <a:masterClrMapping/>
-  </p:clrMapOvr>
-  <p:transition spd="slow">
-    <p:wipe dir="d"/>
-  </p:transition>
-  <p:timing>
-    <p:tnLst>
-      <p:par>
-        <p:cTn id="1" dur="indefinite" restart="never" nodeType="tmRoot"/>
-      </p:par>
-    </p:tnLst>
-  </p:timing>
-</p:sld>
-</file>
-
-<file path=ppt/slides/slide4.xml><?xml version="1.0" encoding="utf-8"?>
-<p:sld xmlns:a="http://schemas.openxmlformats.org/drawingml/2006/main" xmlns:r="http://schemas.openxmlformats.org/officeDocument/2006/relationships" xmlns:p="http://schemas.openxmlformats.org/presentationml/2006/main">
-  <p:cSld>
-    <p:spTree>
-      <p:nvGrpSpPr>
-        <p:cNvPr id="1" name=""/>
-        <p:cNvGrpSpPr/>
-        <p:nvPr/>
-      </p:nvGrpSpPr>
-      <p:grpSpPr>
-        <a:xfrm>
-          <a:off x="0" y="0"/>
-          <a:ext cx="0" cy="0"/>
-          <a:chOff x="0" y="0"/>
-          <a:chExt cx="0" cy="0"/>
-        </a:xfrm>
-      </p:grpSpPr>
-      <p:sp>
-        <p:nvSpPr>
-          <p:cNvPr id="2" name="Title 1"/>
-          <p:cNvSpPr>
-            <a:spLocks noGrp="1"/>
-          </p:cNvSpPr>
-          <p:nvPr>
-            <p:ph type="title"/>
-            <p:custDataLst>
-              <p:tags r:id="rId2"/>
-            </p:custDataLst>
-          </p:nvPr>
-        </p:nvSpPr>
-        <p:spPr/>
-        <p:txBody>
-          <a:bodyPr/>
-          <a:lstStyle/>
-          <a:p>
-            <a:r>
-              <a:rPr lang="en-US" dirty="0" smtClean="0"/>
-              <a:t>HTML 5 Features</a:t>
-            </a:r>
-            <a:endParaRPr lang="en-US" dirty="0"/>
-          </a:p>
-        </p:txBody>
-      </p:sp>
-      <p:sp>
-        <p:nvSpPr>
-          <p:cNvPr id="5" name="Content Placeholder 4"/>
-          <p:cNvSpPr>
-            <a:spLocks noGrp="1"/>
-          </p:cNvSpPr>
-          <p:nvPr>
-            <p:ph idx="1"/>
-            <p:custDataLst>
-              <p:tags r:id="rId3"/>
-            </p:custDataLst>
-          </p:nvPr>
-        </p:nvSpPr>
-        <p:spPr/>
-        <p:txBody>
-          <a:bodyPr>
-            <a:normAutofit fontScale="85000" lnSpcReduction="10000"/>
-          </a:bodyPr>
-          <a:lstStyle/>
-          <a:p>
-            <a:r>
-              <a:rPr lang="en-US" dirty="0" smtClean="0"/>
-              <a:t>Semantic Structure</a:t>
-            </a:r>
-          </a:p>
-          <a:p>
-            <a:r>
-              <a:rPr lang="en-US" dirty="0" smtClean="0"/>
-              <a:t>Custom </a:t>
-            </a:r>
-            <a:r>
-              <a:rPr lang="en-US" dirty="0" smtClean="0"/>
-              <a:t>Attributes – start with data</a:t>
-            </a:r>
-          </a:p>
-          <a:p>
-            <a:r>
-              <a:rPr lang="en-US" dirty="0" smtClean="0"/>
-              <a:t>Web workers</a:t>
-            </a:r>
-          </a:p>
-          <a:p>
-            <a:r>
-              <a:rPr lang="en-US" dirty="0" smtClean="0"/>
-              <a:t>Web storage</a:t>
-            </a:r>
-          </a:p>
-          <a:p>
-            <a:r>
-              <a:rPr lang="en-US" dirty="0" smtClean="0"/>
-              <a:t>Geo location</a:t>
-            </a:r>
-          </a:p>
-          <a:p>
-            <a:r>
-              <a:rPr lang="en-US" dirty="0" smtClean="0"/>
-              <a:t>Web Sockets</a:t>
-            </a:r>
-          </a:p>
-          <a:p>
-            <a:r>
-              <a:rPr lang="en-US" dirty="0" smtClean="0"/>
-              <a:t>Audio and Video Support</a:t>
-            </a:r>
-          </a:p>
-          <a:p>
-            <a:r>
-              <a:rPr lang="en-US" dirty="0" smtClean="0"/>
-              <a:t>Canvas</a:t>
-            </a:r>
-          </a:p>
-          <a:p>
-            <a:pPr marL="0" indent="0">
-              <a:buNone/>
-            </a:pPr>
-            <a:r>
-              <a:rPr lang="en-US" dirty="0" smtClean="0"/>
-              <a:t>HTML 5 specs implementation will complete in 2022</a:t>
-            </a:r>
-          </a:p>
-        </p:txBody>
-      </p:sp>
-    </p:spTree>
-    <p:custDataLst>
-      <p:tags r:id="rId1"/>
-    </p:custDataLst>
-    <p:extLst>
-      <p:ext uri="{BB962C8B-B14F-4D97-AF65-F5344CB8AC3E}">
-        <p14:creationId xmlns:p14="http://schemas.microsoft.com/office/powerpoint/2010/main" val="3241600861"/>
-      </p:ext>
-    </p:extLst>
-  </p:cSld>
-  <p:clrMapOvr>
-    <a:masterClrMapping/>
-  </p:clrMapOvr>
-  <p:transition spd="slow">
-    <p:wipe dir="d"/>
-  </p:transition>
-  <p:timing>
-    <p:tnLst>
-      <p:par>
-        <p:cTn id="1" dur="indefinite" restart="never" nodeType="tmRoot"/>
-      </p:par>
-    </p:tnLst>
-  </p:timing>
-</p:sld>
-</file>
-
-<file path=ppt/slides/slide5.xml><?xml version="1.0" encoding="utf-8"?>
-<p:sld xmlns:a="http://schemas.openxmlformats.org/drawingml/2006/main" xmlns:r="http://schemas.openxmlformats.org/officeDocument/2006/relationships" xmlns:p="http://schemas.openxmlformats.org/presentationml/2006/main">
-  <p:cSld>
-    <p:spTree>
-      <p:nvGrpSpPr>
-        <p:cNvPr id="1" name=""/>
-        <p:cNvGrpSpPr/>
-        <p:nvPr/>
-      </p:nvGrpSpPr>
-      <p:grpSpPr>
-        <a:xfrm>
-          <a:off x="0" y="0"/>
-          <a:ext cx="0" cy="0"/>
-          <a:chOff x="0" y="0"/>
-          <a:chExt cx="0" cy="0"/>
-        </a:xfrm>
-      </p:grpSpPr>
-      <p:sp>
-        <p:nvSpPr>
           <p:cNvPr id="7" name="TextBox 6"/>
           <p:cNvSpPr txBox="1"/>
           <p:nvPr/>
@@ -8253,7 +9304,7 @@
           <a:p>
             <a:r>
               <a:rPr lang="en-US" sz="7200" dirty="0" smtClean="0"/>
-              <a:t>HTML 5 Semantics</a:t>
+              <a:t>WAI ARIA</a:t>
             </a:r>
             <a:endParaRPr lang="en-US" sz="7200" dirty="0"/>
           </a:p>
@@ -8292,7 +9343,7 @@
     </p:spTree>
     <p:extLst>
       <p:ext uri="{BB962C8B-B14F-4D97-AF65-F5344CB8AC3E}">
-        <p14:creationId xmlns:p14="http://schemas.microsoft.com/office/powerpoint/2010/main" val="2479029445"/>
+        <p14:creationId xmlns:p14="http://schemas.microsoft.com/office/powerpoint/2010/main" val="4261066294"/>
       </p:ext>
     </p:extLst>
   </p:cSld>
@@ -8312,6 +9363,217 @@
 </p:sld>
 </file>
 
+<file path=ppt/slides/slide4.xml><?xml version="1.0" encoding="utf-8"?>
+<p:sld xmlns:a="http://schemas.openxmlformats.org/drawingml/2006/main" xmlns:r="http://schemas.openxmlformats.org/officeDocument/2006/relationships" xmlns:p="http://schemas.openxmlformats.org/presentationml/2006/main">
+  <p:cSld>
+    <p:spTree>
+      <p:nvGrpSpPr>
+        <p:cNvPr id="1" name=""/>
+        <p:cNvGrpSpPr/>
+        <p:nvPr/>
+      </p:nvGrpSpPr>
+      <p:grpSpPr>
+        <a:xfrm>
+          <a:off x="0" y="0"/>
+          <a:ext cx="0" cy="0"/>
+          <a:chOff x="0" y="0"/>
+          <a:chExt cx="0" cy="0"/>
+        </a:xfrm>
+      </p:grpSpPr>
+      <p:sp>
+        <p:nvSpPr>
+          <p:cNvPr id="2" name="Title 1"/>
+          <p:cNvSpPr>
+            <a:spLocks noGrp="1"/>
+          </p:cNvSpPr>
+          <p:nvPr>
+            <p:ph type="title"/>
+            <p:custDataLst>
+              <p:tags r:id="rId2"/>
+            </p:custDataLst>
+          </p:nvPr>
+        </p:nvSpPr>
+        <p:spPr/>
+        <p:txBody>
+          <a:bodyPr>
+            <a:normAutofit/>
+          </a:bodyPr>
+          <a:lstStyle/>
+          <a:p>
+            <a:r>
+              <a:rPr lang="en-US" dirty="0" smtClean="0"/>
+              <a:t>ARIA Introduction – HTML 4</a:t>
+            </a:r>
+            <a:endParaRPr lang="en-US" dirty="0"/>
+          </a:p>
+        </p:txBody>
+      </p:sp>
+      <p:sp>
+        <p:nvSpPr>
+          <p:cNvPr id="5" name="Content Placeholder 4"/>
+          <p:cNvSpPr>
+            <a:spLocks noGrp="1"/>
+          </p:cNvSpPr>
+          <p:nvPr>
+            <p:ph idx="1"/>
+            <p:custDataLst>
+              <p:tags r:id="rId3"/>
+            </p:custDataLst>
+          </p:nvPr>
+        </p:nvSpPr>
+        <p:spPr/>
+        <p:txBody>
+          <a:bodyPr>
+            <a:normAutofit/>
+          </a:bodyPr>
+          <a:lstStyle/>
+          <a:p>
+            <a:r>
+              <a:rPr lang="en-US" dirty="0" smtClean="0"/>
+              <a:t>HTML 4 tags </a:t>
+            </a:r>
+            <a:endParaRPr lang="en-US" dirty="0" smtClean="0"/>
+          </a:p>
+        </p:txBody>
+      </p:sp>
+    </p:spTree>
+    <p:custDataLst>
+      <p:tags r:id="rId1"/>
+    </p:custDataLst>
+    <p:extLst>
+      <p:ext uri="{BB962C8B-B14F-4D97-AF65-F5344CB8AC3E}">
+        <p14:creationId xmlns:p14="http://schemas.microsoft.com/office/powerpoint/2010/main" val="280796424"/>
+      </p:ext>
+    </p:extLst>
+  </p:cSld>
+  <p:clrMapOvr>
+    <a:masterClrMapping/>
+  </p:clrMapOvr>
+  <p:transition spd="slow">
+    <p:wipe dir="d"/>
+  </p:transition>
+  <p:timing>
+    <p:tnLst>
+      <p:par>
+        <p:cTn id="1" dur="indefinite" restart="never" nodeType="tmRoot"/>
+      </p:par>
+    </p:tnLst>
+  </p:timing>
+</p:sld>
+</file>
+
+<file path=ppt/slides/slide5.xml><?xml version="1.0" encoding="utf-8"?>
+<p:sld xmlns:a="http://schemas.openxmlformats.org/drawingml/2006/main" xmlns:r="http://schemas.openxmlformats.org/officeDocument/2006/relationships" xmlns:p="http://schemas.openxmlformats.org/presentationml/2006/main">
+  <p:cSld>
+    <p:spTree>
+      <p:nvGrpSpPr>
+        <p:cNvPr id="1" name=""/>
+        <p:cNvGrpSpPr/>
+        <p:nvPr/>
+      </p:nvGrpSpPr>
+      <p:grpSpPr>
+        <a:xfrm>
+          <a:off x="0" y="0"/>
+          <a:ext cx="0" cy="0"/>
+          <a:chOff x="0" y="0"/>
+          <a:chExt cx="0" cy="0"/>
+        </a:xfrm>
+      </p:grpSpPr>
+      <p:sp>
+        <p:nvSpPr>
+          <p:cNvPr id="7" name="TextBox 6"/>
+          <p:cNvSpPr txBox="1"/>
+          <p:nvPr/>
+        </p:nvSpPr>
+        <p:spPr>
+          <a:xfrm>
+            <a:off x="1295400" y="2363450"/>
+            <a:ext cx="6781800" cy="3808750"/>
+          </a:xfrm>
+          <a:prstGeom prst="rect">
+            <a:avLst/>
+          </a:prstGeom>
+          <a:noFill/>
+        </p:spPr>
+        <p:txBody>
+          <a:bodyPr wrap="square" rtlCol="0">
+            <a:normAutofit/>
+          </a:bodyPr>
+          <a:lstStyle/>
+          <a:p>
+            <a:r>
+              <a:rPr lang="en-US" sz="7200" dirty="0"/>
+              <a:t>ARIA bridge </a:t>
+            </a:r>
+            <a:r>
+              <a:rPr lang="en-US" sz="7200" dirty="0" smtClean="0"/>
+              <a:t>the </a:t>
+            </a:r>
+            <a:r>
+              <a:rPr lang="en-US" sz="7200" dirty="0"/>
+              <a:t>semantic </a:t>
+            </a:r>
+            <a:r>
+              <a:rPr lang="en-US" sz="7200" dirty="0" smtClean="0"/>
+              <a:t>gap with HTML 4</a:t>
+            </a:r>
+            <a:endParaRPr lang="en-US" sz="7200" dirty="0"/>
+          </a:p>
+        </p:txBody>
+      </p:sp>
+      <p:pic>
+        <p:nvPicPr>
+          <p:cNvPr id="12" name="Picture 11"/>
+          <p:cNvPicPr>
+            <a:picLocks noChangeAspect="1"/>
+          </p:cNvPicPr>
+          <p:nvPr/>
+        </p:nvPicPr>
+        <p:blipFill>
+          <a:blip r:embed="rId3" cstate="email">
+            <a:extLst>
+              <a:ext uri="{28A0092B-C50C-407E-A947-70E740481C1C}">
+                <a14:useLocalDpi xmlns:a14="http://schemas.microsoft.com/office/drawing/2010/main"/>
+              </a:ext>
+            </a:extLst>
+          </a:blip>
+          <a:stretch>
+            <a:fillRect/>
+          </a:stretch>
+        </p:blipFill>
+        <p:spPr>
+          <a:xfrm>
+            <a:off x="4191000" y="0"/>
+            <a:ext cx="7765662" cy="16476125"/>
+          </a:xfrm>
+          <a:prstGeom prst="rect">
+            <a:avLst/>
+          </a:prstGeom>
+        </p:spPr>
+      </p:pic>
+    </p:spTree>
+    <p:extLst>
+      <p:ext uri="{BB962C8B-B14F-4D97-AF65-F5344CB8AC3E}">
+        <p14:creationId xmlns:p14="http://schemas.microsoft.com/office/powerpoint/2010/main" val="1220890023"/>
+      </p:ext>
+    </p:extLst>
+  </p:cSld>
+  <p:clrMapOvr>
+    <a:masterClrMapping/>
+  </p:clrMapOvr>
+  <p:transition spd="slow">
+    <p:fade/>
+  </p:transition>
+  <p:timing>
+    <p:tnLst>
+      <p:par>
+        <p:cTn id="1" dur="indefinite" restart="never" nodeType="tmRoot"/>
+      </p:par>
+    </p:tnLst>
+  </p:timing>
+</p:sld>
+</file>
+
 <file path=ppt/slides/slide6.xml><?xml version="1.0" encoding="utf-8"?>
 <p:sld xmlns:a="http://schemas.openxmlformats.org/drawingml/2006/main" xmlns:r="http://schemas.openxmlformats.org/officeDocument/2006/relationships" xmlns:p="http://schemas.openxmlformats.org/presentationml/2006/main">
   <p:cSld>
@@ -8344,12 +9606,14 @@
         </p:nvSpPr>
         <p:spPr/>
         <p:txBody>
-          <a:bodyPr/>
-          <a:lstStyle/>
-          <a:p>
-            <a:r>
-              <a:rPr lang="en-US" dirty="0" smtClean="0"/>
-              <a:t>Progressive Enhancement</a:t>
+          <a:bodyPr>
+            <a:normAutofit fontScale="90000"/>
+          </a:bodyPr>
+          <a:lstStyle/>
+          <a:p>
+            <a:r>
+              <a:rPr lang="en-US" dirty="0" smtClean="0"/>
+              <a:t>ARIA Introduction – JS Components</a:t>
             </a:r>
             <a:endParaRPr lang="en-US" dirty="0"/>
           </a:p>
@@ -8371,75 +9635,37 @@
         <p:spPr/>
         <p:txBody>
           <a:bodyPr>
-            <a:normAutofit fontScale="85000" lnSpcReduction="10000"/>
+            <a:normAutofit/>
           </a:bodyPr>
           <a:lstStyle/>
           <a:p>
             <a:r>
-              <a:rPr lang="en-US" dirty="0" smtClean="0"/>
-              <a:t>Approach </a:t>
-            </a:r>
-            <a:r>
               <a:rPr lang="en-US" dirty="0"/>
-              <a:t>to Web design that promotes accessibility using semantic HTML, </a:t>
-            </a:r>
-            <a:r>
-              <a:rPr lang="en-US" dirty="0" smtClean="0"/>
-              <a:t>style sheets </a:t>
-            </a:r>
-            <a:r>
-              <a:rPr lang="en-US" dirty="0"/>
-              <a:t>and scripting</a:t>
-            </a:r>
-            <a:r>
-              <a:rPr lang="en-US" dirty="0" smtClean="0"/>
-              <a:t>.</a:t>
-            </a:r>
-          </a:p>
-          <a:p>
-            <a:r>
-              <a:rPr lang="en-US" dirty="0" smtClean="0"/>
-              <a:t>Create Web </a:t>
-            </a:r>
-            <a:r>
-              <a:rPr lang="en-US" dirty="0"/>
-              <a:t>site where basic content is available to everyone while more advanced content and functionality are accessible to those with more </a:t>
-            </a:r>
-            <a:r>
-              <a:rPr lang="en-US" dirty="0" smtClean="0"/>
-              <a:t>capability</a:t>
-            </a:r>
-          </a:p>
-          <a:p>
-            <a:r>
-              <a:rPr lang="en-US" dirty="0"/>
-              <a:t>C</a:t>
-            </a:r>
-            <a:r>
-              <a:rPr lang="en-US" dirty="0" smtClean="0"/>
-              <a:t>oncentrate </a:t>
-            </a:r>
-            <a:r>
-              <a:rPr lang="en-US" dirty="0"/>
-              <a:t>first on displaying the content in the simplest manner.</a:t>
-            </a:r>
-          </a:p>
-          <a:p>
-            <a:r>
-              <a:rPr lang="en-US" dirty="0" smtClean="0"/>
-              <a:t>MVC for </a:t>
-            </a:r>
-            <a:r>
-              <a:rPr lang="en-US" dirty="0" smtClean="0"/>
-              <a:t>web – HTML as data, </a:t>
-            </a:r>
-            <a:r>
-              <a:rPr lang="en-US" dirty="0" err="1" smtClean="0"/>
-              <a:t>css</a:t>
-            </a:r>
-            <a:r>
-              <a:rPr lang="en-US" dirty="0" smtClean="0"/>
-              <a:t> as presentation and Java Script to manage interactions</a:t>
+              <a:t>HTML </a:t>
+            </a:r>
+            <a:r>
+              <a:rPr lang="en-US" dirty="0" smtClean="0"/>
+              <a:t>was not designed for creating web application.</a:t>
+            </a:r>
+            <a:endParaRPr lang="en-US" dirty="0" smtClean="0"/>
+          </a:p>
+          <a:p>
+            <a:r>
+              <a:rPr lang="en-US" dirty="0" smtClean="0"/>
+              <a:t>It had limited set of controls</a:t>
+            </a:r>
+            <a:endParaRPr lang="en-US" dirty="0"/>
+          </a:p>
+          <a:p>
+            <a:r>
+              <a:rPr lang="en-US" dirty="0" smtClean="0"/>
+              <a:t>Web developer gotten around these limitation by creating their own components.</a:t>
+            </a:r>
+          </a:p>
+          <a:p>
+            <a:r>
+              <a:rPr lang="en-US" dirty="0" smtClean="0"/>
+              <a:t>But there was no standard way to make these components accessible</a:t>
             </a:r>
             <a:endParaRPr lang="en-US" dirty="0" smtClean="0"/>
           </a:p>
@@ -8451,7 +9677,7 @@
     </p:custDataLst>
     <p:extLst>
       <p:ext uri="{BB962C8B-B14F-4D97-AF65-F5344CB8AC3E}">
-        <p14:creationId xmlns:p14="http://schemas.microsoft.com/office/powerpoint/2010/main" val="1877717642"/>
+        <p14:creationId xmlns:p14="http://schemas.microsoft.com/office/powerpoint/2010/main" val="2116277925"/>
       </p:ext>
     </p:extLst>
   </p:cSld>
@@ -8503,12 +9729,14 @@
         </p:nvSpPr>
         <p:spPr/>
         <p:txBody>
-          <a:bodyPr/>
-          <a:lstStyle/>
-          <a:p>
-            <a:r>
-              <a:rPr lang="en-US" dirty="0" smtClean="0"/>
-              <a:t>Fallback</a:t>
+          <a:bodyPr>
+            <a:normAutofit/>
+          </a:bodyPr>
+          <a:lstStyle/>
+          <a:p>
+            <a:r>
+              <a:rPr lang="en-US" dirty="0" smtClean="0"/>
+              <a:t>UI elements - attributes</a:t>
             </a:r>
             <a:endParaRPr lang="en-US" dirty="0"/>
           </a:p>
@@ -8530,29 +9758,48 @@
         <p:spPr/>
         <p:txBody>
           <a:bodyPr>
-            <a:normAutofit/>
+            <a:normAutofit lnSpcReduction="10000"/>
           </a:bodyPr>
           <a:lstStyle/>
           <a:p>
             <a:r>
               <a:rPr lang="en-US" dirty="0" smtClean="0"/>
-              <a:t>Modernizer – demo</a:t>
-            </a:r>
-          </a:p>
-          <a:p>
-            <a:pPr lvl="1"/>
-            <a:r>
-              <a:rPr lang="en-US" dirty="0" err="1" smtClean="0"/>
-              <a:t>polyfills</a:t>
-            </a:r>
+              <a:t>Function or semantic meaning of element</a:t>
+            </a:r>
+          </a:p>
+          <a:p>
+            <a:r>
+              <a:rPr lang="en-US" dirty="0" smtClean="0"/>
+              <a:t>State – that can change, dynamic aspect of element</a:t>
+            </a:r>
+          </a:p>
+          <a:p>
+            <a:r>
+              <a:rPr lang="en-US" dirty="0" smtClean="0"/>
+              <a:t>Properties – static aspect of element</a:t>
+            </a:r>
+          </a:p>
+          <a:p>
             <a:endParaRPr lang="en-US" dirty="0" smtClean="0"/>
           </a:p>
           <a:p>
-            <a:r>
-              <a:rPr lang="en-US" dirty="0" smtClean="0"/>
-              <a:t>Html 5 shiv - demo</a:t>
-            </a:r>
-            <a:endParaRPr lang="en-US" dirty="0" smtClean="0"/>
+            <a:pPr marL="0" indent="0" algn="ctr">
+              <a:buNone/>
+            </a:pPr>
+            <a:r>
+              <a:rPr lang="en-US" dirty="0" smtClean="0"/>
+              <a:t>Need some way to make above attributes available to AT</a:t>
+            </a:r>
+          </a:p>
+          <a:p>
+            <a:pPr marL="0" indent="0" algn="ctr">
+              <a:buNone/>
+            </a:pPr>
+            <a:r>
+              <a:rPr lang="en-US" dirty="0" smtClean="0"/>
+              <a:t>Demo – Slider &amp; Tree</a:t>
+            </a:r>
+            <a:endParaRPr lang="en-US" dirty="0"/>
           </a:p>
         </p:txBody>
       </p:sp>
@@ -8562,7 +9809,7 @@
     </p:custDataLst>
     <p:extLst>
       <p:ext uri="{BB962C8B-B14F-4D97-AF65-F5344CB8AC3E}">
-        <p14:creationId xmlns:p14="http://schemas.microsoft.com/office/powerpoint/2010/main" val="2020274867"/>
+        <p14:creationId xmlns:p14="http://schemas.microsoft.com/office/powerpoint/2010/main" val="1215114749"/>
       </p:ext>
     </p:extLst>
   </p:cSld>
@@ -8607,18 +9854,21 @@
           </p:cNvSpPr>
           <p:nvPr>
             <p:ph type="title"/>
+            <p:custDataLst>
+              <p:tags r:id="rId2"/>
+            </p:custDataLst>
           </p:nvPr>
         </p:nvSpPr>
         <p:spPr/>
         <p:txBody>
           <a:bodyPr>
-            <a:normAutofit/>
+            <a:normAutofit fontScale="90000"/>
           </a:bodyPr>
           <a:lstStyle/>
           <a:p>
             <a:r>
               <a:rPr lang="en-US" dirty="0" smtClean="0"/>
-              <a:t>Semantic HTML</a:t>
+              <a:t>ARIA Introduction – Example Controls</a:t>
             </a:r>
             <a:endParaRPr lang="en-US" dirty="0"/>
           </a:p>
@@ -8626,55 +9876,87 @@
       </p:sp>
       <p:sp>
         <p:nvSpPr>
-          <p:cNvPr id="3" name="Content Placeholder 2"/>
+          <p:cNvPr id="5" name="Content Placeholder 4"/>
           <p:cNvSpPr>
             <a:spLocks noGrp="1"/>
           </p:cNvSpPr>
           <p:nvPr>
             <p:ph idx="1"/>
-          </p:nvPr>
-        </p:nvSpPr>
-        <p:spPr/>
-        <p:txBody>
-          <a:bodyPr/>
-          <a:lstStyle/>
-          <a:p>
-            <a:pPr marL="0" indent="0" algn="ctr">
-              <a:buNone/>
-            </a:pPr>
-            <a:r>
-              <a:rPr lang="en-US" dirty="0" smtClean="0"/>
-              <a:t>It </a:t>
+            <p:custDataLst>
+              <p:tags r:id="rId3"/>
+            </p:custDataLst>
+          </p:nvPr>
+        </p:nvSpPr>
+        <p:spPr/>
+        <p:txBody>
+          <a:bodyPr>
+            <a:normAutofit fontScale="92500" lnSpcReduction="10000"/>
+          </a:bodyPr>
+          <a:lstStyle/>
+          <a:p>
+            <a:r>
+              <a:rPr lang="en-US" dirty="0" smtClean="0"/>
+              <a:t>Slider </a:t>
             </a:r>
             <a:r>
               <a:rPr lang="en-US" dirty="0"/>
-              <a:t>means the HTML tags in a page should describe the content in a way that has to do with its meaning rather than its presentation</a:t>
-            </a:r>
-            <a:r>
-              <a:rPr lang="en-US" dirty="0" smtClean="0"/>
-              <a:t>.</a:t>
-            </a:r>
-          </a:p>
-          <a:p>
-            <a:pPr marL="0" indent="0" algn="ctr">
-              <a:buNone/>
-            </a:pPr>
-            <a:r>
-              <a:rPr lang="en-US" dirty="0" smtClean="0"/>
-              <a:t>Demo – old way of </a:t>
-            </a:r>
-            <a:r>
-              <a:rPr lang="en-US" smtClean="0"/>
-              <a:t>doing things</a:t>
+              <a:t>is neither perceivable nor operable</a:t>
+            </a:r>
+          </a:p>
+          <a:p>
+            <a:r>
+              <a:rPr lang="en-US" dirty="0" smtClean="0"/>
+              <a:t>User interface element have three important attributes – Slider Demo</a:t>
+            </a:r>
+          </a:p>
+          <a:p>
+            <a:pPr lvl="1"/>
+            <a:r>
+              <a:rPr lang="en-US" dirty="0" smtClean="0"/>
+              <a:t>Role </a:t>
+            </a:r>
+            <a:r>
+              <a:rPr lang="en-US" dirty="0"/>
+              <a:t>- indicate the type of element in a meaningful way</a:t>
+            </a:r>
+            <a:endParaRPr lang="en-US" dirty="0" smtClean="0"/>
+          </a:p>
+          <a:p>
+            <a:pPr lvl="1"/>
+            <a:r>
+              <a:rPr lang="en-US" dirty="0" smtClean="0"/>
+              <a:t>State</a:t>
+            </a:r>
+          </a:p>
+          <a:p>
+            <a:pPr lvl="1"/>
+            <a:r>
+              <a:rPr lang="en-US" dirty="0" smtClean="0"/>
+              <a:t>Properties</a:t>
+            </a:r>
+          </a:p>
+          <a:p>
+            <a:r>
+              <a:rPr lang="en-US" dirty="0" smtClean="0"/>
+              <a:t>ARIA bridge this semantic gap</a:t>
+            </a:r>
+          </a:p>
+          <a:p>
+            <a:r>
+              <a:rPr lang="en-US" dirty="0" smtClean="0"/>
+              <a:t>Tree Demo</a:t>
             </a:r>
             <a:endParaRPr lang="en-US" dirty="0"/>
           </a:p>
         </p:txBody>
       </p:sp>
     </p:spTree>
+    <p:custDataLst>
+      <p:tags r:id="rId1"/>
+    </p:custDataLst>
     <p:extLst>
       <p:ext uri="{BB962C8B-B14F-4D97-AF65-F5344CB8AC3E}">
-        <p14:creationId xmlns:p14="http://schemas.microsoft.com/office/powerpoint/2010/main" val="3682638100"/>
+        <p14:creationId xmlns:p14="http://schemas.microsoft.com/office/powerpoint/2010/main" val="2153637570"/>
       </p:ext>
     </p:extLst>
   </p:cSld>
@@ -8733,7 +10015,7 @@
           <a:p>
             <a:r>
               <a:rPr lang="en-US" dirty="0" smtClean="0"/>
-              <a:t>Accessibility Friendly HTML 5</a:t>
+              <a:t>Re Introducing Browser</a:t>
             </a:r>
             <a:endParaRPr lang="en-US" dirty="0"/>
           </a:p>
@@ -8760,73 +10042,37 @@
           <a:lstStyle/>
           <a:p>
             <a:r>
-              <a:rPr lang="en-US" dirty="0" smtClean="0"/>
-              <a:t>Semantic HTML</a:t>
-            </a:r>
-          </a:p>
-          <a:p>
-            <a:pPr lvl="1"/>
-            <a:r>
-              <a:rPr lang="en-US" dirty="0" smtClean="0"/>
-              <a:t>Header</a:t>
-            </a:r>
-          </a:p>
-          <a:p>
-            <a:pPr lvl="1"/>
-            <a:r>
-              <a:rPr lang="en-US" dirty="0" smtClean="0"/>
-              <a:t>Footer</a:t>
-            </a:r>
-          </a:p>
-          <a:p>
-            <a:pPr lvl="1"/>
-            <a:r>
-              <a:rPr lang="en-US" dirty="0" err="1" smtClean="0"/>
-              <a:t>Nav</a:t>
-            </a:r>
-            <a:endParaRPr lang="en-US" dirty="0" smtClean="0"/>
-          </a:p>
-          <a:p>
-            <a:pPr lvl="1"/>
-            <a:r>
-              <a:rPr lang="en-US" dirty="0" smtClean="0"/>
-              <a:t>Section</a:t>
-            </a:r>
-          </a:p>
-          <a:p>
-            <a:pPr lvl="1"/>
-            <a:r>
-              <a:rPr lang="en-US" dirty="0" smtClean="0"/>
-              <a:t>Aside</a:t>
+              <a:rPr lang="en-US" dirty="0"/>
+              <a:t>HTML has grown from ‘just’ markup </a:t>
+            </a:r>
+            <a:r>
+              <a:rPr lang="en-US" dirty="0" smtClean="0"/>
+              <a:t>language to a whole new Infrastructure.</a:t>
+            </a:r>
+          </a:p>
+          <a:p>
+            <a:r>
+              <a:rPr lang="en-US" dirty="0" smtClean="0"/>
+              <a:t>Browser is Platform</a:t>
             </a:r>
             <a:endParaRPr lang="en-US" dirty="0"/>
           </a:p>
           <a:p>
             <a:r>
-              <a:rPr lang="en-US" dirty="0" err="1"/>
-              <a:t>Divs</a:t>
-            </a:r>
-            <a:r>
-              <a:rPr lang="en-US" dirty="0"/>
-              <a:t> should be utilized when there’s no better element for the job</a:t>
-            </a:r>
-            <a:r>
-              <a:rPr lang="en-US" dirty="0" smtClean="0"/>
-              <a:t>.</a:t>
-            </a:r>
-          </a:p>
-          <a:p>
-            <a:r>
-              <a:rPr lang="en-US" dirty="0" smtClean="0"/>
-              <a:t> Problems </a:t>
-            </a:r>
-            <a:r>
-              <a:rPr lang="en-US" dirty="0"/>
-              <a:t>with </a:t>
-            </a:r>
-            <a:r>
-              <a:rPr lang="en-US" dirty="0" smtClean="0"/>
-              <a:t>IE</a:t>
+              <a:rPr lang="en-US" dirty="0" smtClean="0"/>
+              <a:t>With HTML 5, CSS3 and Java Script now you write desktop equivalent applications</a:t>
+            </a:r>
+          </a:p>
+          <a:p>
+            <a:r>
+              <a:rPr lang="en-US" dirty="0" smtClean="0"/>
+              <a:t>You can debug java script, perform logging etc.</a:t>
+            </a:r>
+          </a:p>
+          <a:p>
+            <a:r>
+              <a:rPr lang="en-US" dirty="0" smtClean="0"/>
+              <a:t>Browse ecosystem is also matured with frameworks like Angular, Backbone, knockout etc.</a:t>
             </a:r>
           </a:p>
         </p:txBody>
@@ -8837,7 +10083,7 @@
     </p:custDataLst>
     <p:extLst>
       <p:ext uri="{BB962C8B-B14F-4D97-AF65-F5344CB8AC3E}">
-        <p14:creationId xmlns:p14="http://schemas.microsoft.com/office/powerpoint/2010/main" val="3373504723"/>
+        <p14:creationId xmlns:p14="http://schemas.microsoft.com/office/powerpoint/2010/main" val="964538590"/>
       </p:ext>
     </p:extLst>
   </p:cSld>
@@ -9063,19 +10309,91 @@
 
 <file path=ppt/tags/tag40.xml><?xml version="1.0" encoding="utf-8"?>
 <p:tagLst xmlns:a="http://schemas.openxmlformats.org/drawingml/2006/main" xmlns:r="http://schemas.openxmlformats.org/officeDocument/2006/relationships" xmlns:p="http://schemas.openxmlformats.org/presentationml/2006/main">
-  <p:tag name="DVSECTIONID" val="ezdaKHeWyBnZyZ2cDqRSoa"/>
+  <p:tag name="DVSECTIONID" val="QUq8QELArFIgadhH063fpq"/>
 </p:tagLst>
 </file>
 
 <file path=ppt/tags/tag41.xml><?xml version="1.0" encoding="utf-8"?>
 <p:tagLst xmlns:a="http://schemas.openxmlformats.org/drawingml/2006/main" xmlns:r="http://schemas.openxmlformats.org/officeDocument/2006/relationships" xmlns:p="http://schemas.openxmlformats.org/presentationml/2006/main">
-  <p:tag name="DVSHAPEID" val="LRMR96J2MVd0CGe2e5htjk"/>
+  <p:tag name="DVSHAPEID" val="InkrlxYPS4jAzciXk8ToAM"/>
+</p:tagLst>
+</file>
+
+<file path=ppt/tags/tag42.xml><?xml version="1.0" encoding="utf-8"?>
+<p:tagLst xmlns:a="http://schemas.openxmlformats.org/drawingml/2006/main" xmlns:r="http://schemas.openxmlformats.org/officeDocument/2006/relationships" xmlns:p="http://schemas.openxmlformats.org/presentationml/2006/main">
+  <p:tag name="DVSHAPEID" val="retnMj4SFfqbVIhVK0Rf83"/>
+</p:tagLst>
+</file>
+
+<file path=ppt/tags/tag43.xml><?xml version="1.0" encoding="utf-8"?>
+<p:tagLst xmlns:a="http://schemas.openxmlformats.org/drawingml/2006/main" xmlns:r="http://schemas.openxmlformats.org/officeDocument/2006/relationships" xmlns:p="http://schemas.openxmlformats.org/presentationml/2006/main">
+  <p:tag name="DVSECTIONID" val="QUq8QELArFIgadhH063fpq"/>
+</p:tagLst>
+</file>
+
+<file path=ppt/tags/tag44.xml><?xml version="1.0" encoding="utf-8"?>
+<p:tagLst xmlns:a="http://schemas.openxmlformats.org/drawingml/2006/main" xmlns:r="http://schemas.openxmlformats.org/officeDocument/2006/relationships" xmlns:p="http://schemas.openxmlformats.org/presentationml/2006/main">
+  <p:tag name="DVSHAPEID" val="InkrlxYPS4jAzciXk8ToAM"/>
+</p:tagLst>
+</file>
+
+<file path=ppt/tags/tag45.xml><?xml version="1.0" encoding="utf-8"?>
+<p:tagLst xmlns:a="http://schemas.openxmlformats.org/drawingml/2006/main" xmlns:r="http://schemas.openxmlformats.org/officeDocument/2006/relationships" xmlns:p="http://schemas.openxmlformats.org/presentationml/2006/main">
+  <p:tag name="DVSHAPEID" val="retnMj4SFfqbVIhVK0Rf83"/>
+</p:tagLst>
+</file>
+
+<file path=ppt/tags/tag46.xml><?xml version="1.0" encoding="utf-8"?>
+<p:tagLst xmlns:a="http://schemas.openxmlformats.org/drawingml/2006/main" xmlns:r="http://schemas.openxmlformats.org/officeDocument/2006/relationships" xmlns:p="http://schemas.openxmlformats.org/presentationml/2006/main">
+  <p:tag name="DVSECTIONID" val="QUq8QELArFIgadhH063fpq"/>
+</p:tagLst>
+</file>
+
+<file path=ppt/tags/tag47.xml><?xml version="1.0" encoding="utf-8"?>
+<p:tagLst xmlns:a="http://schemas.openxmlformats.org/drawingml/2006/main" xmlns:r="http://schemas.openxmlformats.org/officeDocument/2006/relationships" xmlns:p="http://schemas.openxmlformats.org/presentationml/2006/main">
+  <p:tag name="DVSHAPEID" val="InkrlxYPS4jAzciXk8ToAM"/>
+</p:tagLst>
+</file>
+
+<file path=ppt/tags/tag48.xml><?xml version="1.0" encoding="utf-8"?>
+<p:tagLst xmlns:a="http://schemas.openxmlformats.org/drawingml/2006/main" xmlns:r="http://schemas.openxmlformats.org/officeDocument/2006/relationships" xmlns:p="http://schemas.openxmlformats.org/presentationml/2006/main">
+  <p:tag name="DVSHAPEID" val="retnMj4SFfqbVIhVK0Rf83"/>
+</p:tagLst>
+</file>
+
+<file path=ppt/tags/tag49.xml><?xml version="1.0" encoding="utf-8"?>
+<p:tagLst xmlns:a="http://schemas.openxmlformats.org/drawingml/2006/main" xmlns:r="http://schemas.openxmlformats.org/officeDocument/2006/relationships" xmlns:p="http://schemas.openxmlformats.org/presentationml/2006/main">
+  <p:tag name="DVSECTIONID" val="QUq8QELArFIgadhH063fpq"/>
 </p:tagLst>
 </file>
 
 <file path=ppt/tags/tag5.xml><?xml version="1.0" encoding="utf-8"?>
 <p:tagLst xmlns:a="http://schemas.openxmlformats.org/drawingml/2006/main" xmlns:r="http://schemas.openxmlformats.org/officeDocument/2006/relationships" xmlns:p="http://schemas.openxmlformats.org/presentationml/2006/main">
   <p:tag name="DVSHAPEID" val="InkrlxYPS4jAzciXk8ToAM"/>
+</p:tagLst>
+</file>
+
+<file path=ppt/tags/tag50.xml><?xml version="1.0" encoding="utf-8"?>
+<p:tagLst xmlns:a="http://schemas.openxmlformats.org/drawingml/2006/main" xmlns:r="http://schemas.openxmlformats.org/officeDocument/2006/relationships" xmlns:p="http://schemas.openxmlformats.org/presentationml/2006/main">
+  <p:tag name="DVSHAPEID" val="InkrlxYPS4jAzciXk8ToAM"/>
+</p:tagLst>
+</file>
+
+<file path=ppt/tags/tag51.xml><?xml version="1.0" encoding="utf-8"?>
+<p:tagLst xmlns:a="http://schemas.openxmlformats.org/drawingml/2006/main" xmlns:r="http://schemas.openxmlformats.org/officeDocument/2006/relationships" xmlns:p="http://schemas.openxmlformats.org/presentationml/2006/main">
+  <p:tag name="DVSHAPEID" val="retnMj4SFfqbVIhVK0Rf83"/>
+</p:tagLst>
+</file>
+
+<file path=ppt/tags/tag52.xml><?xml version="1.0" encoding="utf-8"?>
+<p:tagLst xmlns:a="http://schemas.openxmlformats.org/drawingml/2006/main" xmlns:r="http://schemas.openxmlformats.org/officeDocument/2006/relationships" xmlns:p="http://schemas.openxmlformats.org/presentationml/2006/main">
+  <p:tag name="DVSECTIONID" val="ezdaKHeWyBnZyZ2cDqRSoa"/>
+</p:tagLst>
+</file>
+
+<file path=ppt/tags/tag53.xml><?xml version="1.0" encoding="utf-8"?>
+<p:tagLst xmlns:a="http://schemas.openxmlformats.org/drawingml/2006/main" xmlns:r="http://schemas.openxmlformats.org/officeDocument/2006/relationships" xmlns:p="http://schemas.openxmlformats.org/presentationml/2006/main">
+  <p:tag name="DVSHAPEID" val="LRMR96J2MVd0CGe2e5htjk"/>
 </p:tagLst>
 </file>
 

</xml_diff>

<commit_message>
Minor modification in ARIA ppt
</commit_message>
<xml_diff>
--- a/ppt/aria.pptx
+++ b/ppt/aria.pptx
@@ -5,39 +5,46 @@
     <p:sldMasterId id="2147483648" r:id="rId1"/>
   </p:sldMasterIdLst>
   <p:notesMasterIdLst>
-    <p:notesMasterId r:id="rId29"/>
+    <p:notesMasterId r:id="rId36"/>
   </p:notesMasterIdLst>
   <p:handoutMasterIdLst>
-    <p:handoutMasterId r:id="rId30"/>
+    <p:handoutMasterId r:id="rId37"/>
   </p:handoutMasterIdLst>
   <p:sldIdLst>
     <p:sldId id="259" r:id="rId2"/>
     <p:sldId id="281" r:id="rId3"/>
     <p:sldId id="320" r:id="rId4"/>
     <p:sldId id="322" r:id="rId5"/>
-    <p:sldId id="323" r:id="rId6"/>
-    <p:sldId id="325" r:id="rId7"/>
-    <p:sldId id="308" r:id="rId8"/>
-    <p:sldId id="324" r:id="rId9"/>
-    <p:sldId id="321" r:id="rId10"/>
-    <p:sldId id="310" r:id="rId11"/>
-    <p:sldId id="303" r:id="rId12"/>
-    <p:sldId id="304" r:id="rId13"/>
-    <p:sldId id="319" r:id="rId14"/>
-    <p:sldId id="311" r:id="rId15"/>
-    <p:sldId id="306" r:id="rId16"/>
-    <p:sldId id="313" r:id="rId17"/>
-    <p:sldId id="309" r:id="rId18"/>
-    <p:sldId id="312" r:id="rId19"/>
-    <p:sldId id="314" r:id="rId20"/>
-    <p:sldId id="307" r:id="rId21"/>
-    <p:sldId id="315" r:id="rId22"/>
-    <p:sldId id="300" r:id="rId23"/>
-    <p:sldId id="316" r:id="rId24"/>
-    <p:sldId id="317" r:id="rId25"/>
-    <p:sldId id="318" r:id="rId26"/>
-    <p:sldId id="292" r:id="rId27"/>
-    <p:sldId id="277" r:id="rId28"/>
+    <p:sldId id="325" r:id="rId6"/>
+    <p:sldId id="326" r:id="rId7"/>
+    <p:sldId id="329" r:id="rId8"/>
+    <p:sldId id="323" r:id="rId9"/>
+    <p:sldId id="330" r:id="rId10"/>
+    <p:sldId id="308" r:id="rId11"/>
+    <p:sldId id="327" r:id="rId12"/>
+    <p:sldId id="328" r:id="rId13"/>
+    <p:sldId id="331" r:id="rId14"/>
+    <p:sldId id="324" r:id="rId15"/>
+    <p:sldId id="332" r:id="rId16"/>
+    <p:sldId id="321" r:id="rId17"/>
+    <p:sldId id="310" r:id="rId18"/>
+    <p:sldId id="303" r:id="rId19"/>
+    <p:sldId id="304" r:id="rId20"/>
+    <p:sldId id="319" r:id="rId21"/>
+    <p:sldId id="311" r:id="rId22"/>
+    <p:sldId id="306" r:id="rId23"/>
+    <p:sldId id="313" r:id="rId24"/>
+    <p:sldId id="309" r:id="rId25"/>
+    <p:sldId id="312" r:id="rId26"/>
+    <p:sldId id="314" r:id="rId27"/>
+    <p:sldId id="307" r:id="rId28"/>
+    <p:sldId id="315" r:id="rId29"/>
+    <p:sldId id="300" r:id="rId30"/>
+    <p:sldId id="316" r:id="rId31"/>
+    <p:sldId id="317" r:id="rId32"/>
+    <p:sldId id="318" r:id="rId33"/>
+    <p:sldId id="292" r:id="rId34"/>
+    <p:sldId id="277" r:id="rId35"/>
   </p:sldIdLst>
   <p:sldSz cx="9144000" cy="6858000" type="screen4x3"/>
   <p:notesSz cx="6858000" cy="9144000"/>
@@ -145,10 +152,17 @@
             <p14:sldId id="281"/>
             <p14:sldId id="320"/>
             <p14:sldId id="322"/>
+            <p14:sldId id="325"/>
+            <p14:sldId id="326"/>
+            <p14:sldId id="329"/>
             <p14:sldId id="323"/>
-            <p14:sldId id="325"/>
+            <p14:sldId id="330"/>
             <p14:sldId id="308"/>
+            <p14:sldId id="327"/>
+            <p14:sldId id="328"/>
+            <p14:sldId id="331"/>
             <p14:sldId id="324"/>
+            <p14:sldId id="332"/>
             <p14:sldId id="321"/>
             <p14:sldId id="310"/>
           </p14:sldIdLst>
@@ -267,7 +281,7 @@
             <a:fld id="{D83FDC75-7F73-4A4A-A77C-09AADF00E0EA}" type="datetimeFigureOut">
               <a:rPr lang="en-US" smtClean="0"/>
               <a:pPr/>
-              <a:t>11/17/2013</a:t>
+              <a:t>11/18/2013</a:t>
             </a:fld>
             <a:endParaRPr lang="en-US" dirty="0"/>
           </a:p>
@@ -434,7 +448,7 @@
             <a:fld id="{48AEF76B-3757-4A0B-AF93-28494465C1DD}" type="datetimeFigureOut">
               <a:rPr lang="en-US" smtClean="0"/>
               <a:pPr/>
-              <a:t>11/17/2013</a:t>
+              <a:t>11/18/2013</a:t>
             </a:fld>
             <a:endParaRPr lang="en-US" dirty="0"/>
           </a:p>
@@ -1080,29 +1094,36 @@
         </p:nvSpPr>
         <p:spPr/>
         <p:txBody>
+          <a:bodyPr>
+            <a:normAutofit/>
+          </a:bodyPr>
+          <a:lstStyle/>
+          <a:p>
+            <a:pPr>
+              <a:lnSpc>
+                <a:spcPct val="80000"/>
+              </a:lnSpc>
+            </a:pPr>
+            <a:endParaRPr lang="en-US" dirty="0" smtClean="0"/>
+          </a:p>
+        </p:txBody>
+      </p:sp>
+      <p:sp>
+        <p:nvSpPr>
+          <p:cNvPr id="4" name="Slide Number Placeholder 3"/>
+          <p:cNvSpPr>
+            <a:spLocks noGrp="1"/>
+          </p:cNvSpPr>
+          <p:nvPr>
+            <p:ph type="sldNum" sz="quarter" idx="10"/>
+          </p:nvPr>
+        </p:nvSpPr>
+        <p:spPr/>
+        <p:txBody>
           <a:bodyPr/>
           <a:lstStyle/>
           <a:p>
-            <a:endParaRPr lang="en-US" dirty="0"/>
-          </a:p>
-        </p:txBody>
-      </p:sp>
-      <p:sp>
-        <p:nvSpPr>
-          <p:cNvPr id="4" name="Slide Number Placeholder 3"/>
-          <p:cNvSpPr>
-            <a:spLocks noGrp="1"/>
-          </p:cNvSpPr>
-          <p:nvPr>
-            <p:ph type="sldNum" sz="quarter" idx="10"/>
-          </p:nvPr>
-        </p:nvSpPr>
-        <p:spPr/>
-        <p:txBody>
-          <a:bodyPr/>
-          <a:lstStyle/>
-          <a:p>
-            <a:fld id="{75693FD4-8F83-4EF7-AC3F-0DC0388986B0}" type="slidenum">
+            <a:fld id="{EC6EAC7D-5A89-47C2-8ABA-56C9C2DEF7A4}" type="slidenum">
               <a:rPr lang="en-US" smtClean="0"/>
               <a:pPr/>
               <a:t>11</a:t>
@@ -1366,7 +1387,7 @@
             <a:fld id="{EC6EAC7D-5A89-47C2-8ABA-56C9C2DEF7A4}" type="slidenum">
               <a:rPr lang="en-US" smtClean="0"/>
               <a:pPr/>
-              <a:t>15</a:t>
+              <a:t>14</a:t>
             </a:fld>
             <a:endParaRPr lang="en-US"/>
           </a:p>
@@ -1453,7 +1474,7 @@
             <a:fld id="{EC6EAC7D-5A89-47C2-8ABA-56C9C2DEF7A4}" type="slidenum">
               <a:rPr lang="en-US" smtClean="0"/>
               <a:pPr/>
-              <a:t>16</a:t>
+              <a:t>15</a:t>
             </a:fld>
             <a:endParaRPr lang="en-US"/>
           </a:p>
@@ -1540,7 +1561,7 @@
             <a:fld id="{EC6EAC7D-5A89-47C2-8ABA-56C9C2DEF7A4}" type="slidenum">
               <a:rPr lang="en-US" smtClean="0"/>
               <a:pPr/>
-              <a:t>17</a:t>
+              <a:t>16</a:t>
             </a:fld>
             <a:endParaRPr lang="en-US"/>
           </a:p>
@@ -1595,32 +1616,39 @@
         </p:nvSpPr>
         <p:spPr/>
         <p:txBody>
+          <a:bodyPr>
+            <a:normAutofit/>
+          </a:bodyPr>
+          <a:lstStyle/>
+          <a:p>
+            <a:pPr>
+              <a:lnSpc>
+                <a:spcPct val="80000"/>
+              </a:lnSpc>
+            </a:pPr>
+            <a:endParaRPr lang="en-US" dirty="0" smtClean="0"/>
+          </a:p>
+        </p:txBody>
+      </p:sp>
+      <p:sp>
+        <p:nvSpPr>
+          <p:cNvPr id="4" name="Slide Number Placeholder 3"/>
+          <p:cNvSpPr>
+            <a:spLocks noGrp="1"/>
+          </p:cNvSpPr>
+          <p:nvPr>
+            <p:ph type="sldNum" sz="quarter" idx="10"/>
+          </p:nvPr>
+        </p:nvSpPr>
+        <p:spPr/>
+        <p:txBody>
           <a:bodyPr/>
           <a:lstStyle/>
           <a:p>
-            <a:endParaRPr lang="en-US" dirty="0"/>
-          </a:p>
-        </p:txBody>
-      </p:sp>
-      <p:sp>
-        <p:nvSpPr>
-          <p:cNvPr id="4" name="Slide Number Placeholder 3"/>
-          <p:cNvSpPr>
-            <a:spLocks noGrp="1"/>
-          </p:cNvSpPr>
-          <p:nvPr>
-            <p:ph type="sldNum" sz="quarter" idx="10"/>
-          </p:nvPr>
-        </p:nvSpPr>
-        <p:spPr/>
-        <p:txBody>
-          <a:bodyPr/>
-          <a:lstStyle/>
-          <a:p>
-            <a:fld id="{75693FD4-8F83-4EF7-AC3F-0DC0388986B0}" type="slidenum">
+            <a:fld id="{EC6EAC7D-5A89-47C2-8ABA-56C9C2DEF7A4}" type="slidenum">
               <a:rPr lang="en-US" smtClean="0"/>
               <a:pPr/>
-              <a:t>18</a:t>
+              <a:t>17</a:t>
             </a:fld>
             <a:endParaRPr lang="en-US"/>
           </a:p>
@@ -1675,17 +1703,10 @@
         </p:nvSpPr>
         <p:spPr/>
         <p:txBody>
-          <a:bodyPr>
-            <a:normAutofit/>
-          </a:bodyPr>
-          <a:lstStyle/>
-          <a:p>
-            <a:pPr>
-              <a:lnSpc>
-                <a:spcPct val="80000"/>
-              </a:lnSpc>
-            </a:pPr>
-            <a:endParaRPr lang="en-US" dirty="0" smtClean="0"/>
+          <a:bodyPr/>
+          <a:lstStyle/>
+          <a:p>
+            <a:endParaRPr lang="en-US" dirty="0"/>
           </a:p>
         </p:txBody>
       </p:sp>
@@ -1704,10 +1725,10 @@
           <a:bodyPr/>
           <a:lstStyle/>
           <a:p>
-            <a:fld id="{EC6EAC7D-5A89-47C2-8ABA-56C9C2DEF7A4}" type="slidenum">
+            <a:fld id="{75693FD4-8F83-4EF7-AC3F-0DC0388986B0}" type="slidenum">
               <a:rPr lang="en-US" smtClean="0"/>
               <a:pPr/>
-              <a:t>19</a:t>
+              <a:t>18</a:t>
             </a:fld>
             <a:endParaRPr lang="en-US"/>
           </a:p>
@@ -1794,7 +1815,7 @@
             <a:fld id="{EC6EAC7D-5A89-47C2-8ABA-56C9C2DEF7A4}" type="slidenum">
               <a:rPr lang="en-US" smtClean="0"/>
               <a:pPr/>
-              <a:t>20</a:t>
+              <a:t>19</a:t>
             </a:fld>
             <a:endParaRPr lang="en-US"/>
           </a:p>
@@ -1961,7 +1982,7 @@
             <a:fld id="{EC6EAC7D-5A89-47C2-8ABA-56C9C2DEF7A4}" type="slidenum">
               <a:rPr lang="en-US" smtClean="0"/>
               <a:pPr/>
-              <a:t>21</a:t>
+              <a:t>20</a:t>
             </a:fld>
             <a:endParaRPr lang="en-US"/>
           </a:p>
@@ -2016,29 +2037,36 @@
         </p:nvSpPr>
         <p:spPr/>
         <p:txBody>
+          <a:bodyPr>
+            <a:normAutofit/>
+          </a:bodyPr>
+          <a:lstStyle/>
+          <a:p>
+            <a:pPr>
+              <a:lnSpc>
+                <a:spcPct val="80000"/>
+              </a:lnSpc>
+            </a:pPr>
+            <a:endParaRPr lang="en-US" dirty="0" smtClean="0"/>
+          </a:p>
+        </p:txBody>
+      </p:sp>
+      <p:sp>
+        <p:nvSpPr>
+          <p:cNvPr id="4" name="Slide Number Placeholder 3"/>
+          <p:cNvSpPr>
+            <a:spLocks noGrp="1"/>
+          </p:cNvSpPr>
+          <p:nvPr>
+            <p:ph type="sldNum" sz="quarter" idx="10"/>
+          </p:nvPr>
+        </p:nvSpPr>
+        <p:spPr/>
+        <p:txBody>
           <a:bodyPr/>
           <a:lstStyle/>
           <a:p>
-            <a:endParaRPr lang="en-US" dirty="0"/>
-          </a:p>
-        </p:txBody>
-      </p:sp>
-      <p:sp>
-        <p:nvSpPr>
-          <p:cNvPr id="4" name="Slide Number Placeholder 3"/>
-          <p:cNvSpPr>
-            <a:spLocks noGrp="1"/>
-          </p:cNvSpPr>
-          <p:nvPr>
-            <p:ph type="sldNum" sz="quarter" idx="10"/>
-          </p:nvPr>
-        </p:nvSpPr>
-        <p:spPr/>
-        <p:txBody>
-          <a:bodyPr/>
-          <a:lstStyle/>
-          <a:p>
-            <a:fld id="{75693FD4-8F83-4EF7-AC3F-0DC0388986B0}" type="slidenum">
+            <a:fld id="{EC6EAC7D-5A89-47C2-8ABA-56C9C2DEF7A4}" type="slidenum">
               <a:rPr lang="en-US" smtClean="0"/>
               <a:pPr/>
               <a:t>22</a:t>
@@ -2096,29 +2124,36 @@
         </p:nvSpPr>
         <p:spPr/>
         <p:txBody>
+          <a:bodyPr>
+            <a:normAutofit/>
+          </a:bodyPr>
+          <a:lstStyle/>
+          <a:p>
+            <a:pPr>
+              <a:lnSpc>
+                <a:spcPct val="80000"/>
+              </a:lnSpc>
+            </a:pPr>
+            <a:endParaRPr lang="en-US" dirty="0" smtClean="0"/>
+          </a:p>
+        </p:txBody>
+      </p:sp>
+      <p:sp>
+        <p:nvSpPr>
+          <p:cNvPr id="4" name="Slide Number Placeholder 3"/>
+          <p:cNvSpPr>
+            <a:spLocks noGrp="1"/>
+          </p:cNvSpPr>
+          <p:nvPr>
+            <p:ph type="sldNum" sz="quarter" idx="10"/>
+          </p:nvPr>
+        </p:nvSpPr>
+        <p:spPr/>
+        <p:txBody>
           <a:bodyPr/>
           <a:lstStyle/>
           <a:p>
-            <a:endParaRPr lang="en-US" dirty="0"/>
-          </a:p>
-        </p:txBody>
-      </p:sp>
-      <p:sp>
-        <p:nvSpPr>
-          <p:cNvPr id="4" name="Slide Number Placeholder 3"/>
-          <p:cNvSpPr>
-            <a:spLocks noGrp="1"/>
-          </p:cNvSpPr>
-          <p:nvPr>
-            <p:ph type="sldNum" sz="quarter" idx="10"/>
-          </p:nvPr>
-        </p:nvSpPr>
-        <p:spPr/>
-        <p:txBody>
-          <a:bodyPr/>
-          <a:lstStyle/>
-          <a:p>
-            <a:fld id="{75693FD4-8F83-4EF7-AC3F-0DC0388986B0}" type="slidenum">
+            <a:fld id="{EC6EAC7D-5A89-47C2-8ABA-56C9C2DEF7A4}" type="slidenum">
               <a:rPr lang="en-US" smtClean="0"/>
               <a:pPr/>
               <a:t>23</a:t>
@@ -2263,17 +2298,10 @@
         </p:nvSpPr>
         <p:spPr/>
         <p:txBody>
-          <a:bodyPr>
-            <a:normAutofit/>
-          </a:bodyPr>
-          <a:lstStyle/>
-          <a:p>
-            <a:pPr>
-              <a:lnSpc>
-                <a:spcPct val="80000"/>
-              </a:lnSpc>
-            </a:pPr>
-            <a:endParaRPr lang="en-US" dirty="0" smtClean="0"/>
+          <a:bodyPr/>
+          <a:lstStyle/>
+          <a:p>
+            <a:endParaRPr lang="en-US" dirty="0"/>
           </a:p>
         </p:txBody>
       </p:sp>
@@ -2292,7 +2320,7 @@
           <a:bodyPr/>
           <a:lstStyle/>
           <a:p>
-            <a:fld id="{EC6EAC7D-5A89-47C2-8ABA-56C9C2DEF7A4}" type="slidenum">
+            <a:fld id="{75693FD4-8F83-4EF7-AC3F-0DC0388986B0}" type="slidenum">
               <a:rPr lang="en-US" smtClean="0"/>
               <a:pPr/>
               <a:t>25</a:t>
@@ -2350,42 +2378,41 @@
         </p:nvSpPr>
         <p:spPr/>
         <p:txBody>
+          <a:bodyPr>
+            <a:normAutofit/>
+          </a:bodyPr>
+          <a:lstStyle/>
+          <a:p>
+            <a:pPr>
+              <a:lnSpc>
+                <a:spcPct val="80000"/>
+              </a:lnSpc>
+            </a:pPr>
+            <a:endParaRPr lang="en-US" dirty="0" smtClean="0"/>
+          </a:p>
+        </p:txBody>
+      </p:sp>
+      <p:sp>
+        <p:nvSpPr>
+          <p:cNvPr id="4" name="Slide Number Placeholder 3"/>
+          <p:cNvSpPr>
+            <a:spLocks noGrp="1"/>
+          </p:cNvSpPr>
+          <p:nvPr>
+            <p:ph type="sldNum" sz="quarter" idx="10"/>
+          </p:nvPr>
+        </p:nvSpPr>
+        <p:spPr/>
+        <p:txBody>
           <a:bodyPr/>
           <a:lstStyle/>
           <a:p>
-            <a:endParaRPr lang="en-US"/>
-          </a:p>
-        </p:txBody>
-      </p:sp>
-      <p:sp>
-        <p:nvSpPr>
-          <p:cNvPr id="4" name="Slide Number Placeholder 3"/>
-          <p:cNvSpPr>
-            <a:spLocks noGrp="1"/>
-          </p:cNvSpPr>
-          <p:nvPr>
-            <p:ph type="sldNum" sz="quarter" idx="10"/>
-          </p:nvPr>
-        </p:nvSpPr>
-        <p:spPr/>
-        <p:txBody>
-          <a:bodyPr/>
-          <a:lstStyle/>
-          <a:p>
-            <a:fld id="{75693FD4-8F83-4EF7-AC3F-0DC0388986B0}" type="slidenum">
-              <a:rPr lang="en-US" smtClean="0">
-                <a:solidFill>
-                  <a:prstClr val="black"/>
-                </a:solidFill>
-              </a:rPr>
+            <a:fld id="{EC6EAC7D-5A89-47C2-8ABA-56C9C2DEF7A4}" type="slidenum">
+              <a:rPr lang="en-US" smtClean="0"/>
               <a:pPr/>
               <a:t>26</a:t>
             </a:fld>
-            <a:endParaRPr lang="en-US">
-              <a:solidFill>
-                <a:prstClr val="black"/>
-              </a:solidFill>
-            </a:endParaRPr>
+            <a:endParaRPr lang="en-US"/>
           </a:p>
         </p:txBody>
       </p:sp>
@@ -2416,128 +2443,310 @@
       </p:grpSpPr>
       <p:sp>
         <p:nvSpPr>
-          <p:cNvPr id="41986" name="Rectangle 23"/>
-          <p:cNvSpPr>
-            <a:spLocks noGrp="1" noChangeArrowheads="1"/>
-          </p:cNvSpPr>
-          <p:nvPr>
-            <p:ph type="hdr" sz="quarter"/>
-          </p:nvPr>
-        </p:nvSpPr>
-        <p:spPr>
-          <a:noFill/>
-        </p:spPr>
+          <p:cNvPr id="2" name="Slide Image Placeholder 1"/>
+          <p:cNvSpPr>
+            <a:spLocks noGrp="1" noRot="1" noChangeAspect="1"/>
+          </p:cNvSpPr>
+          <p:nvPr>
+            <p:ph type="sldImg"/>
+          </p:nvPr>
+        </p:nvSpPr>
+        <p:spPr/>
+      </p:sp>
+      <p:sp>
+        <p:nvSpPr>
+          <p:cNvPr id="3" name="Notes Placeholder 2"/>
+          <p:cNvSpPr>
+            <a:spLocks noGrp="1"/>
+          </p:cNvSpPr>
+          <p:nvPr>
+            <p:ph type="body" idx="1"/>
+          </p:nvPr>
+        </p:nvSpPr>
+        <p:spPr/>
+        <p:txBody>
+          <a:bodyPr>
+            <a:normAutofit/>
+          </a:bodyPr>
+          <a:lstStyle/>
+          <a:p>
+            <a:pPr>
+              <a:lnSpc>
+                <a:spcPct val="80000"/>
+              </a:lnSpc>
+            </a:pPr>
+            <a:endParaRPr lang="en-US" dirty="0" smtClean="0"/>
+          </a:p>
+        </p:txBody>
+      </p:sp>
+      <p:sp>
+        <p:nvSpPr>
+          <p:cNvPr id="4" name="Slide Number Placeholder 3"/>
+          <p:cNvSpPr>
+            <a:spLocks noGrp="1"/>
+          </p:cNvSpPr>
+          <p:nvPr>
+            <p:ph type="sldNum" sz="quarter" idx="10"/>
+          </p:nvPr>
+        </p:nvSpPr>
+        <p:spPr/>
         <p:txBody>
           <a:bodyPr/>
           <a:lstStyle/>
           <a:p>
-            <a:r>
-              <a:rPr lang="en-US" dirty="0" smtClean="0"/>
-              <a:t>Microsoft </a:t>
-            </a:r>
-            <a:r>
-              <a:rPr lang="en-US" b="1" dirty="0" smtClean="0"/>
-              <a:t>Engineering Excellence</a:t>
-            </a:r>
-            <a:endParaRPr lang="en-US" dirty="0" smtClean="0"/>
-          </a:p>
-        </p:txBody>
-      </p:sp>
-      <p:sp>
-        <p:nvSpPr>
-          <p:cNvPr id="41987" name="Rectangle 25"/>
-          <p:cNvSpPr>
-            <a:spLocks noGrp="1" noChangeArrowheads="1"/>
-          </p:cNvSpPr>
-          <p:nvPr>
-            <p:ph type="ftr" sz="quarter" idx="4"/>
-          </p:nvPr>
-        </p:nvSpPr>
-        <p:spPr>
-          <a:noFill/>
-        </p:spPr>
-        <p:txBody>
-          <a:bodyPr/>
-          <a:lstStyle/>
-          <a:p>
-            <a:r>
-              <a:rPr lang="en-US" dirty="0" smtClean="0"/>
-              <a:t>Microsoft Confidential</a:t>
-            </a:r>
-          </a:p>
-        </p:txBody>
-      </p:sp>
-      <p:sp>
-        <p:nvSpPr>
-          <p:cNvPr id="41988" name="Rectangle 26"/>
-          <p:cNvSpPr>
-            <a:spLocks noGrp="1" noChangeArrowheads="1"/>
-          </p:cNvSpPr>
-          <p:nvPr>
-            <p:ph type="sldNum" sz="quarter" idx="5"/>
-          </p:nvPr>
-        </p:nvSpPr>
-        <p:spPr>
-          <a:noFill/>
-        </p:spPr>
-        <p:txBody>
-          <a:bodyPr/>
-          <a:lstStyle/>
-          <a:p>
-            <a:fld id="{B2B44A5F-6CE4-493C-A0D7-6834FF76660C}" type="slidenum">
+            <a:fld id="{EC6EAC7D-5A89-47C2-8ABA-56C9C2DEF7A4}" type="slidenum">
               <a:rPr lang="en-US" smtClean="0"/>
               <a:pPr/>
               <a:t>27</a:t>
             </a:fld>
-            <a:endParaRPr lang="en-US" dirty="0" smtClean="0"/>
-          </a:p>
-        </p:txBody>
-      </p:sp>
-      <p:sp>
-        <p:nvSpPr>
-          <p:cNvPr id="41989" name="Rectangle 2"/>
-          <p:cNvSpPr>
-            <a:spLocks noGrp="1" noRot="1" noChangeAspect="1" noChangeArrowheads="1" noTextEdit="1"/>
+            <a:endParaRPr lang="en-US"/>
+          </a:p>
+        </p:txBody>
+      </p:sp>
+    </p:spTree>
+  </p:cSld>
+  <p:clrMapOvr>
+    <a:masterClrMapping/>
+  </p:clrMapOvr>
+</p:notes>
+</file>
+
+<file path=ppt/notesSlides/notesSlide27.xml><?xml version="1.0" encoding="utf-8"?>
+<p:notes xmlns:a="http://schemas.openxmlformats.org/drawingml/2006/main" xmlns:r="http://schemas.openxmlformats.org/officeDocument/2006/relationships" xmlns:p="http://schemas.openxmlformats.org/presentationml/2006/main">
+  <p:cSld>
+    <p:spTree>
+      <p:nvGrpSpPr>
+        <p:cNvPr id="1" name=""/>
+        <p:cNvGrpSpPr/>
+        <p:nvPr/>
+      </p:nvGrpSpPr>
+      <p:grpSpPr>
+        <a:xfrm>
+          <a:off x="0" y="0"/>
+          <a:ext cx="0" cy="0"/>
+          <a:chOff x="0" y="0"/>
+          <a:chExt cx="0" cy="0"/>
+        </a:xfrm>
+      </p:grpSpPr>
+      <p:sp>
+        <p:nvSpPr>
+          <p:cNvPr id="2" name="Slide Image Placeholder 1"/>
+          <p:cNvSpPr>
+            <a:spLocks noGrp="1" noRot="1" noChangeAspect="1"/>
           </p:cNvSpPr>
           <p:nvPr>
             <p:ph type="sldImg"/>
           </p:nvPr>
         </p:nvSpPr>
-        <p:spPr>
-          <a:xfrm>
-            <a:off x="1143000" y="450850"/>
-            <a:ext cx="4572000" cy="3429000"/>
-          </a:xfrm>
-          <a:ln/>
-        </p:spPr>
-      </p:sp>
-      <p:sp>
-        <p:nvSpPr>
-          <p:cNvPr id="41990" name="Rectangle 3"/>
-          <p:cNvSpPr>
-            <a:spLocks noGrp="1" noChangeArrowheads="1"/>
+        <p:spPr/>
+      </p:sp>
+      <p:sp>
+        <p:nvSpPr>
+          <p:cNvPr id="3" name="Notes Placeholder 2"/>
+          <p:cNvSpPr>
+            <a:spLocks noGrp="1"/>
           </p:cNvSpPr>
           <p:nvPr>
             <p:ph type="body" idx="1"/>
           </p:nvPr>
         </p:nvSpPr>
-        <p:spPr>
-          <a:xfrm>
-            <a:off x="307492" y="4130104"/>
-            <a:ext cx="6261652" cy="4554823"/>
-          </a:xfrm>
-          <a:noFill/>
-          <a:ln/>
-        </p:spPr>
-        <p:txBody>
-          <a:bodyPr/>
+        <p:spPr/>
+        <p:txBody>
+          <a:bodyPr>
+            <a:normAutofit/>
+          </a:bodyPr>
           <a:lstStyle/>
           <a:p>
             <a:pPr>
-              <a:buFontTx/>
-              <a:buNone/>
+              <a:lnSpc>
+                <a:spcPct val="80000"/>
+              </a:lnSpc>
             </a:pPr>
             <a:endParaRPr lang="en-US" dirty="0" smtClean="0"/>
+          </a:p>
+        </p:txBody>
+      </p:sp>
+      <p:sp>
+        <p:nvSpPr>
+          <p:cNvPr id="4" name="Slide Number Placeholder 3"/>
+          <p:cNvSpPr>
+            <a:spLocks noGrp="1"/>
+          </p:cNvSpPr>
+          <p:nvPr>
+            <p:ph type="sldNum" sz="quarter" idx="10"/>
+          </p:nvPr>
+        </p:nvSpPr>
+        <p:spPr/>
+        <p:txBody>
+          <a:bodyPr/>
+          <a:lstStyle/>
+          <a:p>
+            <a:fld id="{EC6EAC7D-5A89-47C2-8ABA-56C9C2DEF7A4}" type="slidenum">
+              <a:rPr lang="en-US" smtClean="0"/>
+              <a:pPr/>
+              <a:t>28</a:t>
+            </a:fld>
+            <a:endParaRPr lang="en-US"/>
+          </a:p>
+        </p:txBody>
+      </p:sp>
+    </p:spTree>
+  </p:cSld>
+  <p:clrMapOvr>
+    <a:masterClrMapping/>
+  </p:clrMapOvr>
+</p:notes>
+</file>
+
+<file path=ppt/notesSlides/notesSlide28.xml><?xml version="1.0" encoding="utf-8"?>
+<p:notes xmlns:a="http://schemas.openxmlformats.org/drawingml/2006/main" xmlns:r="http://schemas.openxmlformats.org/officeDocument/2006/relationships" xmlns:p="http://schemas.openxmlformats.org/presentationml/2006/main">
+  <p:cSld>
+    <p:spTree>
+      <p:nvGrpSpPr>
+        <p:cNvPr id="1" name=""/>
+        <p:cNvGrpSpPr/>
+        <p:nvPr/>
+      </p:nvGrpSpPr>
+      <p:grpSpPr>
+        <a:xfrm>
+          <a:off x="0" y="0"/>
+          <a:ext cx="0" cy="0"/>
+          <a:chOff x="0" y="0"/>
+          <a:chExt cx="0" cy="0"/>
+        </a:xfrm>
+      </p:grpSpPr>
+      <p:sp>
+        <p:nvSpPr>
+          <p:cNvPr id="2" name="Slide Image Placeholder 1"/>
+          <p:cNvSpPr>
+            <a:spLocks noGrp="1" noRot="1" noChangeAspect="1"/>
+          </p:cNvSpPr>
+          <p:nvPr>
+            <p:ph type="sldImg"/>
+          </p:nvPr>
+        </p:nvSpPr>
+        <p:spPr/>
+      </p:sp>
+      <p:sp>
+        <p:nvSpPr>
+          <p:cNvPr id="3" name="Notes Placeholder 2"/>
+          <p:cNvSpPr>
+            <a:spLocks noGrp="1"/>
+          </p:cNvSpPr>
+          <p:nvPr>
+            <p:ph type="body" idx="1"/>
+          </p:nvPr>
+        </p:nvSpPr>
+        <p:spPr/>
+        <p:txBody>
+          <a:bodyPr/>
+          <a:lstStyle/>
+          <a:p>
+            <a:endParaRPr lang="en-US" dirty="0"/>
+          </a:p>
+        </p:txBody>
+      </p:sp>
+      <p:sp>
+        <p:nvSpPr>
+          <p:cNvPr id="4" name="Slide Number Placeholder 3"/>
+          <p:cNvSpPr>
+            <a:spLocks noGrp="1"/>
+          </p:cNvSpPr>
+          <p:nvPr>
+            <p:ph type="sldNum" sz="quarter" idx="10"/>
+          </p:nvPr>
+        </p:nvSpPr>
+        <p:spPr/>
+        <p:txBody>
+          <a:bodyPr/>
+          <a:lstStyle/>
+          <a:p>
+            <a:fld id="{75693FD4-8F83-4EF7-AC3F-0DC0388986B0}" type="slidenum">
+              <a:rPr lang="en-US" smtClean="0"/>
+              <a:pPr/>
+              <a:t>29</a:t>
+            </a:fld>
+            <a:endParaRPr lang="en-US"/>
+          </a:p>
+        </p:txBody>
+      </p:sp>
+    </p:spTree>
+  </p:cSld>
+  <p:clrMapOvr>
+    <a:masterClrMapping/>
+  </p:clrMapOvr>
+</p:notes>
+</file>
+
+<file path=ppt/notesSlides/notesSlide29.xml><?xml version="1.0" encoding="utf-8"?>
+<p:notes xmlns:a="http://schemas.openxmlformats.org/drawingml/2006/main" xmlns:r="http://schemas.openxmlformats.org/officeDocument/2006/relationships" xmlns:p="http://schemas.openxmlformats.org/presentationml/2006/main">
+  <p:cSld>
+    <p:spTree>
+      <p:nvGrpSpPr>
+        <p:cNvPr id="1" name=""/>
+        <p:cNvGrpSpPr/>
+        <p:nvPr/>
+      </p:nvGrpSpPr>
+      <p:grpSpPr>
+        <a:xfrm>
+          <a:off x="0" y="0"/>
+          <a:ext cx="0" cy="0"/>
+          <a:chOff x="0" y="0"/>
+          <a:chExt cx="0" cy="0"/>
+        </a:xfrm>
+      </p:grpSpPr>
+      <p:sp>
+        <p:nvSpPr>
+          <p:cNvPr id="2" name="Slide Image Placeholder 1"/>
+          <p:cNvSpPr>
+            <a:spLocks noGrp="1" noRot="1" noChangeAspect="1"/>
+          </p:cNvSpPr>
+          <p:nvPr>
+            <p:ph type="sldImg"/>
+          </p:nvPr>
+        </p:nvSpPr>
+        <p:spPr/>
+      </p:sp>
+      <p:sp>
+        <p:nvSpPr>
+          <p:cNvPr id="3" name="Notes Placeholder 2"/>
+          <p:cNvSpPr>
+            <a:spLocks noGrp="1"/>
+          </p:cNvSpPr>
+          <p:nvPr>
+            <p:ph type="body" idx="1"/>
+          </p:nvPr>
+        </p:nvSpPr>
+        <p:spPr/>
+        <p:txBody>
+          <a:bodyPr/>
+          <a:lstStyle/>
+          <a:p>
+            <a:endParaRPr lang="en-US" dirty="0"/>
+          </a:p>
+        </p:txBody>
+      </p:sp>
+      <p:sp>
+        <p:nvSpPr>
+          <p:cNvPr id="4" name="Slide Number Placeholder 3"/>
+          <p:cNvSpPr>
+            <a:spLocks noGrp="1"/>
+          </p:cNvSpPr>
+          <p:nvPr>
+            <p:ph type="sldNum" sz="quarter" idx="10"/>
+          </p:nvPr>
+        </p:nvSpPr>
+        <p:spPr/>
+        <p:txBody>
+          <a:bodyPr/>
+          <a:lstStyle/>
+          <a:p>
+            <a:fld id="{75693FD4-8F83-4EF7-AC3F-0DC0388986B0}" type="slidenum">
+              <a:rPr lang="en-US" smtClean="0"/>
+              <a:pPr/>
+              <a:t>30</a:t>
+            </a:fld>
+            <a:endParaRPr lang="en-US"/>
           </a:p>
         </p:txBody>
       </p:sp>
@@ -2637,6 +2846,420 @@
 </p:notes>
 </file>
 
+<file path=ppt/notesSlides/notesSlide30.xml><?xml version="1.0" encoding="utf-8"?>
+<p:notes xmlns:a="http://schemas.openxmlformats.org/drawingml/2006/main" xmlns:r="http://schemas.openxmlformats.org/officeDocument/2006/relationships" xmlns:p="http://schemas.openxmlformats.org/presentationml/2006/main">
+  <p:cSld>
+    <p:spTree>
+      <p:nvGrpSpPr>
+        <p:cNvPr id="1" name=""/>
+        <p:cNvGrpSpPr/>
+        <p:nvPr/>
+      </p:nvGrpSpPr>
+      <p:grpSpPr>
+        <a:xfrm>
+          <a:off x="0" y="0"/>
+          <a:ext cx="0" cy="0"/>
+          <a:chOff x="0" y="0"/>
+          <a:chExt cx="0" cy="0"/>
+        </a:xfrm>
+      </p:grpSpPr>
+      <p:sp>
+        <p:nvSpPr>
+          <p:cNvPr id="2" name="Slide Image Placeholder 1"/>
+          <p:cNvSpPr>
+            <a:spLocks noGrp="1" noRot="1" noChangeAspect="1"/>
+          </p:cNvSpPr>
+          <p:nvPr>
+            <p:ph type="sldImg"/>
+          </p:nvPr>
+        </p:nvSpPr>
+        <p:spPr/>
+      </p:sp>
+      <p:sp>
+        <p:nvSpPr>
+          <p:cNvPr id="3" name="Notes Placeholder 2"/>
+          <p:cNvSpPr>
+            <a:spLocks noGrp="1"/>
+          </p:cNvSpPr>
+          <p:nvPr>
+            <p:ph type="body" idx="1"/>
+          </p:nvPr>
+        </p:nvSpPr>
+        <p:spPr/>
+        <p:txBody>
+          <a:bodyPr>
+            <a:normAutofit/>
+          </a:bodyPr>
+          <a:lstStyle/>
+          <a:p>
+            <a:pPr>
+              <a:lnSpc>
+                <a:spcPct val="80000"/>
+              </a:lnSpc>
+            </a:pPr>
+            <a:endParaRPr lang="en-US" dirty="0" smtClean="0"/>
+          </a:p>
+        </p:txBody>
+      </p:sp>
+      <p:sp>
+        <p:nvSpPr>
+          <p:cNvPr id="4" name="Slide Number Placeholder 3"/>
+          <p:cNvSpPr>
+            <a:spLocks noGrp="1"/>
+          </p:cNvSpPr>
+          <p:nvPr>
+            <p:ph type="sldNum" sz="quarter" idx="10"/>
+          </p:nvPr>
+        </p:nvSpPr>
+        <p:spPr/>
+        <p:txBody>
+          <a:bodyPr/>
+          <a:lstStyle/>
+          <a:p>
+            <a:fld id="{EC6EAC7D-5A89-47C2-8ABA-56C9C2DEF7A4}" type="slidenum">
+              <a:rPr lang="en-US" smtClean="0"/>
+              <a:pPr/>
+              <a:t>31</a:t>
+            </a:fld>
+            <a:endParaRPr lang="en-US"/>
+          </a:p>
+        </p:txBody>
+      </p:sp>
+    </p:spTree>
+  </p:cSld>
+  <p:clrMapOvr>
+    <a:masterClrMapping/>
+  </p:clrMapOvr>
+</p:notes>
+</file>
+
+<file path=ppt/notesSlides/notesSlide31.xml><?xml version="1.0" encoding="utf-8"?>
+<p:notes xmlns:a="http://schemas.openxmlformats.org/drawingml/2006/main" xmlns:r="http://schemas.openxmlformats.org/officeDocument/2006/relationships" xmlns:p="http://schemas.openxmlformats.org/presentationml/2006/main">
+  <p:cSld>
+    <p:spTree>
+      <p:nvGrpSpPr>
+        <p:cNvPr id="1" name=""/>
+        <p:cNvGrpSpPr/>
+        <p:nvPr/>
+      </p:nvGrpSpPr>
+      <p:grpSpPr>
+        <a:xfrm>
+          <a:off x="0" y="0"/>
+          <a:ext cx="0" cy="0"/>
+          <a:chOff x="0" y="0"/>
+          <a:chExt cx="0" cy="0"/>
+        </a:xfrm>
+      </p:grpSpPr>
+      <p:sp>
+        <p:nvSpPr>
+          <p:cNvPr id="2" name="Slide Image Placeholder 1"/>
+          <p:cNvSpPr>
+            <a:spLocks noGrp="1" noRot="1" noChangeAspect="1"/>
+          </p:cNvSpPr>
+          <p:nvPr>
+            <p:ph type="sldImg"/>
+          </p:nvPr>
+        </p:nvSpPr>
+        <p:spPr/>
+      </p:sp>
+      <p:sp>
+        <p:nvSpPr>
+          <p:cNvPr id="3" name="Notes Placeholder 2"/>
+          <p:cNvSpPr>
+            <a:spLocks noGrp="1"/>
+          </p:cNvSpPr>
+          <p:nvPr>
+            <p:ph type="body" idx="1"/>
+          </p:nvPr>
+        </p:nvSpPr>
+        <p:spPr/>
+        <p:txBody>
+          <a:bodyPr>
+            <a:normAutofit/>
+          </a:bodyPr>
+          <a:lstStyle/>
+          <a:p>
+            <a:pPr>
+              <a:lnSpc>
+                <a:spcPct val="80000"/>
+              </a:lnSpc>
+            </a:pPr>
+            <a:endParaRPr lang="en-US" dirty="0" smtClean="0"/>
+          </a:p>
+        </p:txBody>
+      </p:sp>
+      <p:sp>
+        <p:nvSpPr>
+          <p:cNvPr id="4" name="Slide Number Placeholder 3"/>
+          <p:cNvSpPr>
+            <a:spLocks noGrp="1"/>
+          </p:cNvSpPr>
+          <p:nvPr>
+            <p:ph type="sldNum" sz="quarter" idx="10"/>
+          </p:nvPr>
+        </p:nvSpPr>
+        <p:spPr/>
+        <p:txBody>
+          <a:bodyPr/>
+          <a:lstStyle/>
+          <a:p>
+            <a:fld id="{EC6EAC7D-5A89-47C2-8ABA-56C9C2DEF7A4}" type="slidenum">
+              <a:rPr lang="en-US" smtClean="0"/>
+              <a:pPr/>
+              <a:t>32</a:t>
+            </a:fld>
+            <a:endParaRPr lang="en-US"/>
+          </a:p>
+        </p:txBody>
+      </p:sp>
+    </p:spTree>
+  </p:cSld>
+  <p:clrMapOvr>
+    <a:masterClrMapping/>
+  </p:clrMapOvr>
+</p:notes>
+</file>
+
+<file path=ppt/notesSlides/notesSlide32.xml><?xml version="1.0" encoding="utf-8"?>
+<p:notes xmlns:a="http://schemas.openxmlformats.org/drawingml/2006/main" xmlns:r="http://schemas.openxmlformats.org/officeDocument/2006/relationships" xmlns:p="http://schemas.openxmlformats.org/presentationml/2006/main">
+  <p:cSld>
+    <p:spTree>
+      <p:nvGrpSpPr>
+        <p:cNvPr id="1" name=""/>
+        <p:cNvGrpSpPr/>
+        <p:nvPr/>
+      </p:nvGrpSpPr>
+      <p:grpSpPr>
+        <a:xfrm>
+          <a:off x="0" y="0"/>
+          <a:ext cx="0" cy="0"/>
+          <a:chOff x="0" y="0"/>
+          <a:chExt cx="0" cy="0"/>
+        </a:xfrm>
+      </p:grpSpPr>
+      <p:sp>
+        <p:nvSpPr>
+          <p:cNvPr id="2" name="Slide Image Placeholder 1"/>
+          <p:cNvSpPr>
+            <a:spLocks noGrp="1" noRot="1" noChangeAspect="1"/>
+          </p:cNvSpPr>
+          <p:nvPr>
+            <p:ph type="sldImg"/>
+          </p:nvPr>
+        </p:nvSpPr>
+        <p:spPr/>
+      </p:sp>
+      <p:sp>
+        <p:nvSpPr>
+          <p:cNvPr id="3" name="Notes Placeholder 2"/>
+          <p:cNvSpPr>
+            <a:spLocks noGrp="1"/>
+          </p:cNvSpPr>
+          <p:nvPr>
+            <p:ph type="body" idx="1"/>
+          </p:nvPr>
+        </p:nvSpPr>
+        <p:spPr/>
+        <p:txBody>
+          <a:bodyPr/>
+          <a:lstStyle/>
+          <a:p>
+            <a:endParaRPr lang="en-US"/>
+          </a:p>
+        </p:txBody>
+      </p:sp>
+      <p:sp>
+        <p:nvSpPr>
+          <p:cNvPr id="4" name="Slide Number Placeholder 3"/>
+          <p:cNvSpPr>
+            <a:spLocks noGrp="1"/>
+          </p:cNvSpPr>
+          <p:nvPr>
+            <p:ph type="sldNum" sz="quarter" idx="10"/>
+          </p:nvPr>
+        </p:nvSpPr>
+        <p:spPr/>
+        <p:txBody>
+          <a:bodyPr/>
+          <a:lstStyle/>
+          <a:p>
+            <a:fld id="{75693FD4-8F83-4EF7-AC3F-0DC0388986B0}" type="slidenum">
+              <a:rPr lang="en-US" smtClean="0">
+                <a:solidFill>
+                  <a:prstClr val="black"/>
+                </a:solidFill>
+              </a:rPr>
+              <a:pPr/>
+              <a:t>33</a:t>
+            </a:fld>
+            <a:endParaRPr lang="en-US">
+              <a:solidFill>
+                <a:prstClr val="black"/>
+              </a:solidFill>
+            </a:endParaRPr>
+          </a:p>
+        </p:txBody>
+      </p:sp>
+    </p:spTree>
+  </p:cSld>
+  <p:clrMapOvr>
+    <a:masterClrMapping/>
+  </p:clrMapOvr>
+</p:notes>
+</file>
+
+<file path=ppt/notesSlides/notesSlide33.xml><?xml version="1.0" encoding="utf-8"?>
+<p:notes xmlns:a="http://schemas.openxmlformats.org/drawingml/2006/main" xmlns:r="http://schemas.openxmlformats.org/officeDocument/2006/relationships" xmlns:p="http://schemas.openxmlformats.org/presentationml/2006/main">
+  <p:cSld>
+    <p:spTree>
+      <p:nvGrpSpPr>
+        <p:cNvPr id="1" name=""/>
+        <p:cNvGrpSpPr/>
+        <p:nvPr/>
+      </p:nvGrpSpPr>
+      <p:grpSpPr>
+        <a:xfrm>
+          <a:off x="0" y="0"/>
+          <a:ext cx="0" cy="0"/>
+          <a:chOff x="0" y="0"/>
+          <a:chExt cx="0" cy="0"/>
+        </a:xfrm>
+      </p:grpSpPr>
+      <p:sp>
+        <p:nvSpPr>
+          <p:cNvPr id="41986" name="Rectangle 23"/>
+          <p:cNvSpPr>
+            <a:spLocks noGrp="1" noChangeArrowheads="1"/>
+          </p:cNvSpPr>
+          <p:nvPr>
+            <p:ph type="hdr" sz="quarter"/>
+          </p:nvPr>
+        </p:nvSpPr>
+        <p:spPr>
+          <a:noFill/>
+        </p:spPr>
+        <p:txBody>
+          <a:bodyPr/>
+          <a:lstStyle/>
+          <a:p>
+            <a:r>
+              <a:rPr lang="en-US" dirty="0" smtClean="0"/>
+              <a:t>Microsoft </a:t>
+            </a:r>
+            <a:r>
+              <a:rPr lang="en-US" b="1" dirty="0" smtClean="0"/>
+              <a:t>Engineering Excellence</a:t>
+            </a:r>
+            <a:endParaRPr lang="en-US" dirty="0" smtClean="0"/>
+          </a:p>
+        </p:txBody>
+      </p:sp>
+      <p:sp>
+        <p:nvSpPr>
+          <p:cNvPr id="41987" name="Rectangle 25"/>
+          <p:cNvSpPr>
+            <a:spLocks noGrp="1" noChangeArrowheads="1"/>
+          </p:cNvSpPr>
+          <p:nvPr>
+            <p:ph type="ftr" sz="quarter" idx="4"/>
+          </p:nvPr>
+        </p:nvSpPr>
+        <p:spPr>
+          <a:noFill/>
+        </p:spPr>
+        <p:txBody>
+          <a:bodyPr/>
+          <a:lstStyle/>
+          <a:p>
+            <a:r>
+              <a:rPr lang="en-US" dirty="0" smtClean="0"/>
+              <a:t>Microsoft Confidential</a:t>
+            </a:r>
+          </a:p>
+        </p:txBody>
+      </p:sp>
+      <p:sp>
+        <p:nvSpPr>
+          <p:cNvPr id="41988" name="Rectangle 26"/>
+          <p:cNvSpPr>
+            <a:spLocks noGrp="1" noChangeArrowheads="1"/>
+          </p:cNvSpPr>
+          <p:nvPr>
+            <p:ph type="sldNum" sz="quarter" idx="5"/>
+          </p:nvPr>
+        </p:nvSpPr>
+        <p:spPr>
+          <a:noFill/>
+        </p:spPr>
+        <p:txBody>
+          <a:bodyPr/>
+          <a:lstStyle/>
+          <a:p>
+            <a:fld id="{B2B44A5F-6CE4-493C-A0D7-6834FF76660C}" type="slidenum">
+              <a:rPr lang="en-US" smtClean="0"/>
+              <a:pPr/>
+              <a:t>34</a:t>
+            </a:fld>
+            <a:endParaRPr lang="en-US" dirty="0" smtClean="0"/>
+          </a:p>
+        </p:txBody>
+      </p:sp>
+      <p:sp>
+        <p:nvSpPr>
+          <p:cNvPr id="41989" name="Rectangle 2"/>
+          <p:cNvSpPr>
+            <a:spLocks noGrp="1" noRot="1" noChangeAspect="1" noChangeArrowheads="1" noTextEdit="1"/>
+          </p:cNvSpPr>
+          <p:nvPr>
+            <p:ph type="sldImg"/>
+          </p:nvPr>
+        </p:nvSpPr>
+        <p:spPr>
+          <a:xfrm>
+            <a:off x="1143000" y="450850"/>
+            <a:ext cx="4572000" cy="3429000"/>
+          </a:xfrm>
+          <a:ln/>
+        </p:spPr>
+      </p:sp>
+      <p:sp>
+        <p:nvSpPr>
+          <p:cNvPr id="41990" name="Rectangle 3"/>
+          <p:cNvSpPr>
+            <a:spLocks noGrp="1" noChangeArrowheads="1"/>
+          </p:cNvSpPr>
+          <p:nvPr>
+            <p:ph type="body" idx="1"/>
+          </p:nvPr>
+        </p:nvSpPr>
+        <p:spPr>
+          <a:xfrm>
+            <a:off x="307492" y="4130104"/>
+            <a:ext cx="6261652" cy="4554823"/>
+          </a:xfrm>
+          <a:noFill/>
+          <a:ln/>
+        </p:spPr>
+        <p:txBody>
+          <a:bodyPr/>
+          <a:lstStyle/>
+          <a:p>
+            <a:pPr>
+              <a:buFontTx/>
+              <a:buNone/>
+            </a:pPr>
+            <a:endParaRPr lang="en-US" dirty="0" smtClean="0"/>
+          </a:p>
+        </p:txBody>
+      </p:sp>
+    </p:spTree>
+  </p:cSld>
+  <p:clrMapOvr>
+    <a:masterClrMapping/>
+  </p:clrMapOvr>
+</p:notes>
+</file>
+
 <file path=ppt/notesSlides/notesSlide4.xml><?xml version="1.0" encoding="utf-8"?>
 <p:notes xmlns:a="http://schemas.openxmlformats.org/drawingml/2006/main" xmlns:r="http://schemas.openxmlformats.org/officeDocument/2006/relationships" xmlns:p="http://schemas.openxmlformats.org/presentationml/2006/main">
   <p:cSld>
@@ -2765,29 +3388,36 @@
         </p:nvSpPr>
         <p:spPr/>
         <p:txBody>
+          <a:bodyPr>
+            <a:normAutofit/>
+          </a:bodyPr>
+          <a:lstStyle/>
+          <a:p>
+            <a:pPr>
+              <a:lnSpc>
+                <a:spcPct val="80000"/>
+              </a:lnSpc>
+            </a:pPr>
+            <a:endParaRPr lang="en-US" dirty="0" smtClean="0"/>
+          </a:p>
+        </p:txBody>
+      </p:sp>
+      <p:sp>
+        <p:nvSpPr>
+          <p:cNvPr id="4" name="Slide Number Placeholder 3"/>
+          <p:cNvSpPr>
+            <a:spLocks noGrp="1"/>
+          </p:cNvSpPr>
+          <p:nvPr>
+            <p:ph type="sldNum" sz="quarter" idx="10"/>
+          </p:nvPr>
+        </p:nvSpPr>
+        <p:spPr/>
+        <p:txBody>
           <a:bodyPr/>
           <a:lstStyle/>
           <a:p>
-            <a:endParaRPr lang="en-US" dirty="0"/>
-          </a:p>
-        </p:txBody>
-      </p:sp>
-      <p:sp>
-        <p:nvSpPr>
-          <p:cNvPr id="4" name="Slide Number Placeholder 3"/>
-          <p:cNvSpPr>
-            <a:spLocks noGrp="1"/>
-          </p:cNvSpPr>
-          <p:nvPr>
-            <p:ph type="sldNum" sz="quarter" idx="10"/>
-          </p:nvPr>
-        </p:nvSpPr>
-        <p:spPr/>
-        <p:txBody>
-          <a:bodyPr/>
-          <a:lstStyle/>
-          <a:p>
-            <a:fld id="{75693FD4-8F83-4EF7-AC3F-0DC0388986B0}" type="slidenum">
+            <a:fld id="{EC6EAC7D-5A89-47C2-8ABA-56C9C2DEF7A4}" type="slidenum">
               <a:rPr lang="en-US" smtClean="0"/>
               <a:pPr/>
               <a:t>5</a:t>
@@ -3019,17 +3649,10 @@
         </p:nvSpPr>
         <p:spPr/>
         <p:txBody>
-          <a:bodyPr>
-            <a:normAutofit/>
-          </a:bodyPr>
-          <a:lstStyle/>
-          <a:p>
-            <a:pPr>
-              <a:lnSpc>
-                <a:spcPct val="80000"/>
-              </a:lnSpc>
-            </a:pPr>
-            <a:endParaRPr lang="en-US" dirty="0" smtClean="0"/>
+          <a:bodyPr/>
+          <a:lstStyle/>
+          <a:p>
+            <a:endParaRPr lang="en-US" dirty="0"/>
           </a:p>
         </p:txBody>
       </p:sp>
@@ -3048,7 +3671,7 @@
           <a:bodyPr/>
           <a:lstStyle/>
           <a:p>
-            <a:fld id="{EC6EAC7D-5A89-47C2-8ABA-56C9C2DEF7A4}" type="slidenum">
+            <a:fld id="{75693FD4-8F83-4EF7-AC3F-0DC0388986B0}" type="slidenum">
               <a:rPr lang="en-US" smtClean="0"/>
               <a:pPr/>
               <a:t>8</a:t>
@@ -3620,7 +4243,7 @@
             <a:fld id="{757B281C-5159-4971-8228-52B9A72E9ED2}" type="datetimeFigureOut">
               <a:rPr lang="en-US" smtClean="0"/>
               <a:pPr/>
-              <a:t>11/17/2013</a:t>
+              <a:t>11/18/2013</a:t>
             </a:fld>
             <a:endParaRPr lang="en-US" dirty="0"/>
           </a:p>
@@ -3722,7 +4345,7 @@
             <a:fld id="{757B281C-5159-4971-8228-52B9A72E9ED2}" type="datetimeFigureOut">
               <a:rPr lang="en-US" smtClean="0"/>
               <a:pPr/>
-              <a:t>11/17/2013</a:t>
+              <a:t>11/18/2013</a:t>
             </a:fld>
             <a:endParaRPr lang="en-US" dirty="0"/>
           </a:p>
@@ -3858,7 +4481,7 @@
             <a:fld id="{757B281C-5159-4971-8228-52B9A72E9ED2}" type="datetimeFigureOut">
               <a:rPr lang="en-US" smtClean="0"/>
               <a:pPr/>
-              <a:t>11/17/2013</a:t>
+              <a:t>11/18/2013</a:t>
             </a:fld>
             <a:endParaRPr lang="en-US" dirty="0"/>
           </a:p>
@@ -4064,7 +4687,7 @@
             <a:fld id="{757B281C-5159-4971-8228-52B9A72E9ED2}" type="datetimeFigureOut">
               <a:rPr lang="en-US" smtClean="0"/>
               <a:pPr/>
-              <a:t>11/17/2013</a:t>
+              <a:t>11/18/2013</a:t>
             </a:fld>
             <a:endParaRPr lang="en-US" dirty="0"/>
           </a:p>
@@ -4463,7 +5086,7 @@
             <a:fld id="{757B281C-5159-4971-8228-52B9A72E9ED2}" type="datetimeFigureOut">
               <a:rPr lang="en-US" smtClean="0"/>
               <a:pPr/>
-              <a:t>11/17/2013</a:t>
+              <a:t>11/18/2013</a:t>
             </a:fld>
             <a:endParaRPr lang="en-US" dirty="0"/>
           </a:p>
@@ -4763,7 +5386,7 @@
             <a:fld id="{757B281C-5159-4971-8228-52B9A72E9ED2}" type="datetimeFigureOut">
               <a:rPr lang="en-US" smtClean="0"/>
               <a:pPr/>
-              <a:t>11/17/2013</a:t>
+              <a:t>11/18/2013</a:t>
             </a:fld>
             <a:endParaRPr lang="en-US" dirty="0"/>
           </a:p>
@@ -5192,7 +5815,7 @@
             <a:fld id="{757B281C-5159-4971-8228-52B9A72E9ED2}" type="datetimeFigureOut">
               <a:rPr lang="en-US" smtClean="0"/>
               <a:pPr/>
-              <a:t>11/17/2013</a:t>
+              <a:t>11/18/2013</a:t>
             </a:fld>
             <a:endParaRPr lang="en-US" dirty="0"/>
           </a:p>
@@ -5469,7 +6092,7 @@
             <a:fld id="{757B281C-5159-4971-8228-52B9A72E9ED2}" type="datetimeFigureOut">
               <a:rPr lang="en-US" smtClean="0"/>
               <a:pPr/>
-              <a:t>11/17/2013</a:t>
+              <a:t>11/18/2013</a:t>
             </a:fld>
             <a:endParaRPr lang="en-US" dirty="0"/>
           </a:p>
@@ -5733,7 +6356,7 @@
             <a:fld id="{757B281C-5159-4971-8228-52B9A72E9ED2}" type="datetimeFigureOut">
               <a:rPr lang="en-US" smtClean="0"/>
               <a:pPr/>
-              <a:t>11/17/2013</a:t>
+              <a:t>11/18/2013</a:t>
             </a:fld>
             <a:endParaRPr lang="en-US" dirty="0"/>
           </a:p>
@@ -5903,7 +6526,7 @@
             <a:fld id="{757B281C-5159-4971-8228-52B9A72E9ED2}" type="datetimeFigureOut">
               <a:rPr lang="en-US" smtClean="0"/>
               <a:pPr/>
-              <a:t>11/17/2013</a:t>
+              <a:t>11/18/2013</a:t>
             </a:fld>
             <a:endParaRPr lang="en-US" dirty="0"/>
           </a:p>
@@ -6083,7 +6706,7 @@
             <a:fld id="{757B281C-5159-4971-8228-52B9A72E9ED2}" type="datetimeFigureOut">
               <a:rPr lang="en-US" smtClean="0"/>
               <a:pPr/>
-              <a:t>11/17/2013</a:t>
+              <a:t>11/18/2013</a:t>
             </a:fld>
             <a:endParaRPr lang="en-US" dirty="0"/>
           </a:p>
@@ -6325,7 +6948,7 @@
             <a:fld id="{757B281C-5159-4971-8228-52B9A72E9ED2}" type="datetimeFigureOut">
               <a:rPr lang="en-US" smtClean="0"/>
               <a:pPr/>
-              <a:t>11/17/2013</a:t>
+              <a:t>11/18/2013</a:t>
             </a:fld>
             <a:endParaRPr lang="en-US" dirty="0"/>
           </a:p>
@@ -6764,15 +7387,7 @@
             </a:r>
             <a:r>
               <a:rPr lang="en-US" dirty="0" smtClean="0"/>
-              <a:t> </a:t>
-            </a:r>
-            <a:r>
-              <a:rPr lang="en-US" dirty="0" smtClean="0"/>
-              <a:t>&amp; </a:t>
-            </a:r>
-            <a:r>
-              <a:rPr lang="en-US" dirty="0" smtClean="0"/>
-              <a:t/>
+              <a:t> &amp; </a:t>
             </a:r>
             <a:br>
               <a:rPr lang="en-US" dirty="0" smtClean="0"/>
@@ -6863,6 +7478,993 @@
 </file>
 
 <file path=ppt/slides/slide10.xml><?xml version="1.0" encoding="utf-8"?>
+<p:sld xmlns:a="http://schemas.openxmlformats.org/drawingml/2006/main" xmlns:r="http://schemas.openxmlformats.org/officeDocument/2006/relationships" xmlns:p="http://schemas.openxmlformats.org/presentationml/2006/main">
+  <p:cSld>
+    <p:spTree>
+      <p:nvGrpSpPr>
+        <p:cNvPr id="1" name=""/>
+        <p:cNvGrpSpPr/>
+        <p:nvPr/>
+      </p:nvGrpSpPr>
+      <p:grpSpPr>
+        <a:xfrm>
+          <a:off x="0" y="0"/>
+          <a:ext cx="0" cy="0"/>
+          <a:chOff x="0" y="0"/>
+          <a:chExt cx="0" cy="0"/>
+        </a:xfrm>
+      </p:grpSpPr>
+      <p:sp>
+        <p:nvSpPr>
+          <p:cNvPr id="2" name="Title 1"/>
+          <p:cNvSpPr>
+            <a:spLocks noGrp="1"/>
+          </p:cNvSpPr>
+          <p:nvPr>
+            <p:ph type="title"/>
+            <p:custDataLst>
+              <p:tags r:id="rId2"/>
+            </p:custDataLst>
+          </p:nvPr>
+        </p:nvSpPr>
+        <p:spPr/>
+        <p:txBody>
+          <a:bodyPr>
+            <a:normAutofit/>
+          </a:bodyPr>
+          <a:lstStyle/>
+          <a:p>
+            <a:r>
+              <a:rPr lang="en-US" dirty="0" smtClean="0"/>
+              <a:t>ARIA – 3 corner stones</a:t>
+            </a:r>
+            <a:endParaRPr lang="en-US" dirty="0"/>
+          </a:p>
+        </p:txBody>
+      </p:sp>
+      <p:sp>
+        <p:nvSpPr>
+          <p:cNvPr id="5" name="Content Placeholder 4"/>
+          <p:cNvSpPr>
+            <a:spLocks noGrp="1"/>
+          </p:cNvSpPr>
+          <p:nvPr>
+            <p:ph idx="1"/>
+            <p:custDataLst>
+              <p:tags r:id="rId3"/>
+            </p:custDataLst>
+          </p:nvPr>
+        </p:nvSpPr>
+        <p:spPr/>
+        <p:txBody>
+          <a:bodyPr>
+            <a:normAutofit/>
+          </a:bodyPr>
+          <a:lstStyle/>
+          <a:p>
+            <a:r>
+              <a:rPr lang="en-US" dirty="0" smtClean="0"/>
+              <a:t>ARIA Role </a:t>
+            </a:r>
+            <a:r>
+              <a:rPr lang="en-US" dirty="0"/>
+              <a:t>– Indicate type of </a:t>
+            </a:r>
+            <a:r>
+              <a:rPr lang="en-US" dirty="0" smtClean="0"/>
+              <a:t>element</a:t>
+            </a:r>
+          </a:p>
+          <a:p>
+            <a:r>
+              <a:rPr lang="en-US" dirty="0" smtClean="0"/>
+              <a:t>ARIA State – Dynamic attribute that represent data associated with control. Can change as result of user interaction</a:t>
+            </a:r>
+          </a:p>
+          <a:p>
+            <a:r>
+              <a:rPr lang="en-US" dirty="0" smtClean="0"/>
+              <a:t>ARIA Properties – Static attributes of control</a:t>
+            </a:r>
+          </a:p>
+          <a:p>
+            <a:pPr marL="0" indent="0" algn="ctr">
+              <a:buNone/>
+            </a:pPr>
+            <a:r>
+              <a:rPr lang="en-US" dirty="0" smtClean="0"/>
+              <a:t>aria-xxx</a:t>
+            </a:r>
+          </a:p>
+          <a:p>
+            <a:endParaRPr lang="en-US" dirty="0"/>
+          </a:p>
+        </p:txBody>
+      </p:sp>
+    </p:spTree>
+    <p:custDataLst>
+      <p:tags r:id="rId1"/>
+    </p:custDataLst>
+    <p:extLst>
+      <p:ext uri="{BB962C8B-B14F-4D97-AF65-F5344CB8AC3E}">
+        <p14:creationId xmlns:p14="http://schemas.microsoft.com/office/powerpoint/2010/main" val="1215114749"/>
+      </p:ext>
+    </p:extLst>
+  </p:cSld>
+  <p:clrMapOvr>
+    <a:masterClrMapping/>
+  </p:clrMapOvr>
+  <p:transition spd="slow">
+    <p:wipe dir="d"/>
+  </p:transition>
+  <p:timing>
+    <p:tnLst>
+      <p:par>
+        <p:cTn id="1" dur="indefinite" restart="never" nodeType="tmRoot"/>
+      </p:par>
+    </p:tnLst>
+  </p:timing>
+</p:sld>
+</file>
+
+<file path=ppt/slides/slide11.xml><?xml version="1.0" encoding="utf-8"?>
+<p:sld xmlns:a="http://schemas.openxmlformats.org/drawingml/2006/main" xmlns:r="http://schemas.openxmlformats.org/officeDocument/2006/relationships" xmlns:p="http://schemas.openxmlformats.org/presentationml/2006/main">
+  <p:cSld>
+    <p:spTree>
+      <p:nvGrpSpPr>
+        <p:cNvPr id="1" name=""/>
+        <p:cNvGrpSpPr/>
+        <p:nvPr/>
+      </p:nvGrpSpPr>
+      <p:grpSpPr>
+        <a:xfrm>
+          <a:off x="0" y="0"/>
+          <a:ext cx="0" cy="0"/>
+          <a:chOff x="0" y="0"/>
+          <a:chExt cx="0" cy="0"/>
+        </a:xfrm>
+      </p:grpSpPr>
+      <p:sp>
+        <p:nvSpPr>
+          <p:cNvPr id="2" name="Title 1"/>
+          <p:cNvSpPr>
+            <a:spLocks noGrp="1"/>
+          </p:cNvSpPr>
+          <p:nvPr>
+            <p:ph type="title"/>
+            <p:custDataLst>
+              <p:tags r:id="rId2"/>
+            </p:custDataLst>
+          </p:nvPr>
+        </p:nvSpPr>
+        <p:spPr/>
+        <p:txBody>
+          <a:bodyPr>
+            <a:normAutofit/>
+          </a:bodyPr>
+          <a:lstStyle/>
+          <a:p>
+            <a:r>
+              <a:rPr lang="en-US" dirty="0" smtClean="0"/>
+              <a:t>ARIA Roles</a:t>
+            </a:r>
+            <a:endParaRPr lang="en-US" dirty="0"/>
+          </a:p>
+        </p:txBody>
+      </p:sp>
+      <p:sp>
+        <p:nvSpPr>
+          <p:cNvPr id="5" name="Content Placeholder 4"/>
+          <p:cNvSpPr>
+            <a:spLocks noGrp="1"/>
+          </p:cNvSpPr>
+          <p:nvPr>
+            <p:ph idx="1"/>
+            <p:custDataLst>
+              <p:tags r:id="rId3"/>
+            </p:custDataLst>
+          </p:nvPr>
+        </p:nvSpPr>
+        <p:spPr/>
+        <p:txBody>
+          <a:bodyPr>
+            <a:normAutofit/>
+          </a:bodyPr>
+          <a:lstStyle/>
+          <a:p>
+            <a:r>
+              <a:rPr lang="en-US" dirty="0" smtClean="0"/>
+              <a:t>Landmark Roles </a:t>
+            </a:r>
+            <a:r>
+              <a:rPr lang="en-US" dirty="0"/>
+              <a:t>– </a:t>
+            </a:r>
+            <a:r>
+              <a:rPr lang="en-US" dirty="0" smtClean="0"/>
+              <a:t>Navigational Landmarks</a:t>
+            </a:r>
+          </a:p>
+          <a:p>
+            <a:pPr lvl="1"/>
+            <a:r>
+              <a:rPr lang="en-US" dirty="0" smtClean="0"/>
+              <a:t>application, banner, form, navigation, search</a:t>
+            </a:r>
+          </a:p>
+          <a:p>
+            <a:r>
+              <a:rPr lang="en-US" dirty="0" smtClean="0"/>
+              <a:t>Structural Roles – Define document structure</a:t>
+            </a:r>
+          </a:p>
+          <a:p>
+            <a:pPr lvl="1"/>
+            <a:r>
+              <a:rPr lang="en-US" dirty="0" smtClean="0"/>
+              <a:t>article, heading, list, </a:t>
+            </a:r>
+            <a:r>
+              <a:rPr lang="en-US" dirty="0" err="1" smtClean="0"/>
+              <a:t>img</a:t>
+            </a:r>
+            <a:r>
+              <a:rPr lang="en-US" dirty="0" smtClean="0"/>
+              <a:t>, toolbar, row</a:t>
+            </a:r>
+          </a:p>
+          <a:p>
+            <a:r>
+              <a:rPr lang="en-US" dirty="0" smtClean="0"/>
+              <a:t>Widget Roles – </a:t>
+            </a:r>
+          </a:p>
+          <a:p>
+            <a:pPr lvl="1"/>
+            <a:r>
+              <a:rPr lang="en-US" dirty="0" smtClean="0"/>
+              <a:t>Standalone Widgets – button, dialog, marquee</a:t>
+            </a:r>
+          </a:p>
+          <a:p>
+            <a:pPr lvl="1"/>
+            <a:r>
+              <a:rPr lang="en-US" dirty="0" smtClean="0"/>
+              <a:t>Composite Widgets – combo box, menu, tree, grid</a:t>
+            </a:r>
+          </a:p>
+          <a:p>
+            <a:pPr lvl="1"/>
+            <a:endParaRPr lang="en-US" dirty="0" smtClean="0"/>
+          </a:p>
+          <a:p>
+            <a:endParaRPr lang="en-US" dirty="0"/>
+          </a:p>
+        </p:txBody>
+      </p:sp>
+    </p:spTree>
+    <p:custDataLst>
+      <p:tags r:id="rId1"/>
+    </p:custDataLst>
+    <p:extLst>
+      <p:ext uri="{BB962C8B-B14F-4D97-AF65-F5344CB8AC3E}">
+        <p14:creationId xmlns:p14="http://schemas.microsoft.com/office/powerpoint/2010/main" val="1616912081"/>
+      </p:ext>
+    </p:extLst>
+  </p:cSld>
+  <p:clrMapOvr>
+    <a:masterClrMapping/>
+  </p:clrMapOvr>
+  <p:transition spd="slow">
+    <p:wipe dir="d"/>
+  </p:transition>
+  <p:timing>
+    <p:tnLst>
+      <p:par>
+        <p:cTn id="1" dur="indefinite" restart="never" nodeType="tmRoot"/>
+      </p:par>
+    </p:tnLst>
+  </p:timing>
+</p:sld>
+</file>
+
+<file path=ppt/slides/slide12.xml><?xml version="1.0" encoding="utf-8"?>
+<p:sld xmlns:a="http://schemas.openxmlformats.org/drawingml/2006/main" xmlns:r="http://schemas.openxmlformats.org/officeDocument/2006/relationships" xmlns:p="http://schemas.openxmlformats.org/presentationml/2006/main">
+  <p:cSld>
+    <p:spTree>
+      <p:nvGrpSpPr>
+        <p:cNvPr id="1" name=""/>
+        <p:cNvGrpSpPr/>
+        <p:nvPr/>
+      </p:nvGrpSpPr>
+      <p:grpSpPr>
+        <a:xfrm>
+          <a:off x="0" y="0"/>
+          <a:ext cx="0" cy="0"/>
+          <a:chOff x="0" y="0"/>
+          <a:chExt cx="0" cy="0"/>
+        </a:xfrm>
+      </p:grpSpPr>
+      <p:sp>
+        <p:nvSpPr>
+          <p:cNvPr id="2" name="Title 1"/>
+          <p:cNvSpPr>
+            <a:spLocks noGrp="1"/>
+          </p:cNvSpPr>
+          <p:nvPr>
+            <p:ph type="title"/>
+            <p:custDataLst>
+              <p:tags r:id="rId2"/>
+            </p:custDataLst>
+          </p:nvPr>
+        </p:nvSpPr>
+        <p:spPr/>
+        <p:txBody>
+          <a:bodyPr>
+            <a:normAutofit/>
+          </a:bodyPr>
+          <a:lstStyle/>
+          <a:p>
+            <a:r>
+              <a:rPr lang="en-US" dirty="0" smtClean="0"/>
+              <a:t>ARIA States</a:t>
+            </a:r>
+            <a:endParaRPr lang="en-US" dirty="0"/>
+          </a:p>
+        </p:txBody>
+      </p:sp>
+      <p:sp>
+        <p:nvSpPr>
+          <p:cNvPr id="5" name="Content Placeholder 4"/>
+          <p:cNvSpPr>
+            <a:spLocks noGrp="1"/>
+          </p:cNvSpPr>
+          <p:nvPr>
+            <p:ph idx="1"/>
+            <p:custDataLst>
+              <p:tags r:id="rId3"/>
+            </p:custDataLst>
+          </p:nvPr>
+        </p:nvSpPr>
+        <p:spPr/>
+        <p:txBody>
+          <a:bodyPr>
+            <a:normAutofit/>
+          </a:bodyPr>
+          <a:lstStyle/>
+          <a:p>
+            <a:r>
+              <a:rPr lang="en-US" dirty="0" smtClean="0"/>
+              <a:t>Global </a:t>
+            </a:r>
+            <a:r>
+              <a:rPr lang="en-US" dirty="0"/>
+              <a:t>– </a:t>
+            </a:r>
+            <a:r>
+              <a:rPr lang="en-US" dirty="0" smtClean="0"/>
+              <a:t>Can be applied irrespective to role</a:t>
+            </a:r>
+          </a:p>
+          <a:p>
+            <a:pPr lvl="1"/>
+            <a:r>
+              <a:rPr lang="en-US" dirty="0" smtClean="0"/>
+              <a:t>aria-busy, aria-disables, aria-hidden, aria-invalid</a:t>
+            </a:r>
+          </a:p>
+          <a:p>
+            <a:r>
+              <a:rPr lang="en-US" dirty="0" smtClean="0"/>
+              <a:t>Widget Specific – </a:t>
+            </a:r>
+          </a:p>
+          <a:p>
+            <a:pPr lvl="1"/>
+            <a:r>
+              <a:rPr lang="en-US" dirty="0" smtClean="0"/>
+              <a:t>aria-checked, aria-selected etc.</a:t>
+            </a:r>
+            <a:endParaRPr lang="en-US" dirty="0"/>
+          </a:p>
+        </p:txBody>
+      </p:sp>
+    </p:spTree>
+    <p:custDataLst>
+      <p:tags r:id="rId1"/>
+    </p:custDataLst>
+    <p:extLst>
+      <p:ext uri="{BB962C8B-B14F-4D97-AF65-F5344CB8AC3E}">
+        <p14:creationId xmlns:p14="http://schemas.microsoft.com/office/powerpoint/2010/main" val="2852440078"/>
+      </p:ext>
+    </p:extLst>
+  </p:cSld>
+  <p:clrMapOvr>
+    <a:masterClrMapping/>
+  </p:clrMapOvr>
+  <p:transition spd="slow">
+    <p:wipe dir="d"/>
+  </p:transition>
+  <p:timing>
+    <p:tnLst>
+      <p:par>
+        <p:cTn id="1" dur="indefinite" restart="never" nodeType="tmRoot"/>
+      </p:par>
+    </p:tnLst>
+  </p:timing>
+</p:sld>
+</file>
+
+<file path=ppt/slides/slide13.xml><?xml version="1.0" encoding="utf-8"?>
+<p:sld xmlns:a="http://schemas.openxmlformats.org/drawingml/2006/main" xmlns:r="http://schemas.openxmlformats.org/officeDocument/2006/relationships" xmlns:p="http://schemas.openxmlformats.org/presentationml/2006/main">
+  <p:cSld>
+    <p:spTree>
+      <p:nvGrpSpPr>
+        <p:cNvPr id="1" name=""/>
+        <p:cNvGrpSpPr/>
+        <p:nvPr/>
+      </p:nvGrpSpPr>
+      <p:grpSpPr>
+        <a:xfrm>
+          <a:off x="0" y="0"/>
+          <a:ext cx="0" cy="0"/>
+          <a:chOff x="0" y="0"/>
+          <a:chExt cx="0" cy="0"/>
+        </a:xfrm>
+      </p:grpSpPr>
+      <p:sp>
+        <p:nvSpPr>
+          <p:cNvPr id="2" name="Title 1"/>
+          <p:cNvSpPr>
+            <a:spLocks noGrp="1"/>
+          </p:cNvSpPr>
+          <p:nvPr>
+            <p:ph type="title"/>
+            <p:custDataLst>
+              <p:tags r:id="rId2"/>
+            </p:custDataLst>
+          </p:nvPr>
+        </p:nvSpPr>
+        <p:spPr/>
+        <p:txBody>
+          <a:bodyPr>
+            <a:normAutofit/>
+          </a:bodyPr>
+          <a:lstStyle/>
+          <a:p>
+            <a:r>
+              <a:rPr lang="en-US" dirty="0" smtClean="0"/>
+              <a:t>ARIA Properties</a:t>
+            </a:r>
+            <a:endParaRPr lang="en-US" dirty="0"/>
+          </a:p>
+        </p:txBody>
+      </p:sp>
+      <p:sp>
+        <p:nvSpPr>
+          <p:cNvPr id="5" name="Content Placeholder 4"/>
+          <p:cNvSpPr>
+            <a:spLocks noGrp="1"/>
+          </p:cNvSpPr>
+          <p:nvPr>
+            <p:ph idx="1"/>
+            <p:custDataLst>
+              <p:tags r:id="rId3"/>
+            </p:custDataLst>
+          </p:nvPr>
+        </p:nvSpPr>
+        <p:spPr/>
+        <p:txBody>
+          <a:bodyPr>
+            <a:normAutofit lnSpcReduction="10000"/>
+          </a:bodyPr>
+          <a:lstStyle/>
+          <a:p>
+            <a:r>
+              <a:rPr lang="en-US" dirty="0" smtClean="0"/>
+              <a:t>Live Region</a:t>
+            </a:r>
+          </a:p>
+          <a:p>
+            <a:r>
+              <a:rPr lang="en-US" dirty="0" smtClean="0"/>
+              <a:t>Orientation</a:t>
+            </a:r>
+            <a:endParaRPr lang="en-US" dirty="0"/>
+          </a:p>
+          <a:p>
+            <a:r>
+              <a:rPr lang="en-US" dirty="0"/>
+              <a:t>Required</a:t>
+            </a:r>
+          </a:p>
+          <a:p>
+            <a:r>
+              <a:rPr lang="en-US" dirty="0"/>
+              <a:t>Multi </a:t>
+            </a:r>
+            <a:r>
+              <a:rPr lang="en-US" dirty="0" smtClean="0"/>
+              <a:t>selectable</a:t>
+            </a:r>
+          </a:p>
+          <a:p>
+            <a:r>
+              <a:rPr lang="en-US" dirty="0" smtClean="0"/>
+              <a:t>Value (min, max, now)</a:t>
+            </a:r>
+          </a:p>
+          <a:p>
+            <a:r>
+              <a:rPr lang="en-US" dirty="0" smtClean="0"/>
+              <a:t>Sort</a:t>
+            </a:r>
+          </a:p>
+          <a:p>
+            <a:r>
+              <a:rPr lang="en-US" dirty="0"/>
+              <a:t>Properties for drag-and-drop that describe drag sources and drop targets</a:t>
+            </a:r>
+          </a:p>
+          <a:p>
+            <a:endParaRPr lang="en-US" dirty="0"/>
+          </a:p>
+        </p:txBody>
+      </p:sp>
+    </p:spTree>
+    <p:custDataLst>
+      <p:tags r:id="rId1"/>
+    </p:custDataLst>
+    <p:extLst>
+      <p:ext uri="{BB962C8B-B14F-4D97-AF65-F5344CB8AC3E}">
+        <p14:creationId xmlns:p14="http://schemas.microsoft.com/office/powerpoint/2010/main" val="2460694100"/>
+      </p:ext>
+    </p:extLst>
+  </p:cSld>
+  <p:clrMapOvr>
+    <a:masterClrMapping/>
+  </p:clrMapOvr>
+  <p:transition spd="slow">
+    <p:wipe dir="d"/>
+  </p:transition>
+  <p:timing>
+    <p:tnLst>
+      <p:par>
+        <p:cTn id="1" dur="indefinite" restart="never" nodeType="tmRoot"/>
+      </p:par>
+    </p:tnLst>
+  </p:timing>
+</p:sld>
+</file>
+
+<file path=ppt/slides/slide14.xml><?xml version="1.0" encoding="utf-8"?>
+<p:sld xmlns:a="http://schemas.openxmlformats.org/drawingml/2006/main" xmlns:r="http://schemas.openxmlformats.org/officeDocument/2006/relationships" xmlns:p="http://schemas.openxmlformats.org/presentationml/2006/main">
+  <p:cSld>
+    <p:spTree>
+      <p:nvGrpSpPr>
+        <p:cNvPr id="1" name=""/>
+        <p:cNvGrpSpPr/>
+        <p:nvPr/>
+      </p:nvGrpSpPr>
+      <p:grpSpPr>
+        <a:xfrm>
+          <a:off x="0" y="0"/>
+          <a:ext cx="0" cy="0"/>
+          <a:chOff x="0" y="0"/>
+          <a:chExt cx="0" cy="0"/>
+        </a:xfrm>
+      </p:grpSpPr>
+      <p:sp>
+        <p:nvSpPr>
+          <p:cNvPr id="2" name="Title 1"/>
+          <p:cNvSpPr>
+            <a:spLocks noGrp="1"/>
+          </p:cNvSpPr>
+          <p:nvPr>
+            <p:ph type="title"/>
+            <p:custDataLst>
+              <p:tags r:id="rId2"/>
+            </p:custDataLst>
+          </p:nvPr>
+        </p:nvSpPr>
+        <p:spPr/>
+        <p:txBody>
+          <a:bodyPr>
+            <a:normAutofit/>
+          </a:bodyPr>
+          <a:lstStyle/>
+          <a:p>
+            <a:r>
+              <a:rPr lang="en-US" dirty="0" smtClean="0"/>
+              <a:t>ARIA </a:t>
+            </a:r>
+            <a:r>
+              <a:rPr lang="en-US" dirty="0" smtClean="0"/>
+              <a:t>Application </a:t>
+            </a:r>
+            <a:r>
+              <a:rPr lang="en-US" dirty="0" smtClean="0"/>
+              <a:t>– </a:t>
+            </a:r>
+            <a:r>
+              <a:rPr lang="en-US" dirty="0" smtClean="0"/>
+              <a:t>Slider</a:t>
+            </a:r>
+            <a:endParaRPr lang="en-US" dirty="0"/>
+          </a:p>
+        </p:txBody>
+      </p:sp>
+      <p:sp>
+        <p:nvSpPr>
+          <p:cNvPr id="5" name="Content Placeholder 4"/>
+          <p:cNvSpPr>
+            <a:spLocks noGrp="1"/>
+          </p:cNvSpPr>
+          <p:nvPr>
+            <p:ph idx="1"/>
+            <p:custDataLst>
+              <p:tags r:id="rId3"/>
+            </p:custDataLst>
+          </p:nvPr>
+        </p:nvSpPr>
+        <p:spPr/>
+        <p:txBody>
+          <a:bodyPr>
+            <a:normAutofit/>
+          </a:bodyPr>
+          <a:lstStyle/>
+          <a:p>
+            <a:r>
+              <a:rPr lang="en-US" dirty="0" smtClean="0"/>
+              <a:t>Slider </a:t>
+            </a:r>
+            <a:r>
+              <a:rPr lang="en-US" dirty="0"/>
+              <a:t>is neither perceivable nor operable</a:t>
+            </a:r>
+          </a:p>
+          <a:p>
+            <a:r>
+              <a:rPr lang="en-US" dirty="0" smtClean="0"/>
+              <a:t>User interface element have three important </a:t>
+            </a:r>
+            <a:r>
+              <a:rPr lang="en-US" dirty="0" smtClean="0"/>
+              <a:t>attributes</a:t>
+            </a:r>
+            <a:endParaRPr lang="en-US" dirty="0" smtClean="0"/>
+          </a:p>
+          <a:p>
+            <a:pPr lvl="1"/>
+            <a:r>
+              <a:rPr lang="en-US" dirty="0" smtClean="0"/>
+              <a:t>Role</a:t>
+            </a:r>
+          </a:p>
+          <a:p>
+            <a:pPr lvl="1"/>
+            <a:r>
+              <a:rPr lang="en-US" dirty="0" smtClean="0"/>
+              <a:t>State</a:t>
+            </a:r>
+            <a:endParaRPr lang="en-US" dirty="0" smtClean="0"/>
+          </a:p>
+          <a:p>
+            <a:pPr lvl="1"/>
+            <a:r>
+              <a:rPr lang="en-US" dirty="0" smtClean="0"/>
+              <a:t>Properties</a:t>
+            </a:r>
+            <a:endParaRPr lang="en-US" dirty="0"/>
+          </a:p>
+        </p:txBody>
+      </p:sp>
+    </p:spTree>
+    <p:custDataLst>
+      <p:tags r:id="rId1"/>
+    </p:custDataLst>
+    <p:extLst>
+      <p:ext uri="{BB962C8B-B14F-4D97-AF65-F5344CB8AC3E}">
+        <p14:creationId xmlns:p14="http://schemas.microsoft.com/office/powerpoint/2010/main" val="2153637570"/>
+      </p:ext>
+    </p:extLst>
+  </p:cSld>
+  <p:clrMapOvr>
+    <a:masterClrMapping/>
+  </p:clrMapOvr>
+  <p:transition spd="slow">
+    <p:wipe dir="d"/>
+  </p:transition>
+  <p:timing>
+    <p:tnLst>
+      <p:par>
+        <p:cTn id="1" dur="indefinite" restart="never" nodeType="tmRoot"/>
+      </p:par>
+    </p:tnLst>
+  </p:timing>
+</p:sld>
+</file>
+
+<file path=ppt/slides/slide15.xml><?xml version="1.0" encoding="utf-8"?>
+<p:sld xmlns:a="http://schemas.openxmlformats.org/drawingml/2006/main" xmlns:r="http://schemas.openxmlformats.org/officeDocument/2006/relationships" xmlns:p="http://schemas.openxmlformats.org/presentationml/2006/main">
+  <p:cSld>
+    <p:spTree>
+      <p:nvGrpSpPr>
+        <p:cNvPr id="1" name=""/>
+        <p:cNvGrpSpPr/>
+        <p:nvPr/>
+      </p:nvGrpSpPr>
+      <p:grpSpPr>
+        <a:xfrm>
+          <a:off x="0" y="0"/>
+          <a:ext cx="0" cy="0"/>
+          <a:chOff x="0" y="0"/>
+          <a:chExt cx="0" cy="0"/>
+        </a:xfrm>
+      </p:grpSpPr>
+      <p:sp>
+        <p:nvSpPr>
+          <p:cNvPr id="2" name="Title 1"/>
+          <p:cNvSpPr>
+            <a:spLocks noGrp="1"/>
+          </p:cNvSpPr>
+          <p:nvPr>
+            <p:ph type="title"/>
+            <p:custDataLst>
+              <p:tags r:id="rId2"/>
+            </p:custDataLst>
+          </p:nvPr>
+        </p:nvSpPr>
+        <p:spPr/>
+        <p:txBody>
+          <a:bodyPr>
+            <a:normAutofit/>
+          </a:bodyPr>
+          <a:lstStyle/>
+          <a:p>
+            <a:r>
+              <a:rPr lang="en-US" dirty="0" smtClean="0"/>
+              <a:t>ARIA </a:t>
+            </a:r>
+            <a:r>
+              <a:rPr lang="en-US" dirty="0" smtClean="0"/>
+              <a:t>Application </a:t>
+            </a:r>
+            <a:r>
+              <a:rPr lang="en-US" dirty="0" smtClean="0"/>
+              <a:t>– </a:t>
+            </a:r>
+            <a:r>
+              <a:rPr lang="en-US" dirty="0" smtClean="0"/>
+              <a:t>Tree</a:t>
+            </a:r>
+            <a:endParaRPr lang="en-US" dirty="0"/>
+          </a:p>
+        </p:txBody>
+      </p:sp>
+      <p:sp>
+        <p:nvSpPr>
+          <p:cNvPr id="5" name="Content Placeholder 4"/>
+          <p:cNvSpPr>
+            <a:spLocks noGrp="1"/>
+          </p:cNvSpPr>
+          <p:nvPr>
+            <p:ph idx="1"/>
+            <p:custDataLst>
+              <p:tags r:id="rId3"/>
+            </p:custDataLst>
+          </p:nvPr>
+        </p:nvSpPr>
+        <p:spPr/>
+        <p:txBody>
+          <a:bodyPr>
+            <a:normAutofit/>
+          </a:bodyPr>
+          <a:lstStyle/>
+          <a:p>
+            <a:r>
+              <a:rPr lang="en-US" dirty="0" smtClean="0"/>
+              <a:t>Tree </a:t>
+            </a:r>
+            <a:r>
+              <a:rPr lang="en-US" smtClean="0"/>
+              <a:t>is also </a:t>
+            </a:r>
+            <a:r>
+              <a:rPr lang="en-US" dirty="0"/>
+              <a:t>neither perceivable nor operable</a:t>
+            </a:r>
+          </a:p>
+          <a:p>
+            <a:r>
+              <a:rPr lang="en-US" dirty="0" smtClean="0"/>
+              <a:t>User interface element have three important </a:t>
+            </a:r>
+            <a:r>
+              <a:rPr lang="en-US" dirty="0" smtClean="0"/>
+              <a:t>attributes</a:t>
+            </a:r>
+            <a:endParaRPr lang="en-US" dirty="0" smtClean="0"/>
+          </a:p>
+          <a:p>
+            <a:pPr lvl="1"/>
+            <a:r>
+              <a:rPr lang="en-US" dirty="0" smtClean="0"/>
+              <a:t>Role</a:t>
+            </a:r>
+          </a:p>
+          <a:p>
+            <a:pPr lvl="1"/>
+            <a:r>
+              <a:rPr lang="en-US" dirty="0" smtClean="0"/>
+              <a:t>State</a:t>
+            </a:r>
+            <a:endParaRPr lang="en-US" dirty="0" smtClean="0"/>
+          </a:p>
+          <a:p>
+            <a:pPr lvl="1"/>
+            <a:r>
+              <a:rPr lang="en-US" dirty="0" smtClean="0"/>
+              <a:t>Properties</a:t>
+            </a:r>
+            <a:endParaRPr lang="en-US" dirty="0"/>
+          </a:p>
+        </p:txBody>
+      </p:sp>
+    </p:spTree>
+    <p:custDataLst>
+      <p:tags r:id="rId1"/>
+    </p:custDataLst>
+    <p:extLst>
+      <p:ext uri="{BB962C8B-B14F-4D97-AF65-F5344CB8AC3E}">
+        <p14:creationId xmlns:p14="http://schemas.microsoft.com/office/powerpoint/2010/main" val="446666622"/>
+      </p:ext>
+    </p:extLst>
+  </p:cSld>
+  <p:clrMapOvr>
+    <a:masterClrMapping/>
+  </p:clrMapOvr>
+  <p:transition spd="slow">
+    <p:wipe dir="d"/>
+  </p:transition>
+  <p:timing>
+    <p:tnLst>
+      <p:par>
+        <p:cTn id="1" dur="indefinite" restart="never" nodeType="tmRoot"/>
+      </p:par>
+    </p:tnLst>
+  </p:timing>
+</p:sld>
+</file>
+
+<file path=ppt/slides/slide16.xml><?xml version="1.0" encoding="utf-8"?>
+<p:sld xmlns:a="http://schemas.openxmlformats.org/drawingml/2006/main" xmlns:r="http://schemas.openxmlformats.org/officeDocument/2006/relationships" xmlns:p="http://schemas.openxmlformats.org/presentationml/2006/main">
+  <p:cSld>
+    <p:spTree>
+      <p:nvGrpSpPr>
+        <p:cNvPr id="1" name=""/>
+        <p:cNvGrpSpPr/>
+        <p:nvPr/>
+      </p:nvGrpSpPr>
+      <p:grpSpPr>
+        <a:xfrm>
+          <a:off x="0" y="0"/>
+          <a:ext cx="0" cy="0"/>
+          <a:chOff x="0" y="0"/>
+          <a:chExt cx="0" cy="0"/>
+        </a:xfrm>
+      </p:grpSpPr>
+      <p:sp>
+        <p:nvSpPr>
+          <p:cNvPr id="2" name="Title 1"/>
+          <p:cNvSpPr>
+            <a:spLocks noGrp="1"/>
+          </p:cNvSpPr>
+          <p:nvPr>
+            <p:ph type="title"/>
+            <p:custDataLst>
+              <p:tags r:id="rId2"/>
+            </p:custDataLst>
+          </p:nvPr>
+        </p:nvSpPr>
+        <p:spPr/>
+        <p:txBody>
+          <a:bodyPr>
+            <a:normAutofit/>
+          </a:bodyPr>
+          <a:lstStyle/>
+          <a:p>
+            <a:r>
+              <a:rPr lang="en-US" dirty="0" smtClean="0"/>
+              <a:t>Re Introducing Browser</a:t>
+            </a:r>
+            <a:endParaRPr lang="en-US" dirty="0"/>
+          </a:p>
+        </p:txBody>
+      </p:sp>
+      <p:sp>
+        <p:nvSpPr>
+          <p:cNvPr id="5" name="Content Placeholder 4"/>
+          <p:cNvSpPr>
+            <a:spLocks noGrp="1"/>
+          </p:cNvSpPr>
+          <p:nvPr>
+            <p:ph idx="1"/>
+            <p:custDataLst>
+              <p:tags r:id="rId3"/>
+            </p:custDataLst>
+          </p:nvPr>
+        </p:nvSpPr>
+        <p:spPr/>
+        <p:txBody>
+          <a:bodyPr>
+            <a:normAutofit fontScale="92500" lnSpcReduction="10000"/>
+          </a:bodyPr>
+          <a:lstStyle/>
+          <a:p>
+            <a:r>
+              <a:rPr lang="en-US" dirty="0"/>
+              <a:t>HTML has grown from ‘just’ markup </a:t>
+            </a:r>
+            <a:r>
+              <a:rPr lang="en-US" dirty="0" smtClean="0"/>
+              <a:t>language to a whole new Infrastructure.</a:t>
+            </a:r>
+          </a:p>
+          <a:p>
+            <a:r>
+              <a:rPr lang="en-US" dirty="0" smtClean="0"/>
+              <a:t>Browser is Platform</a:t>
+            </a:r>
+            <a:endParaRPr lang="en-US" dirty="0"/>
+          </a:p>
+          <a:p>
+            <a:r>
+              <a:rPr lang="en-US" dirty="0" smtClean="0"/>
+              <a:t>With HTML 5, CSS3 and Java Script now you write desktop equivalent applications</a:t>
+            </a:r>
+          </a:p>
+          <a:p>
+            <a:r>
+              <a:rPr lang="en-US" dirty="0" smtClean="0"/>
+              <a:t>You can debug java script, perform logging etc.</a:t>
+            </a:r>
+          </a:p>
+          <a:p>
+            <a:r>
+              <a:rPr lang="en-US" dirty="0" smtClean="0"/>
+              <a:t>Browse ecosystem is also matured with frameworks like Angular, Backbone, knockout etc.</a:t>
+            </a:r>
+          </a:p>
+        </p:txBody>
+      </p:sp>
+    </p:spTree>
+    <p:custDataLst>
+      <p:tags r:id="rId1"/>
+    </p:custDataLst>
+    <p:extLst>
+      <p:ext uri="{BB962C8B-B14F-4D97-AF65-F5344CB8AC3E}">
+        <p14:creationId xmlns:p14="http://schemas.microsoft.com/office/powerpoint/2010/main" val="964538590"/>
+      </p:ext>
+    </p:extLst>
+  </p:cSld>
+  <p:clrMapOvr>
+    <a:masterClrMapping/>
+  </p:clrMapOvr>
+  <p:transition spd="slow">
+    <p:wipe dir="d"/>
+  </p:transition>
+  <p:timing>
+    <p:tnLst>
+      <p:par>
+        <p:cTn id="1" dur="indefinite" restart="never" nodeType="tmRoot"/>
+      </p:par>
+    </p:tnLst>
+  </p:timing>
+</p:sld>
+</file>
+
+<file path=ppt/slides/slide17.xml><?xml version="1.0" encoding="utf-8"?>
 <p:sld xmlns:a="http://schemas.openxmlformats.org/drawingml/2006/main" xmlns:r="http://schemas.openxmlformats.org/officeDocument/2006/relationships" xmlns:p="http://schemas.openxmlformats.org/presentationml/2006/main">
   <p:cSld>
     <p:spTree>
@@ -7009,7 +8611,7 @@
 </p:sld>
 </file>
 
-<file path=ppt/slides/slide11.xml><?xml version="1.0" encoding="utf-8"?>
+<file path=ppt/slides/slide18.xml><?xml version="1.0" encoding="utf-8"?>
 <p:sld xmlns:a="http://schemas.openxmlformats.org/drawingml/2006/main" xmlns:r="http://schemas.openxmlformats.org/officeDocument/2006/relationships" xmlns:p="http://schemas.openxmlformats.org/presentationml/2006/main">
   <p:cSld>
     <p:spTree>
@@ -7109,7 +8711,7 @@
 </p:sld>
 </file>
 
-<file path=ppt/slides/slide12.xml><?xml version="1.0" encoding="utf-8"?>
+<file path=ppt/slides/slide19.xml><?xml version="1.0" encoding="utf-8"?>
 <p:sld xmlns:a="http://schemas.openxmlformats.org/drawingml/2006/main" xmlns:r="http://schemas.openxmlformats.org/officeDocument/2006/relationships" xmlns:p="http://schemas.openxmlformats.org/presentationml/2006/main">
   <p:cSld>
     <p:spTree>
@@ -7263,7 +8865,109 @@
 </p:sld>
 </file>
 
-<file path=ppt/slides/slide13.xml><?xml version="1.0" encoding="utf-8"?>
+<file path=ppt/slides/slide2.xml><?xml version="1.0" encoding="utf-8"?>
+<p:sld xmlns:a="http://schemas.openxmlformats.org/drawingml/2006/main" xmlns:r="http://schemas.openxmlformats.org/officeDocument/2006/relationships" xmlns:p="http://schemas.openxmlformats.org/presentationml/2006/main">
+  <p:cSld>
+    <p:spTree>
+      <p:nvGrpSpPr>
+        <p:cNvPr id="1" name=""/>
+        <p:cNvGrpSpPr/>
+        <p:nvPr/>
+      </p:nvGrpSpPr>
+      <p:grpSpPr>
+        <a:xfrm>
+          <a:off x="0" y="0"/>
+          <a:ext cx="0" cy="0"/>
+          <a:chOff x="0" y="0"/>
+          <a:chExt cx="0" cy="0"/>
+        </a:xfrm>
+      </p:grpSpPr>
+      <p:sp>
+        <p:nvSpPr>
+          <p:cNvPr id="7" name="TextBox 6"/>
+          <p:cNvSpPr txBox="1"/>
+          <p:nvPr/>
+        </p:nvSpPr>
+        <p:spPr>
+          <a:xfrm>
+            <a:off x="1295400" y="2363450"/>
+            <a:ext cx="6781800" cy="3808750"/>
+          </a:xfrm>
+          <a:prstGeom prst="rect">
+            <a:avLst/>
+          </a:prstGeom>
+          <a:noFill/>
+        </p:spPr>
+        <p:txBody>
+          <a:bodyPr wrap="square" rtlCol="0">
+            <a:normAutofit fontScale="92500"/>
+          </a:bodyPr>
+          <a:lstStyle/>
+          <a:p>
+            <a:r>
+              <a:rPr lang="en-US" sz="7200" dirty="0"/>
+              <a:t>Accessible </a:t>
+            </a:r>
+            <a:r>
+              <a:rPr lang="en-US" sz="7200" dirty="0" smtClean="0"/>
+              <a:t>Website are always SEO </a:t>
+            </a:r>
+            <a:r>
+              <a:rPr lang="en-US" sz="7200" dirty="0"/>
+              <a:t>Friendly</a:t>
+            </a:r>
+          </a:p>
+        </p:txBody>
+      </p:sp>
+      <p:pic>
+        <p:nvPicPr>
+          <p:cNvPr id="12" name="Picture 11"/>
+          <p:cNvPicPr>
+            <a:picLocks noChangeAspect="1"/>
+          </p:cNvPicPr>
+          <p:nvPr/>
+        </p:nvPicPr>
+        <p:blipFill>
+          <a:blip r:embed="rId3" cstate="email">
+            <a:extLst>
+              <a:ext uri="{28A0092B-C50C-407E-A947-70E740481C1C}">
+                <a14:useLocalDpi xmlns:a14="http://schemas.microsoft.com/office/drawing/2010/main"/>
+              </a:ext>
+            </a:extLst>
+          </a:blip>
+          <a:stretch>
+            <a:fillRect/>
+          </a:stretch>
+        </p:blipFill>
+        <p:spPr>
+          <a:xfrm>
+            <a:off x="4191000" y="0"/>
+            <a:ext cx="7765662" cy="16476125"/>
+          </a:xfrm>
+          <a:prstGeom prst="rect">
+            <a:avLst/>
+          </a:prstGeom>
+        </p:spPr>
+      </p:pic>
+    </p:spTree>
+  </p:cSld>
+  <p:clrMapOvr>
+    <a:masterClrMapping/>
+  </p:clrMapOvr>
+  <p:transition spd="slow">
+    <p:fade/>
+  </p:transition>
+  <p:timing>
+    <p:tnLst>
+      <p:par>
+        <p:cTn id="1" dur="indefinite" restart="never" nodeType="tmRoot"/>
+      </p:par>
+    </p:tnLst>
+  </p:timing>
+</p:sld>
+</file>
+
+<file path=ppt/slides/slide20.xml><?xml version="1.0" encoding="utf-8"?>
 <p:sld xmlns:a="http://schemas.openxmlformats.org/drawingml/2006/main" xmlns:r="http://schemas.openxmlformats.org/officeDocument/2006/relationships" xmlns:p="http://schemas.openxmlformats.org/presentationml/2006/main">
   <p:cSld>
     <p:spTree>
@@ -7373,7 +9077,7 @@
 </p:sld>
 </file>
 
-<file path=ppt/slides/slide14.xml><?xml version="1.0" encoding="utf-8"?>
+<file path=ppt/slides/slide21.xml><?xml version="1.0" encoding="utf-8"?>
 <p:sld xmlns:a="http://schemas.openxmlformats.org/drawingml/2006/main" xmlns:r="http://schemas.openxmlformats.org/officeDocument/2006/relationships" xmlns:p="http://schemas.openxmlformats.org/presentationml/2006/main">
   <p:cSld>
     <p:spTree>
@@ -7485,7 +9189,7 @@
 </p:sld>
 </file>
 
-<file path=ppt/slides/slide15.xml><?xml version="1.0" encoding="utf-8"?>
+<file path=ppt/slides/slide22.xml><?xml version="1.0" encoding="utf-8"?>
 <p:sld xmlns:a="http://schemas.openxmlformats.org/drawingml/2006/main" xmlns:r="http://schemas.openxmlformats.org/officeDocument/2006/relationships" xmlns:p="http://schemas.openxmlformats.org/presentationml/2006/main">
   <p:cSld>
     <p:spTree>
@@ -7648,7 +9352,7 @@
 </p:sld>
 </file>
 
-<file path=ppt/slides/slide16.xml><?xml version="1.0" encoding="utf-8"?>
+<file path=ppt/slides/slide23.xml><?xml version="1.0" encoding="utf-8"?>
 <p:sld xmlns:a="http://schemas.openxmlformats.org/drawingml/2006/main" xmlns:r="http://schemas.openxmlformats.org/officeDocument/2006/relationships" xmlns:p="http://schemas.openxmlformats.org/presentationml/2006/main">
   <p:cSld>
     <p:spTree>
@@ -7778,7 +9482,7 @@
 </p:sld>
 </file>
 
-<file path=ppt/slides/slide17.xml><?xml version="1.0" encoding="utf-8"?>
+<file path=ppt/slides/slide24.xml><?xml version="1.0" encoding="utf-8"?>
 <p:sld xmlns:a="http://schemas.openxmlformats.org/drawingml/2006/main" xmlns:r="http://schemas.openxmlformats.org/officeDocument/2006/relationships" xmlns:p="http://schemas.openxmlformats.org/presentationml/2006/main">
   <p:cSld>
     <p:spTree>
@@ -7899,7 +9603,7 @@
 </p:sld>
 </file>
 
-<file path=ppt/slides/slide18.xml><?xml version="1.0" encoding="utf-8"?>
+<file path=ppt/slides/slide25.xml><?xml version="1.0" encoding="utf-8"?>
 <p:sld xmlns:a="http://schemas.openxmlformats.org/drawingml/2006/main" xmlns:r="http://schemas.openxmlformats.org/officeDocument/2006/relationships" xmlns:p="http://schemas.openxmlformats.org/presentationml/2006/main">
   <p:cSld>
     <p:spTree>
@@ -7999,7 +9703,7 @@
 </p:sld>
 </file>
 
-<file path=ppt/slides/slide19.xml><?xml version="1.0" encoding="utf-8"?>
+<file path=ppt/slides/slide26.xml><?xml version="1.0" encoding="utf-8"?>
 <p:sld xmlns:a="http://schemas.openxmlformats.org/drawingml/2006/main" xmlns:r="http://schemas.openxmlformats.org/officeDocument/2006/relationships" xmlns:p="http://schemas.openxmlformats.org/presentationml/2006/main">
   <p:cSld>
     <p:spTree>
@@ -8197,117 +9901,7 @@
 </p:sld>
 </file>
 
-<file path=ppt/slides/slide2.xml><?xml version="1.0" encoding="utf-8"?>
-<p:sld xmlns:a="http://schemas.openxmlformats.org/drawingml/2006/main" xmlns:r="http://schemas.openxmlformats.org/officeDocument/2006/relationships" xmlns:p="http://schemas.openxmlformats.org/presentationml/2006/main">
-  <p:cSld>
-    <p:spTree>
-      <p:nvGrpSpPr>
-        <p:cNvPr id="1" name=""/>
-        <p:cNvGrpSpPr/>
-        <p:nvPr/>
-      </p:nvGrpSpPr>
-      <p:grpSpPr>
-        <a:xfrm>
-          <a:off x="0" y="0"/>
-          <a:ext cx="0" cy="0"/>
-          <a:chOff x="0" y="0"/>
-          <a:chExt cx="0" cy="0"/>
-        </a:xfrm>
-      </p:grpSpPr>
-      <p:sp>
-        <p:nvSpPr>
-          <p:cNvPr id="7" name="TextBox 6"/>
-          <p:cNvSpPr txBox="1"/>
-          <p:nvPr/>
-        </p:nvSpPr>
-        <p:spPr>
-          <a:xfrm>
-            <a:off x="1295400" y="2363450"/>
-            <a:ext cx="6781800" cy="3808750"/>
-          </a:xfrm>
-          <a:prstGeom prst="rect">
-            <a:avLst/>
-          </a:prstGeom>
-          <a:noFill/>
-        </p:spPr>
-        <p:txBody>
-          <a:bodyPr wrap="square" rtlCol="0">
-            <a:normAutofit fontScale="92500"/>
-          </a:bodyPr>
-          <a:lstStyle/>
-          <a:p>
-            <a:r>
-              <a:rPr lang="en-US" sz="7200" dirty="0"/>
-              <a:t>Accessible </a:t>
-            </a:r>
-            <a:r>
-              <a:rPr lang="en-US" sz="7200" dirty="0" smtClean="0"/>
-              <a:t>Website </a:t>
-            </a:r>
-            <a:r>
-              <a:rPr lang="en-US" sz="7200" dirty="0" smtClean="0"/>
-              <a:t>are </a:t>
-            </a:r>
-            <a:r>
-              <a:rPr lang="en-US" sz="7200" dirty="0" smtClean="0"/>
-              <a:t>always SEO </a:t>
-            </a:r>
-            <a:r>
-              <a:rPr lang="en-US" sz="7200" dirty="0"/>
-              <a:t>Friendly</a:t>
-            </a:r>
-          </a:p>
-        </p:txBody>
-      </p:sp>
-      <p:pic>
-        <p:nvPicPr>
-          <p:cNvPr id="12" name="Picture 11"/>
-          <p:cNvPicPr>
-            <a:picLocks noChangeAspect="1"/>
-          </p:cNvPicPr>
-          <p:nvPr/>
-        </p:nvPicPr>
-        <p:blipFill>
-          <a:blip r:embed="rId3" cstate="email">
-            <a:extLst>
-              <a:ext uri="{28A0092B-C50C-407E-A947-70E740481C1C}">
-                <a14:useLocalDpi xmlns:a14="http://schemas.microsoft.com/office/drawing/2010/main"/>
-              </a:ext>
-            </a:extLst>
-          </a:blip>
-          <a:stretch>
-            <a:fillRect/>
-          </a:stretch>
-        </p:blipFill>
-        <p:spPr>
-          <a:xfrm>
-            <a:off x="4191000" y="0"/>
-            <a:ext cx="7765662" cy="16476125"/>
-          </a:xfrm>
-          <a:prstGeom prst="rect">
-            <a:avLst/>
-          </a:prstGeom>
-        </p:spPr>
-      </p:pic>
-    </p:spTree>
-  </p:cSld>
-  <p:clrMapOvr>
-    <a:masterClrMapping/>
-  </p:clrMapOvr>
-  <p:transition spd="slow">
-    <p:fade/>
-  </p:transition>
-  <p:timing>
-    <p:tnLst>
-      <p:par>
-        <p:cTn id="1" dur="indefinite" restart="never" nodeType="tmRoot"/>
-      </p:par>
-    </p:tnLst>
-  </p:timing>
-</p:sld>
-</file>
-
-<file path=ppt/slides/slide20.xml><?xml version="1.0" encoding="utf-8"?>
+<file path=ppt/slides/slide27.xml><?xml version="1.0" encoding="utf-8"?>
 <p:sld xmlns:a="http://schemas.openxmlformats.org/drawingml/2006/main" xmlns:r="http://schemas.openxmlformats.org/officeDocument/2006/relationships" xmlns:p="http://schemas.openxmlformats.org/presentationml/2006/main">
   <p:cSld>
     <p:spTree>
@@ -8451,7 +10045,7 @@
 </p:sld>
 </file>
 
-<file path=ppt/slides/slide21.xml><?xml version="1.0" encoding="utf-8"?>
+<file path=ppt/slides/slide28.xml><?xml version="1.0" encoding="utf-8"?>
 <p:sld xmlns:a="http://schemas.openxmlformats.org/drawingml/2006/main" xmlns:r="http://schemas.openxmlformats.org/officeDocument/2006/relationships" xmlns:p="http://schemas.openxmlformats.org/presentationml/2006/main">
   <p:cSld>
     <p:spTree>
@@ -8597,7 +10191,7 @@
 </p:sld>
 </file>
 
-<file path=ppt/slides/slide22.xml><?xml version="1.0" encoding="utf-8"?>
+<file path=ppt/slides/slide29.xml><?xml version="1.0" encoding="utf-8"?>
 <p:sld xmlns:a="http://schemas.openxmlformats.org/drawingml/2006/main" xmlns:r="http://schemas.openxmlformats.org/officeDocument/2006/relationships" xmlns:p="http://schemas.openxmlformats.org/presentationml/2006/main">
   <p:cSld>
     <p:spTree>
@@ -8697,7 +10291,107 @@
 </p:sld>
 </file>
 
-<file path=ppt/slides/slide23.xml><?xml version="1.0" encoding="utf-8"?>
+<file path=ppt/slides/slide3.xml><?xml version="1.0" encoding="utf-8"?>
+<p:sld xmlns:a="http://schemas.openxmlformats.org/drawingml/2006/main" xmlns:r="http://schemas.openxmlformats.org/officeDocument/2006/relationships" xmlns:p="http://schemas.openxmlformats.org/presentationml/2006/main">
+  <p:cSld>
+    <p:spTree>
+      <p:nvGrpSpPr>
+        <p:cNvPr id="1" name=""/>
+        <p:cNvGrpSpPr/>
+        <p:nvPr/>
+      </p:nvGrpSpPr>
+      <p:grpSpPr>
+        <a:xfrm>
+          <a:off x="0" y="0"/>
+          <a:ext cx="0" cy="0"/>
+          <a:chOff x="0" y="0"/>
+          <a:chExt cx="0" cy="0"/>
+        </a:xfrm>
+      </p:grpSpPr>
+      <p:sp>
+        <p:nvSpPr>
+          <p:cNvPr id="7" name="TextBox 6"/>
+          <p:cNvSpPr txBox="1"/>
+          <p:nvPr/>
+        </p:nvSpPr>
+        <p:spPr>
+          <a:xfrm>
+            <a:off x="1295400" y="2363450"/>
+            <a:ext cx="6781800" cy="3808750"/>
+          </a:xfrm>
+          <a:prstGeom prst="rect">
+            <a:avLst/>
+          </a:prstGeom>
+          <a:noFill/>
+        </p:spPr>
+        <p:txBody>
+          <a:bodyPr wrap="square" rtlCol="0">
+            <a:normAutofit/>
+          </a:bodyPr>
+          <a:lstStyle/>
+          <a:p>
+            <a:r>
+              <a:rPr lang="en-US" sz="7200" dirty="0" smtClean="0"/>
+              <a:t>WAI ARIA</a:t>
+            </a:r>
+            <a:endParaRPr lang="en-US" sz="7200" dirty="0"/>
+          </a:p>
+        </p:txBody>
+      </p:sp>
+      <p:pic>
+        <p:nvPicPr>
+          <p:cNvPr id="12" name="Picture 11"/>
+          <p:cNvPicPr>
+            <a:picLocks noChangeAspect="1"/>
+          </p:cNvPicPr>
+          <p:nvPr/>
+        </p:nvPicPr>
+        <p:blipFill>
+          <a:blip r:embed="rId3" cstate="email">
+            <a:extLst>
+              <a:ext uri="{28A0092B-C50C-407E-A947-70E740481C1C}">
+                <a14:useLocalDpi xmlns:a14="http://schemas.microsoft.com/office/drawing/2010/main"/>
+              </a:ext>
+            </a:extLst>
+          </a:blip>
+          <a:stretch>
+            <a:fillRect/>
+          </a:stretch>
+        </p:blipFill>
+        <p:spPr>
+          <a:xfrm>
+            <a:off x="4191000" y="0"/>
+            <a:ext cx="7765662" cy="16476125"/>
+          </a:xfrm>
+          <a:prstGeom prst="rect">
+            <a:avLst/>
+          </a:prstGeom>
+        </p:spPr>
+      </p:pic>
+    </p:spTree>
+    <p:extLst>
+      <p:ext uri="{BB962C8B-B14F-4D97-AF65-F5344CB8AC3E}">
+        <p14:creationId xmlns:p14="http://schemas.microsoft.com/office/powerpoint/2010/main" val="4261066294"/>
+      </p:ext>
+    </p:extLst>
+  </p:cSld>
+  <p:clrMapOvr>
+    <a:masterClrMapping/>
+  </p:clrMapOvr>
+  <p:transition spd="slow">
+    <p:fade/>
+  </p:transition>
+  <p:timing>
+    <p:tnLst>
+      <p:par>
+        <p:cTn id="1" dur="indefinite" restart="never" nodeType="tmRoot"/>
+      </p:par>
+    </p:tnLst>
+  </p:timing>
+</p:sld>
+</file>
+
+<file path=ppt/slides/slide30.xml><?xml version="1.0" encoding="utf-8"?>
 <p:sld xmlns:a="http://schemas.openxmlformats.org/drawingml/2006/main" xmlns:r="http://schemas.openxmlformats.org/officeDocument/2006/relationships" xmlns:p="http://schemas.openxmlformats.org/presentationml/2006/main">
   <p:cSld>
     <p:spTree>
@@ -8803,7 +10497,7 @@
 </p:sld>
 </file>
 
-<file path=ppt/slides/slide24.xml><?xml version="1.0" encoding="utf-8"?>
+<file path=ppt/slides/slide31.xml><?xml version="1.0" encoding="utf-8"?>
 <p:sld xmlns:a="http://schemas.openxmlformats.org/drawingml/2006/main" xmlns:r="http://schemas.openxmlformats.org/officeDocument/2006/relationships" xmlns:p="http://schemas.openxmlformats.org/presentationml/2006/main">
   <p:cSld>
     <p:spTree>
@@ -8982,7 +10676,7 @@
 </p:sld>
 </file>
 
-<file path=ppt/slides/slide25.xml><?xml version="1.0" encoding="utf-8"?>
+<file path=ppt/slides/slide32.xml><?xml version="1.0" encoding="utf-8"?>
 <p:sld xmlns:a="http://schemas.openxmlformats.org/drawingml/2006/main" xmlns:r="http://schemas.openxmlformats.org/officeDocument/2006/relationships" xmlns:p="http://schemas.openxmlformats.org/presentationml/2006/main">
   <p:cSld>
     <p:spTree>
@@ -9092,7 +10786,7 @@
 </p:sld>
 </file>
 
-<file path=ppt/slides/slide26.xml><?xml version="1.0" encoding="utf-8"?>
+<file path=ppt/slides/slide33.xml><?xml version="1.0" encoding="utf-8"?>
 <p:sld xmlns:a="http://schemas.openxmlformats.org/drawingml/2006/main" xmlns:r="http://schemas.openxmlformats.org/officeDocument/2006/relationships" xmlns:p="http://schemas.openxmlformats.org/presentationml/2006/main">
   <p:cSld>
     <p:spTree>
@@ -9195,7 +10889,7 @@
 </p:sld>
 </file>
 
-<file path=ppt/slides/slide27.xml><?xml version="1.0" encoding="utf-8"?>
+<file path=ppt/slides/slide34.xml><?xml version="1.0" encoding="utf-8"?>
 <p:sld xmlns:a="http://schemas.openxmlformats.org/drawingml/2006/main" xmlns:r="http://schemas.openxmlformats.org/officeDocument/2006/relationships" xmlns:p="http://schemas.openxmlformats.org/presentationml/2006/main">
   <p:cSld>
     <p:spTree>
@@ -9263,106 +10957,6 @@
 </p:sld>
 </file>
 
-<file path=ppt/slides/slide3.xml><?xml version="1.0" encoding="utf-8"?>
-<p:sld xmlns:a="http://schemas.openxmlformats.org/drawingml/2006/main" xmlns:r="http://schemas.openxmlformats.org/officeDocument/2006/relationships" xmlns:p="http://schemas.openxmlformats.org/presentationml/2006/main">
-  <p:cSld>
-    <p:spTree>
-      <p:nvGrpSpPr>
-        <p:cNvPr id="1" name=""/>
-        <p:cNvGrpSpPr/>
-        <p:nvPr/>
-      </p:nvGrpSpPr>
-      <p:grpSpPr>
-        <a:xfrm>
-          <a:off x="0" y="0"/>
-          <a:ext cx="0" cy="0"/>
-          <a:chOff x="0" y="0"/>
-          <a:chExt cx="0" cy="0"/>
-        </a:xfrm>
-      </p:grpSpPr>
-      <p:sp>
-        <p:nvSpPr>
-          <p:cNvPr id="7" name="TextBox 6"/>
-          <p:cNvSpPr txBox="1"/>
-          <p:nvPr/>
-        </p:nvSpPr>
-        <p:spPr>
-          <a:xfrm>
-            <a:off x="1295400" y="2363450"/>
-            <a:ext cx="6781800" cy="3808750"/>
-          </a:xfrm>
-          <a:prstGeom prst="rect">
-            <a:avLst/>
-          </a:prstGeom>
-          <a:noFill/>
-        </p:spPr>
-        <p:txBody>
-          <a:bodyPr wrap="square" rtlCol="0">
-            <a:normAutofit/>
-          </a:bodyPr>
-          <a:lstStyle/>
-          <a:p>
-            <a:r>
-              <a:rPr lang="en-US" sz="7200" dirty="0" smtClean="0"/>
-              <a:t>WAI ARIA</a:t>
-            </a:r>
-            <a:endParaRPr lang="en-US" sz="7200" dirty="0"/>
-          </a:p>
-        </p:txBody>
-      </p:sp>
-      <p:pic>
-        <p:nvPicPr>
-          <p:cNvPr id="12" name="Picture 11"/>
-          <p:cNvPicPr>
-            <a:picLocks noChangeAspect="1"/>
-          </p:cNvPicPr>
-          <p:nvPr/>
-        </p:nvPicPr>
-        <p:blipFill>
-          <a:blip r:embed="rId3" cstate="email">
-            <a:extLst>
-              <a:ext uri="{28A0092B-C50C-407E-A947-70E740481C1C}">
-                <a14:useLocalDpi xmlns:a14="http://schemas.microsoft.com/office/drawing/2010/main"/>
-              </a:ext>
-            </a:extLst>
-          </a:blip>
-          <a:stretch>
-            <a:fillRect/>
-          </a:stretch>
-        </p:blipFill>
-        <p:spPr>
-          <a:xfrm>
-            <a:off x="4191000" y="0"/>
-            <a:ext cx="7765662" cy="16476125"/>
-          </a:xfrm>
-          <a:prstGeom prst="rect">
-            <a:avLst/>
-          </a:prstGeom>
-        </p:spPr>
-      </p:pic>
-    </p:spTree>
-    <p:extLst>
-      <p:ext uri="{BB962C8B-B14F-4D97-AF65-F5344CB8AC3E}">
-        <p14:creationId xmlns:p14="http://schemas.microsoft.com/office/powerpoint/2010/main" val="4261066294"/>
-      </p:ext>
-    </p:extLst>
-  </p:cSld>
-  <p:clrMapOvr>
-    <a:masterClrMapping/>
-  </p:clrMapOvr>
-  <p:transition spd="slow">
-    <p:fade/>
-  </p:transition>
-  <p:timing>
-    <p:tnLst>
-      <p:par>
-        <p:cTn id="1" dur="indefinite" restart="never" nodeType="tmRoot"/>
-      </p:par>
-    </p:tnLst>
-  </p:timing>
-</p:sld>
-</file>
-
 <file path=ppt/slides/slide4.xml><?xml version="1.0" encoding="utf-8"?>
 <p:sld xmlns:a="http://schemas.openxmlformats.org/drawingml/2006/main" xmlns:r="http://schemas.openxmlformats.org/officeDocument/2006/relationships" xmlns:p="http://schemas.openxmlformats.org/presentationml/2006/main">
   <p:cSld>
@@ -9402,7 +10996,11 @@
           <a:p>
             <a:r>
               <a:rPr lang="en-US" dirty="0" smtClean="0"/>
-              <a:t>ARIA Introduction – HTML 4</a:t>
+              <a:t>HTML 4 </a:t>
+            </a:r>
+            <a:r>
+              <a:rPr lang="en-US" dirty="0" smtClean="0"/>
+              <a:t>– No Functional meaning</a:t>
             </a:r>
             <a:endParaRPr lang="en-US" dirty="0"/>
           </a:p>
@@ -9430,7 +11028,28 @@
           <a:p>
             <a:r>
               <a:rPr lang="en-US" dirty="0" smtClean="0"/>
-              <a:t>HTML 4 tags </a:t>
+              <a:t>HTML 4 tags like div represent logical unit but has no semantic or meaningful information associated with them</a:t>
+            </a:r>
+          </a:p>
+          <a:p>
+            <a:r>
+              <a:rPr lang="en-US" dirty="0" smtClean="0"/>
+              <a:t>For AT is no way to identify whether div represent header, footer, navigation or some </a:t>
+            </a:r>
+            <a:r>
+              <a:rPr lang="en-US" dirty="0" smtClean="0"/>
+              <a:t>content - Demo</a:t>
+            </a:r>
+            <a:endParaRPr lang="en-US" dirty="0" smtClean="0"/>
+          </a:p>
+          <a:p>
+            <a:r>
+              <a:rPr lang="en-US" dirty="0" smtClean="0"/>
+              <a:t>Similarly </a:t>
+            </a:r>
+            <a:r>
+              <a:rPr lang="en-US" dirty="0" smtClean="0"/>
+              <a:t>tables can represent tabular data as well as layout - Demo</a:t>
             </a:r>
             <a:endParaRPr lang="en-US" dirty="0" smtClean="0"/>
           </a:p>
@@ -9481,6 +11100,393 @@
       </p:grpSpPr>
       <p:sp>
         <p:nvSpPr>
+          <p:cNvPr id="2" name="Title 1"/>
+          <p:cNvSpPr>
+            <a:spLocks noGrp="1"/>
+          </p:cNvSpPr>
+          <p:nvPr>
+            <p:ph type="title"/>
+            <p:custDataLst>
+              <p:tags r:id="rId2"/>
+            </p:custDataLst>
+          </p:nvPr>
+        </p:nvSpPr>
+        <p:spPr/>
+        <p:txBody>
+          <a:bodyPr>
+            <a:normAutofit/>
+          </a:bodyPr>
+          <a:lstStyle/>
+          <a:p>
+            <a:r>
+              <a:rPr lang="en-US" dirty="0" smtClean="0"/>
+              <a:t>Java </a:t>
+            </a:r>
+            <a:r>
+              <a:rPr lang="en-US" dirty="0" smtClean="0"/>
+              <a:t>Script Components</a:t>
+            </a:r>
+            <a:endParaRPr lang="en-US" dirty="0"/>
+          </a:p>
+        </p:txBody>
+      </p:sp>
+      <p:sp>
+        <p:nvSpPr>
+          <p:cNvPr id="5" name="Content Placeholder 4"/>
+          <p:cNvSpPr>
+            <a:spLocks noGrp="1"/>
+          </p:cNvSpPr>
+          <p:nvPr>
+            <p:ph idx="1"/>
+            <p:custDataLst>
+              <p:tags r:id="rId3"/>
+            </p:custDataLst>
+          </p:nvPr>
+        </p:nvSpPr>
+        <p:spPr/>
+        <p:txBody>
+          <a:bodyPr>
+            <a:normAutofit/>
+          </a:bodyPr>
+          <a:lstStyle/>
+          <a:p>
+            <a:r>
+              <a:rPr lang="en-US" dirty="0" smtClean="0"/>
+              <a:t>HTML was not designed for creating web application.</a:t>
+            </a:r>
+          </a:p>
+          <a:p>
+            <a:r>
+              <a:rPr lang="en-US" dirty="0" smtClean="0"/>
+              <a:t>It had limited set of controls</a:t>
+            </a:r>
+            <a:endParaRPr lang="en-US" dirty="0"/>
+          </a:p>
+          <a:p>
+            <a:r>
+              <a:rPr lang="en-US" dirty="0" smtClean="0"/>
+              <a:t>Web developer gotten around these limitation by creating their own components.</a:t>
+            </a:r>
+          </a:p>
+          <a:p>
+            <a:r>
+              <a:rPr lang="en-US" dirty="0" smtClean="0"/>
+              <a:t>But there was no standard way to make these components accessible</a:t>
+            </a:r>
+          </a:p>
+        </p:txBody>
+      </p:sp>
+    </p:spTree>
+    <p:custDataLst>
+      <p:tags r:id="rId1"/>
+    </p:custDataLst>
+    <p:extLst>
+      <p:ext uri="{BB962C8B-B14F-4D97-AF65-F5344CB8AC3E}">
+        <p14:creationId xmlns:p14="http://schemas.microsoft.com/office/powerpoint/2010/main" val="2116277925"/>
+      </p:ext>
+    </p:extLst>
+  </p:cSld>
+  <p:clrMapOvr>
+    <a:masterClrMapping/>
+  </p:clrMapOvr>
+  <p:transition spd="slow">
+    <p:wipe dir="d"/>
+  </p:transition>
+  <p:timing>
+    <p:tnLst>
+      <p:par>
+        <p:cTn id="1" dur="indefinite" restart="never" nodeType="tmRoot"/>
+      </p:par>
+    </p:tnLst>
+  </p:timing>
+</p:sld>
+</file>
+
+<file path=ppt/slides/slide6.xml><?xml version="1.0" encoding="utf-8"?>
+<p:sld xmlns:a="http://schemas.openxmlformats.org/drawingml/2006/main" xmlns:r="http://schemas.openxmlformats.org/officeDocument/2006/relationships" xmlns:p="http://schemas.openxmlformats.org/presentationml/2006/main">
+  <p:cSld>
+    <p:spTree>
+      <p:nvGrpSpPr>
+        <p:cNvPr id="1" name=""/>
+        <p:cNvGrpSpPr/>
+        <p:nvPr/>
+      </p:nvGrpSpPr>
+      <p:grpSpPr>
+        <a:xfrm>
+          <a:off x="0" y="0"/>
+          <a:ext cx="0" cy="0"/>
+          <a:chOff x="0" y="0"/>
+          <a:chExt cx="0" cy="0"/>
+        </a:xfrm>
+      </p:grpSpPr>
+      <p:sp>
+        <p:nvSpPr>
+          <p:cNvPr id="2" name="Title 1"/>
+          <p:cNvSpPr>
+            <a:spLocks noGrp="1"/>
+          </p:cNvSpPr>
+          <p:nvPr>
+            <p:ph type="title"/>
+            <p:custDataLst>
+              <p:tags r:id="rId2"/>
+            </p:custDataLst>
+          </p:nvPr>
+        </p:nvSpPr>
+        <p:spPr/>
+        <p:txBody>
+          <a:bodyPr>
+            <a:normAutofit/>
+          </a:bodyPr>
+          <a:lstStyle/>
+          <a:p>
+            <a:r>
+              <a:rPr lang="en-US" dirty="0" smtClean="0"/>
+              <a:t>Any UI component is described by</a:t>
+            </a:r>
+            <a:endParaRPr lang="en-US" dirty="0"/>
+          </a:p>
+        </p:txBody>
+      </p:sp>
+      <p:sp>
+        <p:nvSpPr>
+          <p:cNvPr id="5" name="Content Placeholder 4"/>
+          <p:cNvSpPr>
+            <a:spLocks noGrp="1"/>
+          </p:cNvSpPr>
+          <p:nvPr>
+            <p:ph idx="1"/>
+            <p:custDataLst>
+              <p:tags r:id="rId3"/>
+            </p:custDataLst>
+          </p:nvPr>
+        </p:nvSpPr>
+        <p:spPr/>
+        <p:txBody>
+          <a:bodyPr>
+            <a:normAutofit lnSpcReduction="10000"/>
+          </a:bodyPr>
+          <a:lstStyle/>
+          <a:p>
+            <a:r>
+              <a:rPr lang="en-US" dirty="0" smtClean="0"/>
+              <a:t>Semantic </a:t>
+            </a:r>
+            <a:r>
+              <a:rPr lang="en-US" dirty="0" smtClean="0"/>
+              <a:t>meaning of element</a:t>
+            </a:r>
+          </a:p>
+          <a:p>
+            <a:r>
+              <a:rPr lang="en-US" dirty="0" smtClean="0"/>
+              <a:t>State of element </a:t>
+            </a:r>
+            <a:r>
+              <a:rPr lang="en-US" dirty="0" smtClean="0"/>
+              <a:t>– that can change, dynamic aspect of element</a:t>
+            </a:r>
+          </a:p>
+          <a:p>
+            <a:r>
+              <a:rPr lang="en-US" dirty="0"/>
+              <a:t>Properties of element </a:t>
+            </a:r>
+            <a:r>
+              <a:rPr lang="en-US" dirty="0" smtClean="0"/>
+              <a:t>– static aspect of element</a:t>
+            </a:r>
+          </a:p>
+          <a:p>
+            <a:pPr marL="0" indent="0" algn="ctr">
+              <a:buNone/>
+            </a:pPr>
+            <a:r>
+              <a:rPr lang="en-US" dirty="0" smtClean="0"/>
+              <a:t>Need </a:t>
+            </a:r>
+            <a:r>
+              <a:rPr lang="en-US" dirty="0" smtClean="0"/>
+              <a:t>some way to make above </a:t>
+            </a:r>
+            <a:r>
+              <a:rPr lang="en-US" dirty="0" smtClean="0"/>
+              <a:t>information </a:t>
+            </a:r>
+            <a:r>
+              <a:rPr lang="en-US" dirty="0" smtClean="0"/>
+              <a:t>available to AT</a:t>
+            </a:r>
+          </a:p>
+          <a:p>
+            <a:pPr marL="0" indent="0" algn="ctr">
+              <a:buNone/>
+            </a:pPr>
+            <a:r>
+              <a:rPr lang="en-US" dirty="0" smtClean="0"/>
+              <a:t>Demo – Slider &amp; Tree</a:t>
+            </a:r>
+            <a:endParaRPr lang="en-US" dirty="0"/>
+          </a:p>
+        </p:txBody>
+      </p:sp>
+    </p:spTree>
+    <p:custDataLst>
+      <p:tags r:id="rId1"/>
+    </p:custDataLst>
+    <p:extLst>
+      <p:ext uri="{BB962C8B-B14F-4D97-AF65-F5344CB8AC3E}">
+        <p14:creationId xmlns:p14="http://schemas.microsoft.com/office/powerpoint/2010/main" val="1484162117"/>
+      </p:ext>
+    </p:extLst>
+  </p:cSld>
+  <p:clrMapOvr>
+    <a:masterClrMapping/>
+  </p:clrMapOvr>
+  <p:transition spd="slow">
+    <p:wipe dir="d"/>
+  </p:transition>
+  <p:timing>
+    <p:tnLst>
+      <p:par>
+        <p:cTn id="1" dur="indefinite" restart="never" nodeType="tmRoot"/>
+      </p:par>
+    </p:tnLst>
+  </p:timing>
+</p:sld>
+</file>
+
+<file path=ppt/slides/slide7.xml><?xml version="1.0" encoding="utf-8"?>
+<p:sld xmlns:a="http://schemas.openxmlformats.org/drawingml/2006/main" xmlns:r="http://schemas.openxmlformats.org/officeDocument/2006/relationships" xmlns:p="http://schemas.openxmlformats.org/presentationml/2006/main">
+  <p:cSld>
+    <p:spTree>
+      <p:nvGrpSpPr>
+        <p:cNvPr id="1" name=""/>
+        <p:cNvGrpSpPr/>
+        <p:nvPr/>
+      </p:nvGrpSpPr>
+      <p:grpSpPr>
+        <a:xfrm>
+          <a:off x="0" y="0"/>
+          <a:ext cx="0" cy="0"/>
+          <a:chOff x="0" y="0"/>
+          <a:chExt cx="0" cy="0"/>
+        </a:xfrm>
+      </p:grpSpPr>
+      <p:sp>
+        <p:nvSpPr>
+          <p:cNvPr id="2" name="Title 1"/>
+          <p:cNvSpPr>
+            <a:spLocks noGrp="1"/>
+          </p:cNvSpPr>
+          <p:nvPr>
+            <p:ph type="title"/>
+            <p:custDataLst>
+              <p:tags r:id="rId2"/>
+            </p:custDataLst>
+          </p:nvPr>
+        </p:nvSpPr>
+        <p:spPr/>
+        <p:txBody>
+          <a:bodyPr>
+            <a:normAutofit/>
+          </a:bodyPr>
+          <a:lstStyle/>
+          <a:p>
+            <a:r>
+              <a:rPr lang="en-US" dirty="0" smtClean="0"/>
+              <a:t>AJAX Controls</a:t>
+            </a:r>
+            <a:endParaRPr lang="en-US" dirty="0"/>
+          </a:p>
+        </p:txBody>
+      </p:sp>
+      <p:sp>
+        <p:nvSpPr>
+          <p:cNvPr id="5" name="Content Placeholder 4"/>
+          <p:cNvSpPr>
+            <a:spLocks noGrp="1"/>
+          </p:cNvSpPr>
+          <p:nvPr>
+            <p:ph idx="1"/>
+            <p:custDataLst>
+              <p:tags r:id="rId3"/>
+            </p:custDataLst>
+          </p:nvPr>
+        </p:nvSpPr>
+        <p:spPr/>
+        <p:txBody>
+          <a:bodyPr>
+            <a:normAutofit/>
+          </a:bodyPr>
+          <a:lstStyle/>
+          <a:p>
+            <a:r>
+              <a:rPr lang="en-US" dirty="0" smtClean="0"/>
+              <a:t>Auto Complete</a:t>
+            </a:r>
+          </a:p>
+          <a:p>
+            <a:r>
+              <a:rPr lang="en-US" dirty="0" smtClean="0"/>
+              <a:t>Updating Contents of HTML dynamically</a:t>
+            </a:r>
+          </a:p>
+          <a:p>
+            <a:r>
+              <a:rPr lang="en-US" dirty="0" smtClean="0"/>
+              <a:t>Demo</a:t>
+            </a:r>
+          </a:p>
+          <a:p>
+            <a:endParaRPr lang="en-US" dirty="0"/>
+          </a:p>
+        </p:txBody>
+      </p:sp>
+    </p:spTree>
+    <p:custDataLst>
+      <p:tags r:id="rId1"/>
+    </p:custDataLst>
+    <p:extLst>
+      <p:ext uri="{BB962C8B-B14F-4D97-AF65-F5344CB8AC3E}">
+        <p14:creationId xmlns:p14="http://schemas.microsoft.com/office/powerpoint/2010/main" val="2852440078"/>
+      </p:ext>
+    </p:extLst>
+  </p:cSld>
+  <p:clrMapOvr>
+    <a:masterClrMapping/>
+  </p:clrMapOvr>
+  <p:transition spd="slow">
+    <p:wipe dir="d"/>
+  </p:transition>
+  <p:timing>
+    <p:tnLst>
+      <p:par>
+        <p:cTn id="1" dur="indefinite" restart="never" nodeType="tmRoot"/>
+      </p:par>
+    </p:tnLst>
+  </p:timing>
+</p:sld>
+</file>
+
+<file path=ppt/slides/slide8.xml><?xml version="1.0" encoding="utf-8"?>
+<p:sld xmlns:a="http://schemas.openxmlformats.org/drawingml/2006/main" xmlns:r="http://schemas.openxmlformats.org/officeDocument/2006/relationships" xmlns:p="http://schemas.openxmlformats.org/presentationml/2006/main">
+  <p:cSld>
+    <p:spTree>
+      <p:nvGrpSpPr>
+        <p:cNvPr id="1" name=""/>
+        <p:cNvGrpSpPr/>
+        <p:nvPr/>
+      </p:nvGrpSpPr>
+      <p:grpSpPr>
+        <a:xfrm>
+          <a:off x="0" y="0"/>
+          <a:ext cx="0" cy="0"/>
+          <a:chOff x="0" y="0"/>
+          <a:chExt cx="0" cy="0"/>
+        </a:xfrm>
+      </p:grpSpPr>
+      <p:sp>
+        <p:nvSpPr>
           <p:cNvPr id="7" name="TextBox 6"/>
           <p:cNvSpPr txBox="1"/>
           <p:nvPr/>
@@ -9507,7 +11513,7 @@
             </a:r>
             <a:r>
               <a:rPr lang="en-US" sz="7200" dirty="0" smtClean="0"/>
-              <a:t>the </a:t>
+              <a:t>this </a:t>
             </a:r>
             <a:r>
               <a:rPr lang="en-US" sz="7200" dirty="0"/>
@@ -9515,7 +11521,7 @@
             </a:r>
             <a:r>
               <a:rPr lang="en-US" sz="7200" dirty="0" smtClean="0"/>
-              <a:t>gap with HTML 4</a:t>
+              <a:t>gap</a:t>
             </a:r>
             <a:endParaRPr lang="en-US" sz="7200" dirty="0"/>
           </a:p>
@@ -9574,7 +11580,7 @@
 </p:sld>
 </file>
 
-<file path=ppt/slides/slide6.xml><?xml version="1.0" encoding="utf-8"?>
+<file path=ppt/slides/slide9.xml><?xml version="1.0" encoding="utf-8"?>
 <p:sld xmlns:a="http://schemas.openxmlformats.org/drawingml/2006/main" xmlns:r="http://schemas.openxmlformats.org/officeDocument/2006/relationships" xmlns:p="http://schemas.openxmlformats.org/presentationml/2006/main">
   <p:cSld>
     <p:spTree>
@@ -9607,77 +11613,54 @@
         <p:spPr/>
         <p:txBody>
           <a:bodyPr>
-            <a:normAutofit fontScale="90000"/>
-          </a:bodyPr>
-          <a:lstStyle/>
-          <a:p>
-            <a:r>
-              <a:rPr lang="en-US" dirty="0" smtClean="0"/>
-              <a:t>ARIA Introduction – JS Components</a:t>
-            </a:r>
-            <a:endParaRPr lang="en-US" dirty="0"/>
-          </a:p>
-        </p:txBody>
-      </p:sp>
-      <p:sp>
-        <p:nvSpPr>
-          <p:cNvPr id="5" name="Content Placeholder 4"/>
-          <p:cNvSpPr>
-            <a:spLocks noGrp="1"/>
-          </p:cNvSpPr>
-          <p:nvPr>
-            <p:ph idx="1"/>
-            <p:custDataLst>
-              <p:tags r:id="rId3"/>
-            </p:custDataLst>
-          </p:nvPr>
-        </p:nvSpPr>
-        <p:spPr/>
-        <p:txBody>
-          <a:bodyPr>
             <a:normAutofit/>
           </a:bodyPr>
           <a:lstStyle/>
           <a:p>
             <a:r>
-              <a:rPr lang="en-US" dirty="0"/>
-              <a:t>HTML </a:t>
-            </a:r>
-            <a:r>
-              <a:rPr lang="en-US" dirty="0" smtClean="0"/>
-              <a:t>was not designed for creating web application.</a:t>
-            </a:r>
-            <a:endParaRPr lang="en-US" dirty="0" smtClean="0"/>
-          </a:p>
-          <a:p>
-            <a:r>
-              <a:rPr lang="en-US" dirty="0" smtClean="0"/>
-              <a:t>It had limited set of controls</a:t>
+              <a:rPr lang="en-US" dirty="0" smtClean="0"/>
+              <a:t>ARIA Architecture</a:t>
             </a:r>
             <a:endParaRPr lang="en-US" dirty="0"/>
           </a:p>
-          <a:p>
-            <a:r>
-              <a:rPr lang="en-US" dirty="0" smtClean="0"/>
-              <a:t>Web developer gotten around these limitation by creating their own components.</a:t>
-            </a:r>
-          </a:p>
-          <a:p>
-            <a:r>
-              <a:rPr lang="en-US" dirty="0" smtClean="0"/>
-              <a:t>But there was no standard way to make these components accessible</a:t>
-            </a:r>
-            <a:endParaRPr lang="en-US" dirty="0" smtClean="0"/>
-          </a:p>
-        </p:txBody>
-      </p:sp>
+        </p:txBody>
+      </p:sp>
+      <p:pic>
+        <p:nvPicPr>
+          <p:cNvPr id="7" name="Content Placeholder 6"/>
+          <p:cNvPicPr>
+            <a:picLocks noGrp="1" noChangeAspect="1"/>
+          </p:cNvPicPr>
+          <p:nvPr>
+            <p:ph idx="1"/>
+          </p:nvPr>
+        </p:nvPicPr>
+        <p:blipFill>
+          <a:blip r:embed="rId5">
+            <a:extLst>
+              <a:ext uri="{28A0092B-C50C-407E-A947-70E740481C1C}">
+                <a14:useLocalDpi xmlns:a14="http://schemas.microsoft.com/office/drawing/2010/main" val="0"/>
+              </a:ext>
+            </a:extLst>
+          </a:blip>
+          <a:stretch>
+            <a:fillRect/>
+          </a:stretch>
+        </p:blipFill>
+        <p:spPr>
+          <a:xfrm>
+            <a:off x="3810000" y="1143000"/>
+            <a:ext cx="2743200" cy="5571242"/>
+          </a:xfrm>
+        </p:spPr>
+      </p:pic>
     </p:spTree>
     <p:custDataLst>
       <p:tags r:id="rId1"/>
     </p:custDataLst>
     <p:extLst>
       <p:ext uri="{BB962C8B-B14F-4D97-AF65-F5344CB8AC3E}">
-        <p14:creationId xmlns:p14="http://schemas.microsoft.com/office/powerpoint/2010/main" val="2116277925"/>
+        <p14:creationId xmlns:p14="http://schemas.microsoft.com/office/powerpoint/2010/main" val="3138792830"/>
       </p:ext>
     </p:extLst>
   </p:cSld>
@@ -9697,412 +11680,6 @@
 </p:sld>
 </file>
 
-<file path=ppt/slides/slide7.xml><?xml version="1.0" encoding="utf-8"?>
-<p:sld xmlns:a="http://schemas.openxmlformats.org/drawingml/2006/main" xmlns:r="http://schemas.openxmlformats.org/officeDocument/2006/relationships" xmlns:p="http://schemas.openxmlformats.org/presentationml/2006/main">
-  <p:cSld>
-    <p:spTree>
-      <p:nvGrpSpPr>
-        <p:cNvPr id="1" name=""/>
-        <p:cNvGrpSpPr/>
-        <p:nvPr/>
-      </p:nvGrpSpPr>
-      <p:grpSpPr>
-        <a:xfrm>
-          <a:off x="0" y="0"/>
-          <a:ext cx="0" cy="0"/>
-          <a:chOff x="0" y="0"/>
-          <a:chExt cx="0" cy="0"/>
-        </a:xfrm>
-      </p:grpSpPr>
-      <p:sp>
-        <p:nvSpPr>
-          <p:cNvPr id="2" name="Title 1"/>
-          <p:cNvSpPr>
-            <a:spLocks noGrp="1"/>
-          </p:cNvSpPr>
-          <p:nvPr>
-            <p:ph type="title"/>
-            <p:custDataLst>
-              <p:tags r:id="rId2"/>
-            </p:custDataLst>
-          </p:nvPr>
-        </p:nvSpPr>
-        <p:spPr/>
-        <p:txBody>
-          <a:bodyPr>
-            <a:normAutofit/>
-          </a:bodyPr>
-          <a:lstStyle/>
-          <a:p>
-            <a:r>
-              <a:rPr lang="en-US" dirty="0" smtClean="0"/>
-              <a:t>UI elements - attributes</a:t>
-            </a:r>
-            <a:endParaRPr lang="en-US" dirty="0"/>
-          </a:p>
-        </p:txBody>
-      </p:sp>
-      <p:sp>
-        <p:nvSpPr>
-          <p:cNvPr id="5" name="Content Placeholder 4"/>
-          <p:cNvSpPr>
-            <a:spLocks noGrp="1"/>
-          </p:cNvSpPr>
-          <p:nvPr>
-            <p:ph idx="1"/>
-            <p:custDataLst>
-              <p:tags r:id="rId3"/>
-            </p:custDataLst>
-          </p:nvPr>
-        </p:nvSpPr>
-        <p:spPr/>
-        <p:txBody>
-          <a:bodyPr>
-            <a:normAutofit lnSpcReduction="10000"/>
-          </a:bodyPr>
-          <a:lstStyle/>
-          <a:p>
-            <a:r>
-              <a:rPr lang="en-US" dirty="0" smtClean="0"/>
-              <a:t>Function or semantic meaning of element</a:t>
-            </a:r>
-          </a:p>
-          <a:p>
-            <a:r>
-              <a:rPr lang="en-US" dirty="0" smtClean="0"/>
-              <a:t>State – that can change, dynamic aspect of element</a:t>
-            </a:r>
-          </a:p>
-          <a:p>
-            <a:r>
-              <a:rPr lang="en-US" dirty="0" smtClean="0"/>
-              <a:t>Properties – static aspect of element</a:t>
-            </a:r>
-          </a:p>
-          <a:p>
-            <a:endParaRPr lang="en-US" dirty="0" smtClean="0"/>
-          </a:p>
-          <a:p>
-            <a:pPr marL="0" indent="0" algn="ctr">
-              <a:buNone/>
-            </a:pPr>
-            <a:r>
-              <a:rPr lang="en-US" dirty="0" smtClean="0"/>
-              <a:t>Need some way to make above attributes available to AT</a:t>
-            </a:r>
-          </a:p>
-          <a:p>
-            <a:pPr marL="0" indent="0" algn="ctr">
-              <a:buNone/>
-            </a:pPr>
-            <a:r>
-              <a:rPr lang="en-US" dirty="0" smtClean="0"/>
-              <a:t>Demo – Slider &amp; Tree</a:t>
-            </a:r>
-            <a:endParaRPr lang="en-US" dirty="0"/>
-          </a:p>
-        </p:txBody>
-      </p:sp>
-    </p:spTree>
-    <p:custDataLst>
-      <p:tags r:id="rId1"/>
-    </p:custDataLst>
-    <p:extLst>
-      <p:ext uri="{BB962C8B-B14F-4D97-AF65-F5344CB8AC3E}">
-        <p14:creationId xmlns:p14="http://schemas.microsoft.com/office/powerpoint/2010/main" val="1215114749"/>
-      </p:ext>
-    </p:extLst>
-  </p:cSld>
-  <p:clrMapOvr>
-    <a:masterClrMapping/>
-  </p:clrMapOvr>
-  <p:transition spd="slow">
-    <p:wipe dir="d"/>
-  </p:transition>
-  <p:timing>
-    <p:tnLst>
-      <p:par>
-        <p:cTn id="1" dur="indefinite" restart="never" nodeType="tmRoot"/>
-      </p:par>
-    </p:tnLst>
-  </p:timing>
-</p:sld>
-</file>
-
-<file path=ppt/slides/slide8.xml><?xml version="1.0" encoding="utf-8"?>
-<p:sld xmlns:a="http://schemas.openxmlformats.org/drawingml/2006/main" xmlns:r="http://schemas.openxmlformats.org/officeDocument/2006/relationships" xmlns:p="http://schemas.openxmlformats.org/presentationml/2006/main">
-  <p:cSld>
-    <p:spTree>
-      <p:nvGrpSpPr>
-        <p:cNvPr id="1" name=""/>
-        <p:cNvGrpSpPr/>
-        <p:nvPr/>
-      </p:nvGrpSpPr>
-      <p:grpSpPr>
-        <a:xfrm>
-          <a:off x="0" y="0"/>
-          <a:ext cx="0" cy="0"/>
-          <a:chOff x="0" y="0"/>
-          <a:chExt cx="0" cy="0"/>
-        </a:xfrm>
-      </p:grpSpPr>
-      <p:sp>
-        <p:nvSpPr>
-          <p:cNvPr id="2" name="Title 1"/>
-          <p:cNvSpPr>
-            <a:spLocks noGrp="1"/>
-          </p:cNvSpPr>
-          <p:nvPr>
-            <p:ph type="title"/>
-            <p:custDataLst>
-              <p:tags r:id="rId2"/>
-            </p:custDataLst>
-          </p:nvPr>
-        </p:nvSpPr>
-        <p:spPr/>
-        <p:txBody>
-          <a:bodyPr>
-            <a:normAutofit fontScale="90000"/>
-          </a:bodyPr>
-          <a:lstStyle/>
-          <a:p>
-            <a:r>
-              <a:rPr lang="en-US" dirty="0" smtClean="0"/>
-              <a:t>ARIA Introduction – Example Controls</a:t>
-            </a:r>
-            <a:endParaRPr lang="en-US" dirty="0"/>
-          </a:p>
-        </p:txBody>
-      </p:sp>
-      <p:sp>
-        <p:nvSpPr>
-          <p:cNvPr id="5" name="Content Placeholder 4"/>
-          <p:cNvSpPr>
-            <a:spLocks noGrp="1"/>
-          </p:cNvSpPr>
-          <p:nvPr>
-            <p:ph idx="1"/>
-            <p:custDataLst>
-              <p:tags r:id="rId3"/>
-            </p:custDataLst>
-          </p:nvPr>
-        </p:nvSpPr>
-        <p:spPr/>
-        <p:txBody>
-          <a:bodyPr>
-            <a:normAutofit fontScale="92500" lnSpcReduction="10000"/>
-          </a:bodyPr>
-          <a:lstStyle/>
-          <a:p>
-            <a:r>
-              <a:rPr lang="en-US" dirty="0" smtClean="0"/>
-              <a:t>Slider </a:t>
-            </a:r>
-            <a:r>
-              <a:rPr lang="en-US" dirty="0"/>
-              <a:t>is neither perceivable nor operable</a:t>
-            </a:r>
-          </a:p>
-          <a:p>
-            <a:r>
-              <a:rPr lang="en-US" dirty="0" smtClean="0"/>
-              <a:t>User interface element have three important attributes – Slider Demo</a:t>
-            </a:r>
-          </a:p>
-          <a:p>
-            <a:pPr lvl="1"/>
-            <a:r>
-              <a:rPr lang="en-US" dirty="0" smtClean="0"/>
-              <a:t>Role </a:t>
-            </a:r>
-            <a:r>
-              <a:rPr lang="en-US" dirty="0"/>
-              <a:t>- indicate the type of element in a meaningful way</a:t>
-            </a:r>
-            <a:endParaRPr lang="en-US" dirty="0" smtClean="0"/>
-          </a:p>
-          <a:p>
-            <a:pPr lvl="1"/>
-            <a:r>
-              <a:rPr lang="en-US" dirty="0" smtClean="0"/>
-              <a:t>State</a:t>
-            </a:r>
-          </a:p>
-          <a:p>
-            <a:pPr lvl="1"/>
-            <a:r>
-              <a:rPr lang="en-US" dirty="0" smtClean="0"/>
-              <a:t>Properties</a:t>
-            </a:r>
-          </a:p>
-          <a:p>
-            <a:r>
-              <a:rPr lang="en-US" dirty="0" smtClean="0"/>
-              <a:t>ARIA bridge this semantic gap</a:t>
-            </a:r>
-          </a:p>
-          <a:p>
-            <a:r>
-              <a:rPr lang="en-US" dirty="0" smtClean="0"/>
-              <a:t>Tree Demo</a:t>
-            </a:r>
-            <a:endParaRPr lang="en-US" dirty="0"/>
-          </a:p>
-        </p:txBody>
-      </p:sp>
-    </p:spTree>
-    <p:custDataLst>
-      <p:tags r:id="rId1"/>
-    </p:custDataLst>
-    <p:extLst>
-      <p:ext uri="{BB962C8B-B14F-4D97-AF65-F5344CB8AC3E}">
-        <p14:creationId xmlns:p14="http://schemas.microsoft.com/office/powerpoint/2010/main" val="2153637570"/>
-      </p:ext>
-    </p:extLst>
-  </p:cSld>
-  <p:clrMapOvr>
-    <a:masterClrMapping/>
-  </p:clrMapOvr>
-  <p:transition spd="slow">
-    <p:wipe dir="d"/>
-  </p:transition>
-  <p:timing>
-    <p:tnLst>
-      <p:par>
-        <p:cTn id="1" dur="indefinite" restart="never" nodeType="tmRoot"/>
-      </p:par>
-    </p:tnLst>
-  </p:timing>
-</p:sld>
-</file>
-
-<file path=ppt/slides/slide9.xml><?xml version="1.0" encoding="utf-8"?>
-<p:sld xmlns:a="http://schemas.openxmlformats.org/drawingml/2006/main" xmlns:r="http://schemas.openxmlformats.org/officeDocument/2006/relationships" xmlns:p="http://schemas.openxmlformats.org/presentationml/2006/main">
-  <p:cSld>
-    <p:spTree>
-      <p:nvGrpSpPr>
-        <p:cNvPr id="1" name=""/>
-        <p:cNvGrpSpPr/>
-        <p:nvPr/>
-      </p:nvGrpSpPr>
-      <p:grpSpPr>
-        <a:xfrm>
-          <a:off x="0" y="0"/>
-          <a:ext cx="0" cy="0"/>
-          <a:chOff x="0" y="0"/>
-          <a:chExt cx="0" cy="0"/>
-        </a:xfrm>
-      </p:grpSpPr>
-      <p:sp>
-        <p:nvSpPr>
-          <p:cNvPr id="2" name="Title 1"/>
-          <p:cNvSpPr>
-            <a:spLocks noGrp="1"/>
-          </p:cNvSpPr>
-          <p:nvPr>
-            <p:ph type="title"/>
-            <p:custDataLst>
-              <p:tags r:id="rId2"/>
-            </p:custDataLst>
-          </p:nvPr>
-        </p:nvSpPr>
-        <p:spPr/>
-        <p:txBody>
-          <a:bodyPr>
-            <a:normAutofit/>
-          </a:bodyPr>
-          <a:lstStyle/>
-          <a:p>
-            <a:r>
-              <a:rPr lang="en-US" dirty="0" smtClean="0"/>
-              <a:t>Re Introducing Browser</a:t>
-            </a:r>
-            <a:endParaRPr lang="en-US" dirty="0"/>
-          </a:p>
-        </p:txBody>
-      </p:sp>
-      <p:sp>
-        <p:nvSpPr>
-          <p:cNvPr id="5" name="Content Placeholder 4"/>
-          <p:cNvSpPr>
-            <a:spLocks noGrp="1"/>
-          </p:cNvSpPr>
-          <p:nvPr>
-            <p:ph idx="1"/>
-            <p:custDataLst>
-              <p:tags r:id="rId3"/>
-            </p:custDataLst>
-          </p:nvPr>
-        </p:nvSpPr>
-        <p:spPr/>
-        <p:txBody>
-          <a:bodyPr>
-            <a:normAutofit fontScale="92500" lnSpcReduction="10000"/>
-          </a:bodyPr>
-          <a:lstStyle/>
-          <a:p>
-            <a:r>
-              <a:rPr lang="en-US" dirty="0"/>
-              <a:t>HTML has grown from ‘just’ markup </a:t>
-            </a:r>
-            <a:r>
-              <a:rPr lang="en-US" dirty="0" smtClean="0"/>
-              <a:t>language to a whole new Infrastructure.</a:t>
-            </a:r>
-          </a:p>
-          <a:p>
-            <a:r>
-              <a:rPr lang="en-US" dirty="0" smtClean="0"/>
-              <a:t>Browser is Platform</a:t>
-            </a:r>
-            <a:endParaRPr lang="en-US" dirty="0"/>
-          </a:p>
-          <a:p>
-            <a:r>
-              <a:rPr lang="en-US" dirty="0" smtClean="0"/>
-              <a:t>With HTML 5, CSS3 and Java Script now you write desktop equivalent applications</a:t>
-            </a:r>
-          </a:p>
-          <a:p>
-            <a:r>
-              <a:rPr lang="en-US" dirty="0" smtClean="0"/>
-              <a:t>You can debug java script, perform logging etc.</a:t>
-            </a:r>
-          </a:p>
-          <a:p>
-            <a:r>
-              <a:rPr lang="en-US" dirty="0" smtClean="0"/>
-              <a:t>Browse ecosystem is also matured with frameworks like Angular, Backbone, knockout etc.</a:t>
-            </a:r>
-          </a:p>
-        </p:txBody>
-      </p:sp>
-    </p:spTree>
-    <p:custDataLst>
-      <p:tags r:id="rId1"/>
-    </p:custDataLst>
-    <p:extLst>
-      <p:ext uri="{BB962C8B-B14F-4D97-AF65-F5344CB8AC3E}">
-        <p14:creationId xmlns:p14="http://schemas.microsoft.com/office/powerpoint/2010/main" val="964538590"/>
-      </p:ext>
-    </p:extLst>
-  </p:cSld>
-  <p:clrMapOvr>
-    <a:masterClrMapping/>
-  </p:clrMapOvr>
-  <p:transition spd="slow">
-    <p:wipe dir="d"/>
-  </p:transition>
-  <p:timing>
-    <p:tnLst>
-      <p:par>
-        <p:cTn id="1" dur="indefinite" restart="never" nodeType="tmRoot"/>
-      </p:par>
-    </p:tnLst>
-  </p:timing>
-</p:sld>
-</file>
-
 <file path=ppt/tags/tag1.xml><?xml version="1.0" encoding="utf-8"?>
 <p:tagLst xmlns:a="http://schemas.openxmlformats.org/drawingml/2006/main" xmlns:r="http://schemas.openxmlformats.org/officeDocument/2006/relationships" xmlns:p="http://schemas.openxmlformats.org/presentationml/2006/main">
   <p:tag name="DVSECTIONID" val="yI2DOt6RzRcU51QxdhNewL"/>
@@ -10159,13 +11736,13 @@
 
 <file path=ppt/tags/tag18.xml><?xml version="1.0" encoding="utf-8"?>
 <p:tagLst xmlns:a="http://schemas.openxmlformats.org/drawingml/2006/main" xmlns:r="http://schemas.openxmlformats.org/officeDocument/2006/relationships" xmlns:p="http://schemas.openxmlformats.org/presentationml/2006/main">
-  <p:tag name="DVSHAPEID" val="retnMj4SFfqbVIhVK0Rf83"/>
+  <p:tag name="DVSECTIONID" val="QUq8QELArFIgadhH063fpq"/>
 </p:tagLst>
 </file>
 
 <file path=ppt/tags/tag19.xml><?xml version="1.0" encoding="utf-8"?>
 <p:tagLst xmlns:a="http://schemas.openxmlformats.org/drawingml/2006/main" xmlns:r="http://schemas.openxmlformats.org/officeDocument/2006/relationships" xmlns:p="http://schemas.openxmlformats.org/presentationml/2006/main">
-  <p:tag name="DVSECTIONID" val="QUq8QELArFIgadhH063fpq"/>
+  <p:tag name="DVSHAPEID" val="InkrlxYPS4jAzciXk8ToAM"/>
 </p:tagLst>
 </file>
 
@@ -10177,61 +11754,61 @@
 
 <file path=ppt/tags/tag20.xml><?xml version="1.0" encoding="utf-8"?>
 <p:tagLst xmlns:a="http://schemas.openxmlformats.org/drawingml/2006/main" xmlns:r="http://schemas.openxmlformats.org/officeDocument/2006/relationships" xmlns:p="http://schemas.openxmlformats.org/presentationml/2006/main">
+  <p:tag name="DVSHAPEID" val="retnMj4SFfqbVIhVK0Rf83"/>
+</p:tagLst>
+</file>
+
+<file path=ppt/tags/tag21.xml><?xml version="1.0" encoding="utf-8"?>
+<p:tagLst xmlns:a="http://schemas.openxmlformats.org/drawingml/2006/main" xmlns:r="http://schemas.openxmlformats.org/officeDocument/2006/relationships" xmlns:p="http://schemas.openxmlformats.org/presentationml/2006/main">
+  <p:tag name="DVSECTIONID" val="QUq8QELArFIgadhH063fpq"/>
+</p:tagLst>
+</file>
+
+<file path=ppt/tags/tag22.xml><?xml version="1.0" encoding="utf-8"?>
+<p:tagLst xmlns:a="http://schemas.openxmlformats.org/drawingml/2006/main" xmlns:r="http://schemas.openxmlformats.org/officeDocument/2006/relationships" xmlns:p="http://schemas.openxmlformats.org/presentationml/2006/main">
   <p:tag name="DVSHAPEID" val="InkrlxYPS4jAzciXk8ToAM"/>
 </p:tagLst>
 </file>
 
-<file path=ppt/tags/tag21.xml><?xml version="1.0" encoding="utf-8"?>
+<file path=ppt/tags/tag23.xml><?xml version="1.0" encoding="utf-8"?>
 <p:tagLst xmlns:a="http://schemas.openxmlformats.org/drawingml/2006/main" xmlns:r="http://schemas.openxmlformats.org/officeDocument/2006/relationships" xmlns:p="http://schemas.openxmlformats.org/presentationml/2006/main">
   <p:tag name="DVSHAPEID" val="retnMj4SFfqbVIhVK0Rf83"/>
 </p:tagLst>
 </file>
 
-<file path=ppt/tags/tag22.xml><?xml version="1.0" encoding="utf-8"?>
+<file path=ppt/tags/tag24.xml><?xml version="1.0" encoding="utf-8"?>
 <p:tagLst xmlns:a="http://schemas.openxmlformats.org/drawingml/2006/main" xmlns:r="http://schemas.openxmlformats.org/officeDocument/2006/relationships" xmlns:p="http://schemas.openxmlformats.org/presentationml/2006/main">
   <p:tag name="DVSECTIONID" val="QUq8QELArFIgadhH063fpq"/>
 </p:tagLst>
 </file>
 
-<file path=ppt/tags/tag23.xml><?xml version="1.0" encoding="utf-8"?>
+<file path=ppt/tags/tag25.xml><?xml version="1.0" encoding="utf-8"?>
 <p:tagLst xmlns:a="http://schemas.openxmlformats.org/drawingml/2006/main" xmlns:r="http://schemas.openxmlformats.org/officeDocument/2006/relationships" xmlns:p="http://schemas.openxmlformats.org/presentationml/2006/main">
   <p:tag name="DVSHAPEID" val="InkrlxYPS4jAzciXk8ToAM"/>
 </p:tagLst>
 </file>
 
-<file path=ppt/tags/tag24.xml><?xml version="1.0" encoding="utf-8"?>
+<file path=ppt/tags/tag26.xml><?xml version="1.0" encoding="utf-8"?>
 <p:tagLst xmlns:a="http://schemas.openxmlformats.org/drawingml/2006/main" xmlns:r="http://schemas.openxmlformats.org/officeDocument/2006/relationships" xmlns:p="http://schemas.openxmlformats.org/presentationml/2006/main">
   <p:tag name="DVSHAPEID" val="retnMj4SFfqbVIhVK0Rf83"/>
 </p:tagLst>
 </file>
 
-<file path=ppt/tags/tag25.xml><?xml version="1.0" encoding="utf-8"?>
+<file path=ppt/tags/tag27.xml><?xml version="1.0" encoding="utf-8"?>
 <p:tagLst xmlns:a="http://schemas.openxmlformats.org/drawingml/2006/main" xmlns:r="http://schemas.openxmlformats.org/officeDocument/2006/relationships" xmlns:p="http://schemas.openxmlformats.org/presentationml/2006/main">
   <p:tag name="DVSECTIONID" val="QUq8QELArFIgadhH063fpq"/>
 </p:tagLst>
 </file>
 
-<file path=ppt/tags/tag26.xml><?xml version="1.0" encoding="utf-8"?>
+<file path=ppt/tags/tag28.xml><?xml version="1.0" encoding="utf-8"?>
 <p:tagLst xmlns:a="http://schemas.openxmlformats.org/drawingml/2006/main" xmlns:r="http://schemas.openxmlformats.org/officeDocument/2006/relationships" xmlns:p="http://schemas.openxmlformats.org/presentationml/2006/main">
   <p:tag name="DVSHAPEID" val="InkrlxYPS4jAzciXk8ToAM"/>
 </p:tagLst>
 </file>
 
-<file path=ppt/tags/tag27.xml><?xml version="1.0" encoding="utf-8"?>
+<file path=ppt/tags/tag29.xml><?xml version="1.0" encoding="utf-8"?>
 <p:tagLst xmlns:a="http://schemas.openxmlformats.org/drawingml/2006/main" xmlns:r="http://schemas.openxmlformats.org/officeDocument/2006/relationships" xmlns:p="http://schemas.openxmlformats.org/presentationml/2006/main">
   <p:tag name="DVSHAPEID" val="retnMj4SFfqbVIhVK0Rf83"/>
-</p:tagLst>
-</file>
-
-<file path=ppt/tags/tag28.xml><?xml version="1.0" encoding="utf-8"?>
-<p:tagLst xmlns:a="http://schemas.openxmlformats.org/drawingml/2006/main" xmlns:r="http://schemas.openxmlformats.org/officeDocument/2006/relationships" xmlns:p="http://schemas.openxmlformats.org/presentationml/2006/main">
-  <p:tag name="DVSECTIONID" val="QUq8QELArFIgadhH063fpq"/>
-</p:tagLst>
-</file>
-
-<file path=ppt/tags/tag29.xml><?xml version="1.0" encoding="utf-8"?>
-<p:tagLst xmlns:a="http://schemas.openxmlformats.org/drawingml/2006/main" xmlns:r="http://schemas.openxmlformats.org/officeDocument/2006/relationships" xmlns:p="http://schemas.openxmlformats.org/presentationml/2006/main">
-  <p:tag name="DVSHAPEID" val="InkrlxYPS4jAzciXk8ToAM"/>
 </p:tagLst>
 </file>
 
@@ -10243,61 +11820,61 @@
 
 <file path=ppt/tags/tag30.xml><?xml version="1.0" encoding="utf-8"?>
 <p:tagLst xmlns:a="http://schemas.openxmlformats.org/drawingml/2006/main" xmlns:r="http://schemas.openxmlformats.org/officeDocument/2006/relationships" xmlns:p="http://schemas.openxmlformats.org/presentationml/2006/main">
+  <p:tag name="DVSECTIONID" val="QUq8QELArFIgadhH063fpq"/>
+</p:tagLst>
+</file>
+
+<file path=ppt/tags/tag31.xml><?xml version="1.0" encoding="utf-8"?>
+<p:tagLst xmlns:a="http://schemas.openxmlformats.org/drawingml/2006/main" xmlns:r="http://schemas.openxmlformats.org/officeDocument/2006/relationships" xmlns:p="http://schemas.openxmlformats.org/presentationml/2006/main">
+  <p:tag name="DVSHAPEID" val="InkrlxYPS4jAzciXk8ToAM"/>
+</p:tagLst>
+</file>
+
+<file path=ppt/tags/tag32.xml><?xml version="1.0" encoding="utf-8"?>
+<p:tagLst xmlns:a="http://schemas.openxmlformats.org/drawingml/2006/main" xmlns:r="http://schemas.openxmlformats.org/officeDocument/2006/relationships" xmlns:p="http://schemas.openxmlformats.org/presentationml/2006/main">
   <p:tag name="DVSHAPEID" val="retnMj4SFfqbVIhVK0Rf83"/>
 </p:tagLst>
 </file>
 
-<file path=ppt/tags/tag31.xml><?xml version="1.0" encoding="utf-8"?>
+<file path=ppt/tags/tag33.xml><?xml version="1.0" encoding="utf-8"?>
 <p:tagLst xmlns:a="http://schemas.openxmlformats.org/drawingml/2006/main" xmlns:r="http://schemas.openxmlformats.org/officeDocument/2006/relationships" xmlns:p="http://schemas.openxmlformats.org/presentationml/2006/main">
   <p:tag name="DVSECTIONID" val="QUq8QELArFIgadhH063fpq"/>
 </p:tagLst>
 </file>
 
-<file path=ppt/tags/tag32.xml><?xml version="1.0" encoding="utf-8"?>
+<file path=ppt/tags/tag34.xml><?xml version="1.0" encoding="utf-8"?>
 <p:tagLst xmlns:a="http://schemas.openxmlformats.org/drawingml/2006/main" xmlns:r="http://schemas.openxmlformats.org/officeDocument/2006/relationships" xmlns:p="http://schemas.openxmlformats.org/presentationml/2006/main">
   <p:tag name="DVSHAPEID" val="InkrlxYPS4jAzciXk8ToAM"/>
 </p:tagLst>
 </file>
 
-<file path=ppt/tags/tag33.xml><?xml version="1.0" encoding="utf-8"?>
+<file path=ppt/tags/tag35.xml><?xml version="1.0" encoding="utf-8"?>
 <p:tagLst xmlns:a="http://schemas.openxmlformats.org/drawingml/2006/main" xmlns:r="http://schemas.openxmlformats.org/officeDocument/2006/relationships" xmlns:p="http://schemas.openxmlformats.org/presentationml/2006/main">
   <p:tag name="DVSHAPEID" val="retnMj4SFfqbVIhVK0Rf83"/>
 </p:tagLst>
 </file>
 
-<file path=ppt/tags/tag34.xml><?xml version="1.0" encoding="utf-8"?>
+<file path=ppt/tags/tag36.xml><?xml version="1.0" encoding="utf-8"?>
 <p:tagLst xmlns:a="http://schemas.openxmlformats.org/drawingml/2006/main" xmlns:r="http://schemas.openxmlformats.org/officeDocument/2006/relationships" xmlns:p="http://schemas.openxmlformats.org/presentationml/2006/main">
   <p:tag name="DVSECTIONID" val="QUq8QELArFIgadhH063fpq"/>
 </p:tagLst>
 </file>
 
-<file path=ppt/tags/tag35.xml><?xml version="1.0" encoding="utf-8"?>
+<file path=ppt/tags/tag37.xml><?xml version="1.0" encoding="utf-8"?>
 <p:tagLst xmlns:a="http://schemas.openxmlformats.org/drawingml/2006/main" xmlns:r="http://schemas.openxmlformats.org/officeDocument/2006/relationships" xmlns:p="http://schemas.openxmlformats.org/presentationml/2006/main">
   <p:tag name="DVSHAPEID" val="InkrlxYPS4jAzciXk8ToAM"/>
 </p:tagLst>
 </file>
 
-<file path=ppt/tags/tag36.xml><?xml version="1.0" encoding="utf-8"?>
+<file path=ppt/tags/tag38.xml><?xml version="1.0" encoding="utf-8"?>
 <p:tagLst xmlns:a="http://schemas.openxmlformats.org/drawingml/2006/main" xmlns:r="http://schemas.openxmlformats.org/officeDocument/2006/relationships" xmlns:p="http://schemas.openxmlformats.org/presentationml/2006/main">
   <p:tag name="DVSHAPEID" val="retnMj4SFfqbVIhVK0Rf83"/>
 </p:tagLst>
 </file>
 
-<file path=ppt/tags/tag37.xml><?xml version="1.0" encoding="utf-8"?>
+<file path=ppt/tags/tag39.xml><?xml version="1.0" encoding="utf-8"?>
 <p:tagLst xmlns:a="http://schemas.openxmlformats.org/drawingml/2006/main" xmlns:r="http://schemas.openxmlformats.org/officeDocument/2006/relationships" xmlns:p="http://schemas.openxmlformats.org/presentationml/2006/main">
   <p:tag name="DVSECTIONID" val="QUq8QELArFIgadhH063fpq"/>
-</p:tagLst>
-</file>
-
-<file path=ppt/tags/tag38.xml><?xml version="1.0" encoding="utf-8"?>
-<p:tagLst xmlns:a="http://schemas.openxmlformats.org/drawingml/2006/main" xmlns:r="http://schemas.openxmlformats.org/officeDocument/2006/relationships" xmlns:p="http://schemas.openxmlformats.org/presentationml/2006/main">
-  <p:tag name="DVSHAPEID" val="InkrlxYPS4jAzciXk8ToAM"/>
-</p:tagLst>
-</file>
-
-<file path=ppt/tags/tag39.xml><?xml version="1.0" encoding="utf-8"?>
-<p:tagLst xmlns:a="http://schemas.openxmlformats.org/drawingml/2006/main" xmlns:r="http://schemas.openxmlformats.org/officeDocument/2006/relationships" xmlns:p="http://schemas.openxmlformats.org/presentationml/2006/main">
-  <p:tag name="DVSHAPEID" val="retnMj4SFfqbVIhVK0Rf83"/>
 </p:tagLst>
 </file>
 
@@ -10309,61 +11886,61 @@
 
 <file path=ppt/tags/tag40.xml><?xml version="1.0" encoding="utf-8"?>
 <p:tagLst xmlns:a="http://schemas.openxmlformats.org/drawingml/2006/main" xmlns:r="http://schemas.openxmlformats.org/officeDocument/2006/relationships" xmlns:p="http://schemas.openxmlformats.org/presentationml/2006/main">
+  <p:tag name="DVSHAPEID" val="InkrlxYPS4jAzciXk8ToAM"/>
+</p:tagLst>
+</file>
+
+<file path=ppt/tags/tag41.xml><?xml version="1.0" encoding="utf-8"?>
+<p:tagLst xmlns:a="http://schemas.openxmlformats.org/drawingml/2006/main" xmlns:r="http://schemas.openxmlformats.org/officeDocument/2006/relationships" xmlns:p="http://schemas.openxmlformats.org/presentationml/2006/main">
+  <p:tag name="DVSHAPEID" val="retnMj4SFfqbVIhVK0Rf83"/>
+</p:tagLst>
+</file>
+
+<file path=ppt/tags/tag42.xml><?xml version="1.0" encoding="utf-8"?>
+<p:tagLst xmlns:a="http://schemas.openxmlformats.org/drawingml/2006/main" xmlns:r="http://schemas.openxmlformats.org/officeDocument/2006/relationships" xmlns:p="http://schemas.openxmlformats.org/presentationml/2006/main">
   <p:tag name="DVSECTIONID" val="QUq8QELArFIgadhH063fpq"/>
 </p:tagLst>
 </file>
 
-<file path=ppt/tags/tag41.xml><?xml version="1.0" encoding="utf-8"?>
+<file path=ppt/tags/tag43.xml><?xml version="1.0" encoding="utf-8"?>
 <p:tagLst xmlns:a="http://schemas.openxmlformats.org/drawingml/2006/main" xmlns:r="http://schemas.openxmlformats.org/officeDocument/2006/relationships" xmlns:p="http://schemas.openxmlformats.org/presentationml/2006/main">
   <p:tag name="DVSHAPEID" val="InkrlxYPS4jAzciXk8ToAM"/>
 </p:tagLst>
 </file>
 
-<file path=ppt/tags/tag42.xml><?xml version="1.0" encoding="utf-8"?>
+<file path=ppt/tags/tag44.xml><?xml version="1.0" encoding="utf-8"?>
 <p:tagLst xmlns:a="http://schemas.openxmlformats.org/drawingml/2006/main" xmlns:r="http://schemas.openxmlformats.org/officeDocument/2006/relationships" xmlns:p="http://schemas.openxmlformats.org/presentationml/2006/main">
   <p:tag name="DVSHAPEID" val="retnMj4SFfqbVIhVK0Rf83"/>
 </p:tagLst>
 </file>
 
-<file path=ppt/tags/tag43.xml><?xml version="1.0" encoding="utf-8"?>
+<file path=ppt/tags/tag45.xml><?xml version="1.0" encoding="utf-8"?>
 <p:tagLst xmlns:a="http://schemas.openxmlformats.org/drawingml/2006/main" xmlns:r="http://schemas.openxmlformats.org/officeDocument/2006/relationships" xmlns:p="http://schemas.openxmlformats.org/presentationml/2006/main">
   <p:tag name="DVSECTIONID" val="QUq8QELArFIgadhH063fpq"/>
 </p:tagLst>
 </file>
 
-<file path=ppt/tags/tag44.xml><?xml version="1.0" encoding="utf-8"?>
+<file path=ppt/tags/tag46.xml><?xml version="1.0" encoding="utf-8"?>
 <p:tagLst xmlns:a="http://schemas.openxmlformats.org/drawingml/2006/main" xmlns:r="http://schemas.openxmlformats.org/officeDocument/2006/relationships" xmlns:p="http://schemas.openxmlformats.org/presentationml/2006/main">
   <p:tag name="DVSHAPEID" val="InkrlxYPS4jAzciXk8ToAM"/>
 </p:tagLst>
 </file>
 
-<file path=ppt/tags/tag45.xml><?xml version="1.0" encoding="utf-8"?>
+<file path=ppt/tags/tag47.xml><?xml version="1.0" encoding="utf-8"?>
 <p:tagLst xmlns:a="http://schemas.openxmlformats.org/drawingml/2006/main" xmlns:r="http://schemas.openxmlformats.org/officeDocument/2006/relationships" xmlns:p="http://schemas.openxmlformats.org/presentationml/2006/main">
   <p:tag name="DVSHAPEID" val="retnMj4SFfqbVIhVK0Rf83"/>
 </p:tagLst>
 </file>
 
-<file path=ppt/tags/tag46.xml><?xml version="1.0" encoding="utf-8"?>
+<file path=ppt/tags/tag48.xml><?xml version="1.0" encoding="utf-8"?>
 <p:tagLst xmlns:a="http://schemas.openxmlformats.org/drawingml/2006/main" xmlns:r="http://schemas.openxmlformats.org/officeDocument/2006/relationships" xmlns:p="http://schemas.openxmlformats.org/presentationml/2006/main">
   <p:tag name="DVSECTIONID" val="QUq8QELArFIgadhH063fpq"/>
 </p:tagLst>
 </file>
 
-<file path=ppt/tags/tag47.xml><?xml version="1.0" encoding="utf-8"?>
+<file path=ppt/tags/tag49.xml><?xml version="1.0" encoding="utf-8"?>
 <p:tagLst xmlns:a="http://schemas.openxmlformats.org/drawingml/2006/main" xmlns:r="http://schemas.openxmlformats.org/officeDocument/2006/relationships" xmlns:p="http://schemas.openxmlformats.org/presentationml/2006/main">
   <p:tag name="DVSHAPEID" val="InkrlxYPS4jAzciXk8ToAM"/>
-</p:tagLst>
-</file>
-
-<file path=ppt/tags/tag48.xml><?xml version="1.0" encoding="utf-8"?>
-<p:tagLst xmlns:a="http://schemas.openxmlformats.org/drawingml/2006/main" xmlns:r="http://schemas.openxmlformats.org/officeDocument/2006/relationships" xmlns:p="http://schemas.openxmlformats.org/presentationml/2006/main">
-  <p:tag name="DVSHAPEID" val="retnMj4SFfqbVIhVK0Rf83"/>
-</p:tagLst>
-</file>
-
-<file path=ppt/tags/tag49.xml><?xml version="1.0" encoding="utf-8"?>
-<p:tagLst xmlns:a="http://schemas.openxmlformats.org/drawingml/2006/main" xmlns:r="http://schemas.openxmlformats.org/officeDocument/2006/relationships" xmlns:p="http://schemas.openxmlformats.org/presentationml/2006/main">
-  <p:tag name="DVSECTIONID" val="QUq8QELArFIgadhH063fpq"/>
 </p:tagLst>
 </file>
 
@@ -10375,25 +11952,61 @@
 
 <file path=ppt/tags/tag50.xml><?xml version="1.0" encoding="utf-8"?>
 <p:tagLst xmlns:a="http://schemas.openxmlformats.org/drawingml/2006/main" xmlns:r="http://schemas.openxmlformats.org/officeDocument/2006/relationships" xmlns:p="http://schemas.openxmlformats.org/presentationml/2006/main">
+  <p:tag name="DVSHAPEID" val="retnMj4SFfqbVIhVK0Rf83"/>
+</p:tagLst>
+</file>
+
+<file path=ppt/tags/tag51.xml><?xml version="1.0" encoding="utf-8"?>
+<p:tagLst xmlns:a="http://schemas.openxmlformats.org/drawingml/2006/main" xmlns:r="http://schemas.openxmlformats.org/officeDocument/2006/relationships" xmlns:p="http://schemas.openxmlformats.org/presentationml/2006/main">
+  <p:tag name="DVSECTIONID" val="QUq8QELArFIgadhH063fpq"/>
+</p:tagLst>
+</file>
+
+<file path=ppt/tags/tag52.xml><?xml version="1.0" encoding="utf-8"?>
+<p:tagLst xmlns:a="http://schemas.openxmlformats.org/drawingml/2006/main" xmlns:r="http://schemas.openxmlformats.org/officeDocument/2006/relationships" xmlns:p="http://schemas.openxmlformats.org/presentationml/2006/main">
   <p:tag name="DVSHAPEID" val="InkrlxYPS4jAzciXk8ToAM"/>
 </p:tagLst>
 </file>
 
-<file path=ppt/tags/tag51.xml><?xml version="1.0" encoding="utf-8"?>
+<file path=ppt/tags/tag53.xml><?xml version="1.0" encoding="utf-8"?>
 <p:tagLst xmlns:a="http://schemas.openxmlformats.org/drawingml/2006/main" xmlns:r="http://schemas.openxmlformats.org/officeDocument/2006/relationships" xmlns:p="http://schemas.openxmlformats.org/presentationml/2006/main">
   <p:tag name="DVSHAPEID" val="retnMj4SFfqbVIhVK0Rf83"/>
 </p:tagLst>
 </file>
 
-<file path=ppt/tags/tag52.xml><?xml version="1.0" encoding="utf-8"?>
+<file path=ppt/tags/tag54.xml><?xml version="1.0" encoding="utf-8"?>
 <p:tagLst xmlns:a="http://schemas.openxmlformats.org/drawingml/2006/main" xmlns:r="http://schemas.openxmlformats.org/officeDocument/2006/relationships" xmlns:p="http://schemas.openxmlformats.org/presentationml/2006/main">
-  <p:tag name="DVSECTIONID" val="ezdaKHeWyBnZyZ2cDqRSoa"/>
+  <p:tag name="DVSECTIONID" val="QUq8QELArFIgadhH063fpq"/>
 </p:tagLst>
 </file>
 
-<file path=ppt/tags/tag53.xml><?xml version="1.0" encoding="utf-8"?>
+<file path=ppt/tags/tag55.xml><?xml version="1.0" encoding="utf-8"?>
 <p:tagLst xmlns:a="http://schemas.openxmlformats.org/drawingml/2006/main" xmlns:r="http://schemas.openxmlformats.org/officeDocument/2006/relationships" xmlns:p="http://schemas.openxmlformats.org/presentationml/2006/main">
-  <p:tag name="DVSHAPEID" val="LRMR96J2MVd0CGe2e5htjk"/>
+  <p:tag name="DVSHAPEID" val="InkrlxYPS4jAzciXk8ToAM"/>
+</p:tagLst>
+</file>
+
+<file path=ppt/tags/tag56.xml><?xml version="1.0" encoding="utf-8"?>
+<p:tagLst xmlns:a="http://schemas.openxmlformats.org/drawingml/2006/main" xmlns:r="http://schemas.openxmlformats.org/officeDocument/2006/relationships" xmlns:p="http://schemas.openxmlformats.org/presentationml/2006/main">
+  <p:tag name="DVSHAPEID" val="retnMj4SFfqbVIhVK0Rf83"/>
+</p:tagLst>
+</file>
+
+<file path=ppt/tags/tag57.xml><?xml version="1.0" encoding="utf-8"?>
+<p:tagLst xmlns:a="http://schemas.openxmlformats.org/drawingml/2006/main" xmlns:r="http://schemas.openxmlformats.org/officeDocument/2006/relationships" xmlns:p="http://schemas.openxmlformats.org/presentationml/2006/main">
+  <p:tag name="DVSECTIONID" val="QUq8QELArFIgadhH063fpq"/>
+</p:tagLst>
+</file>
+
+<file path=ppt/tags/tag58.xml><?xml version="1.0" encoding="utf-8"?>
+<p:tagLst xmlns:a="http://schemas.openxmlformats.org/drawingml/2006/main" xmlns:r="http://schemas.openxmlformats.org/officeDocument/2006/relationships" xmlns:p="http://schemas.openxmlformats.org/presentationml/2006/main">
+  <p:tag name="DVSHAPEID" val="InkrlxYPS4jAzciXk8ToAM"/>
+</p:tagLst>
+</file>
+
+<file path=ppt/tags/tag59.xml><?xml version="1.0" encoding="utf-8"?>
+<p:tagLst xmlns:a="http://schemas.openxmlformats.org/drawingml/2006/main" xmlns:r="http://schemas.openxmlformats.org/officeDocument/2006/relationships" xmlns:p="http://schemas.openxmlformats.org/presentationml/2006/main">
+  <p:tag name="DVSHAPEID" val="retnMj4SFfqbVIhVK0Rf83"/>
 </p:tagLst>
 </file>
 
@@ -10403,9 +12016,93 @@
 </p:tagLst>
 </file>
 
+<file path=ppt/tags/tag60.xml><?xml version="1.0" encoding="utf-8"?>
+<p:tagLst xmlns:a="http://schemas.openxmlformats.org/drawingml/2006/main" xmlns:r="http://schemas.openxmlformats.org/officeDocument/2006/relationships" xmlns:p="http://schemas.openxmlformats.org/presentationml/2006/main">
+  <p:tag name="DVSECTIONID" val="QUq8QELArFIgadhH063fpq"/>
+</p:tagLst>
+</file>
+
+<file path=ppt/tags/tag61.xml><?xml version="1.0" encoding="utf-8"?>
+<p:tagLst xmlns:a="http://schemas.openxmlformats.org/drawingml/2006/main" xmlns:r="http://schemas.openxmlformats.org/officeDocument/2006/relationships" xmlns:p="http://schemas.openxmlformats.org/presentationml/2006/main">
+  <p:tag name="DVSHAPEID" val="InkrlxYPS4jAzciXk8ToAM"/>
+</p:tagLst>
+</file>
+
+<file path=ppt/tags/tag62.xml><?xml version="1.0" encoding="utf-8"?>
+<p:tagLst xmlns:a="http://schemas.openxmlformats.org/drawingml/2006/main" xmlns:r="http://schemas.openxmlformats.org/officeDocument/2006/relationships" xmlns:p="http://schemas.openxmlformats.org/presentationml/2006/main">
+  <p:tag name="DVSHAPEID" val="retnMj4SFfqbVIhVK0Rf83"/>
+</p:tagLst>
+</file>
+
+<file path=ppt/tags/tag63.xml><?xml version="1.0" encoding="utf-8"?>
+<p:tagLst xmlns:a="http://schemas.openxmlformats.org/drawingml/2006/main" xmlns:r="http://schemas.openxmlformats.org/officeDocument/2006/relationships" xmlns:p="http://schemas.openxmlformats.org/presentationml/2006/main">
+  <p:tag name="DVSECTIONID" val="QUq8QELArFIgadhH063fpq"/>
+</p:tagLst>
+</file>
+
+<file path=ppt/tags/tag64.xml><?xml version="1.0" encoding="utf-8"?>
+<p:tagLst xmlns:a="http://schemas.openxmlformats.org/drawingml/2006/main" xmlns:r="http://schemas.openxmlformats.org/officeDocument/2006/relationships" xmlns:p="http://schemas.openxmlformats.org/presentationml/2006/main">
+  <p:tag name="DVSHAPEID" val="InkrlxYPS4jAzciXk8ToAM"/>
+</p:tagLst>
+</file>
+
+<file path=ppt/tags/tag65.xml><?xml version="1.0" encoding="utf-8"?>
+<p:tagLst xmlns:a="http://schemas.openxmlformats.org/drawingml/2006/main" xmlns:r="http://schemas.openxmlformats.org/officeDocument/2006/relationships" xmlns:p="http://schemas.openxmlformats.org/presentationml/2006/main">
+  <p:tag name="DVSHAPEID" val="retnMj4SFfqbVIhVK0Rf83"/>
+</p:tagLst>
+</file>
+
+<file path=ppt/tags/tag66.xml><?xml version="1.0" encoding="utf-8"?>
+<p:tagLst xmlns:a="http://schemas.openxmlformats.org/drawingml/2006/main" xmlns:r="http://schemas.openxmlformats.org/officeDocument/2006/relationships" xmlns:p="http://schemas.openxmlformats.org/presentationml/2006/main">
+  <p:tag name="DVSECTIONID" val="QUq8QELArFIgadhH063fpq"/>
+</p:tagLst>
+</file>
+
+<file path=ppt/tags/tag67.xml><?xml version="1.0" encoding="utf-8"?>
+<p:tagLst xmlns:a="http://schemas.openxmlformats.org/drawingml/2006/main" xmlns:r="http://schemas.openxmlformats.org/officeDocument/2006/relationships" xmlns:p="http://schemas.openxmlformats.org/presentationml/2006/main">
+  <p:tag name="DVSHAPEID" val="InkrlxYPS4jAzciXk8ToAM"/>
+</p:tagLst>
+</file>
+
+<file path=ppt/tags/tag68.xml><?xml version="1.0" encoding="utf-8"?>
+<p:tagLst xmlns:a="http://schemas.openxmlformats.org/drawingml/2006/main" xmlns:r="http://schemas.openxmlformats.org/officeDocument/2006/relationships" xmlns:p="http://schemas.openxmlformats.org/presentationml/2006/main">
+  <p:tag name="DVSHAPEID" val="retnMj4SFfqbVIhVK0Rf83"/>
+</p:tagLst>
+</file>
+
+<file path=ppt/tags/tag69.xml><?xml version="1.0" encoding="utf-8"?>
+<p:tagLst xmlns:a="http://schemas.openxmlformats.org/drawingml/2006/main" xmlns:r="http://schemas.openxmlformats.org/officeDocument/2006/relationships" xmlns:p="http://schemas.openxmlformats.org/presentationml/2006/main">
+  <p:tag name="DVSECTIONID" val="QUq8QELArFIgadhH063fpq"/>
+</p:tagLst>
+</file>
+
 <file path=ppt/tags/tag7.xml><?xml version="1.0" encoding="utf-8"?>
 <p:tagLst xmlns:a="http://schemas.openxmlformats.org/drawingml/2006/main" xmlns:r="http://schemas.openxmlformats.org/officeDocument/2006/relationships" xmlns:p="http://schemas.openxmlformats.org/presentationml/2006/main">
   <p:tag name="DVSECTIONID" val="QUq8QELArFIgadhH063fpq"/>
+</p:tagLst>
+</file>
+
+<file path=ppt/tags/tag70.xml><?xml version="1.0" encoding="utf-8"?>
+<p:tagLst xmlns:a="http://schemas.openxmlformats.org/drawingml/2006/main" xmlns:r="http://schemas.openxmlformats.org/officeDocument/2006/relationships" xmlns:p="http://schemas.openxmlformats.org/presentationml/2006/main">
+  <p:tag name="DVSHAPEID" val="InkrlxYPS4jAzciXk8ToAM"/>
+</p:tagLst>
+</file>
+
+<file path=ppt/tags/tag71.xml><?xml version="1.0" encoding="utf-8"?>
+<p:tagLst xmlns:a="http://schemas.openxmlformats.org/drawingml/2006/main" xmlns:r="http://schemas.openxmlformats.org/officeDocument/2006/relationships" xmlns:p="http://schemas.openxmlformats.org/presentationml/2006/main">
+  <p:tag name="DVSHAPEID" val="retnMj4SFfqbVIhVK0Rf83"/>
+</p:tagLst>
+</file>
+
+<file path=ppt/tags/tag72.xml><?xml version="1.0" encoding="utf-8"?>
+<p:tagLst xmlns:a="http://schemas.openxmlformats.org/drawingml/2006/main" xmlns:r="http://schemas.openxmlformats.org/officeDocument/2006/relationships" xmlns:p="http://schemas.openxmlformats.org/presentationml/2006/main">
+  <p:tag name="DVSECTIONID" val="ezdaKHeWyBnZyZ2cDqRSoa"/>
+</p:tagLst>
+</file>
+
+<file path=ppt/tags/tag73.xml><?xml version="1.0" encoding="utf-8"?>
+<p:tagLst xmlns:a="http://schemas.openxmlformats.org/drawingml/2006/main" xmlns:r="http://schemas.openxmlformats.org/officeDocument/2006/relationships" xmlns:p="http://schemas.openxmlformats.org/presentationml/2006/main">
+  <p:tag name="DVSHAPEID" val="LRMR96J2MVd0CGe2e5htjk"/>
 </p:tagLst>
 </file>
 

</xml_diff>

<commit_message>
Updated links for all sites
</commit_message>
<xml_diff>
--- a/ppt/aria.pptx
+++ b/ppt/aria.pptx
@@ -26,9 +26,9 @@
     <p:sldId id="331" r:id="rId14"/>
     <p:sldId id="324" r:id="rId15"/>
     <p:sldId id="332" r:id="rId16"/>
-    <p:sldId id="321" r:id="rId17"/>
+    <p:sldId id="303" r:id="rId17"/>
     <p:sldId id="310" r:id="rId18"/>
-    <p:sldId id="303" r:id="rId19"/>
+    <p:sldId id="321" r:id="rId19"/>
     <p:sldId id="304" r:id="rId20"/>
     <p:sldId id="319" r:id="rId21"/>
     <p:sldId id="311" r:id="rId22"/>
@@ -163,13 +163,13 @@
             <p14:sldId id="331"/>
             <p14:sldId id="324"/>
             <p14:sldId id="332"/>
-            <p14:sldId id="321"/>
-            <p14:sldId id="310"/>
           </p14:sldIdLst>
         </p14:section>
         <p14:section name="Topics" id="{ABA716BF-3A5C-4ADB-94C9-CFEF84EBA240}">
           <p14:sldIdLst>
             <p14:sldId id="303"/>
+            <p14:sldId id="310"/>
+            <p14:sldId id="321"/>
             <p14:sldId id="304"/>
             <p14:sldId id="319"/>
             <p14:sldId id="311"/>
@@ -1529,17 +1529,10 @@
         </p:nvSpPr>
         <p:spPr/>
         <p:txBody>
-          <a:bodyPr>
-            <a:normAutofit/>
-          </a:bodyPr>
-          <a:lstStyle/>
-          <a:p>
-            <a:pPr>
-              <a:lnSpc>
-                <a:spcPct val="80000"/>
-              </a:lnSpc>
-            </a:pPr>
-            <a:endParaRPr lang="en-US" dirty="0" smtClean="0"/>
+          <a:bodyPr/>
+          <a:lstStyle/>
+          <a:p>
+            <a:endParaRPr lang="en-US" dirty="0"/>
           </a:p>
         </p:txBody>
       </p:sp>
@@ -1558,7 +1551,7 @@
           <a:bodyPr/>
           <a:lstStyle/>
           <a:p>
-            <a:fld id="{EC6EAC7D-5A89-47C2-8ABA-56C9C2DEF7A4}" type="slidenum">
+            <a:fld id="{75693FD4-8F83-4EF7-AC3F-0DC0388986B0}" type="slidenum">
               <a:rPr lang="en-US" smtClean="0"/>
               <a:pPr/>
               <a:t>16</a:t>
@@ -1703,29 +1696,36 @@
         </p:nvSpPr>
         <p:spPr/>
         <p:txBody>
+          <a:bodyPr>
+            <a:normAutofit/>
+          </a:bodyPr>
+          <a:lstStyle/>
+          <a:p>
+            <a:pPr>
+              <a:lnSpc>
+                <a:spcPct val="80000"/>
+              </a:lnSpc>
+            </a:pPr>
+            <a:endParaRPr lang="en-US" dirty="0" smtClean="0"/>
+          </a:p>
+        </p:txBody>
+      </p:sp>
+      <p:sp>
+        <p:nvSpPr>
+          <p:cNvPr id="4" name="Slide Number Placeholder 3"/>
+          <p:cNvSpPr>
+            <a:spLocks noGrp="1"/>
+          </p:cNvSpPr>
+          <p:nvPr>
+            <p:ph type="sldNum" sz="quarter" idx="10"/>
+          </p:nvPr>
+        </p:nvSpPr>
+        <p:spPr/>
+        <p:txBody>
           <a:bodyPr/>
           <a:lstStyle/>
           <a:p>
-            <a:endParaRPr lang="en-US" dirty="0"/>
-          </a:p>
-        </p:txBody>
-      </p:sp>
-      <p:sp>
-        <p:nvSpPr>
-          <p:cNvPr id="4" name="Slide Number Placeholder 3"/>
-          <p:cNvSpPr>
-            <a:spLocks noGrp="1"/>
-          </p:cNvSpPr>
-          <p:nvPr>
-            <p:ph type="sldNum" sz="quarter" idx="10"/>
-          </p:nvPr>
-        </p:nvSpPr>
-        <p:spPr/>
-        <p:txBody>
-          <a:bodyPr/>
-          <a:lstStyle/>
-          <a:p>
-            <a:fld id="{75693FD4-8F83-4EF7-AC3F-0DC0388986B0}" type="slidenum">
+            <a:fld id="{EC6EAC7D-5A89-47C2-8ABA-56C9C2DEF7A4}" type="slidenum">
               <a:rPr lang="en-US" smtClean="0"/>
               <a:pPr/>
               <a:t>18</a:t>
@@ -7538,7 +7538,7 @@
         <p:spPr/>
         <p:txBody>
           <a:bodyPr>
-            <a:normAutofit/>
+            <a:normAutofit lnSpcReduction="10000"/>
           </a:bodyPr>
           <a:lstStyle/>
           <a:p>
@@ -7552,32 +7552,47 @@
             </a:r>
             <a:r>
               <a:rPr lang="en-US" dirty="0" smtClean="0"/>
-              <a:t>element</a:t>
-            </a:r>
-          </a:p>
-          <a:p>
-            <a:r>
-              <a:rPr lang="en-US" dirty="0" smtClean="0"/>
-              <a:t>ARIA State – Dynamic attribute that represent data associated with control. Can change as result of user interaction</a:t>
-            </a:r>
-          </a:p>
-          <a:p>
-            <a:r>
-              <a:rPr lang="en-US" dirty="0" smtClean="0"/>
-              <a:t>ARIA Properties – Static attributes of control</a:t>
-            </a:r>
-          </a:p>
-          <a:p>
-            <a:pPr marL="0" indent="0" algn="ctr">
-              <a:buNone/>
-            </a:pPr>
-            <a:r>
-              <a:rPr lang="en-US" dirty="0" smtClean="0"/>
-              <a:t>aria-xxx</a:t>
-            </a:r>
-          </a:p>
-          <a:p>
-            <a:endParaRPr lang="en-US" dirty="0"/>
+              <a:t>element (I am checkbox)</a:t>
+            </a:r>
+            <a:endParaRPr lang="en-US" dirty="0" smtClean="0"/>
+          </a:p>
+          <a:p>
+            <a:r>
+              <a:rPr lang="en-US" dirty="0" smtClean="0"/>
+              <a:t>ARIA State – Dynamic attribute that represent data associated with control. Can change as result of user </a:t>
+            </a:r>
+            <a:r>
+              <a:rPr lang="en-US" dirty="0" smtClean="0"/>
+              <a:t>interaction. (I am checked)</a:t>
+            </a:r>
+            <a:endParaRPr lang="en-US" dirty="0" smtClean="0"/>
+          </a:p>
+          <a:p>
+            <a:r>
+              <a:rPr lang="en-US" dirty="0" smtClean="0"/>
+              <a:t>ARIA Properties – Static attributes of </a:t>
+            </a:r>
+            <a:r>
+              <a:rPr lang="en-US" dirty="0" smtClean="0"/>
+              <a:t>control</a:t>
+            </a:r>
+            <a:r>
+              <a:rPr lang="en-US" dirty="0"/>
+              <a:t> </a:t>
+            </a:r>
+            <a:r>
+              <a:rPr lang="en-US" dirty="0" smtClean="0"/>
+              <a:t>(</a:t>
+            </a:r>
+            <a:r>
+              <a:rPr lang="en-US" dirty="0"/>
+              <a:t> I am labeled by that text, I am part of this </a:t>
+            </a:r>
+            <a:r>
+              <a:rPr lang="en-US" dirty="0" smtClean="0"/>
+              <a:t>group)</a:t>
+            </a:r>
+            <a:endParaRPr lang="en-US" dirty="0" smtClean="0"/>
           </a:p>
         </p:txBody>
       </p:sp>
@@ -8076,19 +8091,7 @@
           <a:p>
             <a:r>
               <a:rPr lang="en-US" dirty="0" smtClean="0"/>
-              <a:t>ARIA </a:t>
-            </a:r>
-            <a:r>
-              <a:rPr lang="en-US" dirty="0" smtClean="0"/>
-              <a:t>Application </a:t>
-            </a:r>
-            <a:r>
-              <a:rPr lang="en-US" dirty="0" smtClean="0"/>
-              <a:t>– </a:t>
-            </a:r>
-            <a:r>
-              <a:rPr lang="en-US" dirty="0" smtClean="0"/>
-              <a:t>Slider</a:t>
+              <a:t>ARIA Application – Slider</a:t>
             </a:r>
             <a:endParaRPr lang="en-US" dirty="0"/>
           </a:p>
@@ -8126,11 +8129,14 @@
           <a:p>
             <a:r>
               <a:rPr lang="en-US" dirty="0" smtClean="0"/>
-              <a:t>User interface element have three important </a:t>
-            </a:r>
-            <a:r>
-              <a:rPr lang="en-US" dirty="0" smtClean="0"/>
-              <a:t>attributes</a:t>
+              <a:t>User interface element have three important attributes</a:t>
+            </a:r>
+          </a:p>
+          <a:p>
+            <a:pPr lvl="1"/>
+            <a:r>
+              <a:rPr lang="en-US" dirty="0" smtClean="0"/>
+              <a:t>Role – slider</a:t>
             </a:r>
             <a:endParaRPr lang="en-US" dirty="0" smtClean="0"/>
           </a:p>
@@ -8138,14 +8144,7 @@
             <a:pPr lvl="1"/>
             <a:r>
               <a:rPr lang="en-US" dirty="0" smtClean="0"/>
-              <a:t>Role</a:t>
-            </a:r>
-          </a:p>
-          <a:p>
-            <a:pPr lvl="1"/>
-            <a:r>
-              <a:rPr lang="en-US" dirty="0" smtClean="0"/>
-              <a:t>State</a:t>
+              <a:t>State – </a:t>
             </a:r>
             <a:endParaRPr lang="en-US" dirty="0" smtClean="0"/>
           </a:p>
@@ -8224,11 +8223,7 @@
           <a:p>
             <a:r>
               <a:rPr lang="en-US" dirty="0" smtClean="0"/>
-              <a:t>ARIA </a:t>
-            </a:r>
-            <a:r>
-              <a:rPr lang="en-US" dirty="0" smtClean="0"/>
-              <a:t>Application </a:t>
+              <a:t>Accessible </a:t>
             </a:r>
             <a:r>
               <a:rPr lang="en-US" dirty="0" smtClean="0"/>
@@ -8236,7 +8231,7 @@
             </a:r>
             <a:r>
               <a:rPr lang="en-US" dirty="0" smtClean="0"/>
-              <a:t>Tree</a:t>
+              <a:t>Tree and Layout</a:t>
             </a:r>
             <a:endParaRPr lang="en-US" dirty="0"/>
           </a:p>
@@ -8278,13 +8273,8 @@
           <a:p>
             <a:r>
               <a:rPr lang="en-US" dirty="0" smtClean="0"/>
-              <a:t>User interface element have three important </a:t>
-            </a:r>
-            <a:r>
-              <a:rPr lang="en-US" dirty="0" smtClean="0"/>
-              <a:t>attributes</a:t>
-            </a:r>
-            <a:endParaRPr lang="en-US" dirty="0" smtClean="0"/>
+              <a:t>User interface element have three important attributes</a:t>
+            </a:r>
           </a:p>
           <a:p>
             <a:pPr lvl="1"/>
@@ -8299,7 +8289,6 @@
               <a:rPr lang="en-US" dirty="0" smtClean="0"/>
               <a:t>State</a:t>
             </a:r>
-            <a:endParaRPr lang="en-US" dirty="0" smtClean="0"/>
           </a:p>
           <a:p>
             <a:pPr lvl="1"/>
@@ -8338,280 +8327,6 @@
 </file>
 
 <file path=ppt/slides/slide16.xml><?xml version="1.0" encoding="utf-8"?>
-<p:sld xmlns:a="http://schemas.openxmlformats.org/drawingml/2006/main" xmlns:r="http://schemas.openxmlformats.org/officeDocument/2006/relationships" xmlns:p="http://schemas.openxmlformats.org/presentationml/2006/main">
-  <p:cSld>
-    <p:spTree>
-      <p:nvGrpSpPr>
-        <p:cNvPr id="1" name=""/>
-        <p:cNvGrpSpPr/>
-        <p:nvPr/>
-      </p:nvGrpSpPr>
-      <p:grpSpPr>
-        <a:xfrm>
-          <a:off x="0" y="0"/>
-          <a:ext cx="0" cy="0"/>
-          <a:chOff x="0" y="0"/>
-          <a:chExt cx="0" cy="0"/>
-        </a:xfrm>
-      </p:grpSpPr>
-      <p:sp>
-        <p:nvSpPr>
-          <p:cNvPr id="2" name="Title 1"/>
-          <p:cNvSpPr>
-            <a:spLocks noGrp="1"/>
-          </p:cNvSpPr>
-          <p:nvPr>
-            <p:ph type="title"/>
-            <p:custDataLst>
-              <p:tags r:id="rId2"/>
-            </p:custDataLst>
-          </p:nvPr>
-        </p:nvSpPr>
-        <p:spPr/>
-        <p:txBody>
-          <a:bodyPr>
-            <a:normAutofit/>
-          </a:bodyPr>
-          <a:lstStyle/>
-          <a:p>
-            <a:r>
-              <a:rPr lang="en-US" dirty="0" smtClean="0"/>
-              <a:t>Re Introducing Browser</a:t>
-            </a:r>
-            <a:endParaRPr lang="en-US" dirty="0"/>
-          </a:p>
-        </p:txBody>
-      </p:sp>
-      <p:sp>
-        <p:nvSpPr>
-          <p:cNvPr id="5" name="Content Placeholder 4"/>
-          <p:cNvSpPr>
-            <a:spLocks noGrp="1"/>
-          </p:cNvSpPr>
-          <p:nvPr>
-            <p:ph idx="1"/>
-            <p:custDataLst>
-              <p:tags r:id="rId3"/>
-            </p:custDataLst>
-          </p:nvPr>
-        </p:nvSpPr>
-        <p:spPr/>
-        <p:txBody>
-          <a:bodyPr>
-            <a:normAutofit fontScale="92500" lnSpcReduction="10000"/>
-          </a:bodyPr>
-          <a:lstStyle/>
-          <a:p>
-            <a:r>
-              <a:rPr lang="en-US" dirty="0"/>
-              <a:t>HTML has grown from ‘just’ markup </a:t>
-            </a:r>
-            <a:r>
-              <a:rPr lang="en-US" dirty="0" smtClean="0"/>
-              <a:t>language to a whole new Infrastructure.</a:t>
-            </a:r>
-          </a:p>
-          <a:p>
-            <a:r>
-              <a:rPr lang="en-US" dirty="0" smtClean="0"/>
-              <a:t>Browser is Platform</a:t>
-            </a:r>
-            <a:endParaRPr lang="en-US" dirty="0"/>
-          </a:p>
-          <a:p>
-            <a:r>
-              <a:rPr lang="en-US" dirty="0" smtClean="0"/>
-              <a:t>With HTML 5, CSS3 and Java Script now you write desktop equivalent applications</a:t>
-            </a:r>
-          </a:p>
-          <a:p>
-            <a:r>
-              <a:rPr lang="en-US" dirty="0" smtClean="0"/>
-              <a:t>You can debug java script, perform logging etc.</a:t>
-            </a:r>
-          </a:p>
-          <a:p>
-            <a:r>
-              <a:rPr lang="en-US" dirty="0" smtClean="0"/>
-              <a:t>Browse ecosystem is also matured with frameworks like Angular, Backbone, knockout etc.</a:t>
-            </a:r>
-          </a:p>
-        </p:txBody>
-      </p:sp>
-    </p:spTree>
-    <p:custDataLst>
-      <p:tags r:id="rId1"/>
-    </p:custDataLst>
-    <p:extLst>
-      <p:ext uri="{BB962C8B-B14F-4D97-AF65-F5344CB8AC3E}">
-        <p14:creationId xmlns:p14="http://schemas.microsoft.com/office/powerpoint/2010/main" val="964538590"/>
-      </p:ext>
-    </p:extLst>
-  </p:cSld>
-  <p:clrMapOvr>
-    <a:masterClrMapping/>
-  </p:clrMapOvr>
-  <p:transition spd="slow">
-    <p:wipe dir="d"/>
-  </p:transition>
-  <p:timing>
-    <p:tnLst>
-      <p:par>
-        <p:cTn id="1" dur="indefinite" restart="never" nodeType="tmRoot"/>
-      </p:par>
-    </p:tnLst>
-  </p:timing>
-</p:sld>
-</file>
-
-<file path=ppt/slides/slide17.xml><?xml version="1.0" encoding="utf-8"?>
-<p:sld xmlns:a="http://schemas.openxmlformats.org/drawingml/2006/main" xmlns:r="http://schemas.openxmlformats.org/officeDocument/2006/relationships" xmlns:p="http://schemas.openxmlformats.org/presentationml/2006/main">
-  <p:cSld>
-    <p:spTree>
-      <p:nvGrpSpPr>
-        <p:cNvPr id="1" name=""/>
-        <p:cNvGrpSpPr/>
-        <p:nvPr/>
-      </p:nvGrpSpPr>
-      <p:grpSpPr>
-        <a:xfrm>
-          <a:off x="0" y="0"/>
-          <a:ext cx="0" cy="0"/>
-          <a:chOff x="0" y="0"/>
-          <a:chExt cx="0" cy="0"/>
-        </a:xfrm>
-      </p:grpSpPr>
-      <p:sp>
-        <p:nvSpPr>
-          <p:cNvPr id="2" name="Title 1"/>
-          <p:cNvSpPr>
-            <a:spLocks noGrp="1"/>
-          </p:cNvSpPr>
-          <p:nvPr>
-            <p:ph type="title"/>
-            <p:custDataLst>
-              <p:tags r:id="rId2"/>
-            </p:custDataLst>
-          </p:nvPr>
-        </p:nvSpPr>
-        <p:spPr/>
-        <p:txBody>
-          <a:bodyPr/>
-          <a:lstStyle/>
-          <a:p>
-            <a:r>
-              <a:rPr lang="en-US" dirty="0" smtClean="0"/>
-              <a:t>HTML 5 Features</a:t>
-            </a:r>
-            <a:endParaRPr lang="en-US" dirty="0"/>
-          </a:p>
-        </p:txBody>
-      </p:sp>
-      <p:sp>
-        <p:nvSpPr>
-          <p:cNvPr id="5" name="Content Placeholder 4"/>
-          <p:cNvSpPr>
-            <a:spLocks noGrp="1"/>
-          </p:cNvSpPr>
-          <p:nvPr>
-            <p:ph idx="1"/>
-            <p:custDataLst>
-              <p:tags r:id="rId3"/>
-            </p:custDataLst>
-          </p:nvPr>
-        </p:nvSpPr>
-        <p:spPr/>
-        <p:txBody>
-          <a:bodyPr>
-            <a:normAutofit fontScale="85000" lnSpcReduction="10000"/>
-          </a:bodyPr>
-          <a:lstStyle/>
-          <a:p>
-            <a:r>
-              <a:rPr lang="en-US" dirty="0" smtClean="0"/>
-              <a:t>Semantic Structure</a:t>
-            </a:r>
-          </a:p>
-          <a:p>
-            <a:r>
-              <a:rPr lang="en-US" dirty="0" smtClean="0"/>
-              <a:t>Custom Attributes – start with data</a:t>
-            </a:r>
-          </a:p>
-          <a:p>
-            <a:r>
-              <a:rPr lang="en-US" dirty="0" smtClean="0"/>
-              <a:t>Web workers</a:t>
-            </a:r>
-          </a:p>
-          <a:p>
-            <a:r>
-              <a:rPr lang="en-US" dirty="0" smtClean="0"/>
-              <a:t>Web storage</a:t>
-            </a:r>
-          </a:p>
-          <a:p>
-            <a:r>
-              <a:rPr lang="en-US" dirty="0" smtClean="0"/>
-              <a:t>Geo location</a:t>
-            </a:r>
-          </a:p>
-          <a:p>
-            <a:r>
-              <a:rPr lang="en-US" dirty="0" smtClean="0"/>
-              <a:t>Web Sockets</a:t>
-            </a:r>
-          </a:p>
-          <a:p>
-            <a:r>
-              <a:rPr lang="en-US" dirty="0" smtClean="0"/>
-              <a:t>Audio and Video Support</a:t>
-            </a:r>
-          </a:p>
-          <a:p>
-            <a:r>
-              <a:rPr lang="en-US" dirty="0" smtClean="0"/>
-              <a:t>Canvas</a:t>
-            </a:r>
-          </a:p>
-          <a:p>
-            <a:pPr marL="0" indent="0">
-              <a:buNone/>
-            </a:pPr>
-            <a:r>
-              <a:rPr lang="en-US" dirty="0" smtClean="0"/>
-              <a:t>HTML 5 specs implementation will complete in 2022</a:t>
-            </a:r>
-          </a:p>
-        </p:txBody>
-      </p:sp>
-    </p:spTree>
-    <p:custDataLst>
-      <p:tags r:id="rId1"/>
-    </p:custDataLst>
-    <p:extLst>
-      <p:ext uri="{BB962C8B-B14F-4D97-AF65-F5344CB8AC3E}">
-        <p14:creationId xmlns:p14="http://schemas.microsoft.com/office/powerpoint/2010/main" val="3241600861"/>
-      </p:ext>
-    </p:extLst>
-  </p:cSld>
-  <p:clrMapOvr>
-    <a:masterClrMapping/>
-  </p:clrMapOvr>
-  <p:transition spd="slow">
-    <p:wipe dir="d"/>
-  </p:transition>
-  <p:timing>
-    <p:tnLst>
-      <p:par>
-        <p:cTn id="1" dur="indefinite" restart="never" nodeType="tmRoot"/>
-      </p:par>
-    </p:tnLst>
-  </p:timing>
-</p:sld>
-</file>
-
-<file path=ppt/slides/slide18.xml><?xml version="1.0" encoding="utf-8"?>
 <p:sld xmlns:a="http://schemas.openxmlformats.org/drawingml/2006/main" xmlns:r="http://schemas.openxmlformats.org/officeDocument/2006/relationships" xmlns:p="http://schemas.openxmlformats.org/presentationml/2006/main">
   <p:cSld>
     <p:spTree>
@@ -8711,6 +8426,280 @@
 </p:sld>
 </file>
 
+<file path=ppt/slides/slide17.xml><?xml version="1.0" encoding="utf-8"?>
+<p:sld xmlns:a="http://schemas.openxmlformats.org/drawingml/2006/main" xmlns:r="http://schemas.openxmlformats.org/officeDocument/2006/relationships" xmlns:p="http://schemas.openxmlformats.org/presentationml/2006/main">
+  <p:cSld>
+    <p:spTree>
+      <p:nvGrpSpPr>
+        <p:cNvPr id="1" name=""/>
+        <p:cNvGrpSpPr/>
+        <p:nvPr/>
+      </p:nvGrpSpPr>
+      <p:grpSpPr>
+        <a:xfrm>
+          <a:off x="0" y="0"/>
+          <a:ext cx="0" cy="0"/>
+          <a:chOff x="0" y="0"/>
+          <a:chExt cx="0" cy="0"/>
+        </a:xfrm>
+      </p:grpSpPr>
+      <p:sp>
+        <p:nvSpPr>
+          <p:cNvPr id="2" name="Title 1"/>
+          <p:cNvSpPr>
+            <a:spLocks noGrp="1"/>
+          </p:cNvSpPr>
+          <p:nvPr>
+            <p:ph type="title"/>
+            <p:custDataLst>
+              <p:tags r:id="rId2"/>
+            </p:custDataLst>
+          </p:nvPr>
+        </p:nvSpPr>
+        <p:spPr/>
+        <p:txBody>
+          <a:bodyPr/>
+          <a:lstStyle/>
+          <a:p>
+            <a:r>
+              <a:rPr lang="en-US" dirty="0" smtClean="0"/>
+              <a:t>HTML 5 Features</a:t>
+            </a:r>
+            <a:endParaRPr lang="en-US" dirty="0"/>
+          </a:p>
+        </p:txBody>
+      </p:sp>
+      <p:sp>
+        <p:nvSpPr>
+          <p:cNvPr id="5" name="Content Placeholder 4"/>
+          <p:cNvSpPr>
+            <a:spLocks noGrp="1"/>
+          </p:cNvSpPr>
+          <p:nvPr>
+            <p:ph idx="1"/>
+            <p:custDataLst>
+              <p:tags r:id="rId3"/>
+            </p:custDataLst>
+          </p:nvPr>
+        </p:nvSpPr>
+        <p:spPr/>
+        <p:txBody>
+          <a:bodyPr>
+            <a:normAutofit fontScale="85000" lnSpcReduction="10000"/>
+          </a:bodyPr>
+          <a:lstStyle/>
+          <a:p>
+            <a:r>
+              <a:rPr lang="en-US" dirty="0" smtClean="0"/>
+              <a:t>Semantic Structure</a:t>
+            </a:r>
+          </a:p>
+          <a:p>
+            <a:r>
+              <a:rPr lang="en-US" dirty="0" smtClean="0"/>
+              <a:t>Custom Attributes – start with data</a:t>
+            </a:r>
+          </a:p>
+          <a:p>
+            <a:r>
+              <a:rPr lang="en-US" dirty="0" smtClean="0"/>
+              <a:t>Web workers</a:t>
+            </a:r>
+          </a:p>
+          <a:p>
+            <a:r>
+              <a:rPr lang="en-US" dirty="0" smtClean="0"/>
+              <a:t>Web storage</a:t>
+            </a:r>
+          </a:p>
+          <a:p>
+            <a:r>
+              <a:rPr lang="en-US" dirty="0" smtClean="0"/>
+              <a:t>Geo location</a:t>
+            </a:r>
+          </a:p>
+          <a:p>
+            <a:r>
+              <a:rPr lang="en-US" dirty="0" smtClean="0"/>
+              <a:t>Web Sockets</a:t>
+            </a:r>
+          </a:p>
+          <a:p>
+            <a:r>
+              <a:rPr lang="en-US" dirty="0" smtClean="0"/>
+              <a:t>Audio and Video Support</a:t>
+            </a:r>
+          </a:p>
+          <a:p>
+            <a:r>
+              <a:rPr lang="en-US" dirty="0" smtClean="0"/>
+              <a:t>Canvas</a:t>
+            </a:r>
+          </a:p>
+          <a:p>
+            <a:pPr marL="0" indent="0">
+              <a:buNone/>
+            </a:pPr>
+            <a:r>
+              <a:rPr lang="en-US" dirty="0" smtClean="0"/>
+              <a:t>HTML 5 specs implementation will complete in 2022</a:t>
+            </a:r>
+          </a:p>
+        </p:txBody>
+      </p:sp>
+    </p:spTree>
+    <p:custDataLst>
+      <p:tags r:id="rId1"/>
+    </p:custDataLst>
+    <p:extLst>
+      <p:ext uri="{BB962C8B-B14F-4D97-AF65-F5344CB8AC3E}">
+        <p14:creationId xmlns:p14="http://schemas.microsoft.com/office/powerpoint/2010/main" val="3241600861"/>
+      </p:ext>
+    </p:extLst>
+  </p:cSld>
+  <p:clrMapOvr>
+    <a:masterClrMapping/>
+  </p:clrMapOvr>
+  <p:transition spd="slow">
+    <p:wipe dir="d"/>
+  </p:transition>
+  <p:timing>
+    <p:tnLst>
+      <p:par>
+        <p:cTn id="1" dur="indefinite" restart="never" nodeType="tmRoot"/>
+      </p:par>
+    </p:tnLst>
+  </p:timing>
+</p:sld>
+</file>
+
+<file path=ppt/slides/slide18.xml><?xml version="1.0" encoding="utf-8"?>
+<p:sld xmlns:a="http://schemas.openxmlformats.org/drawingml/2006/main" xmlns:r="http://schemas.openxmlformats.org/officeDocument/2006/relationships" xmlns:p="http://schemas.openxmlformats.org/presentationml/2006/main">
+  <p:cSld>
+    <p:spTree>
+      <p:nvGrpSpPr>
+        <p:cNvPr id="1" name=""/>
+        <p:cNvGrpSpPr/>
+        <p:nvPr/>
+      </p:nvGrpSpPr>
+      <p:grpSpPr>
+        <a:xfrm>
+          <a:off x="0" y="0"/>
+          <a:ext cx="0" cy="0"/>
+          <a:chOff x="0" y="0"/>
+          <a:chExt cx="0" cy="0"/>
+        </a:xfrm>
+      </p:grpSpPr>
+      <p:sp>
+        <p:nvSpPr>
+          <p:cNvPr id="2" name="Title 1"/>
+          <p:cNvSpPr>
+            <a:spLocks noGrp="1"/>
+          </p:cNvSpPr>
+          <p:nvPr>
+            <p:ph type="title"/>
+            <p:custDataLst>
+              <p:tags r:id="rId2"/>
+            </p:custDataLst>
+          </p:nvPr>
+        </p:nvSpPr>
+        <p:spPr/>
+        <p:txBody>
+          <a:bodyPr>
+            <a:normAutofit/>
+          </a:bodyPr>
+          <a:lstStyle/>
+          <a:p>
+            <a:r>
+              <a:rPr lang="en-US" dirty="0" smtClean="0"/>
+              <a:t>Re Introducing Browser</a:t>
+            </a:r>
+            <a:endParaRPr lang="en-US" dirty="0"/>
+          </a:p>
+        </p:txBody>
+      </p:sp>
+      <p:sp>
+        <p:nvSpPr>
+          <p:cNvPr id="5" name="Content Placeholder 4"/>
+          <p:cNvSpPr>
+            <a:spLocks noGrp="1"/>
+          </p:cNvSpPr>
+          <p:nvPr>
+            <p:ph idx="1"/>
+            <p:custDataLst>
+              <p:tags r:id="rId3"/>
+            </p:custDataLst>
+          </p:nvPr>
+        </p:nvSpPr>
+        <p:spPr/>
+        <p:txBody>
+          <a:bodyPr>
+            <a:normAutofit fontScale="92500" lnSpcReduction="10000"/>
+          </a:bodyPr>
+          <a:lstStyle/>
+          <a:p>
+            <a:r>
+              <a:rPr lang="en-US" dirty="0"/>
+              <a:t>HTML has grown from ‘just’ markup </a:t>
+            </a:r>
+            <a:r>
+              <a:rPr lang="en-US" dirty="0" smtClean="0"/>
+              <a:t>language to a whole new Infrastructure.</a:t>
+            </a:r>
+          </a:p>
+          <a:p>
+            <a:r>
+              <a:rPr lang="en-US" dirty="0" smtClean="0"/>
+              <a:t>Browser is Platform</a:t>
+            </a:r>
+            <a:endParaRPr lang="en-US" dirty="0"/>
+          </a:p>
+          <a:p>
+            <a:r>
+              <a:rPr lang="en-US" dirty="0" smtClean="0"/>
+              <a:t>With HTML 5, CSS3 and Java Script now you write desktop equivalent applications</a:t>
+            </a:r>
+          </a:p>
+          <a:p>
+            <a:r>
+              <a:rPr lang="en-US" dirty="0" smtClean="0"/>
+              <a:t>You can debug java script, perform logging etc.</a:t>
+            </a:r>
+          </a:p>
+          <a:p>
+            <a:r>
+              <a:rPr lang="en-US" dirty="0" smtClean="0"/>
+              <a:t>Browse ecosystem is also matured with frameworks like Angular, Backbone, knockout etc.</a:t>
+            </a:r>
+          </a:p>
+        </p:txBody>
+      </p:sp>
+    </p:spTree>
+    <p:custDataLst>
+      <p:tags r:id="rId1"/>
+    </p:custDataLst>
+    <p:extLst>
+      <p:ext uri="{BB962C8B-B14F-4D97-AF65-F5344CB8AC3E}">
+        <p14:creationId xmlns:p14="http://schemas.microsoft.com/office/powerpoint/2010/main" val="964538590"/>
+      </p:ext>
+    </p:extLst>
+  </p:cSld>
+  <p:clrMapOvr>
+    <a:masterClrMapping/>
+  </p:clrMapOvr>
+  <p:transition spd="slow">
+    <p:wipe dir="d"/>
+  </p:transition>
+  <p:timing>
+    <p:tnLst>
+      <p:par>
+        <p:cTn id="1" dur="indefinite" restart="never" nodeType="tmRoot"/>
+      </p:par>
+    </p:tnLst>
+  </p:timing>
+</p:sld>
+</file>
+
 <file path=ppt/slides/slide19.xml><?xml version="1.0" encoding="utf-8"?>
 <p:sld xmlns:a="http://schemas.openxmlformats.org/drawingml/2006/main" xmlns:r="http://schemas.openxmlformats.org/officeDocument/2006/relationships" xmlns:p="http://schemas.openxmlformats.org/presentationml/2006/main">
   <p:cSld>
@@ -10996,11 +10985,7 @@
           <a:p>
             <a:r>
               <a:rPr lang="en-US" dirty="0" smtClean="0"/>
-              <a:t>HTML 4 </a:t>
-            </a:r>
-            <a:r>
-              <a:rPr lang="en-US" dirty="0" smtClean="0"/>
-              <a:t>– No Functional meaning</a:t>
+              <a:t>HTML 4 – No Functional meaning</a:t>
             </a:r>
             <a:endParaRPr lang="en-US" dirty="0"/>
           </a:p>
@@ -11034,24 +11019,14 @@
           <a:p>
             <a:r>
               <a:rPr lang="en-US" dirty="0" smtClean="0"/>
-              <a:t>For AT is no way to identify whether div represent header, footer, navigation or some </a:t>
-            </a:r>
-            <a:r>
-              <a:rPr lang="en-US" dirty="0" smtClean="0"/>
-              <a:t>content - Demo</a:t>
-            </a:r>
-            <a:endParaRPr lang="en-US" dirty="0" smtClean="0"/>
-          </a:p>
-          <a:p>
-            <a:r>
-              <a:rPr lang="en-US" dirty="0" smtClean="0"/>
-              <a:t>Similarly </a:t>
-            </a:r>
-            <a:r>
-              <a:rPr lang="en-US" dirty="0" smtClean="0"/>
-              <a:t>tables can represent tabular data as well as layout - Demo</a:t>
-            </a:r>
-            <a:endParaRPr lang="en-US" dirty="0" smtClean="0"/>
+              <a:t>For AT is no way to identify whether div represent header, footer, navigation or some content - Demo</a:t>
+            </a:r>
+          </a:p>
+          <a:p>
+            <a:r>
+              <a:rPr lang="en-US" dirty="0" smtClean="0"/>
+              <a:t>Similarly tables can represent tabular data as well as layout - Demo</a:t>
+            </a:r>
           </a:p>
         </p:txBody>
       </p:sp>
@@ -11120,11 +11095,7 @@
           <a:p>
             <a:r>
               <a:rPr lang="en-US" dirty="0" smtClean="0"/>
-              <a:t>Java </a:t>
-            </a:r>
-            <a:r>
-              <a:rPr lang="en-US" dirty="0" smtClean="0"/>
-              <a:t>Script Components</a:t>
+              <a:t>Java Script Components</a:t>
             </a:r>
             <a:endParaRPr lang="en-US" dirty="0"/>
           </a:p>
@@ -11269,21 +11240,13 @@
           <a:p>
             <a:r>
               <a:rPr lang="en-US" dirty="0" smtClean="0"/>
-              <a:t>Semantic </a:t>
-            </a:r>
-            <a:r>
-              <a:rPr lang="en-US" dirty="0" smtClean="0"/>
-              <a:t>meaning of element</a:t>
-            </a:r>
-          </a:p>
-          <a:p>
-            <a:r>
-              <a:rPr lang="en-US" dirty="0" smtClean="0"/>
-              <a:t>State of element </a:t>
-            </a:r>
-            <a:r>
-              <a:rPr lang="en-US" dirty="0" smtClean="0"/>
-              <a:t>– that can change, dynamic aspect of element</a:t>
+              <a:t>Semantic meaning of element</a:t>
+            </a:r>
+          </a:p>
+          <a:p>
+            <a:r>
+              <a:rPr lang="en-US" dirty="0" smtClean="0"/>
+              <a:t>State of element – that can change, dynamic aspect of element</a:t>
             </a:r>
           </a:p>
           <a:p>
@@ -11302,19 +11265,7 @@
             </a:pPr>
             <a:r>
               <a:rPr lang="en-US" dirty="0" smtClean="0"/>
-              <a:t>Need </a:t>
-            </a:r>
-            <a:r>
-              <a:rPr lang="en-US" dirty="0" smtClean="0"/>
-              <a:t>some way to make above </a:t>
-            </a:r>
-            <a:r>
-              <a:rPr lang="en-US" dirty="0" smtClean="0"/>
-              <a:t>information </a:t>
-            </a:r>
-            <a:r>
-              <a:rPr lang="en-US" dirty="0" smtClean="0"/>
-              <a:t>available to AT</a:t>
+              <a:t>Need some way to make above information available to AT</a:t>
             </a:r>
           </a:p>
           <a:p>

</xml_diff>

<commit_message>
Final version  for training on 19-20 nov
</commit_message>
<xml_diff>
--- a/ppt/aria.pptx
+++ b/ppt/aria.pptx
@@ -5,46 +5,53 @@
     <p:sldMasterId id="2147483648" r:id="rId1"/>
   </p:sldMasterIdLst>
   <p:notesMasterIdLst>
-    <p:notesMasterId r:id="rId36"/>
+    <p:notesMasterId r:id="rId43"/>
   </p:notesMasterIdLst>
   <p:handoutMasterIdLst>
-    <p:handoutMasterId r:id="rId37"/>
+    <p:handoutMasterId r:id="rId44"/>
   </p:handoutMasterIdLst>
   <p:sldIdLst>
     <p:sldId id="259" r:id="rId2"/>
     <p:sldId id="281" r:id="rId3"/>
     <p:sldId id="320" r:id="rId4"/>
     <p:sldId id="322" r:id="rId5"/>
-    <p:sldId id="325" r:id="rId6"/>
-    <p:sldId id="326" r:id="rId7"/>
+    <p:sldId id="333" r:id="rId6"/>
+    <p:sldId id="325" r:id="rId7"/>
     <p:sldId id="329" r:id="rId8"/>
     <p:sldId id="323" r:id="rId9"/>
-    <p:sldId id="330" r:id="rId10"/>
-    <p:sldId id="308" r:id="rId11"/>
-    <p:sldId id="327" r:id="rId12"/>
-    <p:sldId id="328" r:id="rId13"/>
-    <p:sldId id="331" r:id="rId14"/>
-    <p:sldId id="324" r:id="rId15"/>
-    <p:sldId id="332" r:id="rId16"/>
-    <p:sldId id="303" r:id="rId17"/>
-    <p:sldId id="310" r:id="rId18"/>
-    <p:sldId id="321" r:id="rId19"/>
-    <p:sldId id="304" r:id="rId20"/>
-    <p:sldId id="319" r:id="rId21"/>
-    <p:sldId id="311" r:id="rId22"/>
-    <p:sldId id="306" r:id="rId23"/>
-    <p:sldId id="313" r:id="rId24"/>
-    <p:sldId id="309" r:id="rId25"/>
-    <p:sldId id="312" r:id="rId26"/>
-    <p:sldId id="314" r:id="rId27"/>
-    <p:sldId id="307" r:id="rId28"/>
-    <p:sldId id="315" r:id="rId29"/>
-    <p:sldId id="300" r:id="rId30"/>
-    <p:sldId id="316" r:id="rId31"/>
-    <p:sldId id="317" r:id="rId32"/>
-    <p:sldId id="318" r:id="rId33"/>
-    <p:sldId id="292" r:id="rId34"/>
-    <p:sldId id="277" r:id="rId35"/>
+    <p:sldId id="340" r:id="rId10"/>
+    <p:sldId id="330" r:id="rId11"/>
+    <p:sldId id="308" r:id="rId12"/>
+    <p:sldId id="327" r:id="rId13"/>
+    <p:sldId id="328" r:id="rId14"/>
+    <p:sldId id="331" r:id="rId15"/>
+    <p:sldId id="335" r:id="rId16"/>
+    <p:sldId id="336" r:id="rId17"/>
+    <p:sldId id="337" r:id="rId18"/>
+    <p:sldId id="338" r:id="rId19"/>
+    <p:sldId id="339" r:id="rId20"/>
+    <p:sldId id="342" r:id="rId21"/>
+    <p:sldId id="303" r:id="rId22"/>
+    <p:sldId id="341" r:id="rId23"/>
+    <p:sldId id="304" r:id="rId24"/>
+    <p:sldId id="310" r:id="rId25"/>
+    <p:sldId id="319" r:id="rId26"/>
+    <p:sldId id="311" r:id="rId27"/>
+    <p:sldId id="306" r:id="rId28"/>
+    <p:sldId id="313" r:id="rId29"/>
+    <p:sldId id="309" r:id="rId30"/>
+    <p:sldId id="312" r:id="rId31"/>
+    <p:sldId id="314" r:id="rId32"/>
+    <p:sldId id="307" r:id="rId33"/>
+    <p:sldId id="315" r:id="rId34"/>
+    <p:sldId id="343" r:id="rId35"/>
+    <p:sldId id="316" r:id="rId36"/>
+    <p:sldId id="317" r:id="rId37"/>
+    <p:sldId id="345" r:id="rId38"/>
+    <p:sldId id="344" r:id="rId39"/>
+    <p:sldId id="318" r:id="rId40"/>
+    <p:sldId id="292" r:id="rId41"/>
+    <p:sldId id="277" r:id="rId42"/>
   </p:sldIdLst>
   <p:sldSz cx="9144000" cy="6858000" type="screen4x3"/>
   <p:notesSz cx="6858000" cy="9144000"/>
@@ -152,25 +159,30 @@
             <p14:sldId id="281"/>
             <p14:sldId id="320"/>
             <p14:sldId id="322"/>
+            <p14:sldId id="333"/>
             <p14:sldId id="325"/>
-            <p14:sldId id="326"/>
             <p14:sldId id="329"/>
             <p14:sldId id="323"/>
+            <p14:sldId id="340"/>
             <p14:sldId id="330"/>
             <p14:sldId id="308"/>
             <p14:sldId id="327"/>
             <p14:sldId id="328"/>
             <p14:sldId id="331"/>
-            <p14:sldId id="324"/>
-            <p14:sldId id="332"/>
+            <p14:sldId id="335"/>
+            <p14:sldId id="336"/>
+            <p14:sldId id="337"/>
+            <p14:sldId id="338"/>
+            <p14:sldId id="339"/>
+            <p14:sldId id="342"/>
           </p14:sldIdLst>
         </p14:section>
         <p14:section name="Topics" id="{ABA716BF-3A5C-4ADB-94C9-CFEF84EBA240}">
           <p14:sldIdLst>
             <p14:sldId id="303"/>
+            <p14:sldId id="341"/>
+            <p14:sldId id="304"/>
             <p14:sldId id="310"/>
-            <p14:sldId id="321"/>
-            <p14:sldId id="304"/>
             <p14:sldId id="319"/>
             <p14:sldId id="311"/>
             <p14:sldId id="306"/>
@@ -180,9 +192,11 @@
             <p14:sldId id="314"/>
             <p14:sldId id="307"/>
             <p14:sldId id="315"/>
-            <p14:sldId id="300"/>
+            <p14:sldId id="343"/>
             <p14:sldId id="316"/>
             <p14:sldId id="317"/>
+            <p14:sldId id="345"/>
+            <p14:sldId id="344"/>
             <p14:sldId id="318"/>
             <p14:sldId id="292"/>
           </p14:sldIdLst>
@@ -281,7 +295,7 @@
             <a:fld id="{D83FDC75-7F73-4A4A-A77C-09AADF00E0EA}" type="datetimeFigureOut">
               <a:rPr lang="en-US" smtClean="0"/>
               <a:pPr/>
-              <a:t>11/18/2013</a:t>
+              <a:t>11/20/2013</a:t>
             </a:fld>
             <a:endParaRPr lang="en-US" dirty="0"/>
           </a:p>
@@ -448,7 +462,7 @@
             <a:fld id="{48AEF76B-3757-4A0B-AF93-28494465C1DD}" type="datetimeFigureOut">
               <a:rPr lang="en-US" smtClean="0"/>
               <a:pPr/>
-              <a:t>11/18/2013</a:t>
+              <a:t>11/20/2013</a:t>
             </a:fld>
             <a:endParaRPr lang="en-US" dirty="0"/>
           </a:p>
@@ -1529,29 +1543,36 @@
         </p:nvSpPr>
         <p:spPr/>
         <p:txBody>
+          <a:bodyPr>
+            <a:normAutofit/>
+          </a:bodyPr>
+          <a:lstStyle/>
+          <a:p>
+            <a:pPr>
+              <a:lnSpc>
+                <a:spcPct val="80000"/>
+              </a:lnSpc>
+            </a:pPr>
+            <a:endParaRPr lang="en-US" dirty="0" smtClean="0"/>
+          </a:p>
+        </p:txBody>
+      </p:sp>
+      <p:sp>
+        <p:nvSpPr>
+          <p:cNvPr id="4" name="Slide Number Placeholder 3"/>
+          <p:cNvSpPr>
+            <a:spLocks noGrp="1"/>
+          </p:cNvSpPr>
+          <p:nvPr>
+            <p:ph type="sldNum" sz="quarter" idx="10"/>
+          </p:nvPr>
+        </p:nvSpPr>
+        <p:spPr/>
+        <p:txBody>
           <a:bodyPr/>
           <a:lstStyle/>
           <a:p>
-            <a:endParaRPr lang="en-US" dirty="0"/>
-          </a:p>
-        </p:txBody>
-      </p:sp>
-      <p:sp>
-        <p:nvSpPr>
-          <p:cNvPr id="4" name="Slide Number Placeholder 3"/>
-          <p:cNvSpPr>
-            <a:spLocks noGrp="1"/>
-          </p:cNvSpPr>
-          <p:nvPr>
-            <p:ph type="sldNum" sz="quarter" idx="10"/>
-          </p:nvPr>
-        </p:nvSpPr>
-        <p:spPr/>
-        <p:txBody>
-          <a:bodyPr/>
-          <a:lstStyle/>
-          <a:p>
-            <a:fld id="{75693FD4-8F83-4EF7-AC3F-0DC0388986B0}" type="slidenum">
+            <a:fld id="{EC6EAC7D-5A89-47C2-8ABA-56C9C2DEF7A4}" type="slidenum">
               <a:rPr lang="en-US" smtClean="0"/>
               <a:pPr/>
               <a:t>16</a:t>
@@ -1950,17 +1971,10 @@
         </p:nvSpPr>
         <p:spPr/>
         <p:txBody>
-          <a:bodyPr>
-            <a:normAutofit/>
-          </a:bodyPr>
-          <a:lstStyle/>
-          <a:p>
-            <a:pPr>
-              <a:lnSpc>
-                <a:spcPct val="80000"/>
-              </a:lnSpc>
-            </a:pPr>
-            <a:endParaRPr lang="en-US" dirty="0" smtClean="0"/>
+          <a:bodyPr/>
+          <a:lstStyle/>
+          <a:p>
+            <a:endParaRPr lang="en-US" dirty="0"/>
           </a:p>
         </p:txBody>
       </p:sp>
@@ -1979,7 +1993,7 @@
           <a:bodyPr/>
           <a:lstStyle/>
           <a:p>
-            <a:fld id="{EC6EAC7D-5A89-47C2-8ABA-56C9C2DEF7A4}" type="slidenum">
+            <a:fld id="{75693FD4-8F83-4EF7-AC3F-0DC0388986B0}" type="slidenum">
               <a:rPr lang="en-US" smtClean="0"/>
               <a:pPr/>
               <a:t>20</a:t>
@@ -2037,17 +2051,10 @@
         </p:nvSpPr>
         <p:spPr/>
         <p:txBody>
-          <a:bodyPr>
-            <a:normAutofit/>
-          </a:bodyPr>
-          <a:lstStyle/>
-          <a:p>
-            <a:pPr>
-              <a:lnSpc>
-                <a:spcPct val="80000"/>
-              </a:lnSpc>
-            </a:pPr>
-            <a:endParaRPr lang="en-US" dirty="0" smtClean="0"/>
+          <a:bodyPr/>
+          <a:lstStyle/>
+          <a:p>
+            <a:endParaRPr lang="en-US" dirty="0"/>
           </a:p>
         </p:txBody>
       </p:sp>
@@ -2066,10 +2073,10 @@
           <a:bodyPr/>
           <a:lstStyle/>
           <a:p>
-            <a:fld id="{EC6EAC7D-5A89-47C2-8ABA-56C9C2DEF7A4}" type="slidenum">
+            <a:fld id="{75693FD4-8F83-4EF7-AC3F-0DC0388986B0}" type="slidenum">
               <a:rPr lang="en-US" smtClean="0"/>
               <a:pPr/>
-              <a:t>22</a:t>
+              <a:t>21</a:t>
             </a:fld>
             <a:endParaRPr lang="en-US"/>
           </a:p>
@@ -2124,17 +2131,10 @@
         </p:nvSpPr>
         <p:spPr/>
         <p:txBody>
-          <a:bodyPr>
-            <a:normAutofit/>
-          </a:bodyPr>
-          <a:lstStyle/>
-          <a:p>
-            <a:pPr>
-              <a:lnSpc>
-                <a:spcPct val="80000"/>
-              </a:lnSpc>
-            </a:pPr>
-            <a:endParaRPr lang="en-US" dirty="0" smtClean="0"/>
+          <a:bodyPr/>
+          <a:lstStyle/>
+          <a:p>
+            <a:endParaRPr lang="en-US" dirty="0"/>
           </a:p>
         </p:txBody>
       </p:sp>
@@ -2153,10 +2153,10 @@
           <a:bodyPr/>
           <a:lstStyle/>
           <a:p>
-            <a:fld id="{EC6EAC7D-5A89-47C2-8ABA-56C9C2DEF7A4}" type="slidenum">
+            <a:fld id="{75693FD4-8F83-4EF7-AC3F-0DC0388986B0}" type="slidenum">
               <a:rPr lang="en-US" smtClean="0"/>
               <a:pPr/>
-              <a:t>23</a:t>
+              <a:t>22</a:t>
             </a:fld>
             <a:endParaRPr lang="en-US"/>
           </a:p>
@@ -2243,7 +2243,7 @@
             <a:fld id="{EC6EAC7D-5A89-47C2-8ABA-56C9C2DEF7A4}" type="slidenum">
               <a:rPr lang="en-US" smtClean="0"/>
               <a:pPr/>
-              <a:t>24</a:t>
+              <a:t>23</a:t>
             </a:fld>
             <a:endParaRPr lang="en-US"/>
           </a:p>
@@ -2298,32 +2298,39 @@
         </p:nvSpPr>
         <p:spPr/>
         <p:txBody>
+          <a:bodyPr>
+            <a:normAutofit/>
+          </a:bodyPr>
+          <a:lstStyle/>
+          <a:p>
+            <a:pPr>
+              <a:lnSpc>
+                <a:spcPct val="80000"/>
+              </a:lnSpc>
+            </a:pPr>
+            <a:endParaRPr lang="en-US" dirty="0" smtClean="0"/>
+          </a:p>
+        </p:txBody>
+      </p:sp>
+      <p:sp>
+        <p:nvSpPr>
+          <p:cNvPr id="4" name="Slide Number Placeholder 3"/>
+          <p:cNvSpPr>
+            <a:spLocks noGrp="1"/>
+          </p:cNvSpPr>
+          <p:nvPr>
+            <p:ph type="sldNum" sz="quarter" idx="10"/>
+          </p:nvPr>
+        </p:nvSpPr>
+        <p:spPr/>
+        <p:txBody>
           <a:bodyPr/>
           <a:lstStyle/>
           <a:p>
-            <a:endParaRPr lang="en-US" dirty="0"/>
-          </a:p>
-        </p:txBody>
-      </p:sp>
-      <p:sp>
-        <p:nvSpPr>
-          <p:cNvPr id="4" name="Slide Number Placeholder 3"/>
-          <p:cNvSpPr>
-            <a:spLocks noGrp="1"/>
-          </p:cNvSpPr>
-          <p:nvPr>
-            <p:ph type="sldNum" sz="quarter" idx="10"/>
-          </p:nvPr>
-        </p:nvSpPr>
-        <p:spPr/>
-        <p:txBody>
-          <a:bodyPr/>
-          <a:lstStyle/>
-          <a:p>
-            <a:fld id="{75693FD4-8F83-4EF7-AC3F-0DC0388986B0}" type="slidenum">
+            <a:fld id="{EC6EAC7D-5A89-47C2-8ABA-56C9C2DEF7A4}" type="slidenum">
               <a:rPr lang="en-US" smtClean="0"/>
               <a:pPr/>
-              <a:t>25</a:t>
+              <a:t>24</a:t>
             </a:fld>
             <a:endParaRPr lang="en-US"/>
           </a:p>
@@ -2410,7 +2417,7 @@
             <a:fld id="{EC6EAC7D-5A89-47C2-8ABA-56C9C2DEF7A4}" type="slidenum">
               <a:rPr lang="en-US" smtClean="0"/>
               <a:pPr/>
-              <a:t>26</a:t>
+              <a:t>25</a:t>
             </a:fld>
             <a:endParaRPr lang="en-US"/>
           </a:p>
@@ -2639,29 +2646,36 @@
         </p:nvSpPr>
         <p:spPr/>
         <p:txBody>
+          <a:bodyPr>
+            <a:normAutofit/>
+          </a:bodyPr>
+          <a:lstStyle/>
+          <a:p>
+            <a:pPr>
+              <a:lnSpc>
+                <a:spcPct val="80000"/>
+              </a:lnSpc>
+            </a:pPr>
+            <a:endParaRPr lang="en-US" dirty="0" smtClean="0"/>
+          </a:p>
+        </p:txBody>
+      </p:sp>
+      <p:sp>
+        <p:nvSpPr>
+          <p:cNvPr id="4" name="Slide Number Placeholder 3"/>
+          <p:cNvSpPr>
+            <a:spLocks noGrp="1"/>
+          </p:cNvSpPr>
+          <p:nvPr>
+            <p:ph type="sldNum" sz="quarter" idx="10"/>
+          </p:nvPr>
+        </p:nvSpPr>
+        <p:spPr/>
+        <p:txBody>
           <a:bodyPr/>
           <a:lstStyle/>
           <a:p>
-            <a:endParaRPr lang="en-US" dirty="0"/>
-          </a:p>
-        </p:txBody>
-      </p:sp>
-      <p:sp>
-        <p:nvSpPr>
-          <p:cNvPr id="4" name="Slide Number Placeholder 3"/>
-          <p:cNvSpPr>
-            <a:spLocks noGrp="1"/>
-          </p:cNvSpPr>
-          <p:nvPr>
-            <p:ph type="sldNum" sz="quarter" idx="10"/>
-          </p:nvPr>
-        </p:nvSpPr>
-        <p:spPr/>
-        <p:txBody>
-          <a:bodyPr/>
-          <a:lstStyle/>
-          <a:p>
-            <a:fld id="{75693FD4-8F83-4EF7-AC3F-0DC0388986B0}" type="slidenum">
+            <a:fld id="{EC6EAC7D-5A89-47C2-8ABA-56C9C2DEF7A4}" type="slidenum">
               <a:rPr lang="en-US" smtClean="0"/>
               <a:pPr/>
               <a:t>29</a:t>
@@ -3061,42 +3075,41 @@
         </p:nvSpPr>
         <p:spPr/>
         <p:txBody>
+          <a:bodyPr>
+            <a:normAutofit/>
+          </a:bodyPr>
+          <a:lstStyle/>
+          <a:p>
+            <a:pPr>
+              <a:lnSpc>
+                <a:spcPct val="80000"/>
+              </a:lnSpc>
+            </a:pPr>
+            <a:endParaRPr lang="en-US" dirty="0" smtClean="0"/>
+          </a:p>
+        </p:txBody>
+      </p:sp>
+      <p:sp>
+        <p:nvSpPr>
+          <p:cNvPr id="4" name="Slide Number Placeholder 3"/>
+          <p:cNvSpPr>
+            <a:spLocks noGrp="1"/>
+          </p:cNvSpPr>
+          <p:nvPr>
+            <p:ph type="sldNum" sz="quarter" idx="10"/>
+          </p:nvPr>
+        </p:nvSpPr>
+        <p:spPr/>
+        <p:txBody>
           <a:bodyPr/>
           <a:lstStyle/>
           <a:p>
-            <a:endParaRPr lang="en-US"/>
-          </a:p>
-        </p:txBody>
-      </p:sp>
-      <p:sp>
-        <p:nvSpPr>
-          <p:cNvPr id="4" name="Slide Number Placeholder 3"/>
-          <p:cNvSpPr>
-            <a:spLocks noGrp="1"/>
-          </p:cNvSpPr>
-          <p:nvPr>
-            <p:ph type="sldNum" sz="quarter" idx="10"/>
-          </p:nvPr>
-        </p:nvSpPr>
-        <p:spPr/>
-        <p:txBody>
-          <a:bodyPr/>
-          <a:lstStyle/>
-          <a:p>
-            <a:fld id="{75693FD4-8F83-4EF7-AC3F-0DC0388986B0}" type="slidenum">
-              <a:rPr lang="en-US" smtClean="0">
-                <a:solidFill>
-                  <a:prstClr val="black"/>
-                </a:solidFill>
-              </a:rPr>
+            <a:fld id="{EC6EAC7D-5A89-47C2-8ABA-56C9C2DEF7A4}" type="slidenum">
+              <a:rPr lang="en-US" smtClean="0"/>
               <a:pPr/>
               <a:t>33</a:t>
             </a:fld>
-            <a:endParaRPr lang="en-US">
-              <a:solidFill>
-                <a:prstClr val="black"/>
-              </a:solidFill>
-            </a:endParaRPr>
+            <a:endParaRPr lang="en-US"/>
           </a:p>
         </p:txBody>
       </p:sp>
@@ -3127,6 +3140,523 @@
       </p:grpSpPr>
       <p:sp>
         <p:nvSpPr>
+          <p:cNvPr id="2" name="Slide Image Placeholder 1"/>
+          <p:cNvSpPr>
+            <a:spLocks noGrp="1" noRot="1" noChangeAspect="1"/>
+          </p:cNvSpPr>
+          <p:nvPr>
+            <p:ph type="sldImg"/>
+          </p:nvPr>
+        </p:nvSpPr>
+        <p:spPr/>
+      </p:sp>
+      <p:sp>
+        <p:nvSpPr>
+          <p:cNvPr id="3" name="Notes Placeholder 2"/>
+          <p:cNvSpPr>
+            <a:spLocks noGrp="1"/>
+          </p:cNvSpPr>
+          <p:nvPr>
+            <p:ph type="body" idx="1"/>
+          </p:nvPr>
+        </p:nvSpPr>
+        <p:spPr/>
+        <p:txBody>
+          <a:bodyPr>
+            <a:normAutofit/>
+          </a:bodyPr>
+          <a:lstStyle/>
+          <a:p>
+            <a:pPr>
+              <a:lnSpc>
+                <a:spcPct val="80000"/>
+              </a:lnSpc>
+            </a:pPr>
+            <a:endParaRPr lang="en-US" dirty="0" smtClean="0"/>
+          </a:p>
+        </p:txBody>
+      </p:sp>
+      <p:sp>
+        <p:nvSpPr>
+          <p:cNvPr id="4" name="Slide Number Placeholder 3"/>
+          <p:cNvSpPr>
+            <a:spLocks noGrp="1"/>
+          </p:cNvSpPr>
+          <p:nvPr>
+            <p:ph type="sldNum" sz="quarter" idx="10"/>
+          </p:nvPr>
+        </p:nvSpPr>
+        <p:spPr/>
+        <p:txBody>
+          <a:bodyPr/>
+          <a:lstStyle/>
+          <a:p>
+            <a:fld id="{EC6EAC7D-5A89-47C2-8ABA-56C9C2DEF7A4}" type="slidenum">
+              <a:rPr lang="en-US" smtClean="0"/>
+              <a:pPr/>
+              <a:t>34</a:t>
+            </a:fld>
+            <a:endParaRPr lang="en-US"/>
+          </a:p>
+        </p:txBody>
+      </p:sp>
+    </p:spTree>
+  </p:cSld>
+  <p:clrMapOvr>
+    <a:masterClrMapping/>
+  </p:clrMapOvr>
+</p:notes>
+</file>
+
+<file path=ppt/notesSlides/notesSlide34.xml><?xml version="1.0" encoding="utf-8"?>
+<p:notes xmlns:a="http://schemas.openxmlformats.org/drawingml/2006/main" xmlns:r="http://schemas.openxmlformats.org/officeDocument/2006/relationships" xmlns:p="http://schemas.openxmlformats.org/presentationml/2006/main">
+  <p:cSld>
+    <p:spTree>
+      <p:nvGrpSpPr>
+        <p:cNvPr id="1" name=""/>
+        <p:cNvGrpSpPr/>
+        <p:nvPr/>
+      </p:nvGrpSpPr>
+      <p:grpSpPr>
+        <a:xfrm>
+          <a:off x="0" y="0"/>
+          <a:ext cx="0" cy="0"/>
+          <a:chOff x="0" y="0"/>
+          <a:chExt cx="0" cy="0"/>
+        </a:xfrm>
+      </p:grpSpPr>
+      <p:sp>
+        <p:nvSpPr>
+          <p:cNvPr id="2" name="Slide Image Placeholder 1"/>
+          <p:cNvSpPr>
+            <a:spLocks noGrp="1" noRot="1" noChangeAspect="1"/>
+          </p:cNvSpPr>
+          <p:nvPr>
+            <p:ph type="sldImg"/>
+          </p:nvPr>
+        </p:nvSpPr>
+        <p:spPr/>
+      </p:sp>
+      <p:sp>
+        <p:nvSpPr>
+          <p:cNvPr id="3" name="Notes Placeholder 2"/>
+          <p:cNvSpPr>
+            <a:spLocks noGrp="1"/>
+          </p:cNvSpPr>
+          <p:nvPr>
+            <p:ph type="body" idx="1"/>
+          </p:nvPr>
+        </p:nvSpPr>
+        <p:spPr/>
+        <p:txBody>
+          <a:bodyPr/>
+          <a:lstStyle/>
+          <a:p>
+            <a:endParaRPr lang="en-US" dirty="0"/>
+          </a:p>
+        </p:txBody>
+      </p:sp>
+      <p:sp>
+        <p:nvSpPr>
+          <p:cNvPr id="4" name="Slide Number Placeholder 3"/>
+          <p:cNvSpPr>
+            <a:spLocks noGrp="1"/>
+          </p:cNvSpPr>
+          <p:nvPr>
+            <p:ph type="sldNum" sz="quarter" idx="10"/>
+          </p:nvPr>
+        </p:nvSpPr>
+        <p:spPr/>
+        <p:txBody>
+          <a:bodyPr/>
+          <a:lstStyle/>
+          <a:p>
+            <a:fld id="{75693FD4-8F83-4EF7-AC3F-0DC0388986B0}" type="slidenum">
+              <a:rPr lang="en-US" smtClean="0"/>
+              <a:pPr/>
+              <a:t>35</a:t>
+            </a:fld>
+            <a:endParaRPr lang="en-US"/>
+          </a:p>
+        </p:txBody>
+      </p:sp>
+    </p:spTree>
+  </p:cSld>
+  <p:clrMapOvr>
+    <a:masterClrMapping/>
+  </p:clrMapOvr>
+</p:notes>
+</file>
+
+<file path=ppt/notesSlides/notesSlide35.xml><?xml version="1.0" encoding="utf-8"?>
+<p:notes xmlns:a="http://schemas.openxmlformats.org/drawingml/2006/main" xmlns:r="http://schemas.openxmlformats.org/officeDocument/2006/relationships" xmlns:p="http://schemas.openxmlformats.org/presentationml/2006/main">
+  <p:cSld>
+    <p:spTree>
+      <p:nvGrpSpPr>
+        <p:cNvPr id="1" name=""/>
+        <p:cNvGrpSpPr/>
+        <p:nvPr/>
+      </p:nvGrpSpPr>
+      <p:grpSpPr>
+        <a:xfrm>
+          <a:off x="0" y="0"/>
+          <a:ext cx="0" cy="0"/>
+          <a:chOff x="0" y="0"/>
+          <a:chExt cx="0" cy="0"/>
+        </a:xfrm>
+      </p:grpSpPr>
+      <p:sp>
+        <p:nvSpPr>
+          <p:cNvPr id="2" name="Slide Image Placeholder 1"/>
+          <p:cNvSpPr>
+            <a:spLocks noGrp="1" noRot="1" noChangeAspect="1"/>
+          </p:cNvSpPr>
+          <p:nvPr>
+            <p:ph type="sldImg"/>
+          </p:nvPr>
+        </p:nvSpPr>
+        <p:spPr/>
+      </p:sp>
+      <p:sp>
+        <p:nvSpPr>
+          <p:cNvPr id="3" name="Notes Placeholder 2"/>
+          <p:cNvSpPr>
+            <a:spLocks noGrp="1"/>
+          </p:cNvSpPr>
+          <p:nvPr>
+            <p:ph type="body" idx="1"/>
+          </p:nvPr>
+        </p:nvSpPr>
+        <p:spPr/>
+        <p:txBody>
+          <a:bodyPr>
+            <a:normAutofit/>
+          </a:bodyPr>
+          <a:lstStyle/>
+          <a:p>
+            <a:pPr>
+              <a:lnSpc>
+                <a:spcPct val="80000"/>
+              </a:lnSpc>
+            </a:pPr>
+            <a:endParaRPr lang="en-US" dirty="0" smtClean="0"/>
+          </a:p>
+        </p:txBody>
+      </p:sp>
+      <p:sp>
+        <p:nvSpPr>
+          <p:cNvPr id="4" name="Slide Number Placeholder 3"/>
+          <p:cNvSpPr>
+            <a:spLocks noGrp="1"/>
+          </p:cNvSpPr>
+          <p:nvPr>
+            <p:ph type="sldNum" sz="quarter" idx="10"/>
+          </p:nvPr>
+        </p:nvSpPr>
+        <p:spPr/>
+        <p:txBody>
+          <a:bodyPr/>
+          <a:lstStyle/>
+          <a:p>
+            <a:fld id="{EC6EAC7D-5A89-47C2-8ABA-56C9C2DEF7A4}" type="slidenum">
+              <a:rPr lang="en-US" smtClean="0"/>
+              <a:pPr/>
+              <a:t>36</a:t>
+            </a:fld>
+            <a:endParaRPr lang="en-US"/>
+          </a:p>
+        </p:txBody>
+      </p:sp>
+    </p:spTree>
+  </p:cSld>
+  <p:clrMapOvr>
+    <a:masterClrMapping/>
+  </p:clrMapOvr>
+</p:notes>
+</file>
+
+<file path=ppt/notesSlides/notesSlide36.xml><?xml version="1.0" encoding="utf-8"?>
+<p:notes xmlns:a="http://schemas.openxmlformats.org/drawingml/2006/main" xmlns:r="http://schemas.openxmlformats.org/officeDocument/2006/relationships" xmlns:p="http://schemas.openxmlformats.org/presentationml/2006/main">
+  <p:cSld>
+    <p:spTree>
+      <p:nvGrpSpPr>
+        <p:cNvPr id="1" name=""/>
+        <p:cNvGrpSpPr/>
+        <p:nvPr/>
+      </p:nvGrpSpPr>
+      <p:grpSpPr>
+        <a:xfrm>
+          <a:off x="0" y="0"/>
+          <a:ext cx="0" cy="0"/>
+          <a:chOff x="0" y="0"/>
+          <a:chExt cx="0" cy="0"/>
+        </a:xfrm>
+      </p:grpSpPr>
+      <p:sp>
+        <p:nvSpPr>
+          <p:cNvPr id="2" name="Slide Image Placeholder 1"/>
+          <p:cNvSpPr>
+            <a:spLocks noGrp="1" noRot="1" noChangeAspect="1"/>
+          </p:cNvSpPr>
+          <p:nvPr>
+            <p:ph type="sldImg"/>
+          </p:nvPr>
+        </p:nvSpPr>
+        <p:spPr/>
+      </p:sp>
+      <p:sp>
+        <p:nvSpPr>
+          <p:cNvPr id="3" name="Notes Placeholder 2"/>
+          <p:cNvSpPr>
+            <a:spLocks noGrp="1"/>
+          </p:cNvSpPr>
+          <p:nvPr>
+            <p:ph type="body" idx="1"/>
+          </p:nvPr>
+        </p:nvSpPr>
+        <p:spPr/>
+        <p:txBody>
+          <a:bodyPr/>
+          <a:lstStyle/>
+          <a:p>
+            <a:endParaRPr lang="en-US"/>
+          </a:p>
+        </p:txBody>
+      </p:sp>
+      <p:sp>
+        <p:nvSpPr>
+          <p:cNvPr id="4" name="Slide Number Placeholder 3"/>
+          <p:cNvSpPr>
+            <a:spLocks noGrp="1"/>
+          </p:cNvSpPr>
+          <p:nvPr>
+            <p:ph type="sldNum" sz="quarter" idx="10"/>
+          </p:nvPr>
+        </p:nvSpPr>
+        <p:spPr/>
+        <p:txBody>
+          <a:bodyPr/>
+          <a:lstStyle/>
+          <a:p>
+            <a:fld id="{75693FD4-8F83-4EF7-AC3F-0DC0388986B0}" type="slidenum">
+              <a:rPr lang="en-US" smtClean="0">
+                <a:solidFill>
+                  <a:prstClr val="black"/>
+                </a:solidFill>
+              </a:rPr>
+              <a:pPr/>
+              <a:t>37</a:t>
+            </a:fld>
+            <a:endParaRPr lang="en-US">
+              <a:solidFill>
+                <a:prstClr val="black"/>
+              </a:solidFill>
+            </a:endParaRPr>
+          </a:p>
+        </p:txBody>
+      </p:sp>
+    </p:spTree>
+  </p:cSld>
+  <p:clrMapOvr>
+    <a:masterClrMapping/>
+  </p:clrMapOvr>
+</p:notes>
+</file>
+
+<file path=ppt/notesSlides/notesSlide37.xml><?xml version="1.0" encoding="utf-8"?>
+<p:notes xmlns:a="http://schemas.openxmlformats.org/drawingml/2006/main" xmlns:r="http://schemas.openxmlformats.org/officeDocument/2006/relationships" xmlns:p="http://schemas.openxmlformats.org/presentationml/2006/main">
+  <p:cSld>
+    <p:spTree>
+      <p:nvGrpSpPr>
+        <p:cNvPr id="1" name=""/>
+        <p:cNvGrpSpPr/>
+        <p:nvPr/>
+      </p:nvGrpSpPr>
+      <p:grpSpPr>
+        <a:xfrm>
+          <a:off x="0" y="0"/>
+          <a:ext cx="0" cy="0"/>
+          <a:chOff x="0" y="0"/>
+          <a:chExt cx="0" cy="0"/>
+        </a:xfrm>
+      </p:grpSpPr>
+      <p:sp>
+        <p:nvSpPr>
+          <p:cNvPr id="2" name="Slide Image Placeholder 1"/>
+          <p:cNvSpPr>
+            <a:spLocks noGrp="1" noRot="1" noChangeAspect="1"/>
+          </p:cNvSpPr>
+          <p:nvPr>
+            <p:ph type="sldImg"/>
+          </p:nvPr>
+        </p:nvSpPr>
+        <p:spPr/>
+      </p:sp>
+      <p:sp>
+        <p:nvSpPr>
+          <p:cNvPr id="3" name="Notes Placeholder 2"/>
+          <p:cNvSpPr>
+            <a:spLocks noGrp="1"/>
+          </p:cNvSpPr>
+          <p:nvPr>
+            <p:ph type="body" idx="1"/>
+          </p:nvPr>
+        </p:nvSpPr>
+        <p:spPr/>
+        <p:txBody>
+          <a:bodyPr>
+            <a:normAutofit/>
+          </a:bodyPr>
+          <a:lstStyle/>
+          <a:p>
+            <a:pPr>
+              <a:lnSpc>
+                <a:spcPct val="80000"/>
+              </a:lnSpc>
+            </a:pPr>
+            <a:endParaRPr lang="en-US" dirty="0" smtClean="0"/>
+          </a:p>
+        </p:txBody>
+      </p:sp>
+      <p:sp>
+        <p:nvSpPr>
+          <p:cNvPr id="4" name="Slide Number Placeholder 3"/>
+          <p:cNvSpPr>
+            <a:spLocks noGrp="1"/>
+          </p:cNvSpPr>
+          <p:nvPr>
+            <p:ph type="sldNum" sz="quarter" idx="10"/>
+          </p:nvPr>
+        </p:nvSpPr>
+        <p:spPr/>
+        <p:txBody>
+          <a:bodyPr/>
+          <a:lstStyle/>
+          <a:p>
+            <a:fld id="{EC6EAC7D-5A89-47C2-8ABA-56C9C2DEF7A4}" type="slidenum">
+              <a:rPr lang="en-US" smtClean="0"/>
+              <a:pPr/>
+              <a:t>39</a:t>
+            </a:fld>
+            <a:endParaRPr lang="en-US"/>
+          </a:p>
+        </p:txBody>
+      </p:sp>
+    </p:spTree>
+  </p:cSld>
+  <p:clrMapOvr>
+    <a:masterClrMapping/>
+  </p:clrMapOvr>
+</p:notes>
+</file>
+
+<file path=ppt/notesSlides/notesSlide38.xml><?xml version="1.0" encoding="utf-8"?>
+<p:notes xmlns:a="http://schemas.openxmlformats.org/drawingml/2006/main" xmlns:r="http://schemas.openxmlformats.org/officeDocument/2006/relationships" xmlns:p="http://schemas.openxmlformats.org/presentationml/2006/main">
+  <p:cSld>
+    <p:spTree>
+      <p:nvGrpSpPr>
+        <p:cNvPr id="1" name=""/>
+        <p:cNvGrpSpPr/>
+        <p:nvPr/>
+      </p:nvGrpSpPr>
+      <p:grpSpPr>
+        <a:xfrm>
+          <a:off x="0" y="0"/>
+          <a:ext cx="0" cy="0"/>
+          <a:chOff x="0" y="0"/>
+          <a:chExt cx="0" cy="0"/>
+        </a:xfrm>
+      </p:grpSpPr>
+      <p:sp>
+        <p:nvSpPr>
+          <p:cNvPr id="2" name="Slide Image Placeholder 1"/>
+          <p:cNvSpPr>
+            <a:spLocks noGrp="1" noRot="1" noChangeAspect="1"/>
+          </p:cNvSpPr>
+          <p:nvPr>
+            <p:ph type="sldImg"/>
+          </p:nvPr>
+        </p:nvSpPr>
+        <p:spPr/>
+      </p:sp>
+      <p:sp>
+        <p:nvSpPr>
+          <p:cNvPr id="3" name="Notes Placeholder 2"/>
+          <p:cNvSpPr>
+            <a:spLocks noGrp="1"/>
+          </p:cNvSpPr>
+          <p:nvPr>
+            <p:ph type="body" idx="1"/>
+          </p:nvPr>
+        </p:nvSpPr>
+        <p:spPr/>
+        <p:txBody>
+          <a:bodyPr/>
+          <a:lstStyle/>
+          <a:p>
+            <a:endParaRPr lang="en-US"/>
+          </a:p>
+        </p:txBody>
+      </p:sp>
+      <p:sp>
+        <p:nvSpPr>
+          <p:cNvPr id="4" name="Slide Number Placeholder 3"/>
+          <p:cNvSpPr>
+            <a:spLocks noGrp="1"/>
+          </p:cNvSpPr>
+          <p:nvPr>
+            <p:ph type="sldNum" sz="quarter" idx="10"/>
+          </p:nvPr>
+        </p:nvSpPr>
+        <p:spPr/>
+        <p:txBody>
+          <a:bodyPr/>
+          <a:lstStyle/>
+          <a:p>
+            <a:fld id="{75693FD4-8F83-4EF7-AC3F-0DC0388986B0}" type="slidenum">
+              <a:rPr lang="en-US" smtClean="0">
+                <a:solidFill>
+                  <a:prstClr val="black"/>
+                </a:solidFill>
+              </a:rPr>
+              <a:pPr/>
+              <a:t>40</a:t>
+            </a:fld>
+            <a:endParaRPr lang="en-US">
+              <a:solidFill>
+                <a:prstClr val="black"/>
+              </a:solidFill>
+            </a:endParaRPr>
+          </a:p>
+        </p:txBody>
+      </p:sp>
+    </p:spTree>
+  </p:cSld>
+  <p:clrMapOvr>
+    <a:masterClrMapping/>
+  </p:clrMapOvr>
+</p:notes>
+</file>
+
+<file path=ppt/notesSlides/notesSlide39.xml><?xml version="1.0" encoding="utf-8"?>
+<p:notes xmlns:a="http://schemas.openxmlformats.org/drawingml/2006/main" xmlns:r="http://schemas.openxmlformats.org/officeDocument/2006/relationships" xmlns:p="http://schemas.openxmlformats.org/presentationml/2006/main">
+  <p:cSld>
+    <p:spTree>
+      <p:nvGrpSpPr>
+        <p:cNvPr id="1" name=""/>
+        <p:cNvGrpSpPr/>
+        <p:nvPr/>
+      </p:nvGrpSpPr>
+      <p:grpSpPr>
+        <a:xfrm>
+          <a:off x="0" y="0"/>
+          <a:ext cx="0" cy="0"/>
+          <a:chOff x="0" y="0"/>
+          <a:chExt cx="0" cy="0"/>
+        </a:xfrm>
+      </p:grpSpPr>
+      <p:sp>
+        <p:nvSpPr>
           <p:cNvPr id="41986" name="Rectangle 23"/>
           <p:cNvSpPr>
             <a:spLocks noGrp="1" noChangeArrowheads="1"/>
@@ -3198,7 +3728,7 @@
             <a:fld id="{B2B44A5F-6CE4-493C-A0D7-6834FF76660C}" type="slidenum">
               <a:rPr lang="en-US" smtClean="0"/>
               <a:pPr/>
-              <a:t>34</a:t>
+              <a:t>41</a:t>
             </a:fld>
             <a:endParaRPr lang="en-US" dirty="0" smtClean="0"/>
           </a:p>
@@ -3729,17 +4259,10 @@
         </p:nvSpPr>
         <p:spPr/>
         <p:txBody>
-          <a:bodyPr>
-            <a:normAutofit/>
-          </a:bodyPr>
-          <a:lstStyle/>
-          <a:p>
-            <a:pPr>
-              <a:lnSpc>
-                <a:spcPct val="80000"/>
-              </a:lnSpc>
-            </a:pPr>
-            <a:endParaRPr lang="en-US" dirty="0" smtClean="0"/>
+          <a:bodyPr/>
+          <a:lstStyle/>
+          <a:p>
+            <a:endParaRPr lang="en-US" dirty="0"/>
           </a:p>
         </p:txBody>
       </p:sp>
@@ -3758,7 +4281,7 @@
           <a:bodyPr/>
           <a:lstStyle/>
           <a:p>
-            <a:fld id="{EC6EAC7D-5A89-47C2-8ABA-56C9C2DEF7A4}" type="slidenum">
+            <a:fld id="{75693FD4-8F83-4EF7-AC3F-0DC0388986B0}" type="slidenum">
               <a:rPr lang="en-US" smtClean="0"/>
               <a:pPr/>
               <a:t>9</a:t>
@@ -4243,7 +4766,7 @@
             <a:fld id="{757B281C-5159-4971-8228-52B9A72E9ED2}" type="datetimeFigureOut">
               <a:rPr lang="en-US" smtClean="0"/>
               <a:pPr/>
-              <a:t>11/18/2013</a:t>
+              <a:t>11/20/2013</a:t>
             </a:fld>
             <a:endParaRPr lang="en-US" dirty="0"/>
           </a:p>
@@ -4345,7 +4868,7 @@
             <a:fld id="{757B281C-5159-4971-8228-52B9A72E9ED2}" type="datetimeFigureOut">
               <a:rPr lang="en-US" smtClean="0"/>
               <a:pPr/>
-              <a:t>11/18/2013</a:t>
+              <a:t>11/20/2013</a:t>
             </a:fld>
             <a:endParaRPr lang="en-US" dirty="0"/>
           </a:p>
@@ -4481,7 +5004,7 @@
             <a:fld id="{757B281C-5159-4971-8228-52B9A72E9ED2}" type="datetimeFigureOut">
               <a:rPr lang="en-US" smtClean="0"/>
               <a:pPr/>
-              <a:t>11/18/2013</a:t>
+              <a:t>11/20/2013</a:t>
             </a:fld>
             <a:endParaRPr lang="en-US" dirty="0"/>
           </a:p>
@@ -4687,7 +5210,7 @@
             <a:fld id="{757B281C-5159-4971-8228-52B9A72E9ED2}" type="datetimeFigureOut">
               <a:rPr lang="en-US" smtClean="0"/>
               <a:pPr/>
-              <a:t>11/18/2013</a:t>
+              <a:t>11/20/2013</a:t>
             </a:fld>
             <a:endParaRPr lang="en-US" dirty="0"/>
           </a:p>
@@ -5086,7 +5609,7 @@
             <a:fld id="{757B281C-5159-4971-8228-52B9A72E9ED2}" type="datetimeFigureOut">
               <a:rPr lang="en-US" smtClean="0"/>
               <a:pPr/>
-              <a:t>11/18/2013</a:t>
+              <a:t>11/20/2013</a:t>
             </a:fld>
             <a:endParaRPr lang="en-US" dirty="0"/>
           </a:p>
@@ -5386,7 +5909,7 @@
             <a:fld id="{757B281C-5159-4971-8228-52B9A72E9ED2}" type="datetimeFigureOut">
               <a:rPr lang="en-US" smtClean="0"/>
               <a:pPr/>
-              <a:t>11/18/2013</a:t>
+              <a:t>11/20/2013</a:t>
             </a:fld>
             <a:endParaRPr lang="en-US" dirty="0"/>
           </a:p>
@@ -5815,7 +6338,7 @@
             <a:fld id="{757B281C-5159-4971-8228-52B9A72E9ED2}" type="datetimeFigureOut">
               <a:rPr lang="en-US" smtClean="0"/>
               <a:pPr/>
-              <a:t>11/18/2013</a:t>
+              <a:t>11/20/2013</a:t>
             </a:fld>
             <a:endParaRPr lang="en-US" dirty="0"/>
           </a:p>
@@ -6092,7 +6615,7 @@
             <a:fld id="{757B281C-5159-4971-8228-52B9A72E9ED2}" type="datetimeFigureOut">
               <a:rPr lang="en-US" smtClean="0"/>
               <a:pPr/>
-              <a:t>11/18/2013</a:t>
+              <a:t>11/20/2013</a:t>
             </a:fld>
             <a:endParaRPr lang="en-US" dirty="0"/>
           </a:p>
@@ -6356,7 +6879,7 @@
             <a:fld id="{757B281C-5159-4971-8228-52B9A72E9ED2}" type="datetimeFigureOut">
               <a:rPr lang="en-US" smtClean="0"/>
               <a:pPr/>
-              <a:t>11/18/2013</a:t>
+              <a:t>11/20/2013</a:t>
             </a:fld>
             <a:endParaRPr lang="en-US" dirty="0"/>
           </a:p>
@@ -6526,7 +7049,7 @@
             <a:fld id="{757B281C-5159-4971-8228-52B9A72E9ED2}" type="datetimeFigureOut">
               <a:rPr lang="en-US" smtClean="0"/>
               <a:pPr/>
-              <a:t>11/18/2013</a:t>
+              <a:t>11/20/2013</a:t>
             </a:fld>
             <a:endParaRPr lang="en-US" dirty="0"/>
           </a:p>
@@ -6706,7 +7229,7 @@
             <a:fld id="{757B281C-5159-4971-8228-52B9A72E9ED2}" type="datetimeFigureOut">
               <a:rPr lang="en-US" smtClean="0"/>
               <a:pPr/>
-              <a:t>11/18/2013</a:t>
+              <a:t>11/20/2013</a:t>
             </a:fld>
             <a:endParaRPr lang="en-US" dirty="0"/>
           </a:p>
@@ -6948,7 +7471,7 @@
             <a:fld id="{757B281C-5159-4971-8228-52B9A72E9ED2}" type="datetimeFigureOut">
               <a:rPr lang="en-US" smtClean="0"/>
               <a:pPr/>
-              <a:t>11/18/2013</a:t>
+              <a:t>11/20/2013</a:t>
             </a:fld>
             <a:endParaRPr lang="en-US" dirty="0"/>
           </a:p>
@@ -7424,31 +7947,7 @@
               <a:rPr lang="en-US" sz="2400" dirty="0" smtClean="0">
                 <a:latin typeface="+mn-lt"/>
               </a:rPr>
-              <a:t>19</a:t>
-            </a:r>
-            <a:r>
-              <a:rPr lang="en-US" sz="2400" baseline="30000" dirty="0" smtClean="0">
-                <a:latin typeface="+mn-lt"/>
-              </a:rPr>
-              <a:t>th</a:t>
-            </a:r>
-            <a:r>
-              <a:rPr lang="en-US" sz="2400" dirty="0" smtClean="0">
-                <a:latin typeface="+mn-lt"/>
-              </a:rPr>
-              <a:t> and 20</a:t>
-            </a:r>
-            <a:r>
-              <a:rPr lang="en-US" sz="2400" baseline="30000" dirty="0" smtClean="0">
-                <a:latin typeface="+mn-lt"/>
-              </a:rPr>
-              <a:t>th</a:t>
-            </a:r>
-            <a:r>
-              <a:rPr lang="en-US" sz="2400" dirty="0" smtClean="0">
-                <a:latin typeface="+mn-lt"/>
-              </a:rPr>
-              <a:t> November</a:t>
+              <a:t>iAccessible.org</a:t>
             </a:r>
             <a:endParaRPr lang="en-US" sz="2400" dirty="0">
               <a:latin typeface="+mn-lt"/>
@@ -7516,6 +8015,106 @@
           <a:p>
             <a:r>
               <a:rPr lang="en-US" dirty="0" smtClean="0"/>
+              <a:t>ARIA Architecture</a:t>
+            </a:r>
+            <a:endParaRPr lang="en-US" dirty="0"/>
+          </a:p>
+        </p:txBody>
+      </p:sp>
+      <p:pic>
+        <p:nvPicPr>
+          <p:cNvPr id="7" name="Content Placeholder 6"/>
+          <p:cNvPicPr>
+            <a:picLocks noGrp="1" noChangeAspect="1"/>
+          </p:cNvPicPr>
+          <p:nvPr>
+            <p:ph idx="1"/>
+          </p:nvPr>
+        </p:nvPicPr>
+        <p:blipFill>
+          <a:blip r:embed="rId5">
+            <a:extLst>
+              <a:ext uri="{28A0092B-C50C-407E-A947-70E740481C1C}">
+                <a14:useLocalDpi xmlns:a14="http://schemas.microsoft.com/office/drawing/2010/main" val="0"/>
+              </a:ext>
+            </a:extLst>
+          </a:blip>
+          <a:stretch>
+            <a:fillRect/>
+          </a:stretch>
+        </p:blipFill>
+        <p:spPr>
+          <a:xfrm>
+            <a:off x="3810000" y="1143000"/>
+            <a:ext cx="2743200" cy="5571242"/>
+          </a:xfrm>
+        </p:spPr>
+      </p:pic>
+    </p:spTree>
+    <p:custDataLst>
+      <p:tags r:id="rId1"/>
+    </p:custDataLst>
+    <p:extLst>
+      <p:ext uri="{BB962C8B-B14F-4D97-AF65-F5344CB8AC3E}">
+        <p14:creationId xmlns:p14="http://schemas.microsoft.com/office/powerpoint/2010/main" val="3138792830"/>
+      </p:ext>
+    </p:extLst>
+  </p:cSld>
+  <p:clrMapOvr>
+    <a:masterClrMapping/>
+  </p:clrMapOvr>
+  <p:transition spd="slow">
+    <p:wipe dir="d"/>
+  </p:transition>
+  <p:timing>
+    <p:tnLst>
+      <p:par>
+        <p:cTn id="1" dur="indefinite" restart="never" nodeType="tmRoot"/>
+      </p:par>
+    </p:tnLst>
+  </p:timing>
+</p:sld>
+</file>
+
+<file path=ppt/slides/slide11.xml><?xml version="1.0" encoding="utf-8"?>
+<p:sld xmlns:a="http://schemas.openxmlformats.org/drawingml/2006/main" xmlns:r="http://schemas.openxmlformats.org/officeDocument/2006/relationships" xmlns:p="http://schemas.openxmlformats.org/presentationml/2006/main">
+  <p:cSld>
+    <p:spTree>
+      <p:nvGrpSpPr>
+        <p:cNvPr id="1" name=""/>
+        <p:cNvGrpSpPr/>
+        <p:nvPr/>
+      </p:nvGrpSpPr>
+      <p:grpSpPr>
+        <a:xfrm>
+          <a:off x="0" y="0"/>
+          <a:ext cx="0" cy="0"/>
+          <a:chOff x="0" y="0"/>
+          <a:chExt cx="0" cy="0"/>
+        </a:xfrm>
+      </p:grpSpPr>
+      <p:sp>
+        <p:nvSpPr>
+          <p:cNvPr id="2" name="Title 1"/>
+          <p:cNvSpPr>
+            <a:spLocks noGrp="1"/>
+          </p:cNvSpPr>
+          <p:nvPr>
+            <p:ph type="title"/>
+            <p:custDataLst>
+              <p:tags r:id="rId2"/>
+            </p:custDataLst>
+          </p:nvPr>
+        </p:nvSpPr>
+        <p:spPr/>
+        <p:txBody>
+          <a:bodyPr>
+            <a:normAutofit/>
+          </a:bodyPr>
+          <a:lstStyle/>
+          <a:p>
+            <a:r>
+              <a:rPr lang="en-US" dirty="0" smtClean="0"/>
               <a:t>ARIA – 3 corner stones</a:t>
             </a:r>
             <a:endParaRPr lang="en-US" dirty="0"/>
@@ -7554,27 +8153,17 @@
               <a:rPr lang="en-US" dirty="0" smtClean="0"/>
               <a:t>element (I am checkbox)</a:t>
             </a:r>
-            <a:endParaRPr lang="en-US" dirty="0" smtClean="0"/>
-          </a:p>
-          <a:p>
-            <a:r>
-              <a:rPr lang="en-US" dirty="0" smtClean="0"/>
-              <a:t>ARIA State – Dynamic attribute that represent data associated with control. Can change as result of user </a:t>
-            </a:r>
-            <a:r>
-              <a:rPr lang="en-US" dirty="0" smtClean="0"/>
-              <a:t>interaction. (I am checked)</a:t>
-            </a:r>
-            <a:endParaRPr lang="en-US" dirty="0" smtClean="0"/>
-          </a:p>
-          <a:p>
-            <a:r>
-              <a:rPr lang="en-US" dirty="0" smtClean="0"/>
-              <a:t>ARIA Properties – Static attributes of </a:t>
-            </a:r>
-            <a:r>
-              <a:rPr lang="en-US" dirty="0" smtClean="0"/>
-              <a:t>control</a:t>
+          </a:p>
+          <a:p>
+            <a:r>
+              <a:rPr lang="en-US" dirty="0" smtClean="0"/>
+              <a:t>ARIA State – Dynamic attribute that represent data associated with control. Can change as result of user interaction. (I am checked)</a:t>
+            </a:r>
+          </a:p>
+          <a:p>
+            <a:r>
+              <a:rPr lang="en-US" dirty="0" smtClean="0"/>
+              <a:t>ARIA Properties – Static attributes of control</a:t>
             </a:r>
             <a:r>
               <a:rPr lang="en-US" dirty="0"/>
@@ -7592,7 +8181,6 @@
               <a:rPr lang="en-US" dirty="0" smtClean="0"/>
               <a:t>group)</a:t>
             </a:r>
-            <a:endParaRPr lang="en-US" dirty="0" smtClean="0"/>
           </a:p>
         </p:txBody>
       </p:sp>
@@ -7622,7 +8210,7 @@
 </p:sld>
 </file>
 
-<file path=ppt/slides/slide11.xml><?xml version="1.0" encoding="utf-8"?>
+<file path=ppt/slides/slide12.xml><?xml version="1.0" encoding="utf-8"?>
 <p:sld xmlns:a="http://schemas.openxmlformats.org/drawingml/2006/main" xmlns:r="http://schemas.openxmlformats.org/officeDocument/2006/relationships" xmlns:p="http://schemas.openxmlformats.org/presentationml/2006/main">
   <p:cSld>
     <p:spTree>
@@ -7783,7 +8371,7 @@
 </p:sld>
 </file>
 
-<file path=ppt/slides/slide12.xml><?xml version="1.0" encoding="utf-8"?>
+<file path=ppt/slides/slide13.xml><?xml version="1.0" encoding="utf-8"?>
 <p:sld xmlns:a="http://schemas.openxmlformats.org/drawingml/2006/main" xmlns:r="http://schemas.openxmlformats.org/officeDocument/2006/relationships" xmlns:p="http://schemas.openxmlformats.org/presentationml/2006/main">
   <p:cSld>
     <p:spTree>
@@ -7910,7 +8498,7 @@
 </p:sld>
 </file>
 
-<file path=ppt/slides/slide13.xml><?xml version="1.0" encoding="utf-8"?>
+<file path=ppt/slides/slide14.xml><?xml version="1.0" encoding="utf-8"?>
 <p:sld xmlns:a="http://schemas.openxmlformats.org/drawingml/2006/main" xmlns:r="http://schemas.openxmlformats.org/officeDocument/2006/relationships" xmlns:p="http://schemas.openxmlformats.org/presentationml/2006/main">
   <p:cSld>
     <p:spTree>
@@ -8052,7 +8640,7 @@
 </p:sld>
 </file>
 
-<file path=ppt/slides/slide14.xml><?xml version="1.0" encoding="utf-8"?>
+<file path=ppt/slides/slide15.xml><?xml version="1.0" encoding="utf-8"?>
 <p:sld xmlns:a="http://schemas.openxmlformats.org/drawingml/2006/main" xmlns:r="http://schemas.openxmlformats.org/officeDocument/2006/relationships" xmlns:p="http://schemas.openxmlformats.org/presentationml/2006/main">
   <p:cSld>
     <p:spTree>
@@ -8091,7 +8679,7 @@
           <a:p>
             <a:r>
               <a:rPr lang="en-US" dirty="0" smtClean="0"/>
-              <a:t>ARIA Application – Slider</a:t>
+              <a:t>RECAP - Why we needed ARIA?</a:t>
             </a:r>
             <a:endParaRPr lang="en-US" dirty="0"/>
           </a:p>
@@ -8119,42 +8707,46 @@
           <a:p>
             <a:r>
               <a:rPr lang="en-US" dirty="0" smtClean="0"/>
-              <a:t>Slider </a:t>
-            </a:r>
-            <a:r>
-              <a:rPr lang="en-US" dirty="0"/>
-              <a:t>is neither perceivable nor operable</a:t>
-            </a:r>
-          </a:p>
-          <a:p>
-            <a:r>
-              <a:rPr lang="en-US" dirty="0" smtClean="0"/>
-              <a:t>User interface element have three important attributes</a:t>
+              <a:t>Generic HTML 4 tags</a:t>
             </a:r>
           </a:p>
           <a:p>
             <a:pPr lvl="1"/>
             <a:r>
               <a:rPr lang="en-US" dirty="0" smtClean="0"/>
-              <a:t>Role – slider</a:t>
+              <a:t>ARIA roles</a:t>
+            </a:r>
+          </a:p>
+          <a:p>
+            <a:pPr lvl="1"/>
+            <a:r>
+              <a:rPr lang="en-US" dirty="0" smtClean="0"/>
+              <a:t>Code Demo - </a:t>
+            </a:r>
+            <a:r>
+              <a:rPr lang="en-US" dirty="0" smtClean="0">
+                <a:hlinkClick r:id="rId6"/>
+              </a:rPr>
+              <a:t>http://iaccessible.in/training/others/aria.html</a:t>
+            </a:r>
+            <a:r>
+              <a:rPr lang="en-US" dirty="0" smtClean="0"/>
+              <a:t> </a:t>
+            </a:r>
+          </a:p>
+          <a:p>
+            <a:pPr lvl="1"/>
+            <a:r>
+              <a:rPr lang="en-US" dirty="0" smtClean="0"/>
+              <a:t>Real life demo </a:t>
+            </a:r>
+            <a:r>
+              <a:rPr lang="en-US" dirty="0">
+                <a:hlinkClick r:id="rId7"/>
+              </a:rPr>
+              <a:t>https://www.facebook.com/</a:t>
             </a:r>
             <a:endParaRPr lang="en-US" dirty="0" smtClean="0"/>
-          </a:p>
-          <a:p>
-            <a:pPr lvl="1"/>
-            <a:r>
-              <a:rPr lang="en-US" dirty="0" smtClean="0"/>
-              <a:t>State – </a:t>
-            </a:r>
-            <a:endParaRPr lang="en-US" dirty="0" smtClean="0"/>
-          </a:p>
-          <a:p>
-            <a:pPr lvl="1"/>
-            <a:r>
-              <a:rPr lang="en-US" dirty="0" smtClean="0"/>
-              <a:t>Properties</a:t>
-            </a:r>
-            <a:endParaRPr lang="en-US" dirty="0"/>
           </a:p>
         </p:txBody>
       </p:sp>
@@ -8164,7 +8756,7 @@
     </p:custDataLst>
     <p:extLst>
       <p:ext uri="{BB962C8B-B14F-4D97-AF65-F5344CB8AC3E}">
-        <p14:creationId xmlns:p14="http://schemas.microsoft.com/office/powerpoint/2010/main" val="2153637570"/>
+        <p14:creationId xmlns:p14="http://schemas.microsoft.com/office/powerpoint/2010/main" val="598057494"/>
       </p:ext>
     </p:extLst>
   </p:cSld>
@@ -8184,7 +8776,7 @@
 </p:sld>
 </file>
 
-<file path=ppt/slides/slide15.xml><?xml version="1.0" encoding="utf-8"?>
+<file path=ppt/slides/slide16.xml><?xml version="1.0" encoding="utf-8"?>
 <p:sld xmlns:a="http://schemas.openxmlformats.org/drawingml/2006/main" xmlns:r="http://schemas.openxmlformats.org/officeDocument/2006/relationships" xmlns:p="http://schemas.openxmlformats.org/presentationml/2006/main">
   <p:cSld>
     <p:spTree>
@@ -8223,15 +8815,7 @@
           <a:p>
             <a:r>
               <a:rPr lang="en-US" dirty="0" smtClean="0"/>
-              <a:t>Accessible </a:t>
-            </a:r>
-            <a:r>
-              <a:rPr lang="en-US" dirty="0" smtClean="0"/>
-              <a:t>– </a:t>
-            </a:r>
-            <a:r>
-              <a:rPr lang="en-US" dirty="0" smtClean="0"/>
-              <a:t>Tree and Layout</a:t>
+              <a:t>RECAP - Why we needed ARIA?</a:t>
             </a:r>
             <a:endParaRPr lang="en-US" dirty="0"/>
           </a:p>
@@ -8253,48 +8837,63 @@
         <p:spPr/>
         <p:txBody>
           <a:bodyPr>
-            <a:normAutofit/>
+            <a:normAutofit lnSpcReduction="10000"/>
           </a:bodyPr>
           <a:lstStyle/>
           <a:p>
             <a:r>
               <a:rPr lang="en-US" dirty="0" smtClean="0"/>
-              <a:t>Tree </a:t>
-            </a:r>
-            <a:r>
-              <a:rPr lang="en-US" smtClean="0"/>
-              <a:t>is also </a:t>
-            </a:r>
+              <a:t>Custom JS Components</a:t>
+            </a:r>
+          </a:p>
+          <a:p>
+            <a:pPr lvl="1"/>
             <a:r>
               <a:rPr lang="en-US" dirty="0"/>
-              <a:t>neither perceivable nor operable</a:t>
-            </a:r>
-          </a:p>
-          <a:p>
-            <a:r>
-              <a:rPr lang="en-US" dirty="0" smtClean="0"/>
-              <a:t>User interface element have three important attributes</a:t>
+              <a:t>Semantic meaning of element</a:t>
             </a:r>
           </a:p>
           <a:p>
             <a:pPr lvl="1"/>
             <a:r>
-              <a:rPr lang="en-US" dirty="0" smtClean="0"/>
-              <a:t>Role</a:t>
+              <a:rPr lang="en-US" dirty="0"/>
+              <a:t>State of element – that can change, dynamic aspect of element</a:t>
             </a:r>
           </a:p>
           <a:p>
             <a:pPr lvl="1"/>
             <a:r>
-              <a:rPr lang="en-US" dirty="0" smtClean="0"/>
-              <a:t>State</a:t>
-            </a:r>
-          </a:p>
-          <a:p>
-            <a:pPr lvl="1"/>
-            <a:r>
-              <a:rPr lang="en-US" dirty="0" smtClean="0"/>
-              <a:t>Properties</a:t>
+              <a:rPr lang="en-US" dirty="0"/>
+              <a:t>Properties of </a:t>
+            </a:r>
+            <a:r>
+              <a:rPr lang="en-US" dirty="0" smtClean="0"/>
+              <a:t>element </a:t>
+            </a:r>
+            <a:r>
+              <a:rPr lang="en-US" dirty="0"/>
+              <a:t>– static aspect of </a:t>
+            </a:r>
+            <a:r>
+              <a:rPr lang="en-US" dirty="0" smtClean="0"/>
+              <a:t>element</a:t>
+            </a:r>
+          </a:p>
+          <a:p>
+            <a:r>
+              <a:rPr lang="en-US" dirty="0">
+                <a:hlinkClick r:id="rId6"/>
+              </a:rPr>
+              <a:t>http://iaccessible.in/training/examples/accessible-jqueryui/#goto_slider</a:t>
+            </a:r>
+            <a:endParaRPr lang="en-US" dirty="0" smtClean="0"/>
+          </a:p>
+          <a:p>
+            <a:r>
+              <a:rPr lang="en-US" dirty="0">
+                <a:hlinkClick r:id="rId7"/>
+              </a:rPr>
+              <a:t>http://iaccessible.in/training/examples/accessible-jqueryui/#goto_tree</a:t>
             </a:r>
             <a:endParaRPr lang="en-US" dirty="0"/>
           </a:p>
@@ -8306,7 +8905,7 @@
     </p:custDataLst>
     <p:extLst>
       <p:ext uri="{BB962C8B-B14F-4D97-AF65-F5344CB8AC3E}">
-        <p14:creationId xmlns:p14="http://schemas.microsoft.com/office/powerpoint/2010/main" val="446666622"/>
+        <p14:creationId xmlns:p14="http://schemas.microsoft.com/office/powerpoint/2010/main" val="937848891"/>
       </p:ext>
     </p:extLst>
   </p:cSld>
@@ -8326,7 +8925,7 @@
 </p:sld>
 </file>
 
-<file path=ppt/slides/slide16.xml><?xml version="1.0" encoding="utf-8"?>
+<file path=ppt/slides/slide17.xml><?xml version="1.0" encoding="utf-8"?>
 <p:sld xmlns:a="http://schemas.openxmlformats.org/drawingml/2006/main" xmlns:r="http://schemas.openxmlformats.org/officeDocument/2006/relationships" xmlns:p="http://schemas.openxmlformats.org/presentationml/2006/main">
   <p:cSld>
     <p:spTree>
@@ -8345,6 +8944,396 @@
       </p:grpSpPr>
       <p:sp>
         <p:nvSpPr>
+          <p:cNvPr id="2" name="Title 1"/>
+          <p:cNvSpPr>
+            <a:spLocks noGrp="1"/>
+          </p:cNvSpPr>
+          <p:nvPr>
+            <p:ph type="title"/>
+            <p:custDataLst>
+              <p:tags r:id="rId2"/>
+            </p:custDataLst>
+          </p:nvPr>
+        </p:nvSpPr>
+        <p:spPr/>
+        <p:txBody>
+          <a:bodyPr>
+            <a:normAutofit/>
+          </a:bodyPr>
+          <a:lstStyle/>
+          <a:p>
+            <a:r>
+              <a:rPr lang="en-US" dirty="0" smtClean="0"/>
+              <a:t>ARIA Application – Slider</a:t>
+            </a:r>
+            <a:endParaRPr lang="en-US" dirty="0"/>
+          </a:p>
+        </p:txBody>
+      </p:sp>
+      <p:sp>
+        <p:nvSpPr>
+          <p:cNvPr id="5" name="Content Placeholder 4"/>
+          <p:cNvSpPr>
+            <a:spLocks noGrp="1"/>
+          </p:cNvSpPr>
+          <p:nvPr>
+            <p:ph idx="1"/>
+            <p:custDataLst>
+              <p:tags r:id="rId3"/>
+            </p:custDataLst>
+          </p:nvPr>
+        </p:nvSpPr>
+        <p:spPr/>
+        <p:txBody>
+          <a:bodyPr>
+            <a:normAutofit/>
+          </a:bodyPr>
+          <a:lstStyle/>
+          <a:p>
+            <a:r>
+              <a:rPr lang="en-US" dirty="0" smtClean="0"/>
+              <a:t>Slider </a:t>
+            </a:r>
+            <a:r>
+              <a:rPr lang="en-US" dirty="0"/>
+              <a:t>is neither perceivable nor operable</a:t>
+            </a:r>
+          </a:p>
+          <a:p>
+            <a:r>
+              <a:rPr lang="en-US" dirty="0" smtClean="0"/>
+              <a:t>User interface element have three important attributes</a:t>
+            </a:r>
+          </a:p>
+          <a:p>
+            <a:pPr lvl="1"/>
+            <a:r>
+              <a:rPr lang="en-US" dirty="0" smtClean="0"/>
+              <a:t>Role </a:t>
+            </a:r>
+            <a:endParaRPr lang="en-US" dirty="0"/>
+          </a:p>
+          <a:p>
+            <a:pPr lvl="1"/>
+            <a:r>
+              <a:rPr lang="en-US" dirty="0" smtClean="0"/>
+              <a:t>State</a:t>
+            </a:r>
+          </a:p>
+          <a:p>
+            <a:pPr lvl="1"/>
+            <a:r>
+              <a:rPr lang="en-US" dirty="0" smtClean="0"/>
+              <a:t>Properties</a:t>
+            </a:r>
+            <a:endParaRPr lang="en-US" dirty="0"/>
+          </a:p>
+        </p:txBody>
+      </p:sp>
+    </p:spTree>
+    <p:custDataLst>
+      <p:tags r:id="rId1"/>
+    </p:custDataLst>
+    <p:extLst>
+      <p:ext uri="{BB962C8B-B14F-4D97-AF65-F5344CB8AC3E}">
+        <p14:creationId xmlns:p14="http://schemas.microsoft.com/office/powerpoint/2010/main" val="4256248234"/>
+      </p:ext>
+    </p:extLst>
+  </p:cSld>
+  <p:clrMapOvr>
+    <a:masterClrMapping/>
+  </p:clrMapOvr>
+  <p:transition spd="slow">
+    <p:wipe dir="d"/>
+  </p:transition>
+  <p:timing>
+    <p:tnLst>
+      <p:par>
+        <p:cTn id="1" dur="indefinite" restart="never" nodeType="tmRoot"/>
+      </p:par>
+    </p:tnLst>
+  </p:timing>
+</p:sld>
+</file>
+
+<file path=ppt/slides/slide18.xml><?xml version="1.0" encoding="utf-8"?>
+<p:sld xmlns:a="http://schemas.openxmlformats.org/drawingml/2006/main" xmlns:r="http://schemas.openxmlformats.org/officeDocument/2006/relationships" xmlns:p="http://schemas.openxmlformats.org/presentationml/2006/main">
+  <p:cSld>
+    <p:spTree>
+      <p:nvGrpSpPr>
+        <p:cNvPr id="1" name=""/>
+        <p:cNvGrpSpPr/>
+        <p:nvPr/>
+      </p:nvGrpSpPr>
+      <p:grpSpPr>
+        <a:xfrm>
+          <a:off x="0" y="0"/>
+          <a:ext cx="0" cy="0"/>
+          <a:chOff x="0" y="0"/>
+          <a:chExt cx="0" cy="0"/>
+        </a:xfrm>
+      </p:grpSpPr>
+      <p:sp>
+        <p:nvSpPr>
+          <p:cNvPr id="2" name="Title 1"/>
+          <p:cNvSpPr>
+            <a:spLocks noGrp="1"/>
+          </p:cNvSpPr>
+          <p:nvPr>
+            <p:ph type="title"/>
+            <p:custDataLst>
+              <p:tags r:id="rId2"/>
+            </p:custDataLst>
+          </p:nvPr>
+        </p:nvSpPr>
+        <p:spPr/>
+        <p:txBody>
+          <a:bodyPr>
+            <a:normAutofit/>
+          </a:bodyPr>
+          <a:lstStyle/>
+          <a:p>
+            <a:r>
+              <a:rPr lang="en-US" dirty="0" smtClean="0"/>
+              <a:t>Accessible – Tree and Layout</a:t>
+            </a:r>
+            <a:endParaRPr lang="en-US" dirty="0"/>
+          </a:p>
+        </p:txBody>
+      </p:sp>
+      <p:sp>
+        <p:nvSpPr>
+          <p:cNvPr id="5" name="Content Placeholder 4"/>
+          <p:cNvSpPr>
+            <a:spLocks noGrp="1"/>
+          </p:cNvSpPr>
+          <p:nvPr>
+            <p:ph idx="1"/>
+            <p:custDataLst>
+              <p:tags r:id="rId3"/>
+            </p:custDataLst>
+          </p:nvPr>
+        </p:nvSpPr>
+        <p:spPr/>
+        <p:txBody>
+          <a:bodyPr>
+            <a:normAutofit/>
+          </a:bodyPr>
+          <a:lstStyle/>
+          <a:p>
+            <a:r>
+              <a:rPr lang="en-US" dirty="0" smtClean="0"/>
+              <a:t>Tree </a:t>
+            </a:r>
+            <a:r>
+              <a:rPr lang="en-US" smtClean="0"/>
+              <a:t>is also </a:t>
+            </a:r>
+            <a:r>
+              <a:rPr lang="en-US" dirty="0"/>
+              <a:t>neither perceivable nor operable</a:t>
+            </a:r>
+          </a:p>
+          <a:p>
+            <a:r>
+              <a:rPr lang="en-US" dirty="0" smtClean="0"/>
+              <a:t>User interface element have three important attributes</a:t>
+            </a:r>
+          </a:p>
+          <a:p>
+            <a:pPr lvl="1"/>
+            <a:r>
+              <a:rPr lang="en-US" dirty="0" smtClean="0"/>
+              <a:t>Role</a:t>
+            </a:r>
+          </a:p>
+          <a:p>
+            <a:pPr lvl="1"/>
+            <a:r>
+              <a:rPr lang="en-US" dirty="0" smtClean="0"/>
+              <a:t>State</a:t>
+            </a:r>
+          </a:p>
+          <a:p>
+            <a:pPr lvl="1"/>
+            <a:r>
+              <a:rPr lang="en-US" dirty="0" smtClean="0"/>
+              <a:t>Properties</a:t>
+            </a:r>
+            <a:endParaRPr lang="en-US" dirty="0"/>
+          </a:p>
+        </p:txBody>
+      </p:sp>
+    </p:spTree>
+    <p:custDataLst>
+      <p:tags r:id="rId1"/>
+    </p:custDataLst>
+    <p:extLst>
+      <p:ext uri="{BB962C8B-B14F-4D97-AF65-F5344CB8AC3E}">
+        <p14:creationId xmlns:p14="http://schemas.microsoft.com/office/powerpoint/2010/main" val="56961564"/>
+      </p:ext>
+    </p:extLst>
+  </p:cSld>
+  <p:clrMapOvr>
+    <a:masterClrMapping/>
+  </p:clrMapOvr>
+  <p:transition spd="slow">
+    <p:wipe dir="d"/>
+  </p:transition>
+  <p:timing>
+    <p:tnLst>
+      <p:par>
+        <p:cTn id="1" dur="indefinite" restart="never" nodeType="tmRoot"/>
+      </p:par>
+    </p:tnLst>
+  </p:timing>
+</p:sld>
+</file>
+
+<file path=ppt/slides/slide19.xml><?xml version="1.0" encoding="utf-8"?>
+<p:sld xmlns:a="http://schemas.openxmlformats.org/drawingml/2006/main" xmlns:r="http://schemas.openxmlformats.org/officeDocument/2006/relationships" xmlns:p="http://schemas.openxmlformats.org/presentationml/2006/main">
+  <p:cSld>
+    <p:spTree>
+      <p:nvGrpSpPr>
+        <p:cNvPr id="1" name=""/>
+        <p:cNvGrpSpPr/>
+        <p:nvPr/>
+      </p:nvGrpSpPr>
+      <p:grpSpPr>
+        <a:xfrm>
+          <a:off x="0" y="0"/>
+          <a:ext cx="0" cy="0"/>
+          <a:chOff x="0" y="0"/>
+          <a:chExt cx="0" cy="0"/>
+        </a:xfrm>
+      </p:grpSpPr>
+      <p:sp>
+        <p:nvSpPr>
+          <p:cNvPr id="2" name="Title 1"/>
+          <p:cNvSpPr>
+            <a:spLocks noGrp="1"/>
+          </p:cNvSpPr>
+          <p:nvPr>
+            <p:ph type="title"/>
+            <p:custDataLst>
+              <p:tags r:id="rId2"/>
+            </p:custDataLst>
+          </p:nvPr>
+        </p:nvSpPr>
+        <p:spPr/>
+        <p:txBody>
+          <a:bodyPr>
+            <a:normAutofit/>
+          </a:bodyPr>
+          <a:lstStyle/>
+          <a:p>
+            <a:r>
+              <a:rPr lang="en-US" dirty="0" smtClean="0"/>
+              <a:t>RECAP - Why we needed ARIA?</a:t>
+            </a:r>
+            <a:endParaRPr lang="en-US" dirty="0"/>
+          </a:p>
+        </p:txBody>
+      </p:sp>
+      <p:sp>
+        <p:nvSpPr>
+          <p:cNvPr id="5" name="Content Placeholder 4"/>
+          <p:cNvSpPr>
+            <a:spLocks noGrp="1"/>
+          </p:cNvSpPr>
+          <p:nvPr>
+            <p:ph idx="1"/>
+            <p:custDataLst>
+              <p:tags r:id="rId3"/>
+            </p:custDataLst>
+          </p:nvPr>
+        </p:nvSpPr>
+        <p:spPr/>
+        <p:txBody>
+          <a:bodyPr>
+            <a:normAutofit/>
+          </a:bodyPr>
+          <a:lstStyle/>
+          <a:p>
+            <a:r>
+              <a:rPr lang="en-US" dirty="0" smtClean="0"/>
+              <a:t>Ajax Components</a:t>
+            </a:r>
+          </a:p>
+          <a:p>
+            <a:pPr lvl="1"/>
+            <a:r>
+              <a:rPr lang="en-US" dirty="0" smtClean="0"/>
+              <a:t>Auto Complete</a:t>
+            </a:r>
+          </a:p>
+          <a:p>
+            <a:pPr lvl="1"/>
+            <a:r>
+              <a:rPr lang="en-US" dirty="0" smtClean="0"/>
+              <a:t>Code Demo in IE - </a:t>
+            </a:r>
+            <a:r>
+              <a:rPr lang="en-US" dirty="0">
+                <a:hlinkClick r:id="rId6"/>
+              </a:rPr>
+              <a:t>http://iaccessible.in/training/examples/accessible-jqueryui/#</a:t>
+            </a:r>
+            <a:r>
+              <a:rPr lang="en-US" dirty="0" smtClean="0">
+                <a:hlinkClick r:id="rId6"/>
+              </a:rPr>
+              <a:t>goto_autocomplete</a:t>
+            </a:r>
+            <a:endParaRPr lang="en-US" dirty="0" smtClean="0"/>
+          </a:p>
+        </p:txBody>
+      </p:sp>
+    </p:spTree>
+    <p:custDataLst>
+      <p:tags r:id="rId1"/>
+    </p:custDataLst>
+    <p:extLst>
+      <p:ext uri="{BB962C8B-B14F-4D97-AF65-F5344CB8AC3E}">
+        <p14:creationId xmlns:p14="http://schemas.microsoft.com/office/powerpoint/2010/main" val="1275383688"/>
+      </p:ext>
+    </p:extLst>
+  </p:cSld>
+  <p:clrMapOvr>
+    <a:masterClrMapping/>
+  </p:clrMapOvr>
+  <p:transition spd="slow">
+    <p:wipe dir="d"/>
+  </p:transition>
+  <p:timing>
+    <p:tnLst>
+      <p:par>
+        <p:cTn id="1" dur="indefinite" restart="never" nodeType="tmRoot"/>
+      </p:par>
+    </p:tnLst>
+  </p:timing>
+</p:sld>
+</file>
+
+<file path=ppt/slides/slide2.xml><?xml version="1.0" encoding="utf-8"?>
+<p:sld xmlns:a="http://schemas.openxmlformats.org/drawingml/2006/main" xmlns:r="http://schemas.openxmlformats.org/officeDocument/2006/relationships" xmlns:p="http://schemas.openxmlformats.org/presentationml/2006/main">
+  <p:cSld>
+    <p:spTree>
+      <p:nvGrpSpPr>
+        <p:cNvPr id="1" name=""/>
+        <p:cNvGrpSpPr/>
+        <p:nvPr/>
+      </p:nvGrpSpPr>
+      <p:grpSpPr>
+        <a:xfrm>
+          <a:off x="0" y="0"/>
+          <a:ext cx="0" cy="0"/>
+          <a:chOff x="0" y="0"/>
+          <a:chExt cx="0" cy="0"/>
+        </a:xfrm>
+      </p:grpSpPr>
+      <p:sp>
+        <p:nvSpPr>
           <p:cNvPr id="7" name="TextBox 6"/>
           <p:cNvSpPr txBox="1"/>
           <p:nvPr/>
@@ -8361,13 +9350,221 @@
         </p:spPr>
         <p:txBody>
           <a:bodyPr wrap="square" rtlCol="0">
+            <a:normAutofit fontScale="92500"/>
+          </a:bodyPr>
+          <a:lstStyle/>
+          <a:p>
+            <a:r>
+              <a:rPr lang="en-US" sz="7200" dirty="0"/>
+              <a:t>Accessible </a:t>
+            </a:r>
+            <a:r>
+              <a:rPr lang="en-US" sz="7200" dirty="0" smtClean="0"/>
+              <a:t>Website are always SEO </a:t>
+            </a:r>
+            <a:r>
+              <a:rPr lang="en-US" sz="7200" dirty="0"/>
+              <a:t>Friendly</a:t>
+            </a:r>
+          </a:p>
+        </p:txBody>
+      </p:sp>
+      <p:pic>
+        <p:nvPicPr>
+          <p:cNvPr id="12" name="Picture 11"/>
+          <p:cNvPicPr>
+            <a:picLocks noChangeAspect="1"/>
+          </p:cNvPicPr>
+          <p:nvPr/>
+        </p:nvPicPr>
+        <p:blipFill>
+          <a:blip r:embed="rId3" cstate="email">
+            <a:extLst>
+              <a:ext uri="{28A0092B-C50C-407E-A947-70E740481C1C}">
+                <a14:useLocalDpi xmlns:a14="http://schemas.microsoft.com/office/drawing/2010/main"/>
+              </a:ext>
+            </a:extLst>
+          </a:blip>
+          <a:stretch>
+            <a:fillRect/>
+          </a:stretch>
+        </p:blipFill>
+        <p:spPr>
+          <a:xfrm>
+            <a:off x="4191000" y="0"/>
+            <a:ext cx="7765662" cy="16476125"/>
+          </a:xfrm>
+          <a:prstGeom prst="rect">
+            <a:avLst/>
+          </a:prstGeom>
+        </p:spPr>
+      </p:pic>
+    </p:spTree>
+  </p:cSld>
+  <p:clrMapOvr>
+    <a:masterClrMapping/>
+  </p:clrMapOvr>
+  <p:transition spd="slow">
+    <p:fade/>
+  </p:transition>
+  <p:timing>
+    <p:tnLst>
+      <p:par>
+        <p:cTn id="1" dur="indefinite" restart="never" nodeType="tmRoot"/>
+      </p:par>
+    </p:tnLst>
+  </p:timing>
+</p:sld>
+</file>
+
+<file path=ppt/slides/slide20.xml><?xml version="1.0" encoding="utf-8"?>
+<p:sld xmlns:a="http://schemas.openxmlformats.org/drawingml/2006/main" xmlns:r="http://schemas.openxmlformats.org/officeDocument/2006/relationships" xmlns:p="http://schemas.openxmlformats.org/presentationml/2006/main">
+  <p:cSld>
+    <p:spTree>
+      <p:nvGrpSpPr>
+        <p:cNvPr id="1" name=""/>
+        <p:cNvGrpSpPr/>
+        <p:nvPr/>
+      </p:nvGrpSpPr>
+      <p:grpSpPr>
+        <a:xfrm>
+          <a:off x="0" y="0"/>
+          <a:ext cx="0" cy="0"/>
+          <a:chOff x="0" y="0"/>
+          <a:chExt cx="0" cy="0"/>
+        </a:xfrm>
+      </p:grpSpPr>
+      <p:sp>
+        <p:nvSpPr>
+          <p:cNvPr id="7" name="TextBox 6"/>
+          <p:cNvSpPr txBox="1"/>
+          <p:nvPr/>
+        </p:nvSpPr>
+        <p:spPr>
+          <a:xfrm>
+            <a:off x="1295400" y="2363450"/>
+            <a:ext cx="6781800" cy="3808750"/>
+          </a:xfrm>
+          <a:prstGeom prst="rect">
+            <a:avLst/>
+          </a:prstGeom>
+          <a:noFill/>
+        </p:spPr>
+        <p:txBody>
+          <a:bodyPr wrap="square" rtlCol="0">
             <a:normAutofit/>
           </a:bodyPr>
           <a:lstStyle/>
           <a:p>
             <a:r>
+              <a:rPr lang="en-US" sz="7200" dirty="0" smtClean="0">
+                <a:hlinkClick r:id="rId3"/>
+              </a:rPr>
+              <a:t>Exercise</a:t>
+            </a:r>
+            <a:r>
               <a:rPr lang="en-US" sz="7200" dirty="0" smtClean="0"/>
-              <a:t>HTML 5 Semantics</a:t>
+              <a:t> - Create ARIA component</a:t>
+            </a:r>
+            <a:endParaRPr lang="en-US" sz="7200" dirty="0"/>
+          </a:p>
+        </p:txBody>
+      </p:sp>
+      <p:pic>
+        <p:nvPicPr>
+          <p:cNvPr id="12" name="Picture 11"/>
+          <p:cNvPicPr>
+            <a:picLocks noChangeAspect="1"/>
+          </p:cNvPicPr>
+          <p:nvPr/>
+        </p:nvPicPr>
+        <p:blipFill>
+          <a:blip r:embed="rId4" cstate="email">
+            <a:extLst>
+              <a:ext uri="{28A0092B-C50C-407E-A947-70E740481C1C}">
+                <a14:useLocalDpi xmlns:a14="http://schemas.microsoft.com/office/drawing/2010/main"/>
+              </a:ext>
+            </a:extLst>
+          </a:blip>
+          <a:stretch>
+            <a:fillRect/>
+          </a:stretch>
+        </p:blipFill>
+        <p:spPr>
+          <a:xfrm>
+            <a:off x="4191000" y="0"/>
+            <a:ext cx="7765662" cy="16476125"/>
+          </a:xfrm>
+          <a:prstGeom prst="rect">
+            <a:avLst/>
+          </a:prstGeom>
+        </p:spPr>
+      </p:pic>
+    </p:spTree>
+    <p:extLst>
+      <p:ext uri="{BB962C8B-B14F-4D97-AF65-F5344CB8AC3E}">
+        <p14:creationId xmlns:p14="http://schemas.microsoft.com/office/powerpoint/2010/main" val="369081019"/>
+      </p:ext>
+    </p:extLst>
+  </p:cSld>
+  <p:clrMapOvr>
+    <a:masterClrMapping/>
+  </p:clrMapOvr>
+  <p:transition spd="slow">
+    <p:fade/>
+  </p:transition>
+  <p:timing>
+    <p:tnLst>
+      <p:par>
+        <p:cTn id="1" dur="indefinite" restart="never" nodeType="tmRoot"/>
+      </p:par>
+    </p:tnLst>
+  </p:timing>
+</p:sld>
+</file>
+
+<file path=ppt/slides/slide21.xml><?xml version="1.0" encoding="utf-8"?>
+<p:sld xmlns:a="http://schemas.openxmlformats.org/drawingml/2006/main" xmlns:r="http://schemas.openxmlformats.org/officeDocument/2006/relationships" xmlns:p="http://schemas.openxmlformats.org/presentationml/2006/main">
+  <p:cSld>
+    <p:spTree>
+      <p:nvGrpSpPr>
+        <p:cNvPr id="1" name=""/>
+        <p:cNvGrpSpPr/>
+        <p:nvPr/>
+      </p:nvGrpSpPr>
+      <p:grpSpPr>
+        <a:xfrm>
+          <a:off x="0" y="0"/>
+          <a:ext cx="0" cy="0"/>
+          <a:chOff x="0" y="0"/>
+          <a:chExt cx="0" cy="0"/>
+        </a:xfrm>
+      </p:grpSpPr>
+      <p:sp>
+        <p:nvSpPr>
+          <p:cNvPr id="7" name="TextBox 6"/>
+          <p:cNvSpPr txBox="1"/>
+          <p:nvPr/>
+        </p:nvSpPr>
+        <p:spPr>
+          <a:xfrm>
+            <a:off x="1295400" y="2363450"/>
+            <a:ext cx="6781800" cy="3808750"/>
+          </a:xfrm>
+          <a:prstGeom prst="rect">
+            <a:avLst/>
+          </a:prstGeom>
+          <a:noFill/>
+        </p:spPr>
+        <p:txBody>
+          <a:bodyPr wrap="square" rtlCol="0">
+            <a:normAutofit/>
+          </a:bodyPr>
+          <a:lstStyle/>
+          <a:p>
+            <a:r>
+              <a:rPr lang="en-US" sz="7200" dirty="0" smtClean="0"/>
+              <a:t>HTML 5</a:t>
             </a:r>
             <a:endParaRPr lang="en-US" sz="7200" dirty="0"/>
           </a:p>
@@ -8426,7 +9623,7 @@
 </p:sld>
 </file>
 
-<file path=ppt/slides/slide17.xml><?xml version="1.0" encoding="utf-8"?>
+<file path=ppt/slides/slide22.xml><?xml version="1.0" encoding="utf-8"?>
 <p:sld xmlns:a="http://schemas.openxmlformats.org/drawingml/2006/main" xmlns:r="http://schemas.openxmlformats.org/officeDocument/2006/relationships" xmlns:p="http://schemas.openxmlformats.org/presentationml/2006/main">
   <p:cSld>
     <p:spTree>
@@ -8445,434 +9642,6 @@
       </p:grpSpPr>
       <p:sp>
         <p:nvSpPr>
-          <p:cNvPr id="2" name="Title 1"/>
-          <p:cNvSpPr>
-            <a:spLocks noGrp="1"/>
-          </p:cNvSpPr>
-          <p:nvPr>
-            <p:ph type="title"/>
-            <p:custDataLst>
-              <p:tags r:id="rId2"/>
-            </p:custDataLst>
-          </p:nvPr>
-        </p:nvSpPr>
-        <p:spPr/>
-        <p:txBody>
-          <a:bodyPr/>
-          <a:lstStyle/>
-          <a:p>
-            <a:r>
-              <a:rPr lang="en-US" dirty="0" smtClean="0"/>
-              <a:t>HTML 5 Features</a:t>
-            </a:r>
-            <a:endParaRPr lang="en-US" dirty="0"/>
-          </a:p>
-        </p:txBody>
-      </p:sp>
-      <p:sp>
-        <p:nvSpPr>
-          <p:cNvPr id="5" name="Content Placeholder 4"/>
-          <p:cNvSpPr>
-            <a:spLocks noGrp="1"/>
-          </p:cNvSpPr>
-          <p:nvPr>
-            <p:ph idx="1"/>
-            <p:custDataLst>
-              <p:tags r:id="rId3"/>
-            </p:custDataLst>
-          </p:nvPr>
-        </p:nvSpPr>
-        <p:spPr/>
-        <p:txBody>
-          <a:bodyPr>
-            <a:normAutofit fontScale="85000" lnSpcReduction="10000"/>
-          </a:bodyPr>
-          <a:lstStyle/>
-          <a:p>
-            <a:r>
-              <a:rPr lang="en-US" dirty="0" smtClean="0"/>
-              <a:t>Semantic Structure</a:t>
-            </a:r>
-          </a:p>
-          <a:p>
-            <a:r>
-              <a:rPr lang="en-US" dirty="0" smtClean="0"/>
-              <a:t>Custom Attributes – start with data</a:t>
-            </a:r>
-          </a:p>
-          <a:p>
-            <a:r>
-              <a:rPr lang="en-US" dirty="0" smtClean="0"/>
-              <a:t>Web workers</a:t>
-            </a:r>
-          </a:p>
-          <a:p>
-            <a:r>
-              <a:rPr lang="en-US" dirty="0" smtClean="0"/>
-              <a:t>Web storage</a:t>
-            </a:r>
-          </a:p>
-          <a:p>
-            <a:r>
-              <a:rPr lang="en-US" dirty="0" smtClean="0"/>
-              <a:t>Geo location</a:t>
-            </a:r>
-          </a:p>
-          <a:p>
-            <a:r>
-              <a:rPr lang="en-US" dirty="0" smtClean="0"/>
-              <a:t>Web Sockets</a:t>
-            </a:r>
-          </a:p>
-          <a:p>
-            <a:r>
-              <a:rPr lang="en-US" dirty="0" smtClean="0"/>
-              <a:t>Audio and Video Support</a:t>
-            </a:r>
-          </a:p>
-          <a:p>
-            <a:r>
-              <a:rPr lang="en-US" dirty="0" smtClean="0"/>
-              <a:t>Canvas</a:t>
-            </a:r>
-          </a:p>
-          <a:p>
-            <a:pPr marL="0" indent="0">
-              <a:buNone/>
-            </a:pPr>
-            <a:r>
-              <a:rPr lang="en-US" dirty="0" smtClean="0"/>
-              <a:t>HTML 5 specs implementation will complete in 2022</a:t>
-            </a:r>
-          </a:p>
-        </p:txBody>
-      </p:sp>
-    </p:spTree>
-    <p:custDataLst>
-      <p:tags r:id="rId1"/>
-    </p:custDataLst>
-    <p:extLst>
-      <p:ext uri="{BB962C8B-B14F-4D97-AF65-F5344CB8AC3E}">
-        <p14:creationId xmlns:p14="http://schemas.microsoft.com/office/powerpoint/2010/main" val="3241600861"/>
-      </p:ext>
-    </p:extLst>
-  </p:cSld>
-  <p:clrMapOvr>
-    <a:masterClrMapping/>
-  </p:clrMapOvr>
-  <p:transition spd="slow">
-    <p:wipe dir="d"/>
-  </p:transition>
-  <p:timing>
-    <p:tnLst>
-      <p:par>
-        <p:cTn id="1" dur="indefinite" restart="never" nodeType="tmRoot"/>
-      </p:par>
-    </p:tnLst>
-  </p:timing>
-</p:sld>
-</file>
-
-<file path=ppt/slides/slide18.xml><?xml version="1.0" encoding="utf-8"?>
-<p:sld xmlns:a="http://schemas.openxmlformats.org/drawingml/2006/main" xmlns:r="http://schemas.openxmlformats.org/officeDocument/2006/relationships" xmlns:p="http://schemas.openxmlformats.org/presentationml/2006/main">
-  <p:cSld>
-    <p:spTree>
-      <p:nvGrpSpPr>
-        <p:cNvPr id="1" name=""/>
-        <p:cNvGrpSpPr/>
-        <p:nvPr/>
-      </p:nvGrpSpPr>
-      <p:grpSpPr>
-        <a:xfrm>
-          <a:off x="0" y="0"/>
-          <a:ext cx="0" cy="0"/>
-          <a:chOff x="0" y="0"/>
-          <a:chExt cx="0" cy="0"/>
-        </a:xfrm>
-      </p:grpSpPr>
-      <p:sp>
-        <p:nvSpPr>
-          <p:cNvPr id="2" name="Title 1"/>
-          <p:cNvSpPr>
-            <a:spLocks noGrp="1"/>
-          </p:cNvSpPr>
-          <p:nvPr>
-            <p:ph type="title"/>
-            <p:custDataLst>
-              <p:tags r:id="rId2"/>
-            </p:custDataLst>
-          </p:nvPr>
-        </p:nvSpPr>
-        <p:spPr/>
-        <p:txBody>
-          <a:bodyPr>
-            <a:normAutofit/>
-          </a:bodyPr>
-          <a:lstStyle/>
-          <a:p>
-            <a:r>
-              <a:rPr lang="en-US" dirty="0" smtClean="0"/>
-              <a:t>Re Introducing Browser</a:t>
-            </a:r>
-            <a:endParaRPr lang="en-US" dirty="0"/>
-          </a:p>
-        </p:txBody>
-      </p:sp>
-      <p:sp>
-        <p:nvSpPr>
-          <p:cNvPr id="5" name="Content Placeholder 4"/>
-          <p:cNvSpPr>
-            <a:spLocks noGrp="1"/>
-          </p:cNvSpPr>
-          <p:nvPr>
-            <p:ph idx="1"/>
-            <p:custDataLst>
-              <p:tags r:id="rId3"/>
-            </p:custDataLst>
-          </p:nvPr>
-        </p:nvSpPr>
-        <p:spPr/>
-        <p:txBody>
-          <a:bodyPr>
-            <a:normAutofit fontScale="92500" lnSpcReduction="10000"/>
-          </a:bodyPr>
-          <a:lstStyle/>
-          <a:p>
-            <a:r>
-              <a:rPr lang="en-US" dirty="0"/>
-              <a:t>HTML has grown from ‘just’ markup </a:t>
-            </a:r>
-            <a:r>
-              <a:rPr lang="en-US" dirty="0" smtClean="0"/>
-              <a:t>language to a whole new Infrastructure.</a:t>
-            </a:r>
-          </a:p>
-          <a:p>
-            <a:r>
-              <a:rPr lang="en-US" dirty="0" smtClean="0"/>
-              <a:t>Browser is Platform</a:t>
-            </a:r>
-            <a:endParaRPr lang="en-US" dirty="0"/>
-          </a:p>
-          <a:p>
-            <a:r>
-              <a:rPr lang="en-US" dirty="0" smtClean="0"/>
-              <a:t>With HTML 5, CSS3 and Java Script now you write desktop equivalent applications</a:t>
-            </a:r>
-          </a:p>
-          <a:p>
-            <a:r>
-              <a:rPr lang="en-US" dirty="0" smtClean="0"/>
-              <a:t>You can debug java script, perform logging etc.</a:t>
-            </a:r>
-          </a:p>
-          <a:p>
-            <a:r>
-              <a:rPr lang="en-US" dirty="0" smtClean="0"/>
-              <a:t>Browse ecosystem is also matured with frameworks like Angular, Backbone, knockout etc.</a:t>
-            </a:r>
-          </a:p>
-        </p:txBody>
-      </p:sp>
-    </p:spTree>
-    <p:custDataLst>
-      <p:tags r:id="rId1"/>
-    </p:custDataLst>
-    <p:extLst>
-      <p:ext uri="{BB962C8B-B14F-4D97-AF65-F5344CB8AC3E}">
-        <p14:creationId xmlns:p14="http://schemas.microsoft.com/office/powerpoint/2010/main" val="964538590"/>
-      </p:ext>
-    </p:extLst>
-  </p:cSld>
-  <p:clrMapOvr>
-    <a:masterClrMapping/>
-  </p:clrMapOvr>
-  <p:transition spd="slow">
-    <p:wipe dir="d"/>
-  </p:transition>
-  <p:timing>
-    <p:tnLst>
-      <p:par>
-        <p:cTn id="1" dur="indefinite" restart="never" nodeType="tmRoot"/>
-      </p:par>
-    </p:tnLst>
-  </p:timing>
-</p:sld>
-</file>
-
-<file path=ppt/slides/slide19.xml><?xml version="1.0" encoding="utf-8"?>
-<p:sld xmlns:a="http://schemas.openxmlformats.org/drawingml/2006/main" xmlns:r="http://schemas.openxmlformats.org/officeDocument/2006/relationships" xmlns:p="http://schemas.openxmlformats.org/presentationml/2006/main">
-  <p:cSld>
-    <p:spTree>
-      <p:nvGrpSpPr>
-        <p:cNvPr id="1" name=""/>
-        <p:cNvGrpSpPr/>
-        <p:nvPr/>
-      </p:nvGrpSpPr>
-      <p:grpSpPr>
-        <a:xfrm>
-          <a:off x="0" y="0"/>
-          <a:ext cx="0" cy="0"/>
-          <a:chOff x="0" y="0"/>
-          <a:chExt cx="0" cy="0"/>
-        </a:xfrm>
-      </p:grpSpPr>
-      <p:sp>
-        <p:nvSpPr>
-          <p:cNvPr id="2" name="Title 1"/>
-          <p:cNvSpPr>
-            <a:spLocks noGrp="1"/>
-          </p:cNvSpPr>
-          <p:nvPr>
-            <p:ph type="title"/>
-            <p:custDataLst>
-              <p:tags r:id="rId2"/>
-            </p:custDataLst>
-          </p:nvPr>
-        </p:nvSpPr>
-        <p:spPr/>
-        <p:txBody>
-          <a:bodyPr/>
-          <a:lstStyle/>
-          <a:p>
-            <a:r>
-              <a:rPr lang="en-US" dirty="0" smtClean="0"/>
-              <a:t>Progressive Enhancement</a:t>
-            </a:r>
-            <a:endParaRPr lang="en-US" dirty="0"/>
-          </a:p>
-        </p:txBody>
-      </p:sp>
-      <p:sp>
-        <p:nvSpPr>
-          <p:cNvPr id="5" name="Content Placeholder 4"/>
-          <p:cNvSpPr>
-            <a:spLocks noGrp="1"/>
-          </p:cNvSpPr>
-          <p:nvPr>
-            <p:ph idx="1"/>
-            <p:custDataLst>
-              <p:tags r:id="rId3"/>
-            </p:custDataLst>
-          </p:nvPr>
-        </p:nvSpPr>
-        <p:spPr/>
-        <p:txBody>
-          <a:bodyPr>
-            <a:normAutofit fontScale="85000" lnSpcReduction="10000"/>
-          </a:bodyPr>
-          <a:lstStyle/>
-          <a:p>
-            <a:r>
-              <a:rPr lang="en-US" dirty="0" smtClean="0"/>
-              <a:t>Approach </a:t>
-            </a:r>
-            <a:r>
-              <a:rPr lang="en-US" dirty="0"/>
-              <a:t>to Web design that promotes accessibility using semantic HTML, </a:t>
-            </a:r>
-            <a:r>
-              <a:rPr lang="en-US" dirty="0" smtClean="0"/>
-              <a:t>style sheets </a:t>
-            </a:r>
-            <a:r>
-              <a:rPr lang="en-US" dirty="0"/>
-              <a:t>and scripting</a:t>
-            </a:r>
-            <a:r>
-              <a:rPr lang="en-US" dirty="0" smtClean="0"/>
-              <a:t>.</a:t>
-            </a:r>
-          </a:p>
-          <a:p>
-            <a:r>
-              <a:rPr lang="en-US" dirty="0" smtClean="0"/>
-              <a:t>Create Web </a:t>
-            </a:r>
-            <a:r>
-              <a:rPr lang="en-US" dirty="0"/>
-              <a:t>site where basic content is available to everyone while more advanced content and functionality are accessible to those with more </a:t>
-            </a:r>
-            <a:r>
-              <a:rPr lang="en-US" dirty="0" smtClean="0"/>
-              <a:t>capability</a:t>
-            </a:r>
-          </a:p>
-          <a:p>
-            <a:r>
-              <a:rPr lang="en-US" dirty="0"/>
-              <a:t>C</a:t>
-            </a:r>
-            <a:r>
-              <a:rPr lang="en-US" dirty="0" smtClean="0"/>
-              <a:t>oncentrate </a:t>
-            </a:r>
-            <a:r>
-              <a:rPr lang="en-US" dirty="0"/>
-              <a:t>first on displaying the content in the simplest manner.</a:t>
-            </a:r>
-          </a:p>
-          <a:p>
-            <a:r>
-              <a:rPr lang="en-US" dirty="0" smtClean="0"/>
-              <a:t>MVC for web – HTML as data, </a:t>
-            </a:r>
-            <a:r>
-              <a:rPr lang="en-US" dirty="0" err="1" smtClean="0"/>
-              <a:t>css</a:t>
-            </a:r>
-            <a:r>
-              <a:rPr lang="en-US" dirty="0" smtClean="0"/>
-              <a:t> as presentation and Java Script to manage interactions</a:t>
-            </a:r>
-          </a:p>
-        </p:txBody>
-      </p:sp>
-    </p:spTree>
-    <p:custDataLst>
-      <p:tags r:id="rId1"/>
-    </p:custDataLst>
-    <p:extLst>
-      <p:ext uri="{BB962C8B-B14F-4D97-AF65-F5344CB8AC3E}">
-        <p14:creationId xmlns:p14="http://schemas.microsoft.com/office/powerpoint/2010/main" val="1877717642"/>
-      </p:ext>
-    </p:extLst>
-  </p:cSld>
-  <p:clrMapOvr>
-    <a:masterClrMapping/>
-  </p:clrMapOvr>
-  <p:transition spd="slow">
-    <p:wipe dir="d"/>
-  </p:transition>
-  <p:timing>
-    <p:tnLst>
-      <p:par>
-        <p:cTn id="1" dur="indefinite" restart="never" nodeType="tmRoot"/>
-      </p:par>
-    </p:tnLst>
-  </p:timing>
-</p:sld>
-</file>
-
-<file path=ppt/slides/slide2.xml><?xml version="1.0" encoding="utf-8"?>
-<p:sld xmlns:a="http://schemas.openxmlformats.org/drawingml/2006/main" xmlns:r="http://schemas.openxmlformats.org/officeDocument/2006/relationships" xmlns:p="http://schemas.openxmlformats.org/presentationml/2006/main">
-  <p:cSld>
-    <p:spTree>
-      <p:nvGrpSpPr>
-        <p:cNvPr id="1" name=""/>
-        <p:cNvGrpSpPr/>
-        <p:nvPr/>
-      </p:nvGrpSpPr>
-      <p:grpSpPr>
-        <a:xfrm>
-          <a:off x="0" y="0"/>
-          <a:ext cx="0" cy="0"/>
-          <a:chOff x="0" y="0"/>
-          <a:chExt cx="0" cy="0"/>
-        </a:xfrm>
-      </p:grpSpPr>
-      <p:sp>
-        <p:nvSpPr>
           <p:cNvPr id="7" name="TextBox 6"/>
           <p:cNvSpPr txBox="1"/>
           <p:nvPr/>
@@ -8889,22 +9658,15 @@
         </p:spPr>
         <p:txBody>
           <a:bodyPr wrap="square" rtlCol="0">
-            <a:normAutofit fontScale="92500"/>
+            <a:normAutofit/>
           </a:bodyPr>
           <a:lstStyle/>
           <a:p>
             <a:r>
-              <a:rPr lang="en-US" sz="7200" dirty="0"/>
-              <a:t>Accessible </a:t>
-            </a:r>
-            <a:r>
               <a:rPr lang="en-US" sz="7200" dirty="0" smtClean="0"/>
-              <a:t>Website are always SEO </a:t>
-            </a:r>
-            <a:r>
-              <a:rPr lang="en-US" sz="7200" dirty="0"/>
-              <a:t>Friendly</a:t>
-            </a:r>
+              <a:t>Caution : HTML 5 is not fully supported</a:t>
+            </a:r>
+            <a:endParaRPr lang="en-US" sz="7200" dirty="0"/>
           </a:p>
         </p:txBody>
       </p:sp>
@@ -8939,6 +9701,11 @@
         </p:spPr>
       </p:pic>
     </p:spTree>
+    <p:extLst>
+      <p:ext uri="{BB962C8B-B14F-4D97-AF65-F5344CB8AC3E}">
+        <p14:creationId xmlns:p14="http://schemas.microsoft.com/office/powerpoint/2010/main" val="1653172554"/>
+      </p:ext>
+    </p:extLst>
   </p:cSld>
   <p:clrMapOvr>
     <a:masterClrMapping/>
@@ -8956,7 +9723,7 @@
 </p:sld>
 </file>
 
-<file path=ppt/slides/slide20.xml><?xml version="1.0" encoding="utf-8"?>
+<file path=ppt/slides/slide23.xml><?xml version="1.0" encoding="utf-8"?>
 <p:sld xmlns:a="http://schemas.openxmlformats.org/drawingml/2006/main" xmlns:r="http://schemas.openxmlformats.org/officeDocument/2006/relationships" xmlns:p="http://schemas.openxmlformats.org/presentationml/2006/main">
   <p:cSld>
     <p:spTree>
@@ -8993,7 +9760,7 @@
           <a:p>
             <a:r>
               <a:rPr lang="en-US" dirty="0" smtClean="0"/>
-              <a:t>Fallback</a:t>
+              <a:t>Progressive Enhancement</a:t>
             </a:r>
             <a:endParaRPr lang="en-US" dirty="0"/>
           </a:p>
@@ -9015,13 +9782,314 @@
         <p:spPr/>
         <p:txBody>
           <a:bodyPr>
+            <a:normAutofit fontScale="85000" lnSpcReduction="10000"/>
+          </a:bodyPr>
+          <a:lstStyle/>
+          <a:p>
+            <a:r>
+              <a:rPr lang="en-US" dirty="0" smtClean="0"/>
+              <a:t>Approach </a:t>
+            </a:r>
+            <a:r>
+              <a:rPr lang="en-US" dirty="0"/>
+              <a:t>to Web design that promotes accessibility using semantic HTML, </a:t>
+            </a:r>
+            <a:r>
+              <a:rPr lang="en-US" dirty="0" smtClean="0"/>
+              <a:t>style sheets </a:t>
+            </a:r>
+            <a:r>
+              <a:rPr lang="en-US" dirty="0"/>
+              <a:t>and scripting</a:t>
+            </a:r>
+            <a:r>
+              <a:rPr lang="en-US" dirty="0" smtClean="0"/>
+              <a:t>.</a:t>
+            </a:r>
+          </a:p>
+          <a:p>
+            <a:r>
+              <a:rPr lang="en-US" dirty="0" smtClean="0"/>
+              <a:t>Create Web </a:t>
+            </a:r>
+            <a:r>
+              <a:rPr lang="en-US" dirty="0"/>
+              <a:t>site where basic content is available to everyone while more advanced content and functionality are accessible to those with more </a:t>
+            </a:r>
+            <a:r>
+              <a:rPr lang="en-US" dirty="0" smtClean="0"/>
+              <a:t>capability</a:t>
+            </a:r>
+          </a:p>
+          <a:p>
+            <a:r>
+              <a:rPr lang="en-US" dirty="0"/>
+              <a:t>C</a:t>
+            </a:r>
+            <a:r>
+              <a:rPr lang="en-US" dirty="0" smtClean="0"/>
+              <a:t>oncentrate </a:t>
+            </a:r>
+            <a:r>
+              <a:rPr lang="en-US" dirty="0"/>
+              <a:t>first on displaying the content in the simplest manner.</a:t>
+            </a:r>
+          </a:p>
+          <a:p>
+            <a:r>
+              <a:rPr lang="en-US" dirty="0" smtClean="0"/>
+              <a:t>MVC for web – HTML as data, </a:t>
+            </a:r>
+            <a:r>
+              <a:rPr lang="en-US" dirty="0" err="1" smtClean="0"/>
+              <a:t>css</a:t>
+            </a:r>
+            <a:r>
+              <a:rPr lang="en-US" dirty="0" smtClean="0"/>
+              <a:t> as presentation and Java Script to manage interactions</a:t>
+            </a:r>
+          </a:p>
+        </p:txBody>
+      </p:sp>
+    </p:spTree>
+    <p:custDataLst>
+      <p:tags r:id="rId1"/>
+    </p:custDataLst>
+    <p:extLst>
+      <p:ext uri="{BB962C8B-B14F-4D97-AF65-F5344CB8AC3E}">
+        <p14:creationId xmlns:p14="http://schemas.microsoft.com/office/powerpoint/2010/main" val="1877717642"/>
+      </p:ext>
+    </p:extLst>
+  </p:cSld>
+  <p:clrMapOvr>
+    <a:masterClrMapping/>
+  </p:clrMapOvr>
+  <p:transition spd="slow">
+    <p:wipe dir="d"/>
+  </p:transition>
+  <p:timing>
+    <p:tnLst>
+      <p:par>
+        <p:cTn id="1" dur="indefinite" restart="never" nodeType="tmRoot"/>
+      </p:par>
+    </p:tnLst>
+  </p:timing>
+</p:sld>
+</file>
+
+<file path=ppt/slides/slide24.xml><?xml version="1.0" encoding="utf-8"?>
+<p:sld xmlns:a="http://schemas.openxmlformats.org/drawingml/2006/main" xmlns:r="http://schemas.openxmlformats.org/officeDocument/2006/relationships" xmlns:p="http://schemas.openxmlformats.org/presentationml/2006/main">
+  <p:cSld>
+    <p:spTree>
+      <p:nvGrpSpPr>
+        <p:cNvPr id="1" name=""/>
+        <p:cNvGrpSpPr/>
+        <p:nvPr/>
+      </p:nvGrpSpPr>
+      <p:grpSpPr>
+        <a:xfrm>
+          <a:off x="0" y="0"/>
+          <a:ext cx="0" cy="0"/>
+          <a:chOff x="0" y="0"/>
+          <a:chExt cx="0" cy="0"/>
+        </a:xfrm>
+      </p:grpSpPr>
+      <p:sp>
+        <p:nvSpPr>
+          <p:cNvPr id="2" name="Title 1"/>
+          <p:cNvSpPr>
+            <a:spLocks noGrp="1"/>
+          </p:cNvSpPr>
+          <p:nvPr>
+            <p:ph type="title"/>
+            <p:custDataLst>
+              <p:tags r:id="rId2"/>
+            </p:custDataLst>
+          </p:nvPr>
+        </p:nvSpPr>
+        <p:spPr/>
+        <p:txBody>
+          <a:bodyPr/>
+          <a:lstStyle/>
+          <a:p>
+            <a:r>
+              <a:rPr lang="en-US" dirty="0" smtClean="0"/>
+              <a:t>HTML 5 Features</a:t>
+            </a:r>
+            <a:endParaRPr lang="en-US" dirty="0"/>
+          </a:p>
+        </p:txBody>
+      </p:sp>
+      <p:sp>
+        <p:nvSpPr>
+          <p:cNvPr id="5" name="Content Placeholder 4"/>
+          <p:cNvSpPr>
+            <a:spLocks noGrp="1"/>
+          </p:cNvSpPr>
+          <p:nvPr>
+            <p:ph idx="1"/>
+            <p:custDataLst>
+              <p:tags r:id="rId3"/>
+            </p:custDataLst>
+          </p:nvPr>
+        </p:nvSpPr>
+        <p:spPr/>
+        <p:txBody>
+          <a:bodyPr>
+            <a:normAutofit fontScale="85000" lnSpcReduction="10000"/>
+          </a:bodyPr>
+          <a:lstStyle/>
+          <a:p>
+            <a:r>
+              <a:rPr lang="en-US" dirty="0" smtClean="0"/>
+              <a:t>Semantic Structure</a:t>
+            </a:r>
+          </a:p>
+          <a:p>
+            <a:r>
+              <a:rPr lang="en-US" dirty="0" smtClean="0"/>
+              <a:t>Custom Attributes – start with data</a:t>
+            </a:r>
+          </a:p>
+          <a:p>
+            <a:r>
+              <a:rPr lang="en-US" dirty="0" smtClean="0"/>
+              <a:t>Web workers</a:t>
+            </a:r>
+          </a:p>
+          <a:p>
+            <a:r>
+              <a:rPr lang="en-US" dirty="0" smtClean="0"/>
+              <a:t>Web storage</a:t>
+            </a:r>
+          </a:p>
+          <a:p>
+            <a:r>
+              <a:rPr lang="en-US" dirty="0" smtClean="0"/>
+              <a:t>Geo location</a:t>
+            </a:r>
+          </a:p>
+          <a:p>
+            <a:r>
+              <a:rPr lang="en-US" dirty="0" smtClean="0"/>
+              <a:t>Web Sockets</a:t>
+            </a:r>
+          </a:p>
+          <a:p>
+            <a:r>
+              <a:rPr lang="en-US" dirty="0" smtClean="0"/>
+              <a:t>Audio and Video Support</a:t>
+            </a:r>
+          </a:p>
+          <a:p>
+            <a:r>
+              <a:rPr lang="en-US" dirty="0" smtClean="0"/>
+              <a:t>Canvas</a:t>
+            </a:r>
+          </a:p>
+          <a:p>
+            <a:pPr marL="0" indent="0">
+              <a:buNone/>
+            </a:pPr>
+            <a:r>
+              <a:rPr lang="en-US" dirty="0" smtClean="0"/>
+              <a:t>HTML 5 specs implementation will complete in 2022</a:t>
+            </a:r>
+          </a:p>
+        </p:txBody>
+      </p:sp>
+    </p:spTree>
+    <p:custDataLst>
+      <p:tags r:id="rId1"/>
+    </p:custDataLst>
+    <p:extLst>
+      <p:ext uri="{BB962C8B-B14F-4D97-AF65-F5344CB8AC3E}">
+        <p14:creationId xmlns:p14="http://schemas.microsoft.com/office/powerpoint/2010/main" val="3241600861"/>
+      </p:ext>
+    </p:extLst>
+  </p:cSld>
+  <p:clrMapOvr>
+    <a:masterClrMapping/>
+  </p:clrMapOvr>
+  <p:transition spd="slow">
+    <p:wipe dir="d"/>
+  </p:transition>
+  <p:timing>
+    <p:tnLst>
+      <p:par>
+        <p:cTn id="1" dur="indefinite" restart="never" nodeType="tmRoot"/>
+      </p:par>
+    </p:tnLst>
+  </p:timing>
+</p:sld>
+</file>
+
+<file path=ppt/slides/slide25.xml><?xml version="1.0" encoding="utf-8"?>
+<p:sld xmlns:a="http://schemas.openxmlformats.org/drawingml/2006/main" xmlns:r="http://schemas.openxmlformats.org/officeDocument/2006/relationships" xmlns:p="http://schemas.openxmlformats.org/presentationml/2006/main">
+  <p:cSld>
+    <p:spTree>
+      <p:nvGrpSpPr>
+        <p:cNvPr id="1" name=""/>
+        <p:cNvGrpSpPr/>
+        <p:nvPr/>
+      </p:nvGrpSpPr>
+      <p:grpSpPr>
+        <a:xfrm>
+          <a:off x="0" y="0"/>
+          <a:ext cx="0" cy="0"/>
+          <a:chOff x="0" y="0"/>
+          <a:chExt cx="0" cy="0"/>
+        </a:xfrm>
+      </p:grpSpPr>
+      <p:sp>
+        <p:nvSpPr>
+          <p:cNvPr id="2" name="Title 1"/>
+          <p:cNvSpPr>
+            <a:spLocks noGrp="1"/>
+          </p:cNvSpPr>
+          <p:nvPr>
+            <p:ph type="title"/>
+            <p:custDataLst>
+              <p:tags r:id="rId2"/>
+            </p:custDataLst>
+          </p:nvPr>
+        </p:nvSpPr>
+        <p:spPr/>
+        <p:txBody>
+          <a:bodyPr/>
+          <a:lstStyle/>
+          <a:p>
+            <a:r>
+              <a:rPr lang="en-US" dirty="0" smtClean="0"/>
+              <a:t>Fallback</a:t>
+            </a:r>
+            <a:endParaRPr lang="en-US" dirty="0"/>
+          </a:p>
+        </p:txBody>
+      </p:sp>
+      <p:sp>
+        <p:nvSpPr>
+          <p:cNvPr id="5" name="Content Placeholder 4"/>
+          <p:cNvSpPr>
+            <a:spLocks noGrp="1"/>
+          </p:cNvSpPr>
+          <p:nvPr>
+            <p:ph idx="1"/>
+            <p:custDataLst>
+              <p:tags r:id="rId3"/>
+            </p:custDataLst>
+          </p:nvPr>
+        </p:nvSpPr>
+        <p:spPr/>
+        <p:txBody>
+          <a:bodyPr>
             <a:normAutofit/>
           </a:bodyPr>
           <a:lstStyle/>
           <a:p>
             <a:r>
               <a:rPr lang="en-US" dirty="0" smtClean="0"/>
-              <a:t>Modernizer – demo</a:t>
+              <a:t>Modernizer</a:t>
             </a:r>
           </a:p>
           <a:p>
@@ -9035,8 +10103,21 @@
           <a:p>
             <a:r>
               <a:rPr lang="en-US" dirty="0" smtClean="0"/>
-              <a:t>Html 5 shiv - demo</a:t>
-            </a:r>
+              <a:t>Html 5 shiv</a:t>
+            </a:r>
+          </a:p>
+          <a:p>
+            <a:r>
+              <a:rPr lang="en-US" dirty="0" smtClean="0"/>
+              <a:t>Sample - </a:t>
+            </a:r>
+            <a:r>
+              <a:rPr lang="en-US" dirty="0">
+                <a:hlinkClick r:id="rId6"/>
+              </a:rPr>
+              <a:t>http://iaccessible.in/training/others/progressive.html</a:t>
+            </a:r>
+            <a:endParaRPr lang="en-US" dirty="0" smtClean="0"/>
           </a:p>
         </p:txBody>
       </p:sp>
@@ -9066,7 +10147,7 @@
 </p:sld>
 </file>
 
-<file path=ppt/slides/slide21.xml><?xml version="1.0" encoding="utf-8"?>
+<file path=ppt/slides/slide26.xml><?xml version="1.0" encoding="utf-8"?>
 <p:sld xmlns:a="http://schemas.openxmlformats.org/drawingml/2006/main" xmlns:r="http://schemas.openxmlformats.org/officeDocument/2006/relationships" xmlns:p="http://schemas.openxmlformats.org/presentationml/2006/main">
   <p:cSld>
     <p:spTree>
@@ -9102,7 +10183,7 @@
           <a:p>
             <a:r>
               <a:rPr lang="en-US" dirty="0" smtClean="0"/>
-              <a:t>Semantic HTML</a:t>
+              <a:t>Support Semantic HTML</a:t>
             </a:r>
             <a:endParaRPr lang="en-US" dirty="0"/>
           </a:p>
@@ -9138,20 +10219,6 @@
               <a:rPr lang="en-US" dirty="0" smtClean="0"/>
               <a:t>.</a:t>
             </a:r>
-          </a:p>
-          <a:p>
-            <a:pPr marL="0" indent="0" algn="ctr">
-              <a:buNone/>
-            </a:pPr>
-            <a:r>
-              <a:rPr lang="en-US" dirty="0" smtClean="0"/>
-              <a:t>Demo – old way of </a:t>
-            </a:r>
-            <a:r>
-              <a:rPr lang="en-US" smtClean="0"/>
-              <a:t>doing things</a:t>
-            </a:r>
-            <a:endParaRPr lang="en-US" dirty="0"/>
           </a:p>
         </p:txBody>
       </p:sp>
@@ -9178,7 +10245,7 @@
 </p:sld>
 </file>
 
-<file path=ppt/slides/slide22.xml><?xml version="1.0" encoding="utf-8"?>
+<file path=ppt/slides/slide27.xml><?xml version="1.0" encoding="utf-8"?>
 <p:sld xmlns:a="http://schemas.openxmlformats.org/drawingml/2006/main" xmlns:r="http://schemas.openxmlformats.org/officeDocument/2006/relationships" xmlns:p="http://schemas.openxmlformats.org/presentationml/2006/main">
   <p:cSld>
     <p:spTree>
@@ -9239,7 +10306,7 @@
         <p:spPr/>
         <p:txBody>
           <a:bodyPr>
-            <a:normAutofit fontScale="92500" lnSpcReduction="10000"/>
+            <a:normAutofit fontScale="92500" lnSpcReduction="20000"/>
           </a:bodyPr>
           <a:lstStyle/>
           <a:p>
@@ -9302,16 +10369,15 @@
           <a:p>
             <a:r>
               <a:rPr lang="en-US" dirty="0" smtClean="0"/>
-              <a:t> Problems </a:t>
-            </a:r>
-            <a:r>
-              <a:rPr lang="en-US" dirty="0"/>
-              <a:t>with </a:t>
-            </a:r>
-            <a:r>
-              <a:rPr lang="en-US" dirty="0" smtClean="0"/>
-              <a:t>IE</a:t>
-            </a:r>
+              <a:t>code- </a:t>
+            </a:r>
+            <a:r>
+              <a:rPr lang="en-US" dirty="0">
+                <a:hlinkClick r:id="rId6"/>
+              </a:rPr>
+              <a:t>http://iaccessible.in/training/others/html5.html</a:t>
+            </a:r>
+            <a:endParaRPr lang="en-US" dirty="0" smtClean="0"/>
           </a:p>
         </p:txBody>
       </p:sp>
@@ -9341,7 +10407,7 @@
 </p:sld>
 </file>
 
-<file path=ppt/slides/slide23.xml><?xml version="1.0" encoding="utf-8"?>
+<file path=ppt/slides/slide28.xml><?xml version="1.0" encoding="utf-8"?>
 <p:sld xmlns:a="http://schemas.openxmlformats.org/drawingml/2006/main" xmlns:r="http://schemas.openxmlformats.org/officeDocument/2006/relationships" xmlns:p="http://schemas.openxmlformats.org/presentationml/2006/main">
   <p:cSld>
     <p:spTree>
@@ -9471,7 +10537,7 @@
 </p:sld>
 </file>
 
-<file path=ppt/slides/slide24.xml><?xml version="1.0" encoding="utf-8"?>
+<file path=ppt/slides/slide29.xml><?xml version="1.0" encoding="utf-8"?>
 <p:sld xmlns:a="http://schemas.openxmlformats.org/drawingml/2006/main" xmlns:r="http://schemas.openxmlformats.org/officeDocument/2006/relationships" xmlns:p="http://schemas.openxmlformats.org/presentationml/2006/main">
   <p:cSld>
     <p:spTree>
@@ -9532,10 +10598,17 @@
         <p:spPr/>
         <p:txBody>
           <a:bodyPr>
-            <a:normAutofit/>
+            <a:normAutofit lnSpcReduction="10000"/>
           </a:bodyPr>
           <a:lstStyle/>
           <a:p>
+            <a:r>
+              <a:rPr lang="en-US" dirty="0" smtClean="0"/>
+              <a:t>Examples</a:t>
+            </a:r>
+          </a:p>
+          <a:p>
+            <a:pPr lvl="1"/>
             <a:r>
               <a:rPr lang="en-US" dirty="0" smtClean="0"/>
               <a:t>Figure and </a:t>
@@ -9547,22 +10620,53 @@
             <a:endParaRPr lang="en-US" dirty="0" smtClean="0"/>
           </a:p>
           <a:p>
+            <a:pPr lvl="1"/>
             <a:r>
               <a:rPr lang="en-US" dirty="0" smtClean="0"/>
               <a:t>Address</a:t>
             </a:r>
           </a:p>
           <a:p>
+            <a:pPr lvl="1"/>
             <a:r>
               <a:rPr lang="en-US" dirty="0" smtClean="0"/>
               <a:t>Output element</a:t>
             </a:r>
           </a:p>
           <a:p>
-            <a:r>
-              <a:rPr lang="en-US" dirty="0" smtClean="0"/>
-              <a:t>mark</a:t>
-            </a:r>
+            <a:pPr lvl="1"/>
+            <a:r>
+              <a:rPr lang="en-US" dirty="0" smtClean="0"/>
+              <a:t>Mark</a:t>
+            </a:r>
+          </a:p>
+          <a:p>
+            <a:pPr lvl="1"/>
+            <a:r>
+              <a:rPr lang="en-US" dirty="0" err="1" smtClean="0"/>
+              <a:t>Abbr</a:t>
+            </a:r>
+            <a:r>
+              <a:rPr lang="en-US" dirty="0" smtClean="0"/>
+              <a:t> </a:t>
+            </a:r>
+            <a:endParaRPr lang="en-US" dirty="0"/>
+          </a:p>
+          <a:p>
+            <a:r>
+              <a:rPr lang="en-US" dirty="0"/>
+              <a:t>Sample code </a:t>
+            </a:r>
+            <a:r>
+              <a:rPr lang="en-US" dirty="0">
+                <a:hlinkClick r:id="rId6"/>
+              </a:rPr>
+              <a:t>http://iaccessible.in/training/others/html5.html</a:t>
+            </a:r>
+            <a:endParaRPr lang="en-US" dirty="0"/>
+          </a:p>
+          <a:p>
+            <a:endParaRPr lang="en-US" dirty="0" smtClean="0"/>
           </a:p>
         </p:txBody>
       </p:sp>
@@ -9592,7 +10696,7 @@
 </p:sld>
 </file>
 
-<file path=ppt/slides/slide25.xml><?xml version="1.0" encoding="utf-8"?>
+<file path=ppt/slides/slide3.xml><?xml version="1.0" encoding="utf-8"?>
 <p:sld xmlns:a="http://schemas.openxmlformats.org/drawingml/2006/main" xmlns:r="http://schemas.openxmlformats.org/officeDocument/2006/relationships" xmlns:p="http://schemas.openxmlformats.org/presentationml/2006/main">
   <p:cSld>
     <p:spTree>
@@ -9633,7 +10737,107 @@
           <a:p>
             <a:r>
               <a:rPr lang="en-US" sz="7200" dirty="0" smtClean="0"/>
-              <a:t>HTML 5 Forms</a:t>
+              <a:t>WAI ARIA</a:t>
+            </a:r>
+            <a:endParaRPr lang="en-US" sz="7200" dirty="0"/>
+          </a:p>
+        </p:txBody>
+      </p:sp>
+      <p:pic>
+        <p:nvPicPr>
+          <p:cNvPr id="12" name="Picture 11"/>
+          <p:cNvPicPr>
+            <a:picLocks noChangeAspect="1"/>
+          </p:cNvPicPr>
+          <p:nvPr/>
+        </p:nvPicPr>
+        <p:blipFill>
+          <a:blip r:embed="rId3" cstate="email">
+            <a:extLst>
+              <a:ext uri="{28A0092B-C50C-407E-A947-70E740481C1C}">
+                <a14:useLocalDpi xmlns:a14="http://schemas.microsoft.com/office/drawing/2010/main"/>
+              </a:ext>
+            </a:extLst>
+          </a:blip>
+          <a:stretch>
+            <a:fillRect/>
+          </a:stretch>
+        </p:blipFill>
+        <p:spPr>
+          <a:xfrm>
+            <a:off x="4191000" y="0"/>
+            <a:ext cx="7765662" cy="16476125"/>
+          </a:xfrm>
+          <a:prstGeom prst="rect">
+            <a:avLst/>
+          </a:prstGeom>
+        </p:spPr>
+      </p:pic>
+    </p:spTree>
+    <p:extLst>
+      <p:ext uri="{BB962C8B-B14F-4D97-AF65-F5344CB8AC3E}">
+        <p14:creationId xmlns:p14="http://schemas.microsoft.com/office/powerpoint/2010/main" val="4261066294"/>
+      </p:ext>
+    </p:extLst>
+  </p:cSld>
+  <p:clrMapOvr>
+    <a:masterClrMapping/>
+  </p:clrMapOvr>
+  <p:transition spd="slow">
+    <p:fade/>
+  </p:transition>
+  <p:timing>
+    <p:tnLst>
+      <p:par>
+        <p:cTn id="1" dur="indefinite" restart="never" nodeType="tmRoot"/>
+      </p:par>
+    </p:tnLst>
+  </p:timing>
+</p:sld>
+</file>
+
+<file path=ppt/slides/slide30.xml><?xml version="1.0" encoding="utf-8"?>
+<p:sld xmlns:a="http://schemas.openxmlformats.org/drawingml/2006/main" xmlns:r="http://schemas.openxmlformats.org/officeDocument/2006/relationships" xmlns:p="http://schemas.openxmlformats.org/presentationml/2006/main">
+  <p:cSld>
+    <p:spTree>
+      <p:nvGrpSpPr>
+        <p:cNvPr id="1" name=""/>
+        <p:cNvGrpSpPr/>
+        <p:nvPr/>
+      </p:nvGrpSpPr>
+      <p:grpSpPr>
+        <a:xfrm>
+          <a:off x="0" y="0"/>
+          <a:ext cx="0" cy="0"/>
+          <a:chOff x="0" y="0"/>
+          <a:chExt cx="0" cy="0"/>
+        </a:xfrm>
+      </p:grpSpPr>
+      <p:sp>
+        <p:nvSpPr>
+          <p:cNvPr id="7" name="TextBox 6"/>
+          <p:cNvSpPr txBox="1"/>
+          <p:nvPr/>
+        </p:nvSpPr>
+        <p:spPr>
+          <a:xfrm>
+            <a:off x="1295400" y="2363450"/>
+            <a:ext cx="6781800" cy="3808750"/>
+          </a:xfrm>
+          <a:prstGeom prst="rect">
+            <a:avLst/>
+          </a:prstGeom>
+          <a:noFill/>
+        </p:spPr>
+        <p:txBody>
+          <a:bodyPr wrap="square" rtlCol="0">
+            <a:normAutofit/>
+          </a:bodyPr>
+          <a:lstStyle/>
+          <a:p>
+            <a:r>
+              <a:rPr lang="en-US" sz="7200" dirty="0" smtClean="0"/>
+              <a:t>HTML 5 Forms and Tables</a:t>
             </a:r>
             <a:endParaRPr lang="en-US" sz="7200" dirty="0"/>
           </a:p>
@@ -9692,7 +10896,7 @@
 </p:sld>
 </file>
 
-<file path=ppt/slides/slide26.xml><?xml version="1.0" encoding="utf-8"?>
+<file path=ppt/slides/slide31.xml><?xml version="1.0" encoding="utf-8"?>
 <p:sld xmlns:a="http://schemas.openxmlformats.org/drawingml/2006/main" xmlns:r="http://schemas.openxmlformats.org/officeDocument/2006/relationships" xmlns:p="http://schemas.openxmlformats.org/presentationml/2006/main">
   <p:cSld>
     <p:spTree>
@@ -9890,7 +11094,7 @@
 </p:sld>
 </file>
 
-<file path=ppt/slides/slide27.xml><?xml version="1.0" encoding="utf-8"?>
+<file path=ppt/slides/slide32.xml><?xml version="1.0" encoding="utf-8"?>
 <p:sld xmlns:a="http://schemas.openxmlformats.org/drawingml/2006/main" xmlns:r="http://schemas.openxmlformats.org/officeDocument/2006/relationships" xmlns:p="http://schemas.openxmlformats.org/presentationml/2006/main">
   <p:cSld>
     <p:spTree>
@@ -10034,7 +11238,7 @@
 </p:sld>
 </file>
 
-<file path=ppt/slides/slide28.xml><?xml version="1.0" encoding="utf-8"?>
+<file path=ppt/slides/slide33.xml><?xml version="1.0" encoding="utf-8"?>
 <p:sld xmlns:a="http://schemas.openxmlformats.org/drawingml/2006/main" xmlns:r="http://schemas.openxmlformats.org/officeDocument/2006/relationships" xmlns:p="http://schemas.openxmlformats.org/presentationml/2006/main">
   <p:cSld>
     <p:spTree>
@@ -10180,7 +11384,7 @@
 </p:sld>
 </file>
 
-<file path=ppt/slides/slide29.xml><?xml version="1.0" encoding="utf-8"?>
+<file path=ppt/slides/slide34.xml><?xml version="1.0" encoding="utf-8"?>
 <p:sld xmlns:a="http://schemas.openxmlformats.org/drawingml/2006/main" xmlns:r="http://schemas.openxmlformats.org/officeDocument/2006/relationships" xmlns:p="http://schemas.openxmlformats.org/presentationml/2006/main">
   <p:cSld>
     <p:spTree>
@@ -10199,68 +11403,130 @@
       </p:grpSpPr>
       <p:sp>
         <p:nvSpPr>
-          <p:cNvPr id="7" name="TextBox 6"/>
-          <p:cNvSpPr txBox="1"/>
-          <p:nvPr/>
-        </p:nvSpPr>
-        <p:spPr>
-          <a:xfrm>
-            <a:off x="1295400" y="2363450"/>
-            <a:ext cx="6781800" cy="3808750"/>
-          </a:xfrm>
-          <a:prstGeom prst="rect">
-            <a:avLst/>
-          </a:prstGeom>
-          <a:noFill/>
-        </p:spPr>
-        <p:txBody>
-          <a:bodyPr wrap="square" rtlCol="0">
-            <a:normAutofit/>
+          <p:cNvPr id="2" name="Title 1"/>
+          <p:cNvSpPr>
+            <a:spLocks noGrp="1"/>
+          </p:cNvSpPr>
+          <p:nvPr>
+            <p:ph type="title"/>
+            <p:custDataLst>
+              <p:tags r:id="rId2"/>
+            </p:custDataLst>
+          </p:nvPr>
+        </p:nvSpPr>
+        <p:spPr/>
+        <p:txBody>
+          <a:bodyPr/>
+          <a:lstStyle/>
+          <a:p>
+            <a:r>
+              <a:rPr lang="en-US" dirty="0" smtClean="0"/>
+              <a:t>HTML 5 Tables new tags</a:t>
+            </a:r>
+            <a:endParaRPr lang="en-US" dirty="0"/>
+          </a:p>
+        </p:txBody>
+      </p:sp>
+      <p:sp>
+        <p:nvSpPr>
+          <p:cNvPr id="5" name="Content Placeholder 4"/>
+          <p:cNvSpPr>
+            <a:spLocks noGrp="1"/>
+          </p:cNvSpPr>
+          <p:nvPr>
+            <p:ph idx="1"/>
+            <p:custDataLst>
+              <p:tags r:id="rId3"/>
+            </p:custDataLst>
+          </p:nvPr>
+        </p:nvSpPr>
+        <p:spPr/>
+        <p:txBody>
+          <a:bodyPr>
+            <a:normAutofit fontScale="92500" lnSpcReduction="20000"/>
           </a:bodyPr>
           <a:lstStyle/>
           <a:p>
             <a:r>
-              <a:rPr lang="en-US" sz="7200" dirty="0" smtClean="0"/>
-              <a:t>HTML Tables</a:t>
-            </a:r>
-            <a:endParaRPr lang="en-US" sz="7200" dirty="0"/>
-          </a:p>
-        </p:txBody>
-      </p:sp>
-      <p:pic>
-        <p:nvPicPr>
-          <p:cNvPr id="12" name="Picture 11"/>
-          <p:cNvPicPr>
-            <a:picLocks noChangeAspect="1"/>
-          </p:cNvPicPr>
-          <p:nvPr/>
-        </p:nvPicPr>
-        <p:blipFill>
-          <a:blip r:embed="rId3" cstate="email">
-            <a:extLst>
-              <a:ext uri="{28A0092B-C50C-407E-A947-70E740481C1C}">
-                <a14:useLocalDpi xmlns:a14="http://schemas.microsoft.com/office/drawing/2010/main"/>
-              </a:ext>
-            </a:extLst>
-          </a:blip>
-          <a:stretch>
-            <a:fillRect/>
-          </a:stretch>
-        </p:blipFill>
-        <p:spPr>
-          <a:xfrm>
-            <a:off x="4191000" y="0"/>
-            <a:ext cx="7765662" cy="16476125"/>
-          </a:xfrm>
-          <a:prstGeom prst="rect">
-            <a:avLst/>
-          </a:prstGeom>
-        </p:spPr>
-      </p:pic>
+              <a:rPr lang="en-US" dirty="0"/>
+              <a:t>&lt;caption&gt; is the title of the </a:t>
+            </a:r>
+            <a:r>
+              <a:rPr lang="en-US" dirty="0" smtClean="0"/>
+              <a:t>table</a:t>
+            </a:r>
+          </a:p>
+          <a:p>
+            <a:r>
+              <a:rPr lang="en-US" dirty="0"/>
+              <a:t>&lt;details&gt; shows additional details a user can view or hide on demand</a:t>
+            </a:r>
+          </a:p>
+          <a:p>
+            <a:r>
+              <a:rPr lang="en-US" dirty="0"/>
+              <a:t>&lt;summary&gt; is announced before the real table data is read by a screen reader</a:t>
+            </a:r>
+          </a:p>
+          <a:p>
+            <a:r>
+              <a:rPr lang="en-US" dirty="0"/>
+              <a:t>&lt;</a:t>
+            </a:r>
+            <a:r>
+              <a:rPr lang="en-US" dirty="0" err="1"/>
+              <a:t>thead</a:t>
+            </a:r>
+            <a:r>
+              <a:rPr lang="en-US" dirty="0"/>
+              <a:t>&gt; indicates the table header row</a:t>
+            </a:r>
+          </a:p>
+          <a:p>
+            <a:r>
+              <a:rPr lang="en-US" dirty="0"/>
+              <a:t>&lt;</a:t>
+            </a:r>
+            <a:r>
+              <a:rPr lang="en-US" dirty="0" err="1"/>
+              <a:t>tfoot</a:t>
+            </a:r>
+            <a:r>
+              <a:rPr lang="en-US" dirty="0"/>
+              <a:t>&gt; indicates the table footer row</a:t>
+            </a:r>
+          </a:p>
+          <a:p>
+            <a:r>
+              <a:rPr lang="en-US" dirty="0" smtClean="0">
+                <a:hlinkClick r:id="rId6"/>
+              </a:rPr>
+              <a:t>HTML 5 Demo</a:t>
+            </a:r>
+            <a:endParaRPr lang="en-US" dirty="0" smtClean="0"/>
+          </a:p>
+          <a:p>
+            <a:r>
+              <a:rPr lang="en-US" dirty="0" smtClean="0">
+                <a:hlinkClick r:id="rId7"/>
+              </a:rPr>
+              <a:t>Live Demo</a:t>
+            </a:r>
+            <a:endParaRPr lang="en-US" dirty="0"/>
+          </a:p>
+          <a:p>
+            <a:pPr lvl="1"/>
+            <a:endParaRPr lang="en-US" dirty="0" smtClean="0"/>
+          </a:p>
+        </p:txBody>
+      </p:sp>
     </p:spTree>
+    <p:custDataLst>
+      <p:tags r:id="rId1"/>
+    </p:custDataLst>
     <p:extLst>
       <p:ext uri="{BB962C8B-B14F-4D97-AF65-F5344CB8AC3E}">
-        <p14:creationId xmlns:p14="http://schemas.microsoft.com/office/powerpoint/2010/main" val="107946701"/>
+        <p14:creationId xmlns:p14="http://schemas.microsoft.com/office/powerpoint/2010/main" val="1336114565"/>
       </p:ext>
     </p:extLst>
   </p:cSld>
@@ -10268,7 +11534,7 @@
     <a:masterClrMapping/>
   </p:clrMapOvr>
   <p:transition spd="slow">
-    <p:fade/>
+    <p:wipe dir="d"/>
   </p:transition>
   <p:timing>
     <p:tnLst>
@@ -10280,107 +11546,7 @@
 </p:sld>
 </file>
 
-<file path=ppt/slides/slide3.xml><?xml version="1.0" encoding="utf-8"?>
-<p:sld xmlns:a="http://schemas.openxmlformats.org/drawingml/2006/main" xmlns:r="http://schemas.openxmlformats.org/officeDocument/2006/relationships" xmlns:p="http://schemas.openxmlformats.org/presentationml/2006/main">
-  <p:cSld>
-    <p:spTree>
-      <p:nvGrpSpPr>
-        <p:cNvPr id="1" name=""/>
-        <p:cNvGrpSpPr/>
-        <p:nvPr/>
-      </p:nvGrpSpPr>
-      <p:grpSpPr>
-        <a:xfrm>
-          <a:off x="0" y="0"/>
-          <a:ext cx="0" cy="0"/>
-          <a:chOff x="0" y="0"/>
-          <a:chExt cx="0" cy="0"/>
-        </a:xfrm>
-      </p:grpSpPr>
-      <p:sp>
-        <p:nvSpPr>
-          <p:cNvPr id="7" name="TextBox 6"/>
-          <p:cNvSpPr txBox="1"/>
-          <p:nvPr/>
-        </p:nvSpPr>
-        <p:spPr>
-          <a:xfrm>
-            <a:off x="1295400" y="2363450"/>
-            <a:ext cx="6781800" cy="3808750"/>
-          </a:xfrm>
-          <a:prstGeom prst="rect">
-            <a:avLst/>
-          </a:prstGeom>
-          <a:noFill/>
-        </p:spPr>
-        <p:txBody>
-          <a:bodyPr wrap="square" rtlCol="0">
-            <a:normAutofit/>
-          </a:bodyPr>
-          <a:lstStyle/>
-          <a:p>
-            <a:r>
-              <a:rPr lang="en-US" sz="7200" dirty="0" smtClean="0"/>
-              <a:t>WAI ARIA</a:t>
-            </a:r>
-            <a:endParaRPr lang="en-US" sz="7200" dirty="0"/>
-          </a:p>
-        </p:txBody>
-      </p:sp>
-      <p:pic>
-        <p:nvPicPr>
-          <p:cNvPr id="12" name="Picture 11"/>
-          <p:cNvPicPr>
-            <a:picLocks noChangeAspect="1"/>
-          </p:cNvPicPr>
-          <p:nvPr/>
-        </p:nvPicPr>
-        <p:blipFill>
-          <a:blip r:embed="rId3" cstate="email">
-            <a:extLst>
-              <a:ext uri="{28A0092B-C50C-407E-A947-70E740481C1C}">
-                <a14:useLocalDpi xmlns:a14="http://schemas.microsoft.com/office/drawing/2010/main"/>
-              </a:ext>
-            </a:extLst>
-          </a:blip>
-          <a:stretch>
-            <a:fillRect/>
-          </a:stretch>
-        </p:blipFill>
-        <p:spPr>
-          <a:xfrm>
-            <a:off x="4191000" y="0"/>
-            <a:ext cx="7765662" cy="16476125"/>
-          </a:xfrm>
-          <a:prstGeom prst="rect">
-            <a:avLst/>
-          </a:prstGeom>
-        </p:spPr>
-      </p:pic>
-    </p:spTree>
-    <p:extLst>
-      <p:ext uri="{BB962C8B-B14F-4D97-AF65-F5344CB8AC3E}">
-        <p14:creationId xmlns:p14="http://schemas.microsoft.com/office/powerpoint/2010/main" val="4261066294"/>
-      </p:ext>
-    </p:extLst>
-  </p:cSld>
-  <p:clrMapOvr>
-    <a:masterClrMapping/>
-  </p:clrMapOvr>
-  <p:transition spd="slow">
-    <p:fade/>
-  </p:transition>
-  <p:timing>
-    <p:tnLst>
-      <p:par>
-        <p:cTn id="1" dur="indefinite" restart="never" nodeType="tmRoot"/>
-      </p:par>
-    </p:tnLst>
-  </p:timing>
-</p:sld>
-</file>
-
-<file path=ppt/slides/slide30.xml><?xml version="1.0" encoding="utf-8"?>
+<file path=ppt/slides/slide35.xml><?xml version="1.0" encoding="utf-8"?>
 <p:sld xmlns:a="http://schemas.openxmlformats.org/drawingml/2006/main" xmlns:r="http://schemas.openxmlformats.org/officeDocument/2006/relationships" xmlns:p="http://schemas.openxmlformats.org/presentationml/2006/main">
   <p:cSld>
     <p:spTree>
@@ -10486,7 +11652,7 @@
 </p:sld>
 </file>
 
-<file path=ppt/slides/slide31.xml><?xml version="1.0" encoding="utf-8"?>
+<file path=ppt/slides/slide36.xml><?xml version="1.0" encoding="utf-8"?>
 <p:sld xmlns:a="http://schemas.openxmlformats.org/drawingml/2006/main" xmlns:r="http://schemas.openxmlformats.org/officeDocument/2006/relationships" xmlns:p="http://schemas.openxmlformats.org/presentationml/2006/main">
   <p:cSld>
     <p:spTree>
@@ -10545,7 +11711,7 @@
         <p:spPr/>
         <p:txBody>
           <a:bodyPr>
-            <a:normAutofit fontScale="92500" lnSpcReduction="20000"/>
+            <a:normAutofit fontScale="85000" lnSpcReduction="20000"/>
           </a:bodyPr>
           <a:lstStyle/>
           <a:p>
@@ -10635,6 +11801,15 @@
               <a:rPr lang="en-US" dirty="0" err="1" smtClean="0"/>
               <a:t>onChange</a:t>
             </a:r>
+            <a:endParaRPr lang="en-US" dirty="0" smtClean="0"/>
+          </a:p>
+          <a:p>
+            <a:r>
+              <a:rPr lang="en-US" dirty="0" smtClean="0"/>
+              <a:t>Do not use mouse specific event handler only</a:t>
+            </a:r>
+          </a:p>
+          <a:p>
             <a:endParaRPr lang="en-US" dirty="0" smtClean="0"/>
           </a:p>
         </p:txBody>
@@ -10665,7 +11840,7 @@
 </p:sld>
 </file>
 
-<file path=ppt/slides/slide32.xml><?xml version="1.0" encoding="utf-8"?>
+<file path=ppt/slides/slide37.xml><?xml version="1.0" encoding="utf-8"?>
 <p:sld xmlns:a="http://schemas.openxmlformats.org/drawingml/2006/main" xmlns:r="http://schemas.openxmlformats.org/officeDocument/2006/relationships" xmlns:p="http://schemas.openxmlformats.org/presentationml/2006/main">
   <p:cSld>
     <p:spTree>
@@ -10684,6 +11859,232 @@
       </p:grpSpPr>
       <p:sp>
         <p:nvSpPr>
+          <p:cNvPr id="7" name="TextBox 6"/>
+          <p:cNvSpPr txBox="1"/>
+          <p:nvPr/>
+        </p:nvSpPr>
+        <p:spPr>
+          <a:xfrm>
+            <a:off x="3276600" y="2087940"/>
+            <a:ext cx="5206554" cy="3855660"/>
+          </a:xfrm>
+          <a:prstGeom prst="rect">
+            <a:avLst/>
+          </a:prstGeom>
+          <a:noFill/>
+        </p:spPr>
+        <p:txBody>
+          <a:bodyPr wrap="square" rtlCol="0">
+            <a:normAutofit/>
+          </a:bodyPr>
+          <a:lstStyle/>
+          <a:p>
+            <a:r>
+              <a:rPr lang="en-US" sz="7200" dirty="0" smtClean="0">
+                <a:solidFill>
+                  <a:prstClr val="black"/>
+                </a:solidFill>
+              </a:rPr>
+              <a:t>Simple Component from Scratch</a:t>
+            </a:r>
+            <a:endParaRPr lang="en-US" sz="7200" dirty="0">
+              <a:solidFill>
+                <a:prstClr val="black"/>
+              </a:solidFill>
+            </a:endParaRPr>
+          </a:p>
+        </p:txBody>
+      </p:sp>
+      <p:pic>
+        <p:nvPicPr>
+          <p:cNvPr id="9" name="Picture 8"/>
+          <p:cNvPicPr>
+            <a:picLocks noChangeAspect="1"/>
+          </p:cNvPicPr>
+          <p:nvPr/>
+        </p:nvPicPr>
+        <p:blipFill>
+          <a:blip r:embed="rId3" cstate="email">
+            <a:extLst>
+              <a:ext uri="{28A0092B-C50C-407E-A947-70E740481C1C}">
+                <a14:useLocalDpi xmlns:a14="http://schemas.microsoft.com/office/drawing/2010/main"/>
+              </a:ext>
+            </a:extLst>
+          </a:blip>
+          <a:stretch>
+            <a:fillRect/>
+          </a:stretch>
+        </p:blipFill>
+        <p:spPr>
+          <a:xfrm>
+            <a:off x="-4953000" y="0"/>
+            <a:ext cx="7765662" cy="16476125"/>
+          </a:xfrm>
+          <a:prstGeom prst="rect">
+            <a:avLst/>
+          </a:prstGeom>
+        </p:spPr>
+      </p:pic>
+    </p:spTree>
+    <p:extLst>
+      <p:ext uri="{BB962C8B-B14F-4D97-AF65-F5344CB8AC3E}">
+        <p14:creationId xmlns:p14="http://schemas.microsoft.com/office/powerpoint/2010/main" val="3319574539"/>
+      </p:ext>
+    </p:extLst>
+  </p:cSld>
+  <p:clrMapOvr>
+    <a:masterClrMapping/>
+  </p:clrMapOvr>
+  <p:transition spd="slow">
+    <p:push/>
+  </p:transition>
+  <p:timing>
+    <p:tnLst>
+      <p:par>
+        <p:cTn id="1" dur="indefinite" restart="never" nodeType="tmRoot"/>
+      </p:par>
+    </p:tnLst>
+  </p:timing>
+</p:sld>
+</file>
+
+<file path=ppt/slides/slide38.xml><?xml version="1.0" encoding="utf-8"?>
+<p:sld xmlns:a="http://schemas.openxmlformats.org/drawingml/2006/main" xmlns:r="http://schemas.openxmlformats.org/officeDocument/2006/relationships" xmlns:p="http://schemas.openxmlformats.org/presentationml/2006/main">
+  <p:cSld>
+    <p:spTree>
+      <p:nvGrpSpPr>
+        <p:cNvPr id="1" name=""/>
+        <p:cNvGrpSpPr/>
+        <p:nvPr/>
+      </p:nvGrpSpPr>
+      <p:grpSpPr>
+        <a:xfrm>
+          <a:off x="0" y="0"/>
+          <a:ext cx="0" cy="0"/>
+          <a:chOff x="0" y="0"/>
+          <a:chExt cx="0" cy="0"/>
+        </a:xfrm>
+      </p:grpSpPr>
+      <p:sp>
+        <p:nvSpPr>
+          <p:cNvPr id="2" name="Title 1"/>
+          <p:cNvSpPr>
+            <a:spLocks noGrp="1"/>
+          </p:cNvSpPr>
+          <p:nvPr>
+            <p:ph type="title"/>
+          </p:nvPr>
+        </p:nvSpPr>
+        <p:spPr/>
+        <p:txBody>
+          <a:bodyPr/>
+          <a:lstStyle/>
+          <a:p>
+            <a:r>
+              <a:rPr lang="en-US" dirty="0" smtClean="0"/>
+              <a:t>Accessible friendly Frameworks</a:t>
+            </a:r>
+            <a:endParaRPr lang="en-US" dirty="0"/>
+          </a:p>
+        </p:txBody>
+      </p:sp>
+      <p:sp>
+        <p:nvSpPr>
+          <p:cNvPr id="3" name="Content Placeholder 2"/>
+          <p:cNvSpPr>
+            <a:spLocks noGrp="1"/>
+          </p:cNvSpPr>
+          <p:nvPr>
+            <p:ph idx="1"/>
+          </p:nvPr>
+        </p:nvSpPr>
+        <p:spPr/>
+        <p:txBody>
+          <a:bodyPr/>
+          <a:lstStyle/>
+          <a:p>
+            <a:r>
+              <a:rPr lang="en-US" dirty="0" err="1" smtClean="0"/>
+              <a:t>Jquery</a:t>
+            </a:r>
+            <a:r>
+              <a:rPr lang="en-US" dirty="0" smtClean="0"/>
+              <a:t> UI - </a:t>
+            </a:r>
+            <a:r>
+              <a:rPr lang="en-US" dirty="0" smtClean="0">
+                <a:hlinkClick r:id="rId2"/>
+              </a:rPr>
+              <a:t>Inaccessible</a:t>
+            </a:r>
+            <a:r>
+              <a:rPr lang="en-US" dirty="0" smtClean="0"/>
+              <a:t> </a:t>
+            </a:r>
+            <a:r>
+              <a:rPr lang="en-US" dirty="0" smtClean="0">
+                <a:hlinkClick r:id="rId3"/>
+              </a:rPr>
+              <a:t>Accessible</a:t>
+            </a:r>
+            <a:endParaRPr lang="en-US" dirty="0" smtClean="0"/>
+          </a:p>
+          <a:p>
+            <a:r>
+              <a:rPr lang="en-US" dirty="0" smtClean="0"/>
+              <a:t>Dojo Toolkit</a:t>
+            </a:r>
+          </a:p>
+          <a:p>
+            <a:r>
+              <a:rPr lang="en-US" dirty="0" smtClean="0"/>
+              <a:t>Bootstrap</a:t>
+            </a:r>
+          </a:p>
+          <a:p>
+            <a:r>
+              <a:rPr lang="en-US" dirty="0" smtClean="0"/>
+              <a:t>YUI</a:t>
+            </a:r>
+            <a:endParaRPr lang="en-US" dirty="0"/>
+          </a:p>
+        </p:txBody>
+      </p:sp>
+    </p:spTree>
+    <p:extLst>
+      <p:ext uri="{BB962C8B-B14F-4D97-AF65-F5344CB8AC3E}">
+        <p14:creationId xmlns:p14="http://schemas.microsoft.com/office/powerpoint/2010/main" val="832094830"/>
+      </p:ext>
+    </p:extLst>
+  </p:cSld>
+  <p:clrMapOvr>
+    <a:masterClrMapping/>
+  </p:clrMapOvr>
+  <p:transition spd="slow">
+    <p:wipe dir="d"/>
+  </p:transition>
+</p:sld>
+</file>
+
+<file path=ppt/slides/slide39.xml><?xml version="1.0" encoding="utf-8"?>
+<p:sld xmlns:a="http://schemas.openxmlformats.org/drawingml/2006/main" xmlns:r="http://schemas.openxmlformats.org/officeDocument/2006/relationships" xmlns:p="http://schemas.openxmlformats.org/presentationml/2006/main">
+  <p:cSld>
+    <p:spTree>
+      <p:nvGrpSpPr>
+        <p:cNvPr id="1" name=""/>
+        <p:cNvGrpSpPr/>
+        <p:nvPr/>
+      </p:nvGrpSpPr>
+      <p:grpSpPr>
+        <a:xfrm>
+          <a:off x="0" y="0"/>
+          <a:ext cx="0" cy="0"/>
+          <a:chOff x="0" y="0"/>
+          <a:chExt cx="0" cy="0"/>
+        </a:xfrm>
+      </p:grpSpPr>
+      <p:sp>
+        <p:nvSpPr>
           <p:cNvPr id="2" name="Title 1"/>
           <p:cNvSpPr>
             <a:spLocks noGrp="1"/>
@@ -10724,7 +12125,7 @@
         <p:spPr/>
         <p:txBody>
           <a:bodyPr>
-            <a:normAutofit/>
+            <a:normAutofit fontScale="92500"/>
           </a:bodyPr>
           <a:lstStyle/>
           <a:p>
@@ -10732,6 +12133,19 @@
               <a:rPr lang="en-US" dirty="0" smtClean="0"/>
               <a:t>Keyboard access is bed rock</a:t>
             </a:r>
+          </a:p>
+          <a:p>
+            <a:r>
+              <a:rPr lang="en-US" dirty="0" smtClean="0"/>
+              <a:t>Test fly out menu from keyboard. </a:t>
+            </a:r>
+            <a:r>
+              <a:rPr lang="en-US" dirty="0" smtClean="0">
+                <a:hlinkClick r:id="rId6"/>
+              </a:rPr>
+              <a:t>Example</a:t>
+            </a:r>
+            <a:endParaRPr lang="en-US" dirty="0" smtClean="0"/>
           </a:p>
           <a:p>
             <a:r>
@@ -10740,8 +12154,56 @@
             </a:r>
             <a:r>
               <a:rPr lang="en-US" dirty="0" smtClean="0"/>
-              <a:t> event misuse</a:t>
-            </a:r>
+              <a:t> event misuse – don’t change the context</a:t>
+            </a:r>
+          </a:p>
+          <a:p>
+            <a:r>
+              <a:rPr lang="en-US" dirty="0" smtClean="0"/>
+              <a:t>Don’t </a:t>
+            </a:r>
+            <a:r>
+              <a:rPr lang="en-US" dirty="0"/>
+              <a:t>map mouse coordinate with event </a:t>
+            </a:r>
+            <a:r>
+              <a:rPr lang="en-US" dirty="0" smtClean="0"/>
+              <a:t>handler</a:t>
+            </a:r>
+          </a:p>
+          <a:p>
+            <a:r>
+              <a:rPr lang="en-US" dirty="0"/>
+              <a:t>Use accessible </a:t>
+            </a:r>
+            <a:r>
+              <a:rPr lang="en-US" dirty="0" err="1"/>
+              <a:t>ajax</a:t>
+            </a:r>
+            <a:r>
+              <a:rPr lang="en-US" dirty="0"/>
+              <a:t> component - </a:t>
+            </a:r>
+            <a:r>
+              <a:rPr lang="en-US" dirty="0" smtClean="0">
+                <a:hlinkClick r:id="rId7"/>
+              </a:rPr>
+              <a:t>Auto complete</a:t>
+            </a:r>
+            <a:endParaRPr lang="en-US" dirty="0" smtClean="0"/>
+          </a:p>
+          <a:p>
+            <a:r>
+              <a:rPr lang="en-US" dirty="0" smtClean="0"/>
+              <a:t>Ajax example and concept of live region - </a:t>
+            </a:r>
+            <a:r>
+              <a:rPr lang="en-US" dirty="0">
+                <a:hlinkClick r:id="rId8"/>
+              </a:rPr>
+              <a:t>http://test.cita.illinois.edu/aria/live/live1.php</a:t>
+            </a:r>
+            <a:endParaRPr lang="en-US" dirty="0" smtClean="0"/>
           </a:p>
           <a:p>
             <a:pPr lvl="1"/>
@@ -10775,7 +12237,117 @@
 </p:sld>
 </file>
 
-<file path=ppt/slides/slide33.xml><?xml version="1.0" encoding="utf-8"?>
+<file path=ppt/slides/slide4.xml><?xml version="1.0" encoding="utf-8"?>
+<p:sld xmlns:a="http://schemas.openxmlformats.org/drawingml/2006/main" xmlns:r="http://schemas.openxmlformats.org/officeDocument/2006/relationships" xmlns:p="http://schemas.openxmlformats.org/presentationml/2006/main">
+  <p:cSld>
+    <p:spTree>
+      <p:nvGrpSpPr>
+        <p:cNvPr id="1" name=""/>
+        <p:cNvGrpSpPr/>
+        <p:nvPr/>
+      </p:nvGrpSpPr>
+      <p:grpSpPr>
+        <a:xfrm>
+          <a:off x="0" y="0"/>
+          <a:ext cx="0" cy="0"/>
+          <a:chOff x="0" y="0"/>
+          <a:chExt cx="0" cy="0"/>
+        </a:xfrm>
+      </p:grpSpPr>
+      <p:sp>
+        <p:nvSpPr>
+          <p:cNvPr id="2" name="Title 1"/>
+          <p:cNvSpPr>
+            <a:spLocks noGrp="1"/>
+          </p:cNvSpPr>
+          <p:nvPr>
+            <p:ph type="title"/>
+            <p:custDataLst>
+              <p:tags r:id="rId2"/>
+            </p:custDataLst>
+          </p:nvPr>
+        </p:nvSpPr>
+        <p:spPr/>
+        <p:txBody>
+          <a:bodyPr>
+            <a:normAutofit/>
+          </a:bodyPr>
+          <a:lstStyle/>
+          <a:p>
+            <a:r>
+              <a:rPr lang="en-US" dirty="0" smtClean="0"/>
+              <a:t>Why we needed ARIA?</a:t>
+            </a:r>
+            <a:endParaRPr lang="en-US" dirty="0"/>
+          </a:p>
+        </p:txBody>
+      </p:sp>
+      <p:sp>
+        <p:nvSpPr>
+          <p:cNvPr id="5" name="Content Placeholder 4"/>
+          <p:cNvSpPr>
+            <a:spLocks noGrp="1"/>
+          </p:cNvSpPr>
+          <p:nvPr>
+            <p:ph idx="1"/>
+            <p:custDataLst>
+              <p:tags r:id="rId3"/>
+            </p:custDataLst>
+          </p:nvPr>
+        </p:nvSpPr>
+        <p:spPr/>
+        <p:txBody>
+          <a:bodyPr>
+            <a:normAutofit/>
+          </a:bodyPr>
+          <a:lstStyle/>
+          <a:p>
+            <a:r>
+              <a:rPr lang="en-US" dirty="0" smtClean="0"/>
+              <a:t>Generic HTML 4 tags</a:t>
+            </a:r>
+          </a:p>
+          <a:p>
+            <a:r>
+              <a:rPr lang="en-US" dirty="0" smtClean="0"/>
+              <a:t>Custom JS Components</a:t>
+            </a:r>
+          </a:p>
+          <a:p>
+            <a:r>
+              <a:rPr lang="en-US" dirty="0" smtClean="0"/>
+              <a:t>AJAX components</a:t>
+            </a:r>
+          </a:p>
+        </p:txBody>
+      </p:sp>
+    </p:spTree>
+    <p:custDataLst>
+      <p:tags r:id="rId1"/>
+    </p:custDataLst>
+    <p:extLst>
+      <p:ext uri="{BB962C8B-B14F-4D97-AF65-F5344CB8AC3E}">
+        <p14:creationId xmlns:p14="http://schemas.microsoft.com/office/powerpoint/2010/main" val="280796424"/>
+      </p:ext>
+    </p:extLst>
+  </p:cSld>
+  <p:clrMapOvr>
+    <a:masterClrMapping/>
+  </p:clrMapOvr>
+  <p:transition spd="slow">
+    <p:wipe dir="d"/>
+  </p:transition>
+  <p:timing>
+    <p:tnLst>
+      <p:par>
+        <p:cTn id="1" dur="indefinite" restart="never" nodeType="tmRoot"/>
+      </p:par>
+    </p:tnLst>
+  </p:timing>
+</p:sld>
+</file>
+
+<file path=ppt/slides/slide40.xml><?xml version="1.0" encoding="utf-8"?>
 <p:sld xmlns:a="http://schemas.openxmlformats.org/drawingml/2006/main" xmlns:r="http://schemas.openxmlformats.org/officeDocument/2006/relationships" xmlns:p="http://schemas.openxmlformats.org/presentationml/2006/main">
   <p:cSld>
     <p:spTree>
@@ -10878,7 +12450,7 @@
 </p:sld>
 </file>
 
-<file path=ppt/slides/slide34.xml><?xml version="1.0" encoding="utf-8"?>
+<file path=ppt/slides/slide41.xml><?xml version="1.0" encoding="utf-8"?>
 <p:sld xmlns:a="http://schemas.openxmlformats.org/drawingml/2006/main" xmlns:r="http://schemas.openxmlformats.org/officeDocument/2006/relationships" xmlns:p="http://schemas.openxmlformats.org/presentationml/2006/main">
   <p:cSld>
     <p:spTree>
@@ -10946,7 +12518,7 @@
 </p:sld>
 </file>
 
-<file path=ppt/slides/slide4.xml><?xml version="1.0" encoding="utf-8"?>
+<file path=ppt/slides/slide5.xml><?xml version="1.0" encoding="utf-8"?>
 <p:sld xmlns:a="http://schemas.openxmlformats.org/drawingml/2006/main" xmlns:r="http://schemas.openxmlformats.org/officeDocument/2006/relationships" xmlns:p="http://schemas.openxmlformats.org/presentationml/2006/main">
   <p:cSld>
     <p:spTree>
@@ -11007,26 +12579,47 @@
         <p:spPr/>
         <p:txBody>
           <a:bodyPr>
-            <a:normAutofit/>
+            <a:normAutofit lnSpcReduction="10000"/>
           </a:bodyPr>
           <a:lstStyle/>
           <a:p>
             <a:r>
               <a:rPr lang="en-US" dirty="0" smtClean="0"/>
-              <a:t>HTML 4 tags like div represent logical unit but has no semantic or meaningful information associated with them</a:t>
-            </a:r>
-          </a:p>
-          <a:p>
-            <a:r>
-              <a:rPr lang="en-US" dirty="0" smtClean="0"/>
-              <a:t>For AT is no way to identify whether div represent header, footer, navigation or some content - Demo</a:t>
-            </a:r>
-          </a:p>
-          <a:p>
-            <a:r>
-              <a:rPr lang="en-US" dirty="0" smtClean="0"/>
-              <a:t>Similarly tables can represent tabular data as well as layout - Demo</a:t>
-            </a:r>
+              <a:t>HTML 4 tags like div represent logical unit but has no semantic or meaningful information associated with them – </a:t>
+            </a:r>
+            <a:r>
+              <a:rPr lang="en-US" dirty="0" smtClean="0">
+                <a:hlinkClick r:id="rId6"/>
+              </a:rPr>
+              <a:t>Example markup</a:t>
+            </a:r>
+            <a:endParaRPr lang="en-US" dirty="0" smtClean="0"/>
+          </a:p>
+          <a:p>
+            <a:r>
+              <a:rPr lang="en-US" dirty="0" smtClean="0"/>
+              <a:t>For AT, there is no way to identify whether div represent header, footer, navigation or some content – Demo - </a:t>
+            </a:r>
+            <a:r>
+              <a:rPr lang="en-US" dirty="0" err="1" smtClean="0">
+                <a:hlinkClick r:id="rId7"/>
+              </a:rPr>
+              <a:t>Airtel</a:t>
+            </a:r>
+            <a:endParaRPr lang="en-US" dirty="0" smtClean="0"/>
+          </a:p>
+          <a:p>
+            <a:r>
+              <a:rPr lang="en-US" dirty="0" smtClean="0"/>
+              <a:t>Similarly tables can represent tabular data as well as layout – Demo – </a:t>
+            </a:r>
+            <a:r>
+              <a:rPr lang="en-US" dirty="0" smtClean="0">
+                <a:hlinkClick r:id="rId8"/>
+              </a:rPr>
+              <a:t>Reliance Communication</a:t>
+            </a:r>
+            <a:endParaRPr lang="en-US" dirty="0" smtClean="0"/>
           </a:p>
         </p:txBody>
       </p:sp>
@@ -11036,7 +12629,7 @@
     </p:custDataLst>
     <p:extLst>
       <p:ext uri="{BB962C8B-B14F-4D97-AF65-F5344CB8AC3E}">
-        <p14:creationId xmlns:p14="http://schemas.microsoft.com/office/powerpoint/2010/main" val="280796424"/>
+        <p14:creationId xmlns:p14="http://schemas.microsoft.com/office/powerpoint/2010/main" val="3446742686"/>
       </p:ext>
     </p:extLst>
   </p:cSld>
@@ -11056,7 +12649,7 @@
 </p:sld>
 </file>
 
-<file path=ppt/slides/slide5.xml><?xml version="1.0" encoding="utf-8"?>
+<file path=ppt/slides/slide6.xml><?xml version="1.0" encoding="utf-8"?>
 <p:sld xmlns:a="http://schemas.openxmlformats.org/drawingml/2006/main" xmlns:r="http://schemas.openxmlformats.org/officeDocument/2006/relationships" xmlns:p="http://schemas.openxmlformats.org/presentationml/2006/main">
   <p:cSld>
     <p:spTree>
@@ -11095,7 +12688,7 @@
           <a:p>
             <a:r>
               <a:rPr lang="en-US" dirty="0" smtClean="0"/>
-              <a:t>Java Script Components</a:t>
+              <a:t>Java Script Custom Components</a:t>
             </a:r>
             <a:endParaRPr lang="en-US" dirty="0"/>
           </a:p>
@@ -11117,7 +12710,7 @@
         <p:spPr/>
         <p:txBody>
           <a:bodyPr>
-            <a:normAutofit/>
+            <a:normAutofit lnSpcReduction="10000"/>
           </a:bodyPr>
           <a:lstStyle/>
           <a:p>
@@ -11144,6 +12737,19 @@
               <a:rPr lang="en-US" dirty="0" smtClean="0"/>
               <a:t>But there was no standard way to make these components accessible</a:t>
             </a:r>
+          </a:p>
+          <a:p>
+            <a:r>
+              <a:rPr lang="en-US" dirty="0" smtClean="0"/>
+              <a:t>Demo – </a:t>
+            </a:r>
+            <a:r>
+              <a:rPr lang="en-US" dirty="0" smtClean="0">
+                <a:hlinkClick r:id="rId6"/>
+              </a:rPr>
+              <a:t>Inaccessible Tree</a:t>
+            </a:r>
+            <a:endParaRPr lang="en-US" dirty="0" smtClean="0"/>
           </a:p>
         </p:txBody>
       </p:sp>
@@ -11173,139 +12779,6 @@
 </p:sld>
 </file>
 
-<file path=ppt/slides/slide6.xml><?xml version="1.0" encoding="utf-8"?>
-<p:sld xmlns:a="http://schemas.openxmlformats.org/drawingml/2006/main" xmlns:r="http://schemas.openxmlformats.org/officeDocument/2006/relationships" xmlns:p="http://schemas.openxmlformats.org/presentationml/2006/main">
-  <p:cSld>
-    <p:spTree>
-      <p:nvGrpSpPr>
-        <p:cNvPr id="1" name=""/>
-        <p:cNvGrpSpPr/>
-        <p:nvPr/>
-      </p:nvGrpSpPr>
-      <p:grpSpPr>
-        <a:xfrm>
-          <a:off x="0" y="0"/>
-          <a:ext cx="0" cy="0"/>
-          <a:chOff x="0" y="0"/>
-          <a:chExt cx="0" cy="0"/>
-        </a:xfrm>
-      </p:grpSpPr>
-      <p:sp>
-        <p:nvSpPr>
-          <p:cNvPr id="2" name="Title 1"/>
-          <p:cNvSpPr>
-            <a:spLocks noGrp="1"/>
-          </p:cNvSpPr>
-          <p:nvPr>
-            <p:ph type="title"/>
-            <p:custDataLst>
-              <p:tags r:id="rId2"/>
-            </p:custDataLst>
-          </p:nvPr>
-        </p:nvSpPr>
-        <p:spPr/>
-        <p:txBody>
-          <a:bodyPr>
-            <a:normAutofit/>
-          </a:bodyPr>
-          <a:lstStyle/>
-          <a:p>
-            <a:r>
-              <a:rPr lang="en-US" dirty="0" smtClean="0"/>
-              <a:t>Any UI component is described by</a:t>
-            </a:r>
-            <a:endParaRPr lang="en-US" dirty="0"/>
-          </a:p>
-        </p:txBody>
-      </p:sp>
-      <p:sp>
-        <p:nvSpPr>
-          <p:cNvPr id="5" name="Content Placeholder 4"/>
-          <p:cNvSpPr>
-            <a:spLocks noGrp="1"/>
-          </p:cNvSpPr>
-          <p:nvPr>
-            <p:ph idx="1"/>
-            <p:custDataLst>
-              <p:tags r:id="rId3"/>
-            </p:custDataLst>
-          </p:nvPr>
-        </p:nvSpPr>
-        <p:spPr/>
-        <p:txBody>
-          <a:bodyPr>
-            <a:normAutofit lnSpcReduction="10000"/>
-          </a:bodyPr>
-          <a:lstStyle/>
-          <a:p>
-            <a:r>
-              <a:rPr lang="en-US" dirty="0" smtClean="0"/>
-              <a:t>Semantic meaning of element</a:t>
-            </a:r>
-          </a:p>
-          <a:p>
-            <a:r>
-              <a:rPr lang="en-US" dirty="0" smtClean="0"/>
-              <a:t>State of element – that can change, dynamic aspect of element</a:t>
-            </a:r>
-          </a:p>
-          <a:p>
-            <a:r>
-              <a:rPr lang="en-US" dirty="0"/>
-              <a:t>Properties of element </a:t>
-            </a:r>
-            <a:r>
-              <a:rPr lang="en-US" dirty="0" smtClean="0"/>
-              <a:t>– static aspect of element</a:t>
-            </a:r>
-          </a:p>
-          <a:p>
-            <a:pPr marL="0" indent="0" algn="ctr">
-              <a:buNone/>
-            </a:pPr>
-            <a:r>
-              <a:rPr lang="en-US" dirty="0" smtClean="0"/>
-              <a:t>Need some way to make above information available to AT</a:t>
-            </a:r>
-          </a:p>
-          <a:p>
-            <a:pPr marL="0" indent="0" algn="ctr">
-              <a:buNone/>
-            </a:pPr>
-            <a:r>
-              <a:rPr lang="en-US" dirty="0" smtClean="0"/>
-              <a:t>Demo – Slider &amp; Tree</a:t>
-            </a:r>
-            <a:endParaRPr lang="en-US" dirty="0"/>
-          </a:p>
-        </p:txBody>
-      </p:sp>
-    </p:spTree>
-    <p:custDataLst>
-      <p:tags r:id="rId1"/>
-    </p:custDataLst>
-    <p:extLst>
-      <p:ext uri="{BB962C8B-B14F-4D97-AF65-F5344CB8AC3E}">
-        <p14:creationId xmlns:p14="http://schemas.microsoft.com/office/powerpoint/2010/main" val="1484162117"/>
-      </p:ext>
-    </p:extLst>
-  </p:cSld>
-  <p:clrMapOvr>
-    <a:masterClrMapping/>
-  </p:clrMapOvr>
-  <p:transition spd="slow">
-    <p:wipe dir="d"/>
-  </p:transition>
-  <p:timing>
-    <p:tnLst>
-      <p:par>
-        <p:cTn id="1" dur="indefinite" restart="never" nodeType="tmRoot"/>
-      </p:par>
-    </p:tnLst>
-  </p:timing>
-</p:sld>
-</file>
-
 <file path=ppt/slides/slide7.xml><?xml version="1.0" encoding="utf-8"?>
 <p:sld xmlns:a="http://schemas.openxmlformats.org/drawingml/2006/main" xmlns:r="http://schemas.openxmlformats.org/officeDocument/2006/relationships" xmlns:p="http://schemas.openxmlformats.org/presentationml/2006/main">
   <p:cSld>
@@ -11373,20 +12846,47 @@
           <a:p>
             <a:r>
               <a:rPr lang="en-US" dirty="0" smtClean="0"/>
+              <a:t>Ajax update the DOM tree on the fly</a:t>
+            </a:r>
+          </a:p>
+          <a:p>
+            <a:pPr lvl="1"/>
+            <a:r>
+              <a:rPr lang="en-US" dirty="0" smtClean="0"/>
               <a:t>Auto Complete</a:t>
             </a:r>
           </a:p>
           <a:p>
-            <a:r>
-              <a:rPr lang="en-US" dirty="0" smtClean="0"/>
-              <a:t>Updating Contents of HTML dynamically</a:t>
-            </a:r>
-          </a:p>
-          <a:p>
-            <a:r>
-              <a:rPr lang="en-US" dirty="0" smtClean="0"/>
-              <a:t>Demo</a:t>
-            </a:r>
+            <a:pPr lvl="1"/>
+            <a:r>
+              <a:rPr lang="en-US" dirty="0" smtClean="0"/>
+              <a:t>Get search results from server</a:t>
+            </a:r>
+          </a:p>
+          <a:p>
+            <a:r>
+              <a:rPr lang="en-US" dirty="0" smtClean="0"/>
+              <a:t>Demo </a:t>
+            </a:r>
+            <a:r>
+              <a:rPr lang="en-US" dirty="0"/>
+              <a:t>- </a:t>
+            </a:r>
+            <a:r>
+              <a:rPr lang="en-US" dirty="0" smtClean="0">
+                <a:hlinkClick r:id="rId6"/>
+              </a:rPr>
+              <a:t>IRCTC</a:t>
+            </a:r>
+            <a:r>
+              <a:rPr lang="en-US" dirty="0" smtClean="0"/>
+              <a:t> </a:t>
+            </a:r>
+            <a:r>
+              <a:rPr lang="en-US" dirty="0"/>
+              <a:t>autocomplete</a:t>
+            </a:r>
+            <a:endParaRPr lang="en-US" dirty="0" smtClean="0"/>
           </a:p>
           <a:p>
             <a:endParaRPr lang="en-US" dirty="0"/>
@@ -11550,47 +13050,47 @@
       </p:grpSpPr>
       <p:sp>
         <p:nvSpPr>
-          <p:cNvPr id="2" name="Title 1"/>
-          <p:cNvSpPr>
-            <a:spLocks noGrp="1"/>
-          </p:cNvSpPr>
-          <p:nvPr>
-            <p:ph type="title"/>
-            <p:custDataLst>
-              <p:tags r:id="rId2"/>
-            </p:custDataLst>
-          </p:nvPr>
-        </p:nvSpPr>
-        <p:spPr/>
-        <p:txBody>
-          <a:bodyPr>
+          <p:cNvPr id="7" name="TextBox 6"/>
+          <p:cNvSpPr txBox="1"/>
+          <p:nvPr/>
+        </p:nvSpPr>
+        <p:spPr>
+          <a:xfrm>
+            <a:off x="1295400" y="2363450"/>
+            <a:ext cx="6781800" cy="3808750"/>
+          </a:xfrm>
+          <a:prstGeom prst="rect">
+            <a:avLst/>
+          </a:prstGeom>
+          <a:noFill/>
+        </p:spPr>
+        <p:txBody>
+          <a:bodyPr wrap="square" rtlCol="0">
             <a:normAutofit/>
           </a:bodyPr>
           <a:lstStyle/>
           <a:p>
             <a:r>
-              <a:rPr lang="en-US" dirty="0" smtClean="0"/>
-              <a:t>ARIA Architecture</a:t>
-            </a:r>
-            <a:endParaRPr lang="en-US" dirty="0"/>
+              <a:rPr lang="en-US" sz="7200" dirty="0" smtClean="0"/>
+              <a:t>Caution : ARIA is not fully supported</a:t>
+            </a:r>
+            <a:endParaRPr lang="en-US" sz="7200" dirty="0"/>
           </a:p>
         </p:txBody>
       </p:sp>
       <p:pic>
         <p:nvPicPr>
-          <p:cNvPr id="7" name="Content Placeholder 6"/>
+          <p:cNvPr id="12" name="Picture 11"/>
           <p:cNvPicPr>
-            <a:picLocks noGrp="1" noChangeAspect="1"/>
+            <a:picLocks noChangeAspect="1"/>
           </p:cNvPicPr>
-          <p:nvPr>
-            <p:ph idx="1"/>
-          </p:nvPr>
+          <p:nvPr/>
         </p:nvPicPr>
         <p:blipFill>
-          <a:blip r:embed="rId5">
+          <a:blip r:embed="rId3" cstate="email">
             <a:extLst>
               <a:ext uri="{28A0092B-C50C-407E-A947-70E740481C1C}">
-                <a14:useLocalDpi xmlns:a14="http://schemas.microsoft.com/office/drawing/2010/main" val="0"/>
+                <a14:useLocalDpi xmlns:a14="http://schemas.microsoft.com/office/drawing/2010/main"/>
               </a:ext>
             </a:extLst>
           </a:blip>
@@ -11600,18 +13100,18 @@
         </p:blipFill>
         <p:spPr>
           <a:xfrm>
-            <a:off x="3810000" y="1143000"/>
-            <a:ext cx="2743200" cy="5571242"/>
+            <a:off x="4191000" y="0"/>
+            <a:ext cx="7765662" cy="16476125"/>
           </a:xfrm>
+          <a:prstGeom prst="rect">
+            <a:avLst/>
+          </a:prstGeom>
         </p:spPr>
       </p:pic>
     </p:spTree>
-    <p:custDataLst>
-      <p:tags r:id="rId1"/>
-    </p:custDataLst>
     <p:extLst>
       <p:ext uri="{BB962C8B-B14F-4D97-AF65-F5344CB8AC3E}">
-        <p14:creationId xmlns:p14="http://schemas.microsoft.com/office/powerpoint/2010/main" val="3138792830"/>
+        <p14:creationId xmlns:p14="http://schemas.microsoft.com/office/powerpoint/2010/main" val="924355506"/>
       </p:ext>
     </p:extLst>
   </p:cSld>
@@ -11619,7 +13119,7 @@
     <a:masterClrMapping/>
   </p:clrMapOvr>
   <p:transition spd="slow">
-    <p:wipe dir="d"/>
+    <p:fade/>
   </p:transition>
   <p:timing>
     <p:tnLst>
@@ -12047,19 +13547,73 @@
 
 <file path=ppt/tags/tag72.xml><?xml version="1.0" encoding="utf-8"?>
 <p:tagLst xmlns:a="http://schemas.openxmlformats.org/drawingml/2006/main" xmlns:r="http://schemas.openxmlformats.org/officeDocument/2006/relationships" xmlns:p="http://schemas.openxmlformats.org/presentationml/2006/main">
-  <p:tag name="DVSECTIONID" val="ezdaKHeWyBnZyZ2cDqRSoa"/>
+  <p:tag name="DVSECTIONID" val="QUq8QELArFIgadhH063fpq"/>
 </p:tagLst>
 </file>
 
 <file path=ppt/tags/tag73.xml><?xml version="1.0" encoding="utf-8"?>
 <p:tagLst xmlns:a="http://schemas.openxmlformats.org/drawingml/2006/main" xmlns:r="http://schemas.openxmlformats.org/officeDocument/2006/relationships" xmlns:p="http://schemas.openxmlformats.org/presentationml/2006/main">
-  <p:tag name="DVSHAPEID" val="LRMR96J2MVd0CGe2e5htjk"/>
+  <p:tag name="DVSHAPEID" val="InkrlxYPS4jAzciXk8ToAM"/>
+</p:tagLst>
+</file>
+
+<file path=ppt/tags/tag74.xml><?xml version="1.0" encoding="utf-8"?>
+<p:tagLst xmlns:a="http://schemas.openxmlformats.org/drawingml/2006/main" xmlns:r="http://schemas.openxmlformats.org/officeDocument/2006/relationships" xmlns:p="http://schemas.openxmlformats.org/presentationml/2006/main">
+  <p:tag name="DVSHAPEID" val="retnMj4SFfqbVIhVK0Rf83"/>
+</p:tagLst>
+</file>
+
+<file path=ppt/tags/tag75.xml><?xml version="1.0" encoding="utf-8"?>
+<p:tagLst xmlns:a="http://schemas.openxmlformats.org/drawingml/2006/main" xmlns:r="http://schemas.openxmlformats.org/officeDocument/2006/relationships" xmlns:p="http://schemas.openxmlformats.org/presentationml/2006/main">
+  <p:tag name="DVSECTIONID" val="QUq8QELArFIgadhH063fpq"/>
+</p:tagLst>
+</file>
+
+<file path=ppt/tags/tag76.xml><?xml version="1.0" encoding="utf-8"?>
+<p:tagLst xmlns:a="http://schemas.openxmlformats.org/drawingml/2006/main" xmlns:r="http://schemas.openxmlformats.org/officeDocument/2006/relationships" xmlns:p="http://schemas.openxmlformats.org/presentationml/2006/main">
+  <p:tag name="DVSHAPEID" val="InkrlxYPS4jAzciXk8ToAM"/>
+</p:tagLst>
+</file>
+
+<file path=ppt/tags/tag77.xml><?xml version="1.0" encoding="utf-8"?>
+<p:tagLst xmlns:a="http://schemas.openxmlformats.org/drawingml/2006/main" xmlns:r="http://schemas.openxmlformats.org/officeDocument/2006/relationships" xmlns:p="http://schemas.openxmlformats.org/presentationml/2006/main">
+  <p:tag name="DVSHAPEID" val="retnMj4SFfqbVIhVK0Rf83"/>
+</p:tagLst>
+</file>
+
+<file path=ppt/tags/tag78.xml><?xml version="1.0" encoding="utf-8"?>
+<p:tagLst xmlns:a="http://schemas.openxmlformats.org/drawingml/2006/main" xmlns:r="http://schemas.openxmlformats.org/officeDocument/2006/relationships" xmlns:p="http://schemas.openxmlformats.org/presentationml/2006/main">
+  <p:tag name="DVSECTIONID" val="QUq8QELArFIgadhH063fpq"/>
+</p:tagLst>
+</file>
+
+<file path=ppt/tags/tag79.xml><?xml version="1.0" encoding="utf-8"?>
+<p:tagLst xmlns:a="http://schemas.openxmlformats.org/drawingml/2006/main" xmlns:r="http://schemas.openxmlformats.org/officeDocument/2006/relationships" xmlns:p="http://schemas.openxmlformats.org/presentationml/2006/main">
+  <p:tag name="DVSHAPEID" val="InkrlxYPS4jAzciXk8ToAM"/>
 </p:tagLst>
 </file>
 
 <file path=ppt/tags/tag8.xml><?xml version="1.0" encoding="utf-8"?>
 <p:tagLst xmlns:a="http://schemas.openxmlformats.org/drawingml/2006/main" xmlns:r="http://schemas.openxmlformats.org/officeDocument/2006/relationships" xmlns:p="http://schemas.openxmlformats.org/presentationml/2006/main">
   <p:tag name="DVSHAPEID" val="InkrlxYPS4jAzciXk8ToAM"/>
+</p:tagLst>
+</file>
+
+<file path=ppt/tags/tag80.xml><?xml version="1.0" encoding="utf-8"?>
+<p:tagLst xmlns:a="http://schemas.openxmlformats.org/drawingml/2006/main" xmlns:r="http://schemas.openxmlformats.org/officeDocument/2006/relationships" xmlns:p="http://schemas.openxmlformats.org/presentationml/2006/main">
+  <p:tag name="DVSHAPEID" val="retnMj4SFfqbVIhVK0Rf83"/>
+</p:tagLst>
+</file>
+
+<file path=ppt/tags/tag81.xml><?xml version="1.0" encoding="utf-8"?>
+<p:tagLst xmlns:a="http://schemas.openxmlformats.org/drawingml/2006/main" xmlns:r="http://schemas.openxmlformats.org/officeDocument/2006/relationships" xmlns:p="http://schemas.openxmlformats.org/presentationml/2006/main">
+  <p:tag name="DVSECTIONID" val="ezdaKHeWyBnZyZ2cDqRSoa"/>
+</p:tagLst>
+</file>
+
+<file path=ppt/tags/tag82.xml><?xml version="1.0" encoding="utf-8"?>
+<p:tagLst xmlns:a="http://schemas.openxmlformats.org/drawingml/2006/main" xmlns:r="http://schemas.openxmlformats.org/officeDocument/2006/relationships" xmlns:p="http://schemas.openxmlformats.org/presentationml/2006/main">
+  <p:tag name="DVSHAPEID" val="LRMR96J2MVd0CGe2e5htjk"/>
 </p:tagLst>
 </file>
 

</xml_diff>